<commit_message>
[update] sunum duzenlenmeye baslandi
</commit_message>
<xml_diff>
--- a/juri_sunum.pptx
+++ b/juri_sunum.pptx
@@ -5,17 +5,20 @@
     <p:sldMasterId id="2147483886" r:id="rId1"/>
   </p:sldMasterIdLst>
   <p:notesMasterIdLst>
-    <p:notesMasterId r:id="rId7"/>
+    <p:notesMasterId r:id="rId10"/>
   </p:notesMasterIdLst>
   <p:handoutMasterIdLst>
-    <p:handoutMasterId r:id="rId8"/>
+    <p:handoutMasterId r:id="rId11"/>
   </p:handoutMasterIdLst>
   <p:sldIdLst>
     <p:sldId id="299" r:id="rId2"/>
     <p:sldId id="300" r:id="rId3"/>
     <p:sldId id="301" r:id="rId4"/>
-    <p:sldId id="302" r:id="rId5"/>
-    <p:sldId id="303" r:id="rId6"/>
+    <p:sldId id="304" r:id="rId5"/>
+    <p:sldId id="306" r:id="rId6"/>
+    <p:sldId id="307" r:id="rId7"/>
+    <p:sldId id="305" r:id="rId8"/>
+    <p:sldId id="303" r:id="rId9"/>
   </p:sldIdLst>
   <p:sldSz cx="9144000" cy="6858000" type="screen4x3"/>
   <p:notesSz cx="6858000" cy="9144000"/>
@@ -146,7 +149,7 @@
   </p:defaultTextStyle>
   <p:extLst>
     <p:ext uri="{EFAFB233-063F-42B5-8137-9DF3F51BA10A}">
-      <p15:sldGuideLst xmlns="" xmlns:p15="http://schemas.microsoft.com/office/powerpoint/2012/main">
+      <p15:sldGuideLst xmlns:p15="http://schemas.microsoft.com/office/powerpoint/2012/main" xmlns="">
         <p15:guide id="1" orient="horz" pos="2160">
           <p15:clr>
             <a:srgbClr val="A4A3A4"/>
@@ -368,7 +371,7 @@
     </p:spTree>
     <p:extLst>
       <p:ext uri="{BB962C8B-B14F-4D97-AF65-F5344CB8AC3E}">
-        <p14:creationId xmlns:p14="http://schemas.microsoft.com/office/powerpoint/2010/main" xmlns="" val="2307124841"/>
+        <p14:creationId xmlns="" xmlns:p14="http://schemas.microsoft.com/office/powerpoint/2010/main" val="2307124841"/>
       </p:ext>
     </p:extLst>
   </p:cSld>
@@ -678,7 +681,7 @@
     </p:spTree>
     <p:extLst>
       <p:ext uri="{BB962C8B-B14F-4D97-AF65-F5344CB8AC3E}">
-        <p14:creationId xmlns:p14="http://schemas.microsoft.com/office/powerpoint/2010/main" xmlns="" val="733486758"/>
+        <p14:creationId xmlns="" xmlns:p14="http://schemas.microsoft.com/office/powerpoint/2010/main" val="733486758"/>
       </p:ext>
     </p:extLst>
   </p:cSld>
@@ -840,14 +843,14 @@
           <a:noFill/>
           <a:extLst>
             <a:ext uri="{909E8E84-426E-40DD-AFC4-6F175D3DCCD1}">
-              <a14:hiddenFill xmlns:a14="http://schemas.microsoft.com/office/drawing/2010/main" xmlns="">
+              <a14:hiddenFill xmlns="" xmlns:a14="http://schemas.microsoft.com/office/drawing/2010/main">
                 <a:solidFill>
                   <a:srgbClr val="FFFFFF"/>
                 </a:solidFill>
               </a14:hiddenFill>
             </a:ext>
             <a:ext uri="{91240B29-F687-4F45-9708-019B960494DF}">
-              <a14:hiddenLine xmlns:a14="http://schemas.microsoft.com/office/drawing/2010/main" xmlns="" w="9525">
+              <a14:hiddenLine xmlns="" xmlns:a14="http://schemas.microsoft.com/office/drawing/2010/main" w="9525">
                 <a:solidFill>
                   <a:srgbClr val="000000"/>
                 </a:solidFill>
@@ -994,7 +997,7 @@
           </a:ln>
           <a:extLst>
             <a:ext uri="{909E8E84-426E-40DD-AFC4-6F175D3DCCD1}">
-              <a14:hiddenFill xmlns:a14="http://schemas.microsoft.com/office/drawing/2010/main" xmlns="">
+              <a14:hiddenFill xmlns="" xmlns:a14="http://schemas.microsoft.com/office/drawing/2010/main">
                 <a:solidFill>
                   <a:srgbClr val="FFFFFF"/>
                 </a:solidFill>
@@ -1017,14 +1020,14 @@
           <a:noFill/>
           <a:extLst>
             <a:ext uri="{909E8E84-426E-40DD-AFC4-6F175D3DCCD1}">
-              <a14:hiddenFill xmlns:a14="http://schemas.microsoft.com/office/drawing/2010/main" xmlns="">
+              <a14:hiddenFill xmlns="" xmlns:a14="http://schemas.microsoft.com/office/drawing/2010/main">
                 <a:solidFill>
                   <a:srgbClr val="FFFFFF"/>
                 </a:solidFill>
               </a14:hiddenFill>
             </a:ext>
             <a:ext uri="{91240B29-F687-4F45-9708-019B960494DF}">
-              <a14:hiddenLine xmlns:a14="http://schemas.microsoft.com/office/drawing/2010/main" xmlns="" w="9525">
+              <a14:hiddenLine xmlns="" xmlns:a14="http://schemas.microsoft.com/office/drawing/2010/main" w="9525">
                 <a:solidFill>
                   <a:srgbClr val="000000"/>
                 </a:solidFill>
@@ -1059,7 +1062,7 @@
     </p:spTree>
     <p:extLst>
       <p:ext uri="{BB962C8B-B14F-4D97-AF65-F5344CB8AC3E}">
-        <p14:creationId xmlns:p14="http://schemas.microsoft.com/office/powerpoint/2010/main" xmlns="" val="1831345199"/>
+        <p14:creationId xmlns="" xmlns:p14="http://schemas.microsoft.com/office/powerpoint/2010/main" val="1831345199"/>
       </p:ext>
     </p:extLst>
   </p:cSld>
@@ -1098,7 +1101,7 @@
           <a:blip r:embed="rId2">
             <a:extLst>
               <a:ext uri="{28A0092B-C50C-407E-A947-70E740481C1C}">
-                <a14:useLocalDpi xmlns:a14="http://schemas.microsoft.com/office/drawing/2010/main" xmlns="" val="0"/>
+                <a14:useLocalDpi xmlns="" xmlns:a14="http://schemas.microsoft.com/office/drawing/2010/main" val="0"/>
               </a:ext>
             </a:extLst>
           </a:blip>
@@ -1121,14 +1124,14 @@
           </a:ln>
           <a:extLst>
             <a:ext uri="{909E8E84-426E-40DD-AFC4-6F175D3DCCD1}">
-              <a14:hiddenFill xmlns:a14="http://schemas.microsoft.com/office/drawing/2010/main" xmlns="">
+              <a14:hiddenFill xmlns="" xmlns:a14="http://schemas.microsoft.com/office/drawing/2010/main">
                 <a:solidFill>
                   <a:srgbClr val="FFFFFF"/>
                 </a:solidFill>
               </a14:hiddenFill>
             </a:ext>
             <a:ext uri="{91240B29-F687-4F45-9708-019B960494DF}">
-              <a14:hiddenLine xmlns:a14="http://schemas.microsoft.com/office/drawing/2010/main" xmlns="" w="9525">
+              <a14:hiddenLine xmlns="" xmlns:a14="http://schemas.microsoft.com/office/drawing/2010/main" w="9525">
                 <a:solidFill>
                   <a:srgbClr val="000000"/>
                 </a:solidFill>
@@ -1151,7 +1154,7 @@
         <p:spPr bwMode="auto">
           <a:xfrm>
             <a:off x="4953000" y="2179796"/>
-            <a:ext cx="3962400" cy="4524315"/>
+            <a:ext cx="3962400" cy="4247317"/>
           </a:xfrm>
           <a:prstGeom prst="rect">
             <a:avLst/>
@@ -1267,54 +1270,36 @@
             </a:lvl9pPr>
           </a:lstStyle>
           <a:p>
-            <a:pPr eaLnBrk="1" hangingPunct="1">
-              <a:defRPr/>
-            </a:pPr>
-            <a:r>
-              <a:rPr lang="tr-TR" b="1" dirty="0" smtClean="0">
+            <a:r>
+              <a:rPr lang="en-US" sz="1800" kern="1200" baseline="0" dirty="0" smtClean="0">
                 <a:solidFill>
                   <a:schemeClr val="bg1"/>
                 </a:solidFill>
-                <a:latin typeface="Century Gothic" panose="020B0502020202020204" pitchFamily="34" charset="0"/>
+                <a:latin typeface="Constantia" panose="02030602050306030303" pitchFamily="18" charset="0"/>
+                <a:ea typeface="+mn-ea"/>
+                <a:cs typeface="+mn-cs"/>
               </a:rPr>
-              <a:t>TITLE</a:t>
-            </a:r>
-            <a:r>
-              <a:rPr lang="tr-TR" b="1" baseline="0" dirty="0" smtClean="0">
+              <a:t>DYNAMIC FORMATION CONTROL WITH HETEROGENOUS MOBILE</a:t>
+            </a:r>
+          </a:p>
+          <a:p>
+            <a:r>
+              <a:rPr lang="tr-TR" sz="1800" kern="1200" baseline="0" dirty="0" smtClean="0">
                 <a:solidFill>
                   <a:schemeClr val="bg1"/>
                 </a:solidFill>
-                <a:latin typeface="Century Gothic" panose="020B0502020202020204" pitchFamily="34" charset="0"/>
+                <a:latin typeface="Constantia" panose="02030602050306030303" pitchFamily="18" charset="0"/>
+                <a:ea typeface="+mn-ea"/>
+                <a:cs typeface="+mn-cs"/>
               </a:rPr>
-              <a:t> </a:t>
-            </a:r>
-            <a:r>
-              <a:rPr lang="tr-TR" b="1" dirty="0" smtClean="0">
-                <a:solidFill>
-                  <a:schemeClr val="bg1"/>
-                </a:solidFill>
-                <a:latin typeface="Century Gothic" panose="020B0502020202020204" pitchFamily="34" charset="0"/>
-              </a:rPr>
-              <a:t>CENTURY GOTHIC</a:t>
-            </a:r>
-            <a:r>
-              <a:rPr lang="tr-TR" b="1" baseline="0" dirty="0" smtClean="0">
-                <a:solidFill>
-                  <a:schemeClr val="bg1"/>
-                </a:solidFill>
-                <a:latin typeface="Century Gothic" panose="020B0502020202020204" pitchFamily="34" charset="0"/>
-              </a:rPr>
-              <a:t> </a:t>
-            </a:r>
-            <a:r>
-              <a:rPr lang="en-US" b="1" dirty="0" smtClean="0">
-                <a:solidFill>
-                  <a:schemeClr val="bg1"/>
-                </a:solidFill>
-                <a:latin typeface="Century Gothic" panose="020B0502020202020204" pitchFamily="34" charset="0"/>
-              </a:rPr>
-              <a:t>BOLD 18 PUNTO</a:t>
-            </a:r>
+              <a:t>ROBOTS</a:t>
+            </a:r>
+            <a:endParaRPr lang="tr-TR" b="1" dirty="0" smtClean="0">
+              <a:solidFill>
+                <a:schemeClr val="bg1"/>
+              </a:solidFill>
+              <a:latin typeface="Century Gothic" panose="020B0502020202020204" pitchFamily="34" charset="0"/>
+            </a:endParaRPr>
           </a:p>
           <a:p>
             <a:pPr eaLnBrk="1" hangingPunct="1">
@@ -1331,7 +1316,7 @@
             <a:pPr eaLnBrk="1" hangingPunct="1">
               <a:defRPr/>
             </a:pPr>
-            <a:endParaRPr lang="tr-TR" b="1" dirty="0" smtClean="0">
+            <a:endParaRPr lang="en-US" b="1" dirty="0" smtClean="0">
               <a:solidFill>
                 <a:schemeClr val="bg1"/>
               </a:solidFill>
@@ -1353,17 +1338,6 @@
             <a:pPr eaLnBrk="1" hangingPunct="1">
               <a:defRPr/>
             </a:pPr>
-            <a:endParaRPr lang="en-US" b="1" dirty="0" smtClean="0">
-              <a:solidFill>
-                <a:schemeClr val="bg1"/>
-              </a:solidFill>
-              <a:latin typeface="Century Gothic" panose="020B0502020202020204" pitchFamily="34" charset="0"/>
-            </a:endParaRPr>
-          </a:p>
-          <a:p>
-            <a:pPr eaLnBrk="1" hangingPunct="1">
-              <a:defRPr/>
-            </a:pPr>
             <a:r>
               <a:rPr lang="tr-TR" sz="1400" b="1" dirty="0" smtClean="0">
                 <a:solidFill>
@@ -1371,44 +1345,14 @@
                 </a:solidFill>
                 <a:latin typeface="Century Gothic" panose="020B0502020202020204" pitchFamily="34" charset="0"/>
               </a:rPr>
-              <a:t>Presenter or</a:t>
-            </a:r>
-            <a:r>
-              <a:rPr lang="en-US" sz="1400" b="1" dirty="0" smtClean="0">
-                <a:solidFill>
-                  <a:schemeClr val="bg1"/>
-                </a:solidFill>
-                <a:latin typeface="Century Gothic" panose="020B0502020202020204" pitchFamily="34" charset="0"/>
-              </a:rPr>
-              <a:t> </a:t>
-            </a:r>
-            <a:r>
-              <a:rPr lang="tr-TR" sz="1400" b="1" dirty="0" smtClean="0">
-                <a:solidFill>
-                  <a:schemeClr val="bg1"/>
-                </a:solidFill>
-                <a:latin typeface="Century Gothic" panose="020B0502020202020204" pitchFamily="34" charset="0"/>
-              </a:rPr>
-              <a:t>METU EEE Century Gothic</a:t>
-            </a:r>
-            <a:r>
-              <a:rPr lang="tr-TR" sz="1400" b="1" baseline="0" dirty="0" smtClean="0">
-                <a:solidFill>
-                  <a:schemeClr val="bg1"/>
-                </a:solidFill>
-                <a:latin typeface="Century Gothic" panose="020B0502020202020204" pitchFamily="34" charset="0"/>
-              </a:rPr>
-              <a:t> </a:t>
-            </a:r>
-            <a:r>
-              <a:rPr lang="en-US" sz="1400" b="1" dirty="0" smtClean="0">
-                <a:solidFill>
-                  <a:schemeClr val="bg1"/>
-                </a:solidFill>
-                <a:latin typeface="Century Gothic" panose="020B0502020202020204" pitchFamily="34" charset="0"/>
-              </a:rPr>
-              <a:t>Regular 14 Punto</a:t>
-            </a:r>
+              <a:t>Kadir ÇİMENCİ</a:t>
+            </a:r>
+            <a:endParaRPr lang="en-US" sz="1400" b="1" dirty="0" smtClean="0">
+              <a:solidFill>
+                <a:schemeClr val="bg1"/>
+              </a:solidFill>
+              <a:latin typeface="Century Gothic" panose="020B0502020202020204" pitchFamily="34" charset="0"/>
+            </a:endParaRPr>
           </a:p>
           <a:p>
             <a:pPr eaLnBrk="1" hangingPunct="1">
@@ -1481,19 +1425,23 @@
               <a:defRPr/>
             </a:pPr>
             <a:r>
+              <a:rPr lang="tr-TR" sz="1400" b="1" dirty="0" smtClean="0">
+                <a:solidFill>
+                  <a:schemeClr val="bg1"/>
+                </a:solidFill>
+                <a:latin typeface="Century Gothic" panose="020B0502020202020204" pitchFamily="34" charset="0"/>
+              </a:rPr>
+              <a:t>June 27</a:t>
+            </a:r>
+            <a:r>
               <a:rPr lang="en-US" sz="1400" b="1" dirty="0" smtClean="0">
                 <a:solidFill>
                   <a:schemeClr val="bg1"/>
                 </a:solidFill>
                 <a:latin typeface="Century Gothic" panose="020B0502020202020204" pitchFamily="34" charset="0"/>
               </a:rPr>
-              <a:t>April 29, 2014</a:t>
-            </a:r>
-          </a:p>
-          <a:p>
-            <a:pPr eaLnBrk="1" hangingPunct="1">
-              <a:defRPr/>
-            </a:pPr>
+              <a:t>, 201</a:t>
+            </a:r>
             <a:r>
               <a:rPr lang="tr-TR" sz="1400" b="1" dirty="0" smtClean="0">
                 <a:solidFill>
@@ -1501,7 +1449,27 @@
                 </a:solidFill>
                 <a:latin typeface="Century Gothic" panose="020B0502020202020204" pitchFamily="34" charset="0"/>
               </a:rPr>
-              <a:t>Place</a:t>
+              <a:t>6</a:t>
+            </a:r>
+            <a:endParaRPr lang="en-US" sz="1400" b="1" dirty="0" smtClean="0">
+              <a:solidFill>
+                <a:schemeClr val="bg1"/>
+              </a:solidFill>
+              <a:latin typeface="Century Gothic" panose="020B0502020202020204" pitchFamily="34" charset="0"/>
+            </a:endParaRPr>
+          </a:p>
+          <a:p>
+            <a:pPr eaLnBrk="1" hangingPunct="1">
+              <a:defRPr/>
+            </a:pPr>
+            <a:r>
+              <a:rPr lang="tr-TR" sz="1400" b="1" dirty="0" smtClean="0">
+                <a:solidFill>
+                  <a:schemeClr val="bg1"/>
+                </a:solidFill>
+                <a:latin typeface="Century Gothic" panose="020B0502020202020204" pitchFamily="34" charset="0"/>
+              </a:rPr>
+              <a:t>Ankara</a:t>
             </a:r>
             <a:endParaRPr lang="en-US" b="1" dirty="0" smtClean="0">
               <a:solidFill>
@@ -1529,7 +1497,7 @@
     </p:spTree>
     <p:extLst>
       <p:ext uri="{BB962C8B-B14F-4D97-AF65-F5344CB8AC3E}">
-        <p14:creationId xmlns:p14="http://schemas.microsoft.com/office/powerpoint/2010/main" xmlns="" val="4044641051"/>
+        <p14:creationId xmlns="" xmlns:p14="http://schemas.microsoft.com/office/powerpoint/2010/main" val="4044641051"/>
       </p:ext>
     </p:extLst>
   </p:cSld>
@@ -1847,7 +1815,7 @@
     </p:spTree>
     <p:extLst>
       <p:ext uri="{BB962C8B-B14F-4D97-AF65-F5344CB8AC3E}">
-        <p14:creationId xmlns:p14="http://schemas.microsoft.com/office/powerpoint/2010/main" xmlns="" val="43940600"/>
+        <p14:creationId xmlns="" xmlns:p14="http://schemas.microsoft.com/office/powerpoint/2010/main" val="43940600"/>
       </p:ext>
     </p:extLst>
   </p:cSld>
@@ -2232,7 +2200,7 @@
     </p:spTree>
     <p:extLst>
       <p:ext uri="{BB962C8B-B14F-4D97-AF65-F5344CB8AC3E}">
-        <p14:creationId xmlns:p14="http://schemas.microsoft.com/office/powerpoint/2010/main" xmlns="" val="4116636478"/>
+        <p14:creationId xmlns="" xmlns:p14="http://schemas.microsoft.com/office/powerpoint/2010/main" val="4116636478"/>
       </p:ext>
     </p:extLst>
   </p:cSld>
@@ -2639,7 +2607,7 @@
     </p:spTree>
     <p:extLst>
       <p:ext uri="{BB962C8B-B14F-4D97-AF65-F5344CB8AC3E}">
-        <p14:creationId xmlns:p14="http://schemas.microsoft.com/office/powerpoint/2010/main" xmlns="" val="4111024574"/>
+        <p14:creationId xmlns="" xmlns:p14="http://schemas.microsoft.com/office/powerpoint/2010/main" val="4111024574"/>
       </p:ext>
     </p:extLst>
   </p:cSld>
@@ -2818,7 +2786,7 @@
     </p:spTree>
     <p:extLst>
       <p:ext uri="{BB962C8B-B14F-4D97-AF65-F5344CB8AC3E}">
-        <p14:creationId xmlns:p14="http://schemas.microsoft.com/office/powerpoint/2010/main" xmlns="" val="2069476619"/>
+        <p14:creationId xmlns="" xmlns:p14="http://schemas.microsoft.com/office/powerpoint/2010/main" val="2069476619"/>
       </p:ext>
     </p:extLst>
   </p:cSld>
@@ -2937,7 +2905,7 @@
     </p:spTree>
     <p:extLst>
       <p:ext uri="{BB962C8B-B14F-4D97-AF65-F5344CB8AC3E}">
-        <p14:creationId xmlns:p14="http://schemas.microsoft.com/office/powerpoint/2010/main" xmlns="" val="1462183360"/>
+        <p14:creationId xmlns="" xmlns:p14="http://schemas.microsoft.com/office/powerpoint/2010/main" val="1462183360"/>
       </p:ext>
     </p:extLst>
   </p:cSld>
@@ -2983,7 +2951,7 @@
           <a:blip r:embed="rId2">
             <a:extLst>
               <a:ext uri="{28A0092B-C50C-407E-A947-70E740481C1C}">
-                <a14:useLocalDpi xmlns:a14="http://schemas.microsoft.com/office/drawing/2010/main" xmlns="" val="0"/>
+                <a14:useLocalDpi xmlns="" xmlns:a14="http://schemas.microsoft.com/office/drawing/2010/main" val="0"/>
               </a:ext>
             </a:extLst>
           </a:blip>
@@ -3006,14 +2974,14 @@
           </a:ln>
           <a:extLst>
             <a:ext uri="{909E8E84-426E-40DD-AFC4-6F175D3DCCD1}">
-              <a14:hiddenFill xmlns:a14="http://schemas.microsoft.com/office/drawing/2010/main" xmlns="">
+              <a14:hiddenFill xmlns="" xmlns:a14="http://schemas.microsoft.com/office/drawing/2010/main">
                 <a:solidFill>
                   <a:srgbClr val="FFFFFF"/>
                 </a:solidFill>
               </a14:hiddenFill>
             </a:ext>
             <a:ext uri="{91240B29-F687-4F45-9708-019B960494DF}">
-              <a14:hiddenLine xmlns:a14="http://schemas.microsoft.com/office/drawing/2010/main" xmlns="" w="9525">
+              <a14:hiddenLine xmlns="" xmlns:a14="http://schemas.microsoft.com/office/drawing/2010/main" w="9525">
                 <a:solidFill>
                   <a:srgbClr val="000000"/>
                 </a:solidFill>
@@ -3047,14 +3015,14 @@
           </a:ln>
           <a:extLst>
             <a:ext uri="{909E8E84-426E-40DD-AFC4-6F175D3DCCD1}">
-              <a14:hiddenFill xmlns:a14="http://schemas.microsoft.com/office/drawing/2010/main" xmlns="">
+              <a14:hiddenFill xmlns="" xmlns:a14="http://schemas.microsoft.com/office/drawing/2010/main">
                 <a:solidFill>
                   <a:srgbClr val="FFFFFF"/>
                 </a:solidFill>
               </a14:hiddenFill>
             </a:ext>
             <a:ext uri="{91240B29-F687-4F45-9708-019B960494DF}">
-              <a14:hiddenLine xmlns:a14="http://schemas.microsoft.com/office/drawing/2010/main" xmlns="" w="9525">
+              <a14:hiddenLine xmlns="" xmlns:a14="http://schemas.microsoft.com/office/drawing/2010/main" w="9525">
                 <a:solidFill>
                   <a:srgbClr val="000000"/>
                 </a:solidFill>
@@ -3202,7 +3170,7 @@
     </p:spTree>
     <p:extLst>
       <p:ext uri="{BB962C8B-B14F-4D97-AF65-F5344CB8AC3E}">
-        <p14:creationId xmlns:p14="http://schemas.microsoft.com/office/powerpoint/2010/main" xmlns="" val="3245506927"/>
+        <p14:creationId xmlns="" xmlns:p14="http://schemas.microsoft.com/office/powerpoint/2010/main" val="3245506927"/>
       </p:ext>
     </p:extLst>
   </p:cSld>
@@ -3321,7 +3289,7 @@
             <a:blip r:embed="rId9">
               <a:extLst>
                 <a:ext uri="{28A0092B-C50C-407E-A947-70E740481C1C}">
-                  <a14:useLocalDpi xmlns:a14="http://schemas.microsoft.com/office/drawing/2010/main" xmlns="" val="0"/>
+                  <a14:useLocalDpi xmlns="" xmlns:a14="http://schemas.microsoft.com/office/drawing/2010/main" val="0"/>
                 </a:ext>
               </a:extLst>
             </a:blip>
@@ -3344,14 +3312,14 @@
             </a:ln>
             <a:extLst>
               <a:ext uri="{909E8E84-426E-40DD-AFC4-6F175D3DCCD1}">
-                <a14:hiddenFill xmlns:a14="http://schemas.microsoft.com/office/drawing/2010/main" xmlns="">
+                <a14:hiddenFill xmlns="" xmlns:a14="http://schemas.microsoft.com/office/drawing/2010/main">
                   <a:solidFill>
                     <a:srgbClr val="FFFFFF"/>
                   </a:solidFill>
                 </a14:hiddenFill>
               </a:ext>
               <a:ext uri="{91240B29-F687-4F45-9708-019B960494DF}">
-                <a14:hiddenLine xmlns:a14="http://schemas.microsoft.com/office/drawing/2010/main" xmlns="" w="9525">
+                <a14:hiddenLine xmlns="" xmlns:a14="http://schemas.microsoft.com/office/drawing/2010/main" w="9525">
                   <a:solidFill>
                     <a:srgbClr val="000000"/>
                   </a:solidFill>
@@ -3520,14 +3488,14 @@
           </a:ln>
           <a:extLst>
             <a:ext uri="{909E8E84-426E-40DD-AFC4-6F175D3DCCD1}">
-              <a14:hiddenFill xmlns:a14="http://schemas.microsoft.com/office/drawing/2010/main" xmlns="">
+              <a14:hiddenFill xmlns="" xmlns:a14="http://schemas.microsoft.com/office/drawing/2010/main">
                 <a:solidFill>
                   <a:srgbClr val="FFFFFF"/>
                 </a:solidFill>
               </a14:hiddenFill>
             </a:ext>
             <a:ext uri="{91240B29-F687-4F45-9708-019B960494DF}">
-              <a14:hiddenLine xmlns:a14="http://schemas.microsoft.com/office/drawing/2010/main" xmlns="" w="9525">
+              <a14:hiddenLine xmlns="" xmlns:a14="http://schemas.microsoft.com/office/drawing/2010/main" w="9525">
                 <a:solidFill>
                   <a:srgbClr val="000000"/>
                 </a:solidFill>
@@ -3611,14 +3579,14 @@
           </a:ln>
           <a:extLst>
             <a:ext uri="{909E8E84-426E-40DD-AFC4-6F175D3DCCD1}">
-              <a14:hiddenFill xmlns:a14="http://schemas.microsoft.com/office/drawing/2010/main" xmlns="">
+              <a14:hiddenFill xmlns="" xmlns:a14="http://schemas.microsoft.com/office/drawing/2010/main">
                 <a:solidFill>
                   <a:srgbClr val="FFFFFF"/>
                 </a:solidFill>
               </a14:hiddenFill>
             </a:ext>
             <a:ext uri="{91240B29-F687-4F45-9708-019B960494DF}">
-              <a14:hiddenLine xmlns:a14="http://schemas.microsoft.com/office/drawing/2010/main" xmlns="" w="9525">
+              <a14:hiddenLine xmlns="" xmlns:a14="http://schemas.microsoft.com/office/drawing/2010/main" w="9525">
                 <a:solidFill>
                   <a:srgbClr val="000000"/>
                 </a:solidFill>
@@ -4265,7 +4233,7 @@
           <a:blip r:embed="rId3">
             <a:extLst>
               <a:ext uri="{28A0092B-C50C-407E-A947-70E740481C1C}">
-                <a14:useLocalDpi xmlns:a14="http://schemas.microsoft.com/office/drawing/2010/main" xmlns="" val="0"/>
+                <a14:useLocalDpi xmlns="" xmlns:a14="http://schemas.microsoft.com/office/drawing/2010/main" val="0"/>
               </a:ext>
             </a:extLst>
           </a:blip>
@@ -4288,14 +4256,14 @@
           </a:ln>
           <a:extLst>
             <a:ext uri="{909E8E84-426E-40DD-AFC4-6F175D3DCCD1}">
-              <a14:hiddenFill xmlns:a14="http://schemas.microsoft.com/office/drawing/2010/main" xmlns="">
+              <a14:hiddenFill xmlns="" xmlns:a14="http://schemas.microsoft.com/office/drawing/2010/main">
                 <a:solidFill>
                   <a:srgbClr val="FFFFFF"/>
                 </a:solidFill>
               </a14:hiddenFill>
             </a:ext>
             <a:ext uri="{91240B29-F687-4F45-9708-019B960494DF}">
-              <a14:hiddenLine xmlns:a14="http://schemas.microsoft.com/office/drawing/2010/main" xmlns="" w="9525">
+              <a14:hiddenLine xmlns="" xmlns:a14="http://schemas.microsoft.com/office/drawing/2010/main" w="9525">
                 <a:solidFill>
                   <a:srgbClr val="000000"/>
                 </a:solidFill>
@@ -4342,7 +4310,7 @@
     </p:spTree>
     <p:extLst>
       <p:ext uri="{BB962C8B-B14F-4D97-AF65-F5344CB8AC3E}">
-        <p14:creationId xmlns:p14="http://schemas.microsoft.com/office/powerpoint/2010/main" xmlns="" val="1031498753"/>
+        <p14:creationId xmlns="" xmlns:p14="http://schemas.microsoft.com/office/powerpoint/2010/main" val="1031498753"/>
       </p:ext>
     </p:extLst>
   </p:cSld>
@@ -4384,7 +4352,11 @@
           <a:bodyPr/>
           <a:lstStyle/>
           <a:p>
-            <a:endParaRPr lang="tr-TR"/>
+            <a:r>
+              <a:rPr lang="tr-TR" dirty="0" smtClean="0"/>
+              <a:t>Outline</a:t>
+            </a:r>
+            <a:endParaRPr lang="tr-TR" dirty="0"/>
           </a:p>
         </p:txBody>
       </p:sp>
@@ -4403,7 +4375,75 @@
           <a:bodyPr/>
           <a:lstStyle/>
           <a:p>
-            <a:endParaRPr lang="tr-TR"/>
+            <a:pPr>
+              <a:buFont typeface="Arial" pitchFamily="34" charset="0"/>
+              <a:buChar char="•"/>
+            </a:pPr>
+            <a:r>
+              <a:rPr lang="tr-TR" dirty="0" smtClean="0"/>
+              <a:t>Introduction</a:t>
+            </a:r>
+          </a:p>
+          <a:p>
+            <a:pPr>
+              <a:buFont typeface="Arial" pitchFamily="34" charset="0"/>
+              <a:buChar char="•"/>
+            </a:pPr>
+            <a:r>
+              <a:rPr lang="tr-TR" dirty="0" smtClean="0"/>
+              <a:t>Motivation</a:t>
+            </a:r>
+          </a:p>
+          <a:p>
+            <a:pPr>
+              <a:buFont typeface="Arial" pitchFamily="34" charset="0"/>
+              <a:buChar char="•"/>
+            </a:pPr>
+            <a:r>
+              <a:rPr lang="tr-TR" dirty="0" smtClean="0"/>
+              <a:t>Local Positioning System Design</a:t>
+            </a:r>
+          </a:p>
+          <a:p>
+            <a:pPr>
+              <a:buFont typeface="Arial" pitchFamily="34" charset="0"/>
+              <a:buChar char="•"/>
+            </a:pPr>
+            <a:r>
+              <a:rPr lang="tr-TR" dirty="0" smtClean="0"/>
+              <a:t>Formation Control System Design</a:t>
+            </a:r>
+          </a:p>
+          <a:p>
+            <a:pPr>
+              <a:buFont typeface="Arial" pitchFamily="34" charset="0"/>
+              <a:buChar char="•"/>
+            </a:pPr>
+            <a:r>
+              <a:rPr lang="tr-TR" dirty="0" smtClean="0"/>
+              <a:t>Results</a:t>
+            </a:r>
+          </a:p>
+          <a:p>
+            <a:pPr>
+              <a:buFont typeface="Arial" pitchFamily="34" charset="0"/>
+              <a:buChar char="•"/>
+            </a:pPr>
+            <a:r>
+              <a:rPr lang="tr-TR" dirty="0" smtClean="0"/>
+              <a:t>Conclusion and Future Works</a:t>
+            </a:r>
+          </a:p>
+          <a:p>
+            <a:pPr>
+              <a:buFont typeface="Arial" pitchFamily="34" charset="0"/>
+              <a:buChar char="•"/>
+            </a:pPr>
+            <a:r>
+              <a:rPr lang="tr-TR" dirty="0" smtClean="0"/>
+              <a:t>References</a:t>
+            </a:r>
+            <a:endParaRPr lang="tr-TR" dirty="0"/>
           </a:p>
         </p:txBody>
       </p:sp>
@@ -4465,7 +4505,7 @@
     </p:spTree>
     <p:extLst>
       <p:ext uri="{BB962C8B-B14F-4D97-AF65-F5344CB8AC3E}">
-        <p14:creationId xmlns:p14="http://schemas.microsoft.com/office/powerpoint/2010/main" xmlns="" val="1601229741"/>
+        <p14:creationId xmlns="" xmlns:p14="http://schemas.microsoft.com/office/powerpoint/2010/main" val="1601229741"/>
       </p:ext>
     </p:extLst>
   </p:cSld>
@@ -4507,18 +4547,22 @@
           <a:bodyPr/>
           <a:lstStyle/>
           <a:p>
-            <a:endParaRPr lang="tr-TR"/>
+            <a:r>
+              <a:rPr lang="tr-TR" dirty="0" smtClean="0"/>
+              <a:t>Introduction</a:t>
+            </a:r>
+            <a:endParaRPr lang="tr-TR" dirty="0"/>
           </a:p>
         </p:txBody>
       </p:sp>
       <p:sp>
         <p:nvSpPr>
-          <p:cNvPr id="3" name="Text Placeholder 2"/>
+          <p:cNvPr id="3" name="Content Placeholder 2"/>
           <p:cNvSpPr>
             <a:spLocks noGrp="1"/>
           </p:cNvSpPr>
           <p:nvPr>
-            <p:ph type="body" idx="1"/>
+            <p:ph idx="1"/>
           </p:nvPr>
         </p:nvSpPr>
         <p:spPr/>
@@ -4526,70 +4570,41 @@
           <a:bodyPr/>
           <a:lstStyle/>
           <a:p>
-            <a:endParaRPr lang="tr-TR"/>
+            <a:r>
+              <a:rPr lang="en-US" dirty="0" smtClean="0"/>
+              <a:t>This thesis work focuses on dynamic adaptation to achieve changes in formation </a:t>
+            </a:r>
+            <a:r>
+              <a:rPr lang="en-US" dirty="0" smtClean="0"/>
+              <a:t>of</a:t>
+            </a:r>
+            <a:r>
+              <a:rPr lang="tr-TR" dirty="0" smtClean="0"/>
+              <a:t> </a:t>
+            </a:r>
+            <a:r>
+              <a:rPr lang="en-US" dirty="0" smtClean="0"/>
+              <a:t>swarms </a:t>
+            </a:r>
+            <a:r>
+              <a:rPr lang="en-US" dirty="0" smtClean="0"/>
+              <a:t>consisting of </a:t>
+            </a:r>
+            <a:r>
+              <a:rPr lang="en-US" dirty="0" err="1" smtClean="0"/>
+              <a:t>heterogenous</a:t>
+            </a:r>
+            <a:r>
+              <a:rPr lang="en-US" dirty="0" smtClean="0"/>
+              <a:t> mobile robots</a:t>
+            </a:r>
+            <a:endParaRPr lang="tr-TR" dirty="0"/>
           </a:p>
         </p:txBody>
       </p:sp>
       <p:sp>
         <p:nvSpPr>
-          <p:cNvPr id="4" name="Text Placeholder 3"/>
-          <p:cNvSpPr>
-            <a:spLocks noGrp="1"/>
-          </p:cNvSpPr>
-          <p:nvPr>
-            <p:ph type="body" sz="half" idx="3"/>
-          </p:nvPr>
-        </p:nvSpPr>
-        <p:spPr/>
-        <p:txBody>
-          <a:bodyPr/>
-          <a:lstStyle/>
-          <a:p>
-            <a:endParaRPr lang="tr-TR"/>
-          </a:p>
-        </p:txBody>
-      </p:sp>
-      <p:sp>
-        <p:nvSpPr>
-          <p:cNvPr id="5" name="Content Placeholder 4"/>
-          <p:cNvSpPr>
-            <a:spLocks noGrp="1"/>
-          </p:cNvSpPr>
-          <p:nvPr>
-            <p:ph sz="quarter" idx="2"/>
-          </p:nvPr>
-        </p:nvSpPr>
-        <p:spPr/>
-        <p:txBody>
-          <a:bodyPr/>
-          <a:lstStyle/>
-          <a:p>
-            <a:endParaRPr lang="tr-TR"/>
-          </a:p>
-        </p:txBody>
-      </p:sp>
-      <p:sp>
-        <p:nvSpPr>
-          <p:cNvPr id="6" name="Content Placeholder 5"/>
-          <p:cNvSpPr>
-            <a:spLocks noGrp="1"/>
-          </p:cNvSpPr>
-          <p:nvPr>
-            <p:ph sz="quarter" idx="4"/>
-          </p:nvPr>
-        </p:nvSpPr>
-        <p:spPr/>
-        <p:txBody>
-          <a:bodyPr/>
-          <a:lstStyle/>
-          <a:p>
-            <a:endParaRPr lang="tr-TR"/>
-          </a:p>
-        </p:txBody>
-      </p:sp>
-      <p:sp>
-        <p:nvSpPr>
-          <p:cNvPr id="7" name="Slide Number Placeholder 6"/>
+          <p:cNvPr id="4" name="Slide Number Placeholder 3"/>
           <p:cNvSpPr>
             <a:spLocks noGrp="1"/>
           </p:cNvSpPr>
@@ -4605,25 +4620,25 @@
             <a:pPr>
               <a:defRPr/>
             </a:pPr>
-            <a:fld id="{B5012164-718A-4733-A653-425A1A482A4D}" type="slidenum">
+            <a:fld id="{C878F797-6006-4DDA-AFE9-456F280FE6C5}" type="slidenum">
               <a:rPr lang="en-US" smtClean="0"/>
               <a:pPr>
                 <a:defRPr/>
               </a:pPr>
               <a:t>4</a:t>
             </a:fld>
-            <a:endParaRPr lang="en-US"/>
+            <a:endParaRPr lang="en-US" dirty="0"/>
           </a:p>
         </p:txBody>
       </p:sp>
       <p:sp>
         <p:nvSpPr>
-          <p:cNvPr id="8" name="Date Placeholder 7"/>
+          <p:cNvPr id="5" name="Date Placeholder 4"/>
           <p:cNvSpPr>
             <a:spLocks noGrp="1"/>
           </p:cNvSpPr>
           <p:nvPr>
-            <p:ph type="dt" sz="half" idx="13"/>
+            <p:ph type="dt" sz="half" idx="2"/>
           </p:nvPr>
         </p:nvSpPr>
         <p:spPr/>
@@ -4642,16 +4657,200 @@
           </a:p>
         </p:txBody>
       </p:sp>
+      <p:pic>
+        <p:nvPicPr>
+          <p:cNvPr id="6" name="Picture"/>
+          <p:cNvPicPr/>
+          <p:nvPr/>
+        </p:nvPicPr>
+        <p:blipFill>
+          <a:blip r:embed="rId2" cstate="print"/>
+          <a:stretch>
+            <a:fillRect/>
+          </a:stretch>
+        </p:blipFill>
+        <p:spPr bwMode="auto">
+          <a:xfrm>
+            <a:off x="101599" y="2857499"/>
+            <a:ext cx="3262312" cy="1897063"/>
+          </a:xfrm>
+          <a:prstGeom prst="rect">
+            <a:avLst/>
+          </a:prstGeom>
+          <a:noFill/>
+          <a:ln w="9525">
+            <a:noFill/>
+            <a:miter lim="800000"/>
+            <a:headEnd/>
+            <a:tailEnd/>
+          </a:ln>
+        </p:spPr>
+      </p:pic>
+      <p:pic>
+        <p:nvPicPr>
+          <p:cNvPr id="7" name="Picture"/>
+          <p:cNvPicPr/>
+          <p:nvPr/>
+        </p:nvPicPr>
+        <p:blipFill>
+          <a:blip r:embed="rId3"/>
+          <a:stretch>
+            <a:fillRect/>
+          </a:stretch>
+        </p:blipFill>
+        <p:spPr bwMode="auto">
+          <a:xfrm>
+            <a:off x="6100762" y="2857499"/>
+            <a:ext cx="2967038" cy="1897063"/>
+          </a:xfrm>
+          <a:prstGeom prst="rect">
+            <a:avLst/>
+          </a:prstGeom>
+          <a:noFill/>
+          <a:ln w="9525">
+            <a:noFill/>
+            <a:miter lim="800000"/>
+            <a:headEnd/>
+            <a:tailEnd/>
+          </a:ln>
+        </p:spPr>
+      </p:pic>
+      <p:pic>
+        <p:nvPicPr>
+          <p:cNvPr id="8" name="Picture"/>
+          <p:cNvPicPr/>
+          <p:nvPr/>
+        </p:nvPicPr>
+        <p:blipFill>
+          <a:blip r:embed="rId4"/>
+          <a:stretch>
+            <a:fillRect/>
+          </a:stretch>
+        </p:blipFill>
+        <p:spPr bwMode="auto">
+          <a:xfrm>
+            <a:off x="3699621" y="2857499"/>
+            <a:ext cx="2097182" cy="1897063"/>
+          </a:xfrm>
+          <a:prstGeom prst="rect">
+            <a:avLst/>
+          </a:prstGeom>
+          <a:noFill/>
+          <a:ln w="9525">
+            <a:noFill/>
+            <a:miter lim="800000"/>
+            <a:headEnd/>
+            <a:tailEnd/>
+          </a:ln>
+        </p:spPr>
+      </p:pic>
+      <p:sp>
+        <p:nvSpPr>
+          <p:cNvPr id="9" name="TextBox 8"/>
+          <p:cNvSpPr txBox="1"/>
+          <p:nvPr/>
+        </p:nvSpPr>
+        <p:spPr>
+          <a:xfrm>
+            <a:off x="101599" y="4492952"/>
+            <a:ext cx="325730" cy="261610"/>
+          </a:xfrm>
+          <a:prstGeom prst="rect">
+            <a:avLst/>
+          </a:prstGeom>
+          <a:noFill/>
+        </p:spPr>
+        <p:txBody>
+          <a:bodyPr wrap="none" rtlCol="0">
+            <a:spAutoFit/>
+          </a:bodyPr>
+          <a:lstStyle/>
+          <a:p>
+            <a:r>
+              <a:rPr lang="tr-TR" sz="1050" dirty="0" smtClean="0"/>
+              <a:t>[1]</a:t>
+            </a:r>
+            <a:endParaRPr lang="tr-TR" sz="1050" dirty="0"/>
+          </a:p>
+        </p:txBody>
+      </p:sp>
+      <p:sp>
+        <p:nvSpPr>
+          <p:cNvPr id="10" name="TextBox 9"/>
+          <p:cNvSpPr txBox="1"/>
+          <p:nvPr/>
+        </p:nvSpPr>
+        <p:spPr>
+          <a:xfrm>
+            <a:off x="3699621" y="4492952"/>
+            <a:ext cx="343364" cy="253916"/>
+          </a:xfrm>
+          <a:prstGeom prst="rect">
+            <a:avLst/>
+          </a:prstGeom>
+          <a:noFill/>
+        </p:spPr>
+        <p:txBody>
+          <a:bodyPr wrap="none" rtlCol="0">
+            <a:spAutoFit/>
+          </a:bodyPr>
+          <a:lstStyle/>
+          <a:p>
+            <a:r>
+              <a:rPr lang="tr-TR" sz="1050" dirty="0" smtClean="0"/>
+              <a:t>[2]</a:t>
+            </a:r>
+            <a:endParaRPr lang="tr-TR" sz="1050" dirty="0"/>
+          </a:p>
+        </p:txBody>
+      </p:sp>
+      <p:sp>
+        <p:nvSpPr>
+          <p:cNvPr id="11" name="TextBox 10"/>
+          <p:cNvSpPr txBox="1"/>
+          <p:nvPr/>
+        </p:nvSpPr>
+        <p:spPr>
+          <a:xfrm>
+            <a:off x="6100762" y="4477563"/>
+            <a:ext cx="338554" cy="253916"/>
+          </a:xfrm>
+          <a:prstGeom prst="rect">
+            <a:avLst/>
+          </a:prstGeom>
+          <a:noFill/>
+        </p:spPr>
+        <p:txBody>
+          <a:bodyPr wrap="none" rtlCol="0">
+            <a:spAutoFit/>
+          </a:bodyPr>
+          <a:lstStyle/>
+          <a:p>
+            <a:r>
+              <a:rPr lang="tr-TR" sz="1050" dirty="0" smtClean="0"/>
+              <a:t>[3]</a:t>
+            </a:r>
+            <a:endParaRPr lang="tr-TR" sz="1050" dirty="0"/>
+          </a:p>
+        </p:txBody>
+      </p:sp>
     </p:spTree>
     <p:extLst>
       <p:ext uri="{BB962C8B-B14F-4D97-AF65-F5344CB8AC3E}">
-        <p14:creationId xmlns:p14="http://schemas.microsoft.com/office/powerpoint/2010/main" xmlns="" val="4196449028"/>
+        <p14:creationId xmlns="" xmlns:p14="http://schemas.microsoft.com/office/powerpoint/2010/main" val="1601229741"/>
       </p:ext>
     </p:extLst>
   </p:cSld>
   <p:clrMapOvr>
     <a:masterClrMapping/>
   </p:clrMapOvr>
+  <p:timing>
+    <p:tnLst>
+      <p:par>
+        <p:cTn id="1" dur="indefinite" restart="never" nodeType="tmRoot"/>
+      </p:par>
+    </p:tnLst>
+  </p:timing>
 </p:sld>
 </file>
 
@@ -4672,10 +4871,1027 @@
           <a:chExt cx="0" cy="0"/>
         </a:xfrm>
       </p:grpSpPr>
+      <p:sp>
+        <p:nvSpPr>
+          <p:cNvPr id="2" name="Title 1"/>
+          <p:cNvSpPr>
+            <a:spLocks noGrp="1"/>
+          </p:cNvSpPr>
+          <p:nvPr>
+            <p:ph type="title"/>
+          </p:nvPr>
+        </p:nvSpPr>
+        <p:spPr/>
+        <p:txBody>
+          <a:bodyPr/>
+          <a:lstStyle/>
+          <a:p>
+            <a:r>
+              <a:rPr lang="tr-TR" dirty="0" smtClean="0"/>
+              <a:t>Motivation</a:t>
+            </a:r>
+            <a:endParaRPr lang="tr-TR" dirty="0"/>
+          </a:p>
+        </p:txBody>
+      </p:sp>
+      <p:sp>
+        <p:nvSpPr>
+          <p:cNvPr id="3" name="Content Placeholder 2"/>
+          <p:cNvSpPr>
+            <a:spLocks noGrp="1"/>
+          </p:cNvSpPr>
+          <p:nvPr>
+            <p:ph idx="1"/>
+          </p:nvPr>
+        </p:nvSpPr>
+        <p:spPr/>
+        <p:txBody>
+          <a:bodyPr/>
+          <a:lstStyle/>
+          <a:p>
+            <a:r>
+              <a:rPr lang="tr-TR" dirty="0" smtClean="0"/>
+              <a:t>The research about the formation control, mainly focuses on swarms with homogenous agents.</a:t>
+            </a:r>
+            <a:endParaRPr lang="tr-TR" dirty="0"/>
+          </a:p>
+        </p:txBody>
+      </p:sp>
+      <p:sp>
+        <p:nvSpPr>
+          <p:cNvPr id="4" name="Slide Number Placeholder 3"/>
+          <p:cNvSpPr>
+            <a:spLocks noGrp="1"/>
+          </p:cNvSpPr>
+          <p:nvPr>
+            <p:ph type="sldNum" sz="quarter" idx="12"/>
+          </p:nvPr>
+        </p:nvSpPr>
+        <p:spPr/>
+        <p:txBody>
+          <a:bodyPr/>
+          <a:lstStyle/>
+          <a:p>
+            <a:pPr>
+              <a:defRPr/>
+            </a:pPr>
+            <a:fld id="{C878F797-6006-4DDA-AFE9-456F280FE6C5}" type="slidenum">
+              <a:rPr lang="en-US" smtClean="0"/>
+              <a:pPr>
+                <a:defRPr/>
+              </a:pPr>
+              <a:t>5</a:t>
+            </a:fld>
+            <a:endParaRPr lang="en-US" dirty="0"/>
+          </a:p>
+        </p:txBody>
+      </p:sp>
+      <p:sp>
+        <p:nvSpPr>
+          <p:cNvPr id="5" name="Date Placeholder 4"/>
+          <p:cNvSpPr>
+            <a:spLocks noGrp="1"/>
+          </p:cNvSpPr>
+          <p:nvPr>
+            <p:ph type="dt" sz="half" idx="2"/>
+          </p:nvPr>
+        </p:nvSpPr>
+        <p:spPr/>
+        <p:txBody>
+          <a:bodyPr/>
+          <a:lstStyle/>
+          <a:p>
+            <a:pPr>
+              <a:defRPr/>
+            </a:pPr>
+            <a:r>
+              <a:rPr lang="tr-TR" smtClean="0"/>
+              <a:t>METU Electrical &amp; Electronics Engineering Department</a:t>
+            </a:r>
+            <a:endParaRPr lang="en-US" dirty="0"/>
+          </a:p>
+        </p:txBody>
+      </p:sp>
+      <p:grpSp>
+        <p:nvGrpSpPr>
+          <p:cNvPr id="13" name="Group 12"/>
+          <p:cNvGrpSpPr/>
+          <p:nvPr/>
+        </p:nvGrpSpPr>
+        <p:grpSpPr>
+          <a:xfrm>
+            <a:off x="2176462" y="2123589"/>
+            <a:ext cx="4945235" cy="3357604"/>
+            <a:chOff x="4457700" y="633371"/>
+            <a:chExt cx="4945235" cy="3357604"/>
+          </a:xfrm>
+        </p:grpSpPr>
+        <p:pic>
+          <p:nvPicPr>
+            <p:cNvPr id="1026" name="Picture 2" descr="C:\Users\Kadir\Desktop\Seminer\mobilerobots.png"/>
+            <p:cNvPicPr>
+              <a:picLocks noChangeAspect="1" noChangeArrowheads="1"/>
+            </p:cNvPicPr>
+            <p:nvPr/>
+          </p:nvPicPr>
+          <p:blipFill>
+            <a:blip r:embed="rId2"/>
+            <a:srcRect/>
+            <a:stretch>
+              <a:fillRect/>
+            </a:stretch>
+          </p:blipFill>
+          <p:spPr bwMode="auto">
+            <a:xfrm>
+              <a:off x="4457700" y="633371"/>
+              <a:ext cx="4927601" cy="3357604"/>
+            </a:xfrm>
+            <a:prstGeom prst="rect">
+              <a:avLst/>
+            </a:prstGeom>
+            <a:noFill/>
+          </p:spPr>
+        </p:pic>
+        <p:sp>
+          <p:nvSpPr>
+            <p:cNvPr id="9" name="TextBox 8"/>
+            <p:cNvSpPr txBox="1"/>
+            <p:nvPr/>
+          </p:nvSpPr>
+          <p:spPr>
+            <a:xfrm>
+              <a:off x="6428851" y="2123589"/>
+              <a:ext cx="349776" cy="253916"/>
+            </a:xfrm>
+            <a:prstGeom prst="rect">
+              <a:avLst/>
+            </a:prstGeom>
+            <a:noFill/>
+          </p:spPr>
+          <p:txBody>
+            <a:bodyPr wrap="none" rtlCol="0">
+              <a:spAutoFit/>
+            </a:bodyPr>
+            <a:lstStyle/>
+            <a:p>
+              <a:r>
+                <a:rPr lang="tr-TR" sz="1050" dirty="0" smtClean="0"/>
+                <a:t>[4]</a:t>
+              </a:r>
+              <a:endParaRPr lang="tr-TR" sz="1050" dirty="0"/>
+            </a:p>
+          </p:txBody>
+        </p:sp>
+        <p:sp>
+          <p:nvSpPr>
+            <p:cNvPr id="14" name="TextBox 13"/>
+            <p:cNvSpPr txBox="1"/>
+            <p:nvPr/>
+          </p:nvSpPr>
+          <p:spPr>
+            <a:xfrm>
+              <a:off x="9059571" y="2123589"/>
+              <a:ext cx="341760" cy="253916"/>
+            </a:xfrm>
+            <a:prstGeom prst="rect">
+              <a:avLst/>
+            </a:prstGeom>
+            <a:noFill/>
+          </p:spPr>
+          <p:txBody>
+            <a:bodyPr wrap="none" rtlCol="0">
+              <a:spAutoFit/>
+            </a:bodyPr>
+            <a:lstStyle/>
+            <a:p>
+              <a:r>
+                <a:rPr lang="tr-TR" sz="1050" dirty="0" smtClean="0"/>
+                <a:t>[5]</a:t>
+              </a:r>
+              <a:endParaRPr lang="tr-TR" sz="1050" dirty="0"/>
+            </a:p>
+          </p:txBody>
+        </p:sp>
+        <p:sp>
+          <p:nvSpPr>
+            <p:cNvPr id="15" name="TextBox 14"/>
+            <p:cNvSpPr txBox="1"/>
+            <p:nvPr/>
+          </p:nvSpPr>
+          <p:spPr>
+            <a:xfrm>
+              <a:off x="6413208" y="3729365"/>
+              <a:ext cx="349776" cy="253916"/>
+            </a:xfrm>
+            <a:prstGeom prst="rect">
+              <a:avLst/>
+            </a:prstGeom>
+            <a:noFill/>
+          </p:spPr>
+          <p:txBody>
+            <a:bodyPr wrap="none" rtlCol="0">
+              <a:spAutoFit/>
+            </a:bodyPr>
+            <a:lstStyle/>
+            <a:p>
+              <a:r>
+                <a:rPr lang="tr-TR" sz="1050" dirty="0" smtClean="0"/>
+                <a:t>[6]</a:t>
+              </a:r>
+              <a:endParaRPr lang="tr-TR" sz="1050" dirty="0"/>
+            </a:p>
+          </p:txBody>
+        </p:sp>
+        <p:sp>
+          <p:nvSpPr>
+            <p:cNvPr id="16" name="TextBox 15"/>
+            <p:cNvSpPr txBox="1"/>
+            <p:nvPr/>
+          </p:nvSpPr>
+          <p:spPr>
+            <a:xfrm>
+              <a:off x="9059571" y="3729365"/>
+              <a:ext cx="343364" cy="253916"/>
+            </a:xfrm>
+            <a:prstGeom prst="rect">
+              <a:avLst/>
+            </a:prstGeom>
+            <a:noFill/>
+          </p:spPr>
+          <p:txBody>
+            <a:bodyPr wrap="none" rtlCol="0">
+              <a:spAutoFit/>
+            </a:bodyPr>
+            <a:lstStyle/>
+            <a:p>
+              <a:r>
+                <a:rPr lang="tr-TR" sz="1050" dirty="0" smtClean="0"/>
+                <a:t>[7]</a:t>
+              </a:r>
+              <a:endParaRPr lang="tr-TR" sz="1050" dirty="0"/>
+            </a:p>
+          </p:txBody>
+        </p:sp>
+      </p:grpSp>
     </p:spTree>
     <p:extLst>
       <p:ext uri="{BB962C8B-B14F-4D97-AF65-F5344CB8AC3E}">
-        <p14:creationId xmlns:p14="http://schemas.microsoft.com/office/powerpoint/2010/main" xmlns="" val="3835474893"/>
+        <p14:creationId xmlns="" xmlns:p14="http://schemas.microsoft.com/office/powerpoint/2010/main" val="1601229741"/>
+      </p:ext>
+    </p:extLst>
+  </p:cSld>
+  <p:clrMapOvr>
+    <a:masterClrMapping/>
+  </p:clrMapOvr>
+  <p:timing>
+    <p:tnLst>
+      <p:par>
+        <p:cTn id="1" dur="indefinite" restart="never" nodeType="tmRoot"/>
+      </p:par>
+    </p:tnLst>
+  </p:timing>
+</p:sld>
+</file>
+
+<file path=ppt/slides/slide6.xml><?xml version="1.0" encoding="utf-8"?>
+<p:sld xmlns:a="http://schemas.openxmlformats.org/drawingml/2006/main" xmlns:r="http://schemas.openxmlformats.org/officeDocument/2006/relationships" xmlns:p="http://schemas.openxmlformats.org/presentationml/2006/main">
+  <p:cSld>
+    <p:spTree>
+      <p:nvGrpSpPr>
+        <p:cNvPr id="1" name=""/>
+        <p:cNvGrpSpPr/>
+        <p:nvPr/>
+      </p:nvGrpSpPr>
+      <p:grpSpPr>
+        <a:xfrm>
+          <a:off x="0" y="0"/>
+          <a:ext cx="0" cy="0"/>
+          <a:chOff x="0" y="0"/>
+          <a:chExt cx="0" cy="0"/>
+        </a:xfrm>
+      </p:grpSpPr>
+      <p:sp>
+        <p:nvSpPr>
+          <p:cNvPr id="2" name="Title 1"/>
+          <p:cNvSpPr>
+            <a:spLocks noGrp="1"/>
+          </p:cNvSpPr>
+          <p:nvPr>
+            <p:ph type="title"/>
+          </p:nvPr>
+        </p:nvSpPr>
+        <p:spPr/>
+        <p:txBody>
+          <a:bodyPr/>
+          <a:lstStyle/>
+          <a:p>
+            <a:r>
+              <a:rPr lang="tr-TR" dirty="0" smtClean="0"/>
+              <a:t>Motivation</a:t>
+            </a:r>
+            <a:endParaRPr lang="tr-TR" dirty="0"/>
+          </a:p>
+        </p:txBody>
+      </p:sp>
+      <p:sp>
+        <p:nvSpPr>
+          <p:cNvPr id="3" name="Content Placeholder 2"/>
+          <p:cNvSpPr>
+            <a:spLocks noGrp="1"/>
+          </p:cNvSpPr>
+          <p:nvPr>
+            <p:ph idx="1"/>
+          </p:nvPr>
+        </p:nvSpPr>
+        <p:spPr/>
+        <p:txBody>
+          <a:bodyPr/>
+          <a:lstStyle/>
+          <a:p>
+            <a:r>
+              <a:rPr lang="tr-TR" dirty="0" smtClean="0"/>
+              <a:t>Formation control solutions are generally implemented with simple geometrical shapes which don’t change with time. </a:t>
+            </a:r>
+            <a:endParaRPr lang="tr-TR" dirty="0"/>
+          </a:p>
+        </p:txBody>
+      </p:sp>
+      <p:sp>
+        <p:nvSpPr>
+          <p:cNvPr id="4" name="Slide Number Placeholder 3"/>
+          <p:cNvSpPr>
+            <a:spLocks noGrp="1"/>
+          </p:cNvSpPr>
+          <p:nvPr>
+            <p:ph type="sldNum" sz="quarter" idx="12"/>
+          </p:nvPr>
+        </p:nvSpPr>
+        <p:spPr/>
+        <p:txBody>
+          <a:bodyPr/>
+          <a:lstStyle/>
+          <a:p>
+            <a:pPr>
+              <a:defRPr/>
+            </a:pPr>
+            <a:fld id="{C878F797-6006-4DDA-AFE9-456F280FE6C5}" type="slidenum">
+              <a:rPr lang="en-US" smtClean="0"/>
+              <a:pPr>
+                <a:defRPr/>
+              </a:pPr>
+              <a:t>6</a:t>
+            </a:fld>
+            <a:endParaRPr lang="en-US" dirty="0"/>
+          </a:p>
+        </p:txBody>
+      </p:sp>
+      <p:sp>
+        <p:nvSpPr>
+          <p:cNvPr id="5" name="Date Placeholder 4"/>
+          <p:cNvSpPr>
+            <a:spLocks noGrp="1"/>
+          </p:cNvSpPr>
+          <p:nvPr>
+            <p:ph type="dt" sz="half" idx="2"/>
+          </p:nvPr>
+        </p:nvSpPr>
+        <p:spPr/>
+        <p:txBody>
+          <a:bodyPr/>
+          <a:lstStyle/>
+          <a:p>
+            <a:pPr>
+              <a:defRPr/>
+            </a:pPr>
+            <a:r>
+              <a:rPr lang="tr-TR" smtClean="0"/>
+              <a:t>METU Electrical &amp; Electronics Engineering Department</a:t>
+            </a:r>
+            <a:endParaRPr lang="en-US" dirty="0"/>
+          </a:p>
+        </p:txBody>
+      </p:sp>
+      <p:pic>
+        <p:nvPicPr>
+          <p:cNvPr id="2050" name="Picture 2"/>
+          <p:cNvPicPr>
+            <a:picLocks noChangeAspect="1" noChangeArrowheads="1"/>
+          </p:cNvPicPr>
+          <p:nvPr/>
+        </p:nvPicPr>
+        <p:blipFill>
+          <a:blip r:embed="rId2"/>
+          <a:srcRect/>
+          <a:stretch>
+            <a:fillRect/>
+          </a:stretch>
+        </p:blipFill>
+        <p:spPr bwMode="auto">
+          <a:xfrm>
+            <a:off x="5621338" y="2382838"/>
+            <a:ext cx="2489200" cy="1797755"/>
+          </a:xfrm>
+          <a:prstGeom prst="rect">
+            <a:avLst/>
+          </a:prstGeom>
+          <a:noFill/>
+          <a:ln w="9525">
+            <a:noFill/>
+            <a:miter lim="800000"/>
+            <a:headEnd/>
+            <a:tailEnd/>
+          </a:ln>
+          <a:effectLst/>
+        </p:spPr>
+      </p:pic>
+      <p:pic>
+        <p:nvPicPr>
+          <p:cNvPr id="2051" name="Picture 3" descr="C:\Users\Kadir\Desktop\Seminer\houslotine.png"/>
+          <p:cNvPicPr>
+            <a:picLocks noChangeAspect="1" noChangeArrowheads="1"/>
+          </p:cNvPicPr>
+          <p:nvPr/>
+        </p:nvPicPr>
+        <p:blipFill>
+          <a:blip r:embed="rId3"/>
+          <a:srcRect/>
+          <a:stretch>
+            <a:fillRect/>
+          </a:stretch>
+        </p:blipFill>
+        <p:spPr bwMode="auto">
+          <a:xfrm>
+            <a:off x="876299" y="2382838"/>
+            <a:ext cx="3810001" cy="3431882"/>
+          </a:xfrm>
+          <a:prstGeom prst="rect">
+            <a:avLst/>
+          </a:prstGeom>
+          <a:noFill/>
+        </p:spPr>
+      </p:pic>
+      <p:pic>
+        <p:nvPicPr>
+          <p:cNvPr id="2052" name="Picture 4" descr="C:\Users\Kadir\Desktop\Seminer\complex.png"/>
+          <p:cNvPicPr>
+            <a:picLocks noChangeAspect="1" noChangeArrowheads="1"/>
+          </p:cNvPicPr>
+          <p:nvPr/>
+        </p:nvPicPr>
+        <p:blipFill>
+          <a:blip r:embed="rId4"/>
+          <a:srcRect/>
+          <a:stretch>
+            <a:fillRect/>
+          </a:stretch>
+        </p:blipFill>
+        <p:spPr bwMode="auto">
+          <a:xfrm>
+            <a:off x="5384800" y="4736733"/>
+            <a:ext cx="2801938" cy="1762694"/>
+          </a:xfrm>
+          <a:prstGeom prst="rect">
+            <a:avLst/>
+          </a:prstGeom>
+          <a:noFill/>
+        </p:spPr>
+      </p:pic>
+      <p:sp>
+        <p:nvSpPr>
+          <p:cNvPr id="17" name="TextBox 16"/>
+          <p:cNvSpPr txBox="1"/>
+          <p:nvPr/>
+        </p:nvSpPr>
+        <p:spPr>
+          <a:xfrm>
+            <a:off x="6070600" y="4295894"/>
+            <a:ext cx="1247457" cy="400110"/>
+          </a:xfrm>
+          <a:prstGeom prst="rect">
+            <a:avLst/>
+          </a:prstGeom>
+          <a:noFill/>
+        </p:spPr>
+        <p:txBody>
+          <a:bodyPr wrap="none" rtlCol="0">
+            <a:spAutoFit/>
+          </a:bodyPr>
+          <a:lstStyle/>
+          <a:p>
+            <a:r>
+              <a:rPr lang="tr-TR" sz="2000" u="sng" dirty="0" smtClean="0">
+                <a:latin typeface="Century Gothic" pitchFamily="34" charset="0"/>
+              </a:rPr>
+              <a:t>Our  aim</a:t>
+            </a:r>
+            <a:endParaRPr lang="tr-TR" sz="2000" u="sng" dirty="0">
+              <a:latin typeface="Century Gothic" pitchFamily="34" charset="0"/>
+            </a:endParaRPr>
+          </a:p>
+        </p:txBody>
+      </p:sp>
+    </p:spTree>
+    <p:extLst>
+      <p:ext uri="{BB962C8B-B14F-4D97-AF65-F5344CB8AC3E}">
+        <p14:creationId xmlns="" xmlns:p14="http://schemas.microsoft.com/office/powerpoint/2010/main" val="1601229741"/>
+      </p:ext>
+    </p:extLst>
+  </p:cSld>
+  <p:clrMapOvr>
+    <a:masterClrMapping/>
+  </p:clrMapOvr>
+  <p:timing>
+    <p:tnLst>
+      <p:par>
+        <p:cTn id="1" dur="indefinite" restart="never" nodeType="tmRoot"/>
+      </p:par>
+    </p:tnLst>
+  </p:timing>
+</p:sld>
+</file>
+
+<file path=ppt/slides/slide7.xml><?xml version="1.0" encoding="utf-8"?>
+<p:sld xmlns:a="http://schemas.openxmlformats.org/drawingml/2006/main" xmlns:r="http://schemas.openxmlformats.org/officeDocument/2006/relationships" xmlns:p="http://schemas.openxmlformats.org/presentationml/2006/main">
+  <p:cSld>
+    <p:spTree>
+      <p:nvGrpSpPr>
+        <p:cNvPr id="1" name=""/>
+        <p:cNvGrpSpPr/>
+        <p:nvPr/>
+      </p:nvGrpSpPr>
+      <p:grpSpPr>
+        <a:xfrm>
+          <a:off x="0" y="0"/>
+          <a:ext cx="0" cy="0"/>
+          <a:chOff x="0" y="0"/>
+          <a:chExt cx="0" cy="0"/>
+        </a:xfrm>
+      </p:grpSpPr>
+      <p:sp>
+        <p:nvSpPr>
+          <p:cNvPr id="2" name="Title 1"/>
+          <p:cNvSpPr>
+            <a:spLocks noGrp="1"/>
+          </p:cNvSpPr>
+          <p:nvPr>
+            <p:ph type="title"/>
+          </p:nvPr>
+        </p:nvSpPr>
+        <p:spPr/>
+        <p:txBody>
+          <a:bodyPr/>
+          <a:lstStyle/>
+          <a:p>
+            <a:r>
+              <a:rPr lang="tr-TR" dirty="0" smtClean="0"/>
+              <a:t>References</a:t>
+            </a:r>
+            <a:endParaRPr lang="tr-TR" dirty="0"/>
+          </a:p>
+        </p:txBody>
+      </p:sp>
+      <p:sp>
+        <p:nvSpPr>
+          <p:cNvPr id="3" name="Content Placeholder 2"/>
+          <p:cNvSpPr>
+            <a:spLocks noGrp="1"/>
+          </p:cNvSpPr>
+          <p:nvPr>
+            <p:ph idx="1"/>
+          </p:nvPr>
+        </p:nvSpPr>
+        <p:spPr/>
+        <p:txBody>
+          <a:bodyPr/>
+          <a:lstStyle/>
+          <a:p>
+            <a:pPr>
+              <a:buFont typeface="Arial" pitchFamily="34" charset="0"/>
+              <a:buChar char="•"/>
+            </a:pPr>
+            <a:r>
+              <a:rPr lang="tr-TR" sz="1600" dirty="0" smtClean="0"/>
+              <a:t>[1]</a:t>
+            </a:r>
+            <a:r>
+              <a:rPr lang="tr-TR" sz="1600" dirty="0" smtClean="0">
+                <a:hlinkClick r:id="rId2"/>
+              </a:rPr>
+              <a:t> </a:t>
+            </a:r>
+            <a:r>
+              <a:rPr lang="tr-TR" sz="1400" dirty="0" smtClean="0">
+                <a:hlinkClick r:id="rId2"/>
+              </a:rPr>
+              <a:t>http://www.eecs.harvard.edu/ssr/projects/progSA/kilobot.html</a:t>
+            </a:r>
+            <a:endParaRPr lang="tr-TR" sz="1600" dirty="0" smtClean="0"/>
+          </a:p>
+          <a:p>
+            <a:pPr>
+              <a:buFont typeface="Arial" pitchFamily="34" charset="0"/>
+              <a:buChar char="•"/>
+            </a:pPr>
+            <a:r>
+              <a:rPr lang="tr-TR" sz="1600" dirty="0" smtClean="0"/>
+              <a:t>[</a:t>
+            </a:r>
+            <a:r>
+              <a:rPr lang="tr-TR" sz="1600" dirty="0" smtClean="0"/>
+              <a:t>2] </a:t>
+            </a:r>
+            <a:r>
+              <a:rPr lang="tr-TR" sz="1100" dirty="0" smtClean="0"/>
+              <a:t>Martin N, Klupar P, “</a:t>
+            </a:r>
+            <a:r>
+              <a:rPr lang="en-US" sz="1100" dirty="0" err="1" smtClean="0"/>
+              <a:t>Techsat</a:t>
+            </a:r>
+            <a:r>
+              <a:rPr lang="en-US" sz="1100" dirty="0" smtClean="0"/>
+              <a:t> 21 And Revolutionizing </a:t>
+            </a:r>
+            <a:r>
+              <a:rPr lang="en-US" sz="1100" dirty="0" smtClean="0"/>
+              <a:t>Space</a:t>
+            </a:r>
+            <a:r>
+              <a:rPr lang="tr-TR" sz="1100" dirty="0" smtClean="0"/>
+              <a:t> M</a:t>
+            </a:r>
+            <a:r>
+              <a:rPr lang="en-US" sz="1100" dirty="0" err="1" smtClean="0"/>
+              <a:t>issions</a:t>
+            </a:r>
+            <a:r>
+              <a:rPr lang="tr-TR" sz="1100" dirty="0" smtClean="0"/>
+              <a:t> </a:t>
+            </a:r>
+            <a:r>
+              <a:rPr lang="tr-TR" sz="1100" dirty="0" smtClean="0"/>
+              <a:t>Using Mıcrosatellıtes”, </a:t>
+            </a:r>
+            <a:endParaRPr lang="tr-TR" sz="1600" dirty="0" smtClean="0"/>
+          </a:p>
+          <a:p>
+            <a:pPr>
+              <a:buFont typeface="Arial" pitchFamily="34" charset="0"/>
+              <a:buChar char="•"/>
+            </a:pPr>
+            <a:r>
+              <a:rPr lang="tr-TR" sz="1600" dirty="0" smtClean="0"/>
+              <a:t>[3]</a:t>
+            </a:r>
+            <a:r>
+              <a:rPr lang="tr-TR" sz="1600" dirty="0" smtClean="0">
+                <a:hlinkClick r:id="rId3"/>
+              </a:rPr>
+              <a:t> </a:t>
+            </a:r>
+            <a:r>
+              <a:rPr lang="tr-TR" sz="1400" dirty="0" smtClean="0">
+                <a:hlinkClick r:id="rId3"/>
+              </a:rPr>
+              <a:t>http://</a:t>
+            </a:r>
+            <a:r>
+              <a:rPr lang="tr-TR" sz="1400" dirty="0" smtClean="0">
+                <a:hlinkClick r:id="rId3"/>
+              </a:rPr>
+              <a:t>www.swarmanoid.org/swarmanoid_hardware.php.html</a:t>
+            </a:r>
+            <a:endParaRPr lang="tr-TR" sz="1400" dirty="0" smtClean="0"/>
+          </a:p>
+          <a:p>
+            <a:pPr>
+              <a:buFont typeface="Arial" pitchFamily="34" charset="0"/>
+              <a:buChar char="•"/>
+            </a:pPr>
+            <a:r>
+              <a:rPr lang="en-US" sz="1400" dirty="0" smtClean="0"/>
+              <a:t>[</a:t>
+            </a:r>
+            <a:r>
+              <a:rPr lang="tr-TR" sz="1400" dirty="0" smtClean="0"/>
+              <a:t>4</a:t>
+            </a:r>
+            <a:r>
+              <a:rPr lang="en-US" sz="1400" dirty="0" smtClean="0"/>
+              <a:t>] </a:t>
+            </a:r>
+            <a:r>
+              <a:rPr lang="en-US" sz="1400" dirty="0" smtClean="0"/>
+              <a:t>S </a:t>
+            </a:r>
+            <a:r>
+              <a:rPr lang="en-US" sz="1400" dirty="0" err="1" smtClean="0"/>
+              <a:t>Kornienki</a:t>
+            </a:r>
+            <a:r>
+              <a:rPr lang="en-US" sz="1400" dirty="0" smtClean="0"/>
+              <a:t>, O. </a:t>
+            </a:r>
+            <a:r>
+              <a:rPr lang="en-US" sz="1400" dirty="0" err="1" smtClean="0"/>
+              <a:t>Kornienko</a:t>
+            </a:r>
+            <a:r>
+              <a:rPr lang="en-US" sz="1400" dirty="0" smtClean="0"/>
+              <a:t>, and Levi. P. Minimalistic approach towards communication</a:t>
+            </a:r>
+          </a:p>
+          <a:p>
+            <a:r>
+              <a:rPr lang="en-US" sz="1400" dirty="0" smtClean="0"/>
+              <a:t>and perception in </a:t>
+            </a:r>
+            <a:r>
+              <a:rPr lang="en-US" sz="1400" dirty="0" err="1" smtClean="0"/>
+              <a:t>microrobotic</a:t>
+            </a:r>
+            <a:r>
+              <a:rPr lang="en-US" sz="1400" dirty="0" smtClean="0"/>
+              <a:t> swarms. In IEEE International </a:t>
+            </a:r>
+            <a:r>
+              <a:rPr lang="en-US" sz="1400" dirty="0" smtClean="0"/>
+              <a:t>Conference</a:t>
+            </a:r>
+            <a:r>
+              <a:rPr lang="tr-TR" sz="1400" dirty="0" smtClean="0"/>
+              <a:t> </a:t>
+            </a:r>
+            <a:r>
+              <a:rPr lang="en-US" sz="1400" dirty="0" smtClean="0"/>
+              <a:t>on </a:t>
+            </a:r>
+            <a:r>
+              <a:rPr lang="en-US" sz="1400" dirty="0" smtClean="0"/>
+              <a:t>Intelligent Robots and Systems, 2005</a:t>
+            </a:r>
+            <a:r>
+              <a:rPr lang="en-US" sz="1400" dirty="0" smtClean="0"/>
+              <a:t>.</a:t>
+            </a:r>
+            <a:endParaRPr lang="tr-TR" sz="1400" dirty="0" smtClean="0"/>
+          </a:p>
+          <a:p>
+            <a:pPr>
+              <a:buFont typeface="Arial" pitchFamily="34" charset="0"/>
+              <a:buChar char="•"/>
+            </a:pPr>
+            <a:r>
+              <a:rPr lang="tr-TR" sz="1400" dirty="0" smtClean="0"/>
+              <a:t>[5]</a:t>
+            </a:r>
+            <a:r>
+              <a:rPr lang="tr-TR" sz="1400" dirty="0" smtClean="0"/>
+              <a:t> Farshad Arvin, John Murray, Licheng Shi, Chun Zhang, and Shigang Yue. Development</a:t>
+            </a:r>
+          </a:p>
+          <a:p>
+            <a:r>
+              <a:rPr lang="en-US" sz="1400" dirty="0" smtClean="0"/>
+              <a:t>of an autonomous micro robot for swarm robotics. In IEEE </a:t>
+            </a:r>
+            <a:r>
+              <a:rPr lang="en-US" sz="1400" dirty="0" smtClean="0"/>
+              <a:t>International</a:t>
+            </a:r>
+            <a:r>
+              <a:rPr lang="tr-TR" sz="1400" dirty="0" smtClean="0"/>
+              <a:t> </a:t>
+            </a:r>
+            <a:r>
+              <a:rPr lang="en-US" sz="1400" dirty="0" smtClean="0"/>
+              <a:t>Conference </a:t>
+            </a:r>
+            <a:r>
+              <a:rPr lang="en-US" sz="1400" dirty="0" smtClean="0"/>
+              <a:t>on </a:t>
+            </a:r>
+            <a:r>
+              <a:rPr lang="en-US" sz="1400" dirty="0" err="1" smtClean="0"/>
+              <a:t>Mechatronics</a:t>
+            </a:r>
+            <a:r>
+              <a:rPr lang="en-US" sz="1400" dirty="0" smtClean="0"/>
+              <a:t> and Automation, 2014</a:t>
+            </a:r>
+            <a:r>
+              <a:rPr lang="en-US" sz="1400" dirty="0" smtClean="0"/>
+              <a:t>.</a:t>
+            </a:r>
+            <a:endParaRPr lang="tr-TR" sz="1400" dirty="0" smtClean="0"/>
+          </a:p>
+          <a:p>
+            <a:pPr>
+              <a:buFont typeface="Arial" pitchFamily="34" charset="0"/>
+              <a:buChar char="•"/>
+            </a:pPr>
+            <a:r>
+              <a:rPr lang="tr-TR" sz="1400" dirty="0" smtClean="0"/>
+              <a:t>[6]</a:t>
+            </a:r>
+            <a:r>
+              <a:rPr lang="it-IT" sz="1400" dirty="0" smtClean="0"/>
+              <a:t>Touraj </a:t>
+            </a:r>
+            <a:r>
+              <a:rPr lang="it-IT" sz="1400" dirty="0" smtClean="0"/>
+              <a:t>Soleymani, Vito Trianni, Michael Bonani, Francesco Mondada, </a:t>
+            </a:r>
+            <a:r>
+              <a:rPr lang="it-IT" sz="1400" dirty="0" smtClean="0"/>
+              <a:t>and</a:t>
+            </a:r>
+            <a:r>
+              <a:rPr lang="tr-TR" sz="1400" dirty="0" smtClean="0"/>
+              <a:t> </a:t>
+            </a:r>
+            <a:r>
+              <a:rPr lang="en-US" sz="1400" dirty="0" smtClean="0"/>
+              <a:t>Marco </a:t>
+            </a:r>
+            <a:r>
+              <a:rPr lang="en-US" sz="1400" dirty="0" err="1" smtClean="0"/>
+              <a:t>Dorigo</a:t>
+            </a:r>
+            <a:r>
+              <a:rPr lang="en-US" sz="1400" dirty="0" smtClean="0"/>
+              <a:t>. Bio-inspired construction with mobile robots and </a:t>
+            </a:r>
+            <a:r>
+              <a:rPr lang="en-US" sz="1400" dirty="0" smtClean="0"/>
+              <a:t>compliant</a:t>
+            </a:r>
+            <a:r>
+              <a:rPr lang="tr-TR" sz="1400" dirty="0" smtClean="0"/>
+              <a:t> </a:t>
+            </a:r>
+            <a:r>
+              <a:rPr lang="en-US" sz="1400" dirty="0" smtClean="0"/>
+              <a:t>pockets</a:t>
+            </a:r>
+            <a:r>
+              <a:rPr lang="en-US" sz="1400" dirty="0" smtClean="0"/>
+              <a:t>. Robotics and </a:t>
+            </a:r>
+            <a:r>
+              <a:rPr lang="en-US" sz="1400" dirty="0" err="1" smtClean="0"/>
+              <a:t>Autonomus</a:t>
+            </a:r>
+            <a:r>
+              <a:rPr lang="en-US" sz="1400" dirty="0" smtClean="0"/>
+              <a:t> Systems, 74:340–350, 2015</a:t>
+            </a:r>
+            <a:r>
+              <a:rPr lang="en-US" sz="1400" dirty="0" smtClean="0"/>
+              <a:t>.</a:t>
+            </a:r>
+            <a:endParaRPr lang="tr-TR" sz="1400" dirty="0" smtClean="0"/>
+          </a:p>
+          <a:p>
+            <a:pPr>
+              <a:buFont typeface="Arial" pitchFamily="34" charset="0"/>
+              <a:buChar char="•"/>
+            </a:pPr>
+            <a:r>
+              <a:rPr lang="tr-TR" sz="1400" dirty="0" smtClean="0"/>
+              <a:t>[7] Roderich </a:t>
+            </a:r>
+            <a:r>
+              <a:rPr lang="tr-TR" sz="1400" dirty="0" smtClean="0"/>
+              <a:t>Grof, Michael Bonani, Mondada Francesco, and Marco Dorigo. Autonomous</a:t>
+            </a:r>
+          </a:p>
+          <a:p>
+            <a:r>
+              <a:rPr lang="en-US" sz="1400" dirty="0" smtClean="0"/>
+              <a:t>self-assembly in a swarm-bot. 22:1115–1130, 2006.</a:t>
+            </a:r>
+            <a:endParaRPr lang="tr-TR" sz="1400" dirty="0" smtClean="0"/>
+          </a:p>
+          <a:p>
+            <a:pPr>
+              <a:buFont typeface="Arial" pitchFamily="34" charset="0"/>
+              <a:buChar char="•"/>
+            </a:pPr>
+            <a:endParaRPr lang="tr-TR" sz="1600" dirty="0" smtClean="0"/>
+          </a:p>
+          <a:p>
+            <a:endParaRPr lang="tr-TR" sz="1600" dirty="0" smtClean="0"/>
+          </a:p>
+          <a:p>
+            <a:r>
+              <a:rPr lang="tr-TR" sz="1600" dirty="0" smtClean="0"/>
+              <a:t>             </a:t>
+            </a:r>
+            <a:r>
+              <a:rPr lang="tr-TR" sz="1600" dirty="0" smtClean="0"/>
+              <a:t>              </a:t>
+            </a:r>
+            <a:endParaRPr lang="tr-TR" sz="1600" dirty="0"/>
+          </a:p>
+        </p:txBody>
+      </p:sp>
+      <p:sp>
+        <p:nvSpPr>
+          <p:cNvPr id="4" name="Slide Number Placeholder 3"/>
+          <p:cNvSpPr>
+            <a:spLocks noGrp="1"/>
+          </p:cNvSpPr>
+          <p:nvPr>
+            <p:ph type="sldNum" sz="quarter" idx="12"/>
+          </p:nvPr>
+        </p:nvSpPr>
+        <p:spPr/>
+        <p:txBody>
+          <a:bodyPr/>
+          <a:lstStyle/>
+          <a:p>
+            <a:pPr>
+              <a:defRPr/>
+            </a:pPr>
+            <a:fld id="{C878F797-6006-4DDA-AFE9-456F280FE6C5}" type="slidenum">
+              <a:rPr lang="en-US" smtClean="0"/>
+              <a:pPr>
+                <a:defRPr/>
+              </a:pPr>
+              <a:t>7</a:t>
+            </a:fld>
+            <a:endParaRPr lang="en-US" dirty="0"/>
+          </a:p>
+        </p:txBody>
+      </p:sp>
+      <p:sp>
+        <p:nvSpPr>
+          <p:cNvPr id="5" name="Date Placeholder 4"/>
+          <p:cNvSpPr>
+            <a:spLocks noGrp="1"/>
+          </p:cNvSpPr>
+          <p:nvPr>
+            <p:ph type="dt" sz="half" idx="2"/>
+          </p:nvPr>
+        </p:nvSpPr>
+        <p:spPr/>
+        <p:txBody>
+          <a:bodyPr/>
+          <a:lstStyle/>
+          <a:p>
+            <a:pPr>
+              <a:defRPr/>
+            </a:pPr>
+            <a:r>
+              <a:rPr lang="tr-TR" smtClean="0"/>
+              <a:t>METU Electrical &amp; Electronics Engineering Department</a:t>
+            </a:r>
+            <a:endParaRPr lang="en-US" dirty="0"/>
+          </a:p>
+        </p:txBody>
+      </p:sp>
+    </p:spTree>
+    <p:extLst>
+      <p:ext uri="{BB962C8B-B14F-4D97-AF65-F5344CB8AC3E}">
+        <p14:creationId xmlns="" xmlns:p14="http://schemas.microsoft.com/office/powerpoint/2010/main" val="1601229741"/>
+      </p:ext>
+    </p:extLst>
+  </p:cSld>
+  <p:clrMapOvr>
+    <a:masterClrMapping/>
+  </p:clrMapOvr>
+  <p:timing>
+    <p:tnLst>
+      <p:par>
+        <p:cTn id="1" dur="indefinite" restart="never" nodeType="tmRoot"/>
+      </p:par>
+    </p:tnLst>
+  </p:timing>
+</p:sld>
+</file>
+
+<file path=ppt/slides/slide8.xml><?xml version="1.0" encoding="utf-8"?>
+<p:sld xmlns:a="http://schemas.openxmlformats.org/drawingml/2006/main" xmlns:r="http://schemas.openxmlformats.org/officeDocument/2006/relationships" xmlns:p="http://schemas.openxmlformats.org/presentationml/2006/main">
+  <p:cSld>
+    <p:spTree>
+      <p:nvGrpSpPr>
+        <p:cNvPr id="1" name=""/>
+        <p:cNvGrpSpPr/>
+        <p:nvPr/>
+      </p:nvGrpSpPr>
+      <p:grpSpPr>
+        <a:xfrm>
+          <a:off x="0" y="0"/>
+          <a:ext cx="0" cy="0"/>
+          <a:chOff x="0" y="0"/>
+          <a:chExt cx="0" cy="0"/>
+        </a:xfrm>
+      </p:grpSpPr>
+    </p:spTree>
+    <p:extLst>
+      <p:ext uri="{BB962C8B-B14F-4D97-AF65-F5344CB8AC3E}">
+        <p14:creationId xmlns="" xmlns:p14="http://schemas.microsoft.com/office/powerpoint/2010/main" val="3835474893"/>
       </p:ext>
     </p:extLst>
   </p:cSld>

</xml_diff>

<commit_message>
[update] formation control kismi sunuma ekleniyor
</commit_message>
<xml_diff>
--- a/juri_sunum.pptx
+++ b/juri_sunum.pptx
@@ -5,10 +5,10 @@
     <p:sldMasterId id="2147483886" r:id="rId1"/>
   </p:sldMasterIdLst>
   <p:notesMasterIdLst>
-    <p:notesMasterId r:id="rId21"/>
+    <p:notesMasterId r:id="rId25"/>
   </p:notesMasterIdLst>
   <p:handoutMasterIdLst>
-    <p:handoutMasterId r:id="rId22"/>
+    <p:handoutMasterId r:id="rId26"/>
   </p:handoutMasterIdLst>
   <p:sldIdLst>
     <p:sldId id="299" r:id="rId2"/>
@@ -28,8 +28,12 @@
     <p:sldId id="316" r:id="rId16"/>
     <p:sldId id="317" r:id="rId17"/>
     <p:sldId id="319" r:id="rId18"/>
-    <p:sldId id="305" r:id="rId19"/>
-    <p:sldId id="303" r:id="rId20"/>
+    <p:sldId id="320" r:id="rId19"/>
+    <p:sldId id="321" r:id="rId20"/>
+    <p:sldId id="322" r:id="rId21"/>
+    <p:sldId id="323" r:id="rId22"/>
+    <p:sldId id="305" r:id="rId23"/>
+    <p:sldId id="303" r:id="rId24"/>
   </p:sldIdLst>
   <p:sldSz cx="9144000" cy="6858000" type="screen4x3"/>
   <p:notesSz cx="6858000" cy="9144000"/>
@@ -160,7 +164,7 @@
   </p:defaultTextStyle>
   <p:extLst>
     <p:ext uri="{EFAFB233-063F-42B5-8137-9DF3F51BA10A}">
-      <p15:sldGuideLst xmlns:p15="http://schemas.microsoft.com/office/powerpoint/2012/main" xmlns="">
+      <p15:sldGuideLst xmlns:p15="http://schemas.microsoft.com/office/powerpoint/2012/main">
         <p15:guide id="1" orient="horz" pos="2160">
           <p15:clr>
             <a:srgbClr val="A4A3A4"/>
@@ -284,7 +288,7 @@
               <a:pPr>
                 <a:defRPr/>
               </a:pPr>
-              <a:t>4/17/2016</a:t>
+              <a:t>4/23/2016</a:t>
             </a:fld>
             <a:endParaRPr lang="en-US"/>
           </a:p>
@@ -382,7 +386,7 @@
     </p:spTree>
     <p:extLst>
       <p:ext uri="{BB962C8B-B14F-4D97-AF65-F5344CB8AC3E}">
-        <p14:creationId xmlns="" xmlns:p14="http://schemas.microsoft.com/office/powerpoint/2010/main" val="2307124841"/>
+        <p14:creationId xmlns:p14="http://schemas.microsoft.com/office/powerpoint/2010/main" val="2307124841"/>
       </p:ext>
     </p:extLst>
   </p:cSld>
@@ -498,7 +502,7 @@
               <a:pPr>
                 <a:defRPr/>
               </a:pPr>
-              <a:t>4/17/2016</a:t>
+              <a:t>4/23/2016</a:t>
             </a:fld>
             <a:endParaRPr lang="en-US"/>
           </a:p>
@@ -692,7 +696,7 @@
     </p:spTree>
     <p:extLst>
       <p:ext uri="{BB962C8B-B14F-4D97-AF65-F5344CB8AC3E}">
-        <p14:creationId xmlns="" xmlns:p14="http://schemas.microsoft.com/office/powerpoint/2010/main" val="733486758"/>
+        <p14:creationId xmlns:p14="http://schemas.microsoft.com/office/powerpoint/2010/main" val="733486758"/>
       </p:ext>
     </p:extLst>
   </p:cSld>
@@ -854,14 +858,14 @@
           <a:noFill/>
           <a:extLst>
             <a:ext uri="{909E8E84-426E-40DD-AFC4-6F175D3DCCD1}">
-              <a14:hiddenFill xmlns="" xmlns:a14="http://schemas.microsoft.com/office/drawing/2010/main">
+              <a14:hiddenFill xmlns:a14="http://schemas.microsoft.com/office/drawing/2010/main">
                 <a:solidFill>
                   <a:srgbClr val="FFFFFF"/>
                 </a:solidFill>
               </a14:hiddenFill>
             </a:ext>
             <a:ext uri="{91240B29-F687-4F45-9708-019B960494DF}">
-              <a14:hiddenLine xmlns="" xmlns:a14="http://schemas.microsoft.com/office/drawing/2010/main" w="9525">
+              <a14:hiddenLine xmlns:a14="http://schemas.microsoft.com/office/drawing/2010/main" w="9525">
                 <a:solidFill>
                   <a:srgbClr val="000000"/>
                 </a:solidFill>
@@ -1008,7 +1012,7 @@
           </a:ln>
           <a:extLst>
             <a:ext uri="{909E8E84-426E-40DD-AFC4-6F175D3DCCD1}">
-              <a14:hiddenFill xmlns="" xmlns:a14="http://schemas.microsoft.com/office/drawing/2010/main">
+              <a14:hiddenFill xmlns:a14="http://schemas.microsoft.com/office/drawing/2010/main">
                 <a:solidFill>
                   <a:srgbClr val="FFFFFF"/>
                 </a:solidFill>
@@ -1031,14 +1035,14 @@
           <a:noFill/>
           <a:extLst>
             <a:ext uri="{909E8E84-426E-40DD-AFC4-6F175D3DCCD1}">
-              <a14:hiddenFill xmlns="" xmlns:a14="http://schemas.microsoft.com/office/drawing/2010/main">
+              <a14:hiddenFill xmlns:a14="http://schemas.microsoft.com/office/drawing/2010/main">
                 <a:solidFill>
                   <a:srgbClr val="FFFFFF"/>
                 </a:solidFill>
               </a14:hiddenFill>
             </a:ext>
             <a:ext uri="{91240B29-F687-4F45-9708-019B960494DF}">
-              <a14:hiddenLine xmlns="" xmlns:a14="http://schemas.microsoft.com/office/drawing/2010/main" w="9525">
+              <a14:hiddenLine xmlns:a14="http://schemas.microsoft.com/office/drawing/2010/main" w="9525">
                 <a:solidFill>
                   <a:srgbClr val="000000"/>
                 </a:solidFill>
@@ -1073,7 +1077,7 @@
     </p:spTree>
     <p:extLst>
       <p:ext uri="{BB962C8B-B14F-4D97-AF65-F5344CB8AC3E}">
-        <p14:creationId xmlns="" xmlns:p14="http://schemas.microsoft.com/office/powerpoint/2010/main" val="1831345199"/>
+        <p14:creationId xmlns:p14="http://schemas.microsoft.com/office/powerpoint/2010/main" val="1831345199"/>
       </p:ext>
     </p:extLst>
   </p:cSld>
@@ -1112,7 +1116,7 @@
           <a:blip r:embed="rId2">
             <a:extLst>
               <a:ext uri="{28A0092B-C50C-407E-A947-70E740481C1C}">
-                <a14:useLocalDpi xmlns="" xmlns:a14="http://schemas.microsoft.com/office/drawing/2010/main" val="0"/>
+                <a14:useLocalDpi xmlns:a14="http://schemas.microsoft.com/office/drawing/2010/main" val="0"/>
               </a:ext>
             </a:extLst>
           </a:blip>
@@ -1135,14 +1139,14 @@
           </a:ln>
           <a:extLst>
             <a:ext uri="{909E8E84-426E-40DD-AFC4-6F175D3DCCD1}">
-              <a14:hiddenFill xmlns="" xmlns:a14="http://schemas.microsoft.com/office/drawing/2010/main">
+              <a14:hiddenFill xmlns:a14="http://schemas.microsoft.com/office/drawing/2010/main">
                 <a:solidFill>
                   <a:srgbClr val="FFFFFF"/>
                 </a:solidFill>
               </a14:hiddenFill>
             </a:ext>
             <a:ext uri="{91240B29-F687-4F45-9708-019B960494DF}">
-              <a14:hiddenLine xmlns="" xmlns:a14="http://schemas.microsoft.com/office/drawing/2010/main" w="9525">
+              <a14:hiddenLine xmlns:a14="http://schemas.microsoft.com/office/drawing/2010/main" w="9525">
                 <a:solidFill>
                   <a:srgbClr val="000000"/>
                 </a:solidFill>
@@ -1508,7 +1512,7 @@
     </p:spTree>
     <p:extLst>
       <p:ext uri="{BB962C8B-B14F-4D97-AF65-F5344CB8AC3E}">
-        <p14:creationId xmlns="" xmlns:p14="http://schemas.microsoft.com/office/powerpoint/2010/main" val="4044641051"/>
+        <p14:creationId xmlns:p14="http://schemas.microsoft.com/office/powerpoint/2010/main" val="4044641051"/>
       </p:ext>
     </p:extLst>
   </p:cSld>
@@ -1826,7 +1830,7 @@
     </p:spTree>
     <p:extLst>
       <p:ext uri="{BB962C8B-B14F-4D97-AF65-F5344CB8AC3E}">
-        <p14:creationId xmlns="" xmlns:p14="http://schemas.microsoft.com/office/powerpoint/2010/main" val="43940600"/>
+        <p14:creationId xmlns:p14="http://schemas.microsoft.com/office/powerpoint/2010/main" val="43940600"/>
       </p:ext>
     </p:extLst>
   </p:cSld>
@@ -2211,7 +2215,7 @@
     </p:spTree>
     <p:extLst>
       <p:ext uri="{BB962C8B-B14F-4D97-AF65-F5344CB8AC3E}">
-        <p14:creationId xmlns="" xmlns:p14="http://schemas.microsoft.com/office/powerpoint/2010/main" val="4116636478"/>
+        <p14:creationId xmlns:p14="http://schemas.microsoft.com/office/powerpoint/2010/main" val="4116636478"/>
       </p:ext>
     </p:extLst>
   </p:cSld>
@@ -2618,7 +2622,7 @@
     </p:spTree>
     <p:extLst>
       <p:ext uri="{BB962C8B-B14F-4D97-AF65-F5344CB8AC3E}">
-        <p14:creationId xmlns="" xmlns:p14="http://schemas.microsoft.com/office/powerpoint/2010/main" val="4111024574"/>
+        <p14:creationId xmlns:p14="http://schemas.microsoft.com/office/powerpoint/2010/main" val="4111024574"/>
       </p:ext>
     </p:extLst>
   </p:cSld>
@@ -2797,7 +2801,7 @@
     </p:spTree>
     <p:extLst>
       <p:ext uri="{BB962C8B-B14F-4D97-AF65-F5344CB8AC3E}">
-        <p14:creationId xmlns="" xmlns:p14="http://schemas.microsoft.com/office/powerpoint/2010/main" val="2069476619"/>
+        <p14:creationId xmlns:p14="http://schemas.microsoft.com/office/powerpoint/2010/main" val="2069476619"/>
       </p:ext>
     </p:extLst>
   </p:cSld>
@@ -2916,7 +2920,7 @@
     </p:spTree>
     <p:extLst>
       <p:ext uri="{BB962C8B-B14F-4D97-AF65-F5344CB8AC3E}">
-        <p14:creationId xmlns="" xmlns:p14="http://schemas.microsoft.com/office/powerpoint/2010/main" val="1462183360"/>
+        <p14:creationId xmlns:p14="http://schemas.microsoft.com/office/powerpoint/2010/main" val="1462183360"/>
       </p:ext>
     </p:extLst>
   </p:cSld>
@@ -2962,7 +2966,7 @@
           <a:blip r:embed="rId2">
             <a:extLst>
               <a:ext uri="{28A0092B-C50C-407E-A947-70E740481C1C}">
-                <a14:useLocalDpi xmlns="" xmlns:a14="http://schemas.microsoft.com/office/drawing/2010/main" val="0"/>
+                <a14:useLocalDpi xmlns:a14="http://schemas.microsoft.com/office/drawing/2010/main" val="0"/>
               </a:ext>
             </a:extLst>
           </a:blip>
@@ -2985,14 +2989,14 @@
           </a:ln>
           <a:extLst>
             <a:ext uri="{909E8E84-426E-40DD-AFC4-6F175D3DCCD1}">
-              <a14:hiddenFill xmlns="" xmlns:a14="http://schemas.microsoft.com/office/drawing/2010/main">
+              <a14:hiddenFill xmlns:a14="http://schemas.microsoft.com/office/drawing/2010/main">
                 <a:solidFill>
                   <a:srgbClr val="FFFFFF"/>
                 </a:solidFill>
               </a14:hiddenFill>
             </a:ext>
             <a:ext uri="{91240B29-F687-4F45-9708-019B960494DF}">
-              <a14:hiddenLine xmlns="" xmlns:a14="http://schemas.microsoft.com/office/drawing/2010/main" w="9525">
+              <a14:hiddenLine xmlns:a14="http://schemas.microsoft.com/office/drawing/2010/main" w="9525">
                 <a:solidFill>
                   <a:srgbClr val="000000"/>
                 </a:solidFill>
@@ -3026,14 +3030,14 @@
           </a:ln>
           <a:extLst>
             <a:ext uri="{909E8E84-426E-40DD-AFC4-6F175D3DCCD1}">
-              <a14:hiddenFill xmlns="" xmlns:a14="http://schemas.microsoft.com/office/drawing/2010/main">
+              <a14:hiddenFill xmlns:a14="http://schemas.microsoft.com/office/drawing/2010/main">
                 <a:solidFill>
                   <a:srgbClr val="FFFFFF"/>
                 </a:solidFill>
               </a14:hiddenFill>
             </a:ext>
             <a:ext uri="{91240B29-F687-4F45-9708-019B960494DF}">
-              <a14:hiddenLine xmlns="" xmlns:a14="http://schemas.microsoft.com/office/drawing/2010/main" w="9525">
+              <a14:hiddenLine xmlns:a14="http://schemas.microsoft.com/office/drawing/2010/main" w="9525">
                 <a:solidFill>
                   <a:srgbClr val="000000"/>
                 </a:solidFill>
@@ -3181,7 +3185,7 @@
     </p:spTree>
     <p:extLst>
       <p:ext uri="{BB962C8B-B14F-4D97-AF65-F5344CB8AC3E}">
-        <p14:creationId xmlns="" xmlns:p14="http://schemas.microsoft.com/office/powerpoint/2010/main" val="3245506927"/>
+        <p14:creationId xmlns:p14="http://schemas.microsoft.com/office/powerpoint/2010/main" val="3245506927"/>
       </p:ext>
     </p:extLst>
   </p:cSld>
@@ -3300,7 +3304,7 @@
             <a:blip r:embed="rId9">
               <a:extLst>
                 <a:ext uri="{28A0092B-C50C-407E-A947-70E740481C1C}">
-                  <a14:useLocalDpi xmlns="" xmlns:a14="http://schemas.microsoft.com/office/drawing/2010/main" val="0"/>
+                  <a14:useLocalDpi xmlns:a14="http://schemas.microsoft.com/office/drawing/2010/main" val="0"/>
                 </a:ext>
               </a:extLst>
             </a:blip>
@@ -3323,14 +3327,14 @@
             </a:ln>
             <a:extLst>
               <a:ext uri="{909E8E84-426E-40DD-AFC4-6F175D3DCCD1}">
-                <a14:hiddenFill xmlns="" xmlns:a14="http://schemas.microsoft.com/office/drawing/2010/main">
+                <a14:hiddenFill xmlns:a14="http://schemas.microsoft.com/office/drawing/2010/main">
                   <a:solidFill>
                     <a:srgbClr val="FFFFFF"/>
                   </a:solidFill>
                 </a14:hiddenFill>
               </a:ext>
               <a:ext uri="{91240B29-F687-4F45-9708-019B960494DF}">
-                <a14:hiddenLine xmlns="" xmlns:a14="http://schemas.microsoft.com/office/drawing/2010/main" w="9525">
+                <a14:hiddenLine xmlns:a14="http://schemas.microsoft.com/office/drawing/2010/main" w="9525">
                   <a:solidFill>
                     <a:srgbClr val="000000"/>
                   </a:solidFill>
@@ -3499,14 +3503,14 @@
           </a:ln>
           <a:extLst>
             <a:ext uri="{909E8E84-426E-40DD-AFC4-6F175D3DCCD1}">
-              <a14:hiddenFill xmlns="" xmlns:a14="http://schemas.microsoft.com/office/drawing/2010/main">
+              <a14:hiddenFill xmlns:a14="http://schemas.microsoft.com/office/drawing/2010/main">
                 <a:solidFill>
                   <a:srgbClr val="FFFFFF"/>
                 </a:solidFill>
               </a14:hiddenFill>
             </a:ext>
             <a:ext uri="{91240B29-F687-4F45-9708-019B960494DF}">
-              <a14:hiddenLine xmlns="" xmlns:a14="http://schemas.microsoft.com/office/drawing/2010/main" w="9525">
+              <a14:hiddenLine xmlns:a14="http://schemas.microsoft.com/office/drawing/2010/main" w="9525">
                 <a:solidFill>
                   <a:srgbClr val="000000"/>
                 </a:solidFill>
@@ -3590,14 +3594,14 @@
           </a:ln>
           <a:extLst>
             <a:ext uri="{909E8E84-426E-40DD-AFC4-6F175D3DCCD1}">
-              <a14:hiddenFill xmlns="" xmlns:a14="http://schemas.microsoft.com/office/drawing/2010/main">
+              <a14:hiddenFill xmlns:a14="http://schemas.microsoft.com/office/drawing/2010/main">
                 <a:solidFill>
                   <a:srgbClr val="FFFFFF"/>
                 </a:solidFill>
               </a14:hiddenFill>
             </a:ext>
             <a:ext uri="{91240B29-F687-4F45-9708-019B960494DF}">
-              <a14:hiddenLine xmlns="" xmlns:a14="http://schemas.microsoft.com/office/drawing/2010/main" w="9525">
+              <a14:hiddenLine xmlns:a14="http://schemas.microsoft.com/office/drawing/2010/main" w="9525">
                 <a:solidFill>
                   <a:srgbClr val="000000"/>
                 </a:solidFill>
@@ -4244,7 +4248,7 @@
           <a:blip r:embed="rId3">
             <a:extLst>
               <a:ext uri="{28A0092B-C50C-407E-A947-70E740481C1C}">
-                <a14:useLocalDpi xmlns="" xmlns:a14="http://schemas.microsoft.com/office/drawing/2010/main" val="0"/>
+                <a14:useLocalDpi xmlns:a14="http://schemas.microsoft.com/office/drawing/2010/main" val="0"/>
               </a:ext>
             </a:extLst>
           </a:blip>
@@ -4267,14 +4271,14 @@
           </a:ln>
           <a:extLst>
             <a:ext uri="{909E8E84-426E-40DD-AFC4-6F175D3DCCD1}">
-              <a14:hiddenFill xmlns="" xmlns:a14="http://schemas.microsoft.com/office/drawing/2010/main">
+              <a14:hiddenFill xmlns:a14="http://schemas.microsoft.com/office/drawing/2010/main">
                 <a:solidFill>
                   <a:srgbClr val="FFFFFF"/>
                 </a:solidFill>
               </a14:hiddenFill>
             </a:ext>
             <a:ext uri="{91240B29-F687-4F45-9708-019B960494DF}">
-              <a14:hiddenLine xmlns="" xmlns:a14="http://schemas.microsoft.com/office/drawing/2010/main" w="9525">
+              <a14:hiddenLine xmlns:a14="http://schemas.microsoft.com/office/drawing/2010/main" w="9525">
                 <a:solidFill>
                   <a:srgbClr val="000000"/>
                 </a:solidFill>
@@ -4401,11 +4405,7 @@
             </a:r>
             <a:r>
               <a:rPr lang="en-US" sz="1600" u="sng" dirty="0" smtClean="0"/>
-              <a:t>Route </a:t>
-            </a:r>
-            <a:r>
-              <a:rPr lang="en-US" sz="1600" u="sng" dirty="0" smtClean="0"/>
-              <a:t>Table Determination</a:t>
+              <a:t>Route Table Determination</a:t>
             </a:r>
           </a:p>
           <a:p>
@@ -4424,15 +4424,7 @@
             </a:r>
             <a:r>
               <a:rPr lang="en-US" sz="1400" dirty="0" smtClean="0"/>
-              <a:t>determines </a:t>
-            </a:r>
-            <a:r>
-              <a:rPr lang="en-US" sz="1400" dirty="0" smtClean="0"/>
-              <a:t>the clusters around </a:t>
-            </a:r>
-            <a:r>
-              <a:rPr lang="en-US" sz="1400" dirty="0" smtClean="0"/>
-              <a:t>the</a:t>
+              <a:t>determines the clusters around the</a:t>
             </a:r>
             <a:r>
               <a:rPr lang="tr-TR" sz="1400" dirty="0" smtClean="0"/>
@@ -4444,11 +4436,7 @@
             </a:r>
             <a:r>
               <a:rPr lang="en-US" sz="1400" dirty="0" smtClean="0"/>
-              <a:t> </a:t>
-            </a:r>
-            <a:r>
-              <a:rPr lang="en-US" sz="1400" dirty="0" smtClean="0"/>
-              <a:t>beacons and provides the order for the </a:t>
+              <a:t> beacons and provides the order for the </a:t>
             </a:r>
             <a:r>
               <a:rPr lang="tr-TR" sz="1400" dirty="0" smtClean="0"/>
@@ -4530,23 +4518,11 @@
             </a:r>
             <a:r>
               <a:rPr lang="en-US" sz="1400" dirty="0" smtClean="0"/>
-              <a:t> </a:t>
-            </a:r>
-            <a:r>
-              <a:rPr lang="en-US" sz="1400" dirty="0" smtClean="0"/>
-              <a:t>the agents which don’t have position </a:t>
-            </a:r>
-            <a:r>
-              <a:rPr lang="en-US" sz="1400" dirty="0" smtClean="0"/>
-              <a:t>sensors</a:t>
+              <a:t> the agents which don’t have position sensors</a:t>
             </a:r>
             <a:r>
               <a:rPr lang="tr-TR" sz="1400" dirty="0" smtClean="0"/>
-              <a:t>  by using local </a:t>
-            </a:r>
-            <a:r>
-              <a:rPr lang="tr-TR" sz="1400" dirty="0" smtClean="0"/>
-              <a:t>neighbors.</a:t>
+              <a:t>  by using local neighbors.</a:t>
             </a:r>
             <a:endParaRPr lang="tr-TR" sz="1400" dirty="0"/>
           </a:p>
@@ -4651,7 +4627,7 @@
     </p:spTree>
     <p:extLst>
       <p:ext uri="{BB962C8B-B14F-4D97-AF65-F5344CB8AC3E}">
-        <p14:creationId xmlns="" xmlns:p14="http://schemas.microsoft.com/office/powerpoint/2010/main" val="1601229741"/>
+        <p14:creationId xmlns:p14="http://schemas.microsoft.com/office/powerpoint/2010/main" val="1601229741"/>
       </p:ext>
     </p:extLst>
   </p:cSld>
@@ -4806,11 +4782,7 @@
             </a:r>
             <a:r>
               <a:rPr lang="en-US" sz="1400" dirty="0" smtClean="0"/>
-              <a:t>Handles </a:t>
-            </a:r>
-            <a:r>
-              <a:rPr lang="en-US" sz="1400" dirty="0" smtClean="0"/>
-              <a:t>lost agents (agents do not have  three neighbors) </a:t>
+              <a:t>Handles lost agents (agents do not have  three neighbors) </a:t>
             </a:r>
           </a:p>
           <a:p>
@@ -5827,7 +5799,7 @@
     </p:spTree>
     <p:extLst>
       <p:ext uri="{BB962C8B-B14F-4D97-AF65-F5344CB8AC3E}">
-        <p14:creationId xmlns="" xmlns:p14="http://schemas.microsoft.com/office/powerpoint/2010/main" val="1601229741"/>
+        <p14:creationId xmlns:p14="http://schemas.microsoft.com/office/powerpoint/2010/main" val="1601229741"/>
       </p:ext>
     </p:extLst>
   </p:cSld>
@@ -5916,15 +5888,7 @@
             </a:r>
             <a:r>
               <a:rPr lang="en-US" sz="1600" dirty="0" smtClean="0"/>
-              <a:t> </a:t>
-            </a:r>
-            <a:r>
-              <a:rPr lang="en-US" sz="1600" dirty="0" smtClean="0"/>
-              <a:t>of the </a:t>
-            </a:r>
-            <a:r>
-              <a:rPr lang="en-US" sz="1600" dirty="0" smtClean="0"/>
-              <a:t>position(P(</a:t>
+              <a:t> of the position(P(</a:t>
             </a:r>
             <a:r>
               <a:rPr lang="en-US" sz="1600" dirty="0" err="1" smtClean="0"/>
@@ -5940,11 +5904,7 @@
             </a:r>
             <a:r>
               <a:rPr lang="en-US" sz="1600" dirty="0" smtClean="0"/>
-              <a:t>can </a:t>
-            </a:r>
-            <a:r>
-              <a:rPr lang="en-US" sz="1600" dirty="0" smtClean="0"/>
-              <a:t>be reduced to a problem of; </a:t>
+              <a:t>can be reduced to a problem of; </a:t>
             </a:r>
             <a:endParaRPr lang="tr-TR" sz="1600" dirty="0"/>
           </a:p>
@@ -5964,9 +5924,59 @@
         </p:xfrm>
         <a:graphic>
           <a:graphicData uri="http://schemas.openxmlformats.org/presentationml/2006/ole">
-            <p:oleObj spid="_x0000_s1026" name="Equation" r:id="rId3" imgW="469800" imgH="228600" progId="Equation.3">
-              <p:embed/>
-            </p:oleObj>
+            <mc:AlternateContent xmlns:mc="http://schemas.openxmlformats.org/markup-compatibility/2006">
+              <mc:Choice xmlns:v="urn:schemas-microsoft-com:vml" Requires="v">
+                <p:oleObj spid="_x0000_s1030" name="Equation" r:id="rId3" imgW="469800" imgH="228600" progId="Equation.3">
+                  <p:embed/>
+                </p:oleObj>
+              </mc:Choice>
+              <mc:Fallback>
+                <p:oleObj name="Equation" r:id="rId3" imgW="469800" imgH="228600" progId="Equation.3">
+                  <p:embed/>
+                  <p:pic>
+                    <p:nvPicPr>
+                      <p:cNvPr id="0" name="Picture 2"/>
+                      <p:cNvPicPr>
+                        <a:picLocks noChangeAspect="1" noChangeArrowheads="1"/>
+                      </p:cNvPicPr>
+                      <p:nvPr/>
+                    </p:nvPicPr>
+                    <p:blipFill>
+                      <a:blip r:embed="rId4">
+                        <a:extLst>
+                          <a:ext uri="{28A0092B-C50C-407E-A947-70E740481C1C}">
+                            <a14:useLocalDpi xmlns:a14="http://schemas.microsoft.com/office/drawing/2010/main" val="0"/>
+                          </a:ext>
+                        </a:extLst>
+                      </a:blip>
+                      <a:srcRect/>
+                      <a:stretch>
+                        <a:fillRect/>
+                      </a:stretch>
+                    </p:blipFill>
+                    <p:spPr bwMode="auto">
+                      <a:xfrm>
+                        <a:off x="3958431" y="2571750"/>
+                        <a:ext cx="998537" cy="485775"/>
+                      </a:xfrm>
+                      <a:prstGeom prst="rect">
+                        <a:avLst/>
+                      </a:prstGeom>
+                      <a:noFill/>
+                      <a:extLst>
+                        <a:ext uri="{909E8E84-426E-40DD-AFC4-6F175D3DCCD1}">
+                          <a14:hiddenFill xmlns:a14="http://schemas.microsoft.com/office/drawing/2010/main">
+                            <a:solidFill>
+                              <a:srgbClr val="FFFFFF"/>
+                            </a:solidFill>
+                          </a14:hiddenFill>
+                        </a:ext>
+                      </a:extLst>
+                    </p:spPr>
+                  </p:pic>
+                </p:oleObj>
+              </mc:Fallback>
+            </mc:AlternateContent>
           </a:graphicData>
         </a:graphic>
       </p:graphicFrame>
@@ -6012,15 +6022,7 @@
               </a:r>
               <a:r>
                 <a:rPr lang="en-US" sz="1600" dirty="0" smtClean="0"/>
-                <a:t>e </a:t>
-              </a:r>
-              <a:r>
-                <a:rPr lang="en-US" sz="1600" dirty="0" smtClean="0"/>
-                <a:t>have </a:t>
-              </a:r>
-              <a:r>
-                <a:rPr lang="en-US" sz="1600" dirty="0" smtClean="0"/>
-                <a:t>a</a:t>
+                <a:t>e have a</a:t>
               </a:r>
               <a:r>
                 <a:rPr lang="tr-TR" sz="1600" dirty="0" smtClean="0"/>
@@ -6028,11 +6030,7 @@
               </a:r>
               <a:r>
                 <a:rPr lang="en-US" sz="1600" dirty="0" smtClean="0"/>
-                <a:t> </a:t>
-              </a:r>
-              <a:r>
-                <a:rPr lang="en-US" sz="1600" dirty="0" smtClean="0"/>
-                <a:t>A matrix with a dimension of </a:t>
+                <a:t> A matrix with a dimension of </a:t>
               </a:r>
               <a:r>
                 <a:rPr lang="tr-TR" sz="1600" dirty="0" smtClean="0"/>
@@ -6048,15 +6046,7 @@
               </a:r>
               <a:r>
                 <a:rPr lang="en-US" sz="1600" dirty="0" smtClean="0"/>
-                <a:t> </a:t>
-              </a:r>
-              <a:r>
-                <a:rPr lang="en-US" sz="1600" dirty="0" smtClean="0"/>
-                <a:t>x </a:t>
-              </a:r>
-              <a:r>
-                <a:rPr lang="en-US" sz="1600" dirty="0" smtClean="0"/>
-                <a:t>2</a:t>
+                <a:t> x 2</a:t>
               </a:r>
               <a:r>
                 <a:rPr lang="tr-TR" sz="1600" dirty="0" smtClean="0"/>
@@ -6072,15 +6062,7 @@
               </a:r>
               <a:r>
                 <a:rPr lang="en-US" sz="1600" dirty="0" smtClean="0"/>
-                <a:t>here </a:t>
-              </a:r>
-              <a:r>
-                <a:rPr lang="en-US" sz="1600" dirty="0" smtClean="0"/>
-                <a:t>are three options </a:t>
-              </a:r>
-              <a:r>
-                <a:rPr lang="en-US" sz="1600" dirty="0" smtClean="0"/>
-                <a:t>for</a:t>
+                <a:t>here are three options for</a:t>
               </a:r>
               <a:r>
                 <a:rPr lang="tr-TR" sz="1600" dirty="0" smtClean="0"/>
@@ -6088,11 +6070,7 @@
               </a:r>
               <a:r>
                 <a:rPr lang="en-US" sz="1600" dirty="0" smtClean="0"/>
-                <a:t>he </a:t>
-              </a:r>
-              <a:r>
-                <a:rPr lang="en-US" sz="1600" dirty="0" smtClean="0"/>
-                <a:t>solution of the problem related with the condition of A matrix,</a:t>
+                <a:t>he solution of the problem related with the condition of A matrix,</a:t>
               </a:r>
             </a:p>
             <a:p>
@@ -6117,11 +6095,7 @@
               </a:r>
               <a:r>
                 <a:rPr lang="en-US" sz="1400" dirty="0" smtClean="0"/>
-                <a:t>unique </a:t>
-              </a:r>
-              <a:r>
-                <a:rPr lang="en-US" sz="1400" dirty="0" smtClean="0"/>
-                <a:t>solution </a:t>
+                <a:t>unique solution </a:t>
               </a:r>
               <a:r>
                 <a:rPr lang="tr-TR" sz="1400" dirty="0" smtClean="0"/>
@@ -6129,15 +6103,7 @@
               </a:r>
               <a:r>
                 <a:rPr lang="en-US" sz="1400" dirty="0" smtClean="0"/>
-                <a:t> </a:t>
-              </a:r>
-              <a:r>
-                <a:rPr lang="en-US" sz="1400" dirty="0" smtClean="0"/>
-                <a:t>3 neighbors and A is full column rank </a:t>
-              </a:r>
-              <a:r>
-                <a:rPr lang="en-US" sz="1400" dirty="0" smtClean="0"/>
-                <a:t>matrix</a:t>
+                <a:t> 3 neighbors and A is full column rank matrix</a:t>
               </a:r>
               <a:r>
                 <a:rPr lang="tr-TR" sz="1400" dirty="0" smtClean="0"/>
@@ -6152,11 +6118,7 @@
               </a:r>
               <a:r>
                 <a:rPr lang="en-US" dirty="0" smtClean="0"/>
-                <a:t>                         </a:t>
-              </a:r>
-              <a:r>
-                <a:rPr lang="en-US" dirty="0" smtClean="0"/>
-                <a:t>, </a:t>
+                <a:t>                         , </a:t>
               </a:r>
               <a:r>
                 <a:rPr lang="tr-TR" dirty="0" smtClean="0"/>
@@ -6164,11 +6126,7 @@
               </a:r>
               <a:r>
                 <a:rPr lang="en-US" sz="1400" dirty="0" smtClean="0"/>
-                <a:t>minimum </a:t>
-              </a:r>
-              <a:r>
-                <a:rPr lang="en-US" sz="1400" dirty="0" smtClean="0"/>
-                <a:t>norm solution </a:t>
+                <a:t>minimum norm solution </a:t>
               </a:r>
               <a:r>
                 <a:rPr lang="tr-TR" sz="1400" dirty="0" smtClean="0"/>
@@ -6176,11 +6134,7 @@
               </a:r>
               <a:r>
                 <a:rPr lang="en-US" sz="1400" dirty="0" smtClean="0"/>
-                <a:t>more </a:t>
-              </a:r>
-              <a:r>
-                <a:rPr lang="en-US" sz="1400" dirty="0" smtClean="0"/>
-                <a:t>neighbors and A is full column rank matrix</a:t>
+                <a:t>more neighbors and A is full column rank matrix</a:t>
               </a:r>
               <a:endParaRPr lang="en-US" dirty="0" smtClean="0"/>
             </a:p>
@@ -6199,15 +6153,7 @@
               </a:r>
               <a:r>
                 <a:rPr lang="en-US" sz="1400" dirty="0" smtClean="0"/>
-                <a:t>Find </a:t>
-              </a:r>
-              <a:r>
-                <a:rPr lang="en-US" sz="1400" dirty="0" smtClean="0"/>
-                <a:t>the minimum error/norm solution with nonlinear least squares </a:t>
-              </a:r>
-              <a:r>
-                <a:rPr lang="en-US" sz="1400" dirty="0" smtClean="0"/>
-                <a:t>method</a:t>
+                <a:t>Find the minimum error/norm solution with nonlinear least squares method</a:t>
               </a:r>
               <a:r>
                 <a:rPr lang="tr-TR" sz="1400" dirty="0" smtClean="0"/>
@@ -6236,7 +6182,7 @@
             <p:nvPr/>
           </p:nvPicPr>
           <p:blipFill>
-            <a:blip r:embed="rId4"/>
+            <a:blip r:embed="rId5"/>
             <a:srcRect/>
             <a:stretch>
               <a:fillRect/>
@@ -6269,7 +6215,7 @@
             <p:nvPr/>
           </p:nvPicPr>
           <p:blipFill>
-            <a:blip r:embed="rId5"/>
+            <a:blip r:embed="rId6"/>
             <a:srcRect/>
             <a:stretch>
               <a:fillRect/>
@@ -6339,7 +6285,7 @@
     </p:spTree>
     <p:extLst>
       <p:ext uri="{BB962C8B-B14F-4D97-AF65-F5344CB8AC3E}">
-        <p14:creationId xmlns="" xmlns:p14="http://schemas.microsoft.com/office/powerpoint/2010/main" val="1601229741"/>
+        <p14:creationId xmlns:p14="http://schemas.microsoft.com/office/powerpoint/2010/main" val="1601229741"/>
       </p:ext>
     </p:extLst>
   </p:cSld>
@@ -6451,11 +6397,7 @@
           <a:p>
             <a:r>
               <a:rPr lang="en-US" sz="1600" u="sng" dirty="0" smtClean="0"/>
-              <a:t>Lost agent handling </a:t>
-            </a:r>
-            <a:r>
-              <a:rPr lang="en-US" sz="1600" u="sng" dirty="0" smtClean="0"/>
-              <a:t>rules</a:t>
+              <a:t>Lost agent handling rules</a:t>
             </a:r>
             <a:r>
               <a:rPr lang="tr-TR" sz="1600" u="sng" dirty="0" smtClean="0"/>
@@ -6483,11 +6425,7 @@
             </a:pPr>
             <a:r>
               <a:rPr lang="en-US" sz="1400" dirty="0" smtClean="0"/>
-              <a:t>If an agent is lost it cannot enter the localization </a:t>
-            </a:r>
-            <a:r>
-              <a:rPr lang="en-US" sz="1400" dirty="0" smtClean="0"/>
-              <a:t>process</a:t>
+              <a:t>If an agent is lost it cannot enter the localization process</a:t>
             </a:r>
             <a:r>
               <a:rPr lang="tr-TR" sz="1400" dirty="0" smtClean="0"/>
@@ -6502,11 +6440,7 @@
             </a:pPr>
             <a:r>
               <a:rPr lang="en-US" sz="1400" dirty="0" smtClean="0"/>
-              <a:t>If an agent is missing the localization process for </a:t>
-            </a:r>
-            <a:r>
-              <a:rPr lang="en-US" sz="1400" dirty="0" smtClean="0"/>
-              <a:t>3 times</a:t>
+              <a:t>If an agent is missing the localization process for 3 times</a:t>
             </a:r>
             <a:r>
               <a:rPr lang="tr-TR" sz="1400" dirty="0" smtClean="0"/>
@@ -6526,19 +6460,11 @@
             </a:r>
             <a:r>
               <a:rPr lang="tr-TR" sz="1400" dirty="0" smtClean="0"/>
-              <a:t>mode</a:t>
-            </a:r>
-            <a:r>
-              <a:rPr lang="tr-TR" sz="1400" dirty="0" smtClean="0"/>
-              <a:t>’ in which </a:t>
+              <a:t>mode’ in which </a:t>
             </a:r>
             <a:r>
               <a:rPr lang="en-US" sz="1400" dirty="0" smtClean="0"/>
-              <a:t> </a:t>
-            </a:r>
-            <a:r>
-              <a:rPr lang="en-US" sz="1400" dirty="0" smtClean="0"/>
-              <a:t>it </a:t>
+              <a:t> it </a:t>
             </a:r>
             <a:r>
               <a:rPr lang="tr-TR" sz="1400" dirty="0" smtClean="0"/>
@@ -6546,15 +6472,7 @@
             </a:r>
             <a:r>
               <a:rPr lang="en-US" sz="1400" dirty="0" smtClean="0"/>
-              <a:t>to </a:t>
-            </a:r>
-            <a:r>
-              <a:rPr lang="en-US" sz="1400" dirty="0" smtClean="0"/>
-              <a:t>the formation shape center </a:t>
-            </a:r>
-            <a:r>
-              <a:rPr lang="en-US" sz="1400" dirty="0" smtClean="0"/>
-              <a:t> </a:t>
+              <a:t>to the formation shape center  </a:t>
             </a:r>
             <a:endParaRPr lang="tr-TR" sz="1400" dirty="0"/>
           </a:p>
@@ -6851,7 +6769,7 @@
     </p:spTree>
     <p:extLst>
       <p:ext uri="{BB962C8B-B14F-4D97-AF65-F5344CB8AC3E}">
-        <p14:creationId xmlns="" xmlns:p14="http://schemas.microsoft.com/office/powerpoint/2010/main" val="1601229741"/>
+        <p14:creationId xmlns:p14="http://schemas.microsoft.com/office/powerpoint/2010/main" val="1601229741"/>
       </p:ext>
     </p:extLst>
   </p:cSld>
@@ -9414,7 +9332,7 @@
     </p:spTree>
     <p:extLst>
       <p:ext uri="{BB962C8B-B14F-4D97-AF65-F5344CB8AC3E}">
-        <p14:creationId xmlns="" xmlns:p14="http://schemas.microsoft.com/office/powerpoint/2010/main" val="1601229741"/>
+        <p14:creationId xmlns:p14="http://schemas.microsoft.com/office/powerpoint/2010/main" val="1601229741"/>
       </p:ext>
     </p:extLst>
   </p:cSld>
@@ -9568,15 +9486,7 @@
             </a:r>
             <a:r>
               <a:rPr lang="en-US" sz="1600" dirty="0" smtClean="0"/>
-              <a:t>determines </a:t>
-            </a:r>
-            <a:r>
-              <a:rPr lang="en-US" sz="1600" dirty="0" smtClean="0"/>
-              <a:t>the clusters around position </a:t>
-            </a:r>
-            <a:r>
-              <a:rPr lang="en-US" sz="1600" dirty="0" smtClean="0"/>
-              <a:t>beacon</a:t>
+              <a:t>determines the clusters around position beacon</a:t>
             </a:r>
             <a:r>
               <a:rPr lang="tr-TR" sz="1600" dirty="0" smtClean="0"/>
@@ -9627,15 +9537,7 @@
             </a:r>
             <a:r>
               <a:rPr lang="en-US" sz="1600" dirty="0" smtClean="0"/>
-              <a:t>Destination-Sequenced </a:t>
-            </a:r>
-            <a:r>
-              <a:rPr lang="en-US" sz="1600" dirty="0" smtClean="0"/>
-              <a:t>Distance Vector Routing </a:t>
-            </a:r>
-            <a:r>
-              <a:rPr lang="en-US" sz="1600" dirty="0" smtClean="0"/>
-              <a:t>Protocol</a:t>
+              <a:t>Destination-Sequenced Distance Vector Routing Protocol</a:t>
             </a:r>
             <a:r>
               <a:rPr lang="tr-TR" sz="1600" dirty="0" smtClean="0"/>
@@ -9651,21 +9553,13 @@
             </a:r>
             <a:r>
               <a:rPr lang="en-US" sz="1600" dirty="0" smtClean="0"/>
-              <a:t> </a:t>
-            </a:r>
-            <a:r>
-              <a:rPr lang="en-US" sz="1600" dirty="0" smtClean="0"/>
-              <a:t>algorithms</a:t>
+              <a:t> algorithms</a:t>
             </a:r>
           </a:p>
           <a:p>
             <a:r>
               <a:rPr lang="en-US" sz="1600" dirty="0" smtClean="0"/>
-              <a:t>   are </a:t>
-            </a:r>
-            <a:r>
-              <a:rPr lang="en-US" sz="1600" dirty="0" smtClean="0"/>
-              <a:t>used</a:t>
+              <a:t>   are used</a:t>
             </a:r>
             <a:r>
               <a:rPr lang="tr-TR" sz="1600" dirty="0" smtClean="0"/>
@@ -9681,7 +9575,7 @@
     </p:spTree>
     <p:extLst>
       <p:ext uri="{BB962C8B-B14F-4D97-AF65-F5344CB8AC3E}">
-        <p14:creationId xmlns="" xmlns:p14="http://schemas.microsoft.com/office/powerpoint/2010/main" val="1601229741"/>
+        <p14:creationId xmlns:p14="http://schemas.microsoft.com/office/powerpoint/2010/main" val="1601229741"/>
       </p:ext>
     </p:extLst>
   </p:cSld>
@@ -9839,11 +9733,7 @@
             </a:r>
             <a:r>
               <a:rPr lang="en-US" sz="1600" dirty="0" smtClean="0"/>
-              <a:t> </a:t>
-            </a:r>
-            <a:r>
-              <a:rPr lang="en-US" sz="1600" dirty="0" smtClean="0"/>
-              <a:t>Ford algorithm</a:t>
+              <a:t> Ford algorithm</a:t>
             </a:r>
           </a:p>
           <a:p>
@@ -15021,7 +14911,7 @@
     </p:spTree>
     <p:extLst>
       <p:ext uri="{BB962C8B-B14F-4D97-AF65-F5344CB8AC3E}">
-        <p14:creationId xmlns="" xmlns:p14="http://schemas.microsoft.com/office/powerpoint/2010/main" val="1601229741"/>
+        <p14:creationId xmlns:p14="http://schemas.microsoft.com/office/powerpoint/2010/main" val="1601229741"/>
       </p:ext>
     </p:extLst>
   </p:cSld>
@@ -15141,15 +15031,7 @@
             </a:r>
             <a:r>
               <a:rPr lang="en-US" sz="1400" dirty="0" smtClean="0"/>
-              <a:t>Agents decide </a:t>
-            </a:r>
-            <a:r>
-              <a:rPr lang="en-US" sz="1400" dirty="0" smtClean="0"/>
-              <a:t>to join the cluster of position agent with minimum metric </a:t>
-            </a:r>
-            <a:r>
-              <a:rPr lang="en-US" sz="1400" dirty="0" smtClean="0"/>
-              <a:t>value</a:t>
+              <a:t>Agents decide to join the cluster of position agent with minimum metric value</a:t>
             </a:r>
             <a:r>
               <a:rPr lang="tr-TR" sz="1400" dirty="0" smtClean="0"/>
@@ -15172,11 +15054,7 @@
             </a:r>
             <a:r>
               <a:rPr lang="en-US" sz="1400" dirty="0" smtClean="0"/>
-              <a:t>error for </a:t>
-            </a:r>
-            <a:r>
-              <a:rPr lang="en-US" sz="1400" dirty="0" smtClean="0"/>
-              <a:t>the positions of agents which are relatively</a:t>
+              <a:t>error for the positions of agents which are relatively</a:t>
             </a:r>
           </a:p>
           <a:p>
@@ -15222,11 +15100,7 @@
           <a:p>
             <a:r>
               <a:rPr lang="en-US" sz="1600" u="sng" dirty="0" smtClean="0"/>
-              <a:t>Rules </a:t>
-            </a:r>
-            <a:r>
-              <a:rPr lang="en-US" sz="1600" u="sng" dirty="0" smtClean="0"/>
-              <a:t>for Localization Problem</a:t>
+              <a:t>Rules for Localization Problem</a:t>
             </a:r>
             <a:endParaRPr lang="tr-TR" sz="1600" u="sng" dirty="0"/>
           </a:p>
@@ -20851,7 +20725,7 @@
     </p:spTree>
     <p:extLst>
       <p:ext uri="{BB962C8B-B14F-4D97-AF65-F5344CB8AC3E}">
-        <p14:creationId xmlns="" xmlns:p14="http://schemas.microsoft.com/office/powerpoint/2010/main" val="1601229741"/>
+        <p14:creationId xmlns:p14="http://schemas.microsoft.com/office/powerpoint/2010/main" val="1601229741"/>
       </p:ext>
     </p:extLst>
   </p:cSld>
@@ -20902,484 +20776,9 @@
           <a:p>
             <a:r>
               <a:rPr lang="tr-TR" dirty="0" smtClean="0"/>
-              <a:t>References</a:t>
+              <a:t>Formation Control System</a:t>
             </a:r>
             <a:endParaRPr lang="tr-TR" dirty="0"/>
-          </a:p>
-        </p:txBody>
-      </p:sp>
-      <p:sp>
-        <p:nvSpPr>
-          <p:cNvPr id="3" name="Content Placeholder 2"/>
-          <p:cNvSpPr>
-            <a:spLocks noGrp="1"/>
-          </p:cNvSpPr>
-          <p:nvPr>
-            <p:ph idx="1"/>
-          </p:nvPr>
-        </p:nvSpPr>
-        <p:spPr/>
-        <p:txBody>
-          <a:bodyPr/>
-          <a:lstStyle/>
-          <a:p>
-            <a:pPr>
-              <a:buFont typeface="Arial" pitchFamily="34" charset="0"/>
-              <a:buChar char="•"/>
-            </a:pPr>
-            <a:r>
-              <a:rPr lang="tr-TR" sz="1100" dirty="0" smtClean="0"/>
-              <a:t>[1]</a:t>
-            </a:r>
-            <a:r>
-              <a:rPr lang="tr-TR" sz="1100" dirty="0" smtClean="0">
-                <a:hlinkClick r:id="rId2"/>
-              </a:rPr>
-              <a:t> </a:t>
-            </a:r>
-            <a:r>
-              <a:rPr lang="tr-TR" sz="1050" dirty="0" smtClean="0">
-                <a:hlinkClick r:id="rId2"/>
-              </a:rPr>
-              <a:t>http://www.eecs.harvard.edu/ssr/projects/progSA/kilobot.html</a:t>
-            </a:r>
-            <a:endParaRPr lang="tr-TR" sz="1100" dirty="0" smtClean="0"/>
-          </a:p>
-          <a:p>
-            <a:pPr>
-              <a:buFont typeface="Arial" pitchFamily="34" charset="0"/>
-              <a:buChar char="•"/>
-            </a:pPr>
-            <a:r>
-              <a:rPr lang="tr-TR" sz="1100" dirty="0" smtClean="0"/>
-              <a:t>[2] </a:t>
-            </a:r>
-            <a:r>
-              <a:rPr lang="tr-TR" sz="900" dirty="0" smtClean="0"/>
-              <a:t>Martin N, Klupar P, “</a:t>
-            </a:r>
-            <a:r>
-              <a:rPr lang="en-US" sz="900" dirty="0" err="1" smtClean="0"/>
-              <a:t>Techsat</a:t>
-            </a:r>
-            <a:r>
-              <a:rPr lang="en-US" sz="900" dirty="0" smtClean="0"/>
-              <a:t> 21 And Revolutionizing Space</a:t>
-            </a:r>
-            <a:r>
-              <a:rPr lang="tr-TR" sz="900" dirty="0" smtClean="0"/>
-              <a:t> M</a:t>
-            </a:r>
-            <a:r>
-              <a:rPr lang="en-US" sz="900" dirty="0" err="1" smtClean="0"/>
-              <a:t>issions</a:t>
-            </a:r>
-            <a:r>
-              <a:rPr lang="tr-TR" sz="900" dirty="0" smtClean="0"/>
-              <a:t> Using Mıcrosatellıtes”, </a:t>
-            </a:r>
-            <a:endParaRPr lang="tr-TR" sz="1100" dirty="0" smtClean="0"/>
-          </a:p>
-          <a:p>
-            <a:pPr>
-              <a:buFont typeface="Arial" pitchFamily="34" charset="0"/>
-              <a:buChar char="•"/>
-            </a:pPr>
-            <a:r>
-              <a:rPr lang="tr-TR" sz="1100" dirty="0" smtClean="0"/>
-              <a:t>[3]</a:t>
-            </a:r>
-            <a:r>
-              <a:rPr lang="tr-TR" sz="1100" dirty="0" smtClean="0">
-                <a:hlinkClick r:id="rId3"/>
-              </a:rPr>
-              <a:t> </a:t>
-            </a:r>
-            <a:r>
-              <a:rPr lang="tr-TR" sz="1050" dirty="0" smtClean="0">
-                <a:hlinkClick r:id="rId3"/>
-              </a:rPr>
-              <a:t>http://www.swarmanoid.org/swarmanoid_hardware.php.html</a:t>
-            </a:r>
-            <a:endParaRPr lang="tr-TR" sz="1050" dirty="0" smtClean="0"/>
-          </a:p>
-          <a:p>
-            <a:pPr>
-              <a:buFont typeface="Arial" pitchFamily="34" charset="0"/>
-              <a:buChar char="•"/>
-            </a:pPr>
-            <a:r>
-              <a:rPr lang="en-US" sz="1050" dirty="0" smtClean="0"/>
-              <a:t>[</a:t>
-            </a:r>
-            <a:r>
-              <a:rPr lang="tr-TR" sz="1050" dirty="0" smtClean="0"/>
-              <a:t>4</a:t>
-            </a:r>
-            <a:r>
-              <a:rPr lang="en-US" sz="1050" dirty="0" smtClean="0"/>
-              <a:t>] S </a:t>
-            </a:r>
-            <a:r>
-              <a:rPr lang="en-US" sz="1050" dirty="0" err="1" smtClean="0"/>
-              <a:t>Kornienki</a:t>
-            </a:r>
-            <a:r>
-              <a:rPr lang="en-US" sz="1050" dirty="0" smtClean="0"/>
-              <a:t>, O. </a:t>
-            </a:r>
-            <a:r>
-              <a:rPr lang="en-US" sz="1050" dirty="0" err="1" smtClean="0"/>
-              <a:t>Kornienko</a:t>
-            </a:r>
-            <a:r>
-              <a:rPr lang="en-US" sz="1050" dirty="0" smtClean="0"/>
-              <a:t>, and Levi. P. Minimalistic approach towards communication</a:t>
-            </a:r>
-          </a:p>
-          <a:p>
-            <a:r>
-              <a:rPr lang="en-US" sz="1050" dirty="0" smtClean="0"/>
-              <a:t>and perception in </a:t>
-            </a:r>
-            <a:r>
-              <a:rPr lang="en-US" sz="1050" dirty="0" err="1" smtClean="0"/>
-              <a:t>microrobotic</a:t>
-            </a:r>
-            <a:r>
-              <a:rPr lang="en-US" sz="1050" dirty="0" smtClean="0"/>
-              <a:t> swarms. In IEEE International Conference</a:t>
-            </a:r>
-            <a:r>
-              <a:rPr lang="tr-TR" sz="1050" dirty="0" smtClean="0"/>
-              <a:t> </a:t>
-            </a:r>
-            <a:r>
-              <a:rPr lang="en-US" sz="1050" dirty="0" smtClean="0"/>
-              <a:t>on Intelligent Robots and Systems, 2005.</a:t>
-            </a:r>
-            <a:endParaRPr lang="tr-TR" sz="1050" dirty="0" smtClean="0"/>
-          </a:p>
-          <a:p>
-            <a:pPr>
-              <a:buFont typeface="Arial" pitchFamily="34" charset="0"/>
-              <a:buChar char="•"/>
-            </a:pPr>
-            <a:r>
-              <a:rPr lang="tr-TR" sz="1050" dirty="0" smtClean="0"/>
-              <a:t>[5] Farshad Arvin, John Murray, Licheng Shi, Chun Zhang, and Shigang Yue. Development</a:t>
-            </a:r>
-          </a:p>
-          <a:p>
-            <a:r>
-              <a:rPr lang="en-US" sz="1050" dirty="0" smtClean="0"/>
-              <a:t>of an autonomous micro robot for swarm robotics. In IEEE International</a:t>
-            </a:r>
-            <a:r>
-              <a:rPr lang="tr-TR" sz="1050" dirty="0" smtClean="0"/>
-              <a:t> </a:t>
-            </a:r>
-            <a:r>
-              <a:rPr lang="en-US" sz="1050" dirty="0" smtClean="0"/>
-              <a:t>Conference on </a:t>
-            </a:r>
-            <a:r>
-              <a:rPr lang="en-US" sz="1050" dirty="0" err="1" smtClean="0"/>
-              <a:t>Mechatronics</a:t>
-            </a:r>
-            <a:r>
-              <a:rPr lang="en-US" sz="1050" dirty="0" smtClean="0"/>
-              <a:t> and Automation, 2014.</a:t>
-            </a:r>
-            <a:endParaRPr lang="tr-TR" sz="1050" dirty="0" smtClean="0"/>
-          </a:p>
-          <a:p>
-            <a:pPr>
-              <a:buFont typeface="Arial" pitchFamily="34" charset="0"/>
-              <a:buChar char="•"/>
-            </a:pPr>
-            <a:r>
-              <a:rPr lang="tr-TR" sz="1050" dirty="0" smtClean="0"/>
-              <a:t>[6]</a:t>
-            </a:r>
-            <a:r>
-              <a:rPr lang="it-IT" sz="1050" dirty="0" smtClean="0"/>
-              <a:t>Touraj Soleymani, Vito Trianni, Michael Bonani, Francesco Mondada, and</a:t>
-            </a:r>
-            <a:r>
-              <a:rPr lang="tr-TR" sz="1050" dirty="0" smtClean="0"/>
-              <a:t> </a:t>
-            </a:r>
-            <a:r>
-              <a:rPr lang="en-US" sz="1050" dirty="0" smtClean="0"/>
-              <a:t>Marco </a:t>
-            </a:r>
-            <a:r>
-              <a:rPr lang="en-US" sz="1050" dirty="0" err="1" smtClean="0"/>
-              <a:t>Dorigo</a:t>
-            </a:r>
-            <a:r>
-              <a:rPr lang="en-US" sz="1050" dirty="0" smtClean="0"/>
-              <a:t>. Bio-inspired construction with mobile robots and compliant</a:t>
-            </a:r>
-            <a:r>
-              <a:rPr lang="tr-TR" sz="1050" dirty="0" smtClean="0"/>
-              <a:t> </a:t>
-            </a:r>
-            <a:r>
-              <a:rPr lang="en-US" sz="1050" dirty="0" smtClean="0"/>
-              <a:t>pockets. Robotics and </a:t>
-            </a:r>
-            <a:r>
-              <a:rPr lang="en-US" sz="1050" dirty="0" err="1" smtClean="0"/>
-              <a:t>Autonomus</a:t>
-            </a:r>
-            <a:r>
-              <a:rPr lang="en-US" sz="1050" dirty="0" smtClean="0"/>
-              <a:t> Systems, 74:340–350, 2015.</a:t>
-            </a:r>
-            <a:endParaRPr lang="tr-TR" sz="1050" dirty="0" smtClean="0"/>
-          </a:p>
-          <a:p>
-            <a:pPr>
-              <a:buFont typeface="Arial" pitchFamily="34" charset="0"/>
-              <a:buChar char="•"/>
-            </a:pPr>
-            <a:r>
-              <a:rPr lang="tr-TR" sz="1050" dirty="0" smtClean="0"/>
-              <a:t>[7] Roderich Grof, Michael Bonani, Mondada Francesco, and Marco Dorigo. Autonomous</a:t>
-            </a:r>
-          </a:p>
-          <a:p>
-            <a:r>
-              <a:rPr lang="en-US" sz="1050" dirty="0" smtClean="0"/>
-              <a:t>self-assembly in a swarm-bot. 22:1115–1130, 2006.</a:t>
-            </a:r>
-            <a:endParaRPr lang="tr-TR" sz="1050" dirty="0" smtClean="0"/>
-          </a:p>
-          <a:p>
-            <a:r>
-              <a:rPr lang="tr-TR" sz="1050" dirty="0" smtClean="0"/>
-              <a:t>[8]</a:t>
-            </a:r>
-            <a:r>
-              <a:rPr lang="en-US" sz="1050" dirty="0" smtClean="0"/>
-              <a:t> S.P. </a:t>
-            </a:r>
-            <a:r>
-              <a:rPr lang="en-US" sz="1050" dirty="0" err="1" smtClean="0"/>
-              <a:t>Hou</a:t>
-            </a:r>
-            <a:r>
-              <a:rPr lang="en-US" sz="1050" dirty="0" smtClean="0"/>
-              <a:t>, C.C. </a:t>
-            </a:r>
-            <a:r>
-              <a:rPr lang="en-US" sz="1050" dirty="0" err="1" smtClean="0"/>
-              <a:t>Cheah</a:t>
-            </a:r>
-            <a:r>
-              <a:rPr lang="en-US" sz="1050" dirty="0" smtClean="0"/>
-              <a:t>, and J.J.E. </a:t>
-            </a:r>
-            <a:r>
-              <a:rPr lang="en-US" sz="1050" dirty="0" err="1" smtClean="0"/>
-              <a:t>Slotine</a:t>
-            </a:r>
-            <a:r>
-              <a:rPr lang="en-US" sz="1050" dirty="0" smtClean="0"/>
-              <a:t>. Dynamic region following </a:t>
-            </a:r>
-            <a:r>
-              <a:rPr lang="en-US" sz="1050" dirty="0" err="1" smtClean="0"/>
-              <a:t>formationcontrol</a:t>
-            </a:r>
-            <a:r>
-              <a:rPr lang="en-US" sz="1050" dirty="0" smtClean="0"/>
-              <a:t> for a swarm of robots. In ICRA, 2009.</a:t>
-            </a:r>
-            <a:r>
-              <a:rPr lang="tr-TR" sz="1050" dirty="0" smtClean="0"/>
-              <a:t>[10] </a:t>
-            </a:r>
-            <a:r>
-              <a:rPr lang="tr-TR" sz="1050" dirty="0" smtClean="0">
-                <a:hlinkClick r:id="rId4"/>
-              </a:rPr>
-              <a:t>http://electronicdesign.com/systems/advanced-robots-swarm-nyc-s-museum-math</a:t>
-            </a:r>
-            <a:endParaRPr lang="tr-TR" sz="1050" dirty="0" smtClean="0"/>
-          </a:p>
-          <a:p>
-            <a:r>
-              <a:rPr lang="tr-TR" sz="1050" dirty="0" smtClean="0"/>
-              <a:t>[9]</a:t>
-            </a:r>
-            <a:r>
-              <a:rPr lang="en-US" sz="1050" dirty="0" smtClean="0"/>
-              <a:t> </a:t>
-            </a:r>
-            <a:r>
-              <a:rPr lang="en-US" sz="1050" dirty="0" err="1" smtClean="0"/>
-              <a:t>Samitha</a:t>
-            </a:r>
-            <a:r>
-              <a:rPr lang="en-US" sz="1050" dirty="0" smtClean="0"/>
-              <a:t> </a:t>
-            </a:r>
-            <a:r>
-              <a:rPr lang="en-US" sz="1050" dirty="0" err="1" smtClean="0"/>
-              <a:t>Ekanayake</a:t>
-            </a:r>
-            <a:r>
-              <a:rPr lang="en-US" sz="1050" dirty="0" smtClean="0"/>
-              <a:t> and </a:t>
-            </a:r>
-            <a:r>
-              <a:rPr lang="en-US" sz="1050" dirty="0" err="1" smtClean="0"/>
-              <a:t>Pubudu</a:t>
-            </a:r>
-            <a:r>
-              <a:rPr lang="en-US" sz="1050" dirty="0" smtClean="0"/>
-              <a:t> </a:t>
-            </a:r>
-            <a:r>
-              <a:rPr lang="en-US" sz="1050" dirty="0" err="1" smtClean="0"/>
-              <a:t>Pathirana</a:t>
-            </a:r>
-            <a:r>
-              <a:rPr lang="en-US" sz="1050" dirty="0" smtClean="0"/>
-              <a:t>. Formations of robotic swarm: An</a:t>
-            </a:r>
-            <a:r>
-              <a:rPr lang="tr-TR" sz="1050" dirty="0" smtClean="0"/>
-              <a:t> </a:t>
-            </a:r>
-            <a:r>
-              <a:rPr lang="en-US" sz="1050" dirty="0" smtClean="0"/>
-              <a:t>artificial force based approach. International Journal of Advanced Robotic Systems,</a:t>
-            </a:r>
-            <a:r>
-              <a:rPr lang="tr-TR" sz="1050" dirty="0" smtClean="0"/>
-              <a:t>7:173–190, 2010</a:t>
-            </a:r>
-          </a:p>
-          <a:p>
-            <a:r>
-              <a:rPr lang="tr-TR" sz="1050" dirty="0" smtClean="0"/>
-              <a:t>[10] http://electronicdesign.com/systems/advanced-robots-swarm-nyc-s-museum-math</a:t>
-            </a:r>
-          </a:p>
-          <a:p>
-            <a:r>
-              <a:rPr lang="tr-TR" sz="1050" dirty="0" smtClean="0"/>
-              <a:t>[11]</a:t>
-            </a:r>
-            <a:r>
-              <a:rPr lang="de-DE" sz="1050" dirty="0" smtClean="0"/>
-              <a:t> Aveek Das, Rafael Fierro, Vijay Kumar, James Ostrowski, John Spletzer, and</a:t>
-            </a:r>
-            <a:r>
-              <a:rPr lang="tr-TR" sz="1050" dirty="0" smtClean="0"/>
-              <a:t> </a:t>
-            </a:r>
-            <a:r>
-              <a:rPr lang="en-US" sz="1050" dirty="0" smtClean="0"/>
-              <a:t>Camilla Taylor. A vision-based formation control framework. IEEE Transactions</a:t>
-            </a:r>
-            <a:r>
-              <a:rPr lang="tr-TR" sz="1050" dirty="0" smtClean="0"/>
-              <a:t> </a:t>
-            </a:r>
-            <a:r>
-              <a:rPr lang="en-US" sz="1050" dirty="0" smtClean="0"/>
-              <a:t>on Robotics and Automation, 18:813–825, 2002.</a:t>
-            </a:r>
-            <a:endParaRPr lang="tr-TR" sz="1050" dirty="0" smtClean="0"/>
-          </a:p>
-          <a:p>
-            <a:r>
-              <a:rPr lang="tr-TR" sz="1050" dirty="0" smtClean="0"/>
-              <a:t>[12]</a:t>
-            </a:r>
-            <a:r>
-              <a:rPr lang="en-US" sz="1050" dirty="0" smtClean="0"/>
-              <a:t> </a:t>
-            </a:r>
-            <a:r>
-              <a:rPr lang="en-US" sz="1050" dirty="0" err="1" smtClean="0"/>
-              <a:t>Yogeswaran</a:t>
-            </a:r>
-            <a:r>
-              <a:rPr lang="en-US" sz="1050" dirty="0" smtClean="0"/>
-              <a:t> Mohan and S.G. </a:t>
-            </a:r>
-            <a:r>
-              <a:rPr lang="en-US" sz="1050" dirty="0" err="1" smtClean="0"/>
-              <a:t>Ponnambalam</a:t>
-            </a:r>
-            <a:r>
-              <a:rPr lang="en-US" sz="1050" dirty="0" smtClean="0"/>
-              <a:t>. An extensive review of research</a:t>
-            </a:r>
-            <a:r>
-              <a:rPr lang="tr-TR" sz="1050" dirty="0" smtClean="0"/>
-              <a:t> </a:t>
-            </a:r>
-            <a:r>
-              <a:rPr lang="en-US" sz="1050" dirty="0" smtClean="0"/>
-              <a:t>in swarm robotics. In World Congress on Nature &amp; Biologically Inspired Computing,</a:t>
-            </a:r>
-            <a:r>
-              <a:rPr lang="tr-TR" sz="1050" dirty="0" smtClean="0"/>
-              <a:t> NaBIC, 2009.</a:t>
-            </a:r>
-          </a:p>
-          <a:p>
-            <a:pPr>
-              <a:buFont typeface="Arial" pitchFamily="34" charset="0"/>
-              <a:buChar char="•"/>
-            </a:pPr>
-            <a:endParaRPr lang="tr-TR" sz="1100" dirty="0" smtClean="0"/>
-          </a:p>
-          <a:p>
-            <a:endParaRPr lang="tr-TR" sz="1100" dirty="0" smtClean="0"/>
-          </a:p>
-          <a:p>
-            <a:r>
-              <a:rPr lang="tr-TR" sz="1100" dirty="0" smtClean="0"/>
-              <a:t>                           </a:t>
-            </a:r>
-            <a:endParaRPr lang="tr-TR" sz="1100" dirty="0"/>
-          </a:p>
-        </p:txBody>
-      </p:sp>
-      <p:sp>
-        <p:nvSpPr>
-          <p:cNvPr id="4" name="Slide Number Placeholder 3"/>
-          <p:cNvSpPr>
-            <a:spLocks noGrp="1"/>
-          </p:cNvSpPr>
-          <p:nvPr>
-            <p:ph type="sldNum" sz="quarter" idx="12"/>
-          </p:nvPr>
-        </p:nvSpPr>
-        <p:spPr/>
-        <p:txBody>
-          <a:bodyPr/>
-          <a:lstStyle/>
-          <a:p>
-            <a:pPr>
-              <a:defRPr/>
-            </a:pPr>
-            <a:fld id="{C878F797-6006-4DDA-AFE9-456F280FE6C5}" type="slidenum">
-              <a:rPr lang="en-US" smtClean="0"/>
-              <a:pPr>
-                <a:defRPr/>
-              </a:pPr>
-              <a:t>18</a:t>
-            </a:fld>
-            <a:endParaRPr lang="en-US" dirty="0"/>
           </a:p>
         </p:txBody>
       </p:sp>
@@ -21393,7 +20792,12 @@
             <p:ph type="dt" sz="half" idx="2"/>
           </p:nvPr>
         </p:nvSpPr>
-        <p:spPr/>
+        <p:spPr>
+          <a:xfrm>
+            <a:off x="457199" y="6494463"/>
+            <a:ext cx="4000501" cy="266700"/>
+          </a:xfrm>
+        </p:spPr>
         <p:txBody>
           <a:bodyPr/>
           <a:lstStyle/>
@@ -21409,10 +20813,423 @@
           </a:p>
         </p:txBody>
       </p:sp>
+      <p:sp>
+        <p:nvSpPr>
+          <p:cNvPr id="3" name="TextBox 2"/>
+          <p:cNvSpPr txBox="1"/>
+          <p:nvPr/>
+        </p:nvSpPr>
+        <p:spPr>
+          <a:xfrm>
+            <a:off x="675249" y="1491175"/>
+            <a:ext cx="7596554" cy="646331"/>
+          </a:xfrm>
+          <a:prstGeom prst="rect">
+            <a:avLst/>
+          </a:prstGeom>
+          <a:noFill/>
+        </p:spPr>
+        <p:txBody>
+          <a:bodyPr wrap="square" rtlCol="0">
+            <a:spAutoFit/>
+          </a:bodyPr>
+          <a:lstStyle/>
+          <a:p>
+            <a:pPr algn="just"/>
+            <a:r>
+              <a:rPr lang="tr-TR" dirty="0" smtClean="0"/>
+              <a:t>Three different approaches were used to design the formation control system in this thesis work.</a:t>
+            </a:r>
+            <a:endParaRPr lang="tr-TR" dirty="0"/>
+          </a:p>
+        </p:txBody>
+      </p:sp>
+      <p:cxnSp>
+        <p:nvCxnSpPr>
+          <p:cNvPr id="44" name="Straight Arrow Connector 43"/>
+          <p:cNvCxnSpPr/>
+          <p:nvPr/>
+        </p:nvCxnSpPr>
+        <p:spPr>
+          <a:xfrm flipH="1">
+            <a:off x="2236763" y="2489982"/>
+            <a:ext cx="2220937" cy="520504"/>
+          </a:xfrm>
+          <a:prstGeom prst="straightConnector1">
+            <a:avLst/>
+          </a:prstGeom>
+          <a:ln>
+            <a:tailEnd type="triangle"/>
+          </a:ln>
+        </p:spPr>
+        <p:style>
+          <a:lnRef idx="2">
+            <a:schemeClr val="accent1"/>
+          </a:lnRef>
+          <a:fillRef idx="0">
+            <a:schemeClr val="accent1"/>
+          </a:fillRef>
+          <a:effectRef idx="1">
+            <a:schemeClr val="accent1"/>
+          </a:effectRef>
+          <a:fontRef idx="minor">
+            <a:schemeClr val="tx1"/>
+          </a:fontRef>
+        </p:style>
+      </p:cxnSp>
+      <p:sp>
+        <p:nvSpPr>
+          <p:cNvPr id="46" name="TextBox 45"/>
+          <p:cNvSpPr txBox="1"/>
+          <p:nvPr/>
+        </p:nvSpPr>
+        <p:spPr>
+          <a:xfrm>
+            <a:off x="1195755" y="3010486"/>
+            <a:ext cx="1814731" cy="646331"/>
+          </a:xfrm>
+          <a:prstGeom prst="rect">
+            <a:avLst/>
+          </a:prstGeom>
+          <a:noFill/>
+        </p:spPr>
+        <p:txBody>
+          <a:bodyPr wrap="square" rtlCol="0">
+            <a:spAutoFit/>
+          </a:bodyPr>
+          <a:lstStyle/>
+          <a:p>
+            <a:pPr algn="just"/>
+            <a:r>
+              <a:rPr lang="tr-TR" dirty="0" smtClean="0"/>
+              <a:t>Potential  Field Based Approach</a:t>
+            </a:r>
+          </a:p>
+        </p:txBody>
+      </p:sp>
+      <p:cxnSp>
+        <p:nvCxnSpPr>
+          <p:cNvPr id="48" name="Straight Arrow Connector 47"/>
+          <p:cNvCxnSpPr/>
+          <p:nvPr/>
+        </p:nvCxnSpPr>
+        <p:spPr>
+          <a:xfrm>
+            <a:off x="4965895" y="2475914"/>
+            <a:ext cx="2067951" cy="520504"/>
+          </a:xfrm>
+          <a:prstGeom prst="straightConnector1">
+            <a:avLst/>
+          </a:prstGeom>
+          <a:ln>
+            <a:tailEnd type="triangle"/>
+          </a:ln>
+        </p:spPr>
+        <p:style>
+          <a:lnRef idx="2">
+            <a:schemeClr val="accent1"/>
+          </a:lnRef>
+          <a:fillRef idx="0">
+            <a:schemeClr val="accent1"/>
+          </a:fillRef>
+          <a:effectRef idx="1">
+            <a:schemeClr val="accent1"/>
+          </a:effectRef>
+          <a:fontRef idx="minor">
+            <a:schemeClr val="tx1"/>
+          </a:fontRef>
+        </p:style>
+      </p:cxnSp>
+      <p:sp>
+        <p:nvSpPr>
+          <p:cNvPr id="50" name="TextBox 49"/>
+          <p:cNvSpPr txBox="1"/>
+          <p:nvPr/>
+        </p:nvSpPr>
+        <p:spPr>
+          <a:xfrm>
+            <a:off x="5999870" y="3025728"/>
+            <a:ext cx="2032782" cy="646331"/>
+          </a:xfrm>
+          <a:prstGeom prst="rect">
+            <a:avLst/>
+          </a:prstGeom>
+          <a:noFill/>
+        </p:spPr>
+        <p:txBody>
+          <a:bodyPr wrap="square" rtlCol="0">
+            <a:spAutoFit/>
+          </a:bodyPr>
+          <a:lstStyle/>
+          <a:p>
+            <a:pPr algn="just"/>
+            <a:r>
+              <a:rPr lang="tr-TR" dirty="0" smtClean="0"/>
+              <a:t>Shape Partitioning Based Approaches</a:t>
+            </a:r>
+            <a:endParaRPr lang="tr-TR" dirty="0"/>
+          </a:p>
+        </p:txBody>
+      </p:sp>
+      <p:sp>
+        <p:nvSpPr>
+          <p:cNvPr id="49" name="TextBox 48"/>
+          <p:cNvSpPr txBox="1"/>
+          <p:nvPr/>
+        </p:nvSpPr>
+        <p:spPr>
+          <a:xfrm>
+            <a:off x="3173171" y="2122655"/>
+            <a:ext cx="3077253" cy="369332"/>
+          </a:xfrm>
+          <a:prstGeom prst="rect">
+            <a:avLst/>
+          </a:prstGeom>
+          <a:noFill/>
+        </p:spPr>
+        <p:txBody>
+          <a:bodyPr wrap="none" rtlCol="0">
+            <a:spAutoFit/>
+          </a:bodyPr>
+          <a:lstStyle/>
+          <a:p>
+            <a:r>
+              <a:rPr lang="tr-TR" dirty="0" smtClean="0"/>
+              <a:t>Formation Control Strategies</a:t>
+            </a:r>
+            <a:endParaRPr lang="tr-TR" dirty="0"/>
+          </a:p>
+        </p:txBody>
+      </p:sp>
+      <p:sp>
+        <p:nvSpPr>
+          <p:cNvPr id="52" name="TextBox 51"/>
+          <p:cNvSpPr txBox="1"/>
+          <p:nvPr/>
+        </p:nvSpPr>
+        <p:spPr>
+          <a:xfrm>
+            <a:off x="673842" y="4580090"/>
+            <a:ext cx="2858556" cy="738664"/>
+          </a:xfrm>
+          <a:prstGeom prst="rect">
+            <a:avLst/>
+          </a:prstGeom>
+          <a:noFill/>
+        </p:spPr>
+        <p:txBody>
+          <a:bodyPr wrap="square" rtlCol="0">
+            <a:spAutoFit/>
+          </a:bodyPr>
+          <a:lstStyle/>
+          <a:p>
+            <a:pPr marL="285750" indent="-285750" algn="just">
+              <a:buFont typeface="Arial" panose="020B0604020202020204" pitchFamily="34" charset="0"/>
+              <a:buChar char="•"/>
+            </a:pPr>
+            <a:r>
+              <a:rPr lang="tr-TR" sz="1400" dirty="0"/>
+              <a:t>Directly calculates control laws </a:t>
+            </a:r>
+            <a:r>
+              <a:rPr lang="tr-TR" sz="1400" dirty="0" smtClean="0"/>
+              <a:t>based </a:t>
+            </a:r>
+            <a:r>
+              <a:rPr lang="tr-TR" sz="1400" dirty="0"/>
+              <a:t>upon potential fields</a:t>
+            </a:r>
+          </a:p>
+          <a:p>
+            <a:pPr marL="285750" indent="-285750" algn="just">
+              <a:buFont typeface="Arial" panose="020B0604020202020204" pitchFamily="34" charset="0"/>
+              <a:buChar char="•"/>
+            </a:pPr>
+            <a:endParaRPr lang="tr-TR" sz="1400" dirty="0"/>
+          </a:p>
+        </p:txBody>
+      </p:sp>
+      <p:sp>
+        <p:nvSpPr>
+          <p:cNvPr id="53" name="TextBox 52"/>
+          <p:cNvSpPr txBox="1"/>
+          <p:nvPr/>
+        </p:nvSpPr>
+        <p:spPr>
+          <a:xfrm>
+            <a:off x="675249" y="3882683"/>
+            <a:ext cx="2511329" cy="338554"/>
+          </a:xfrm>
+          <a:prstGeom prst="rect">
+            <a:avLst/>
+          </a:prstGeom>
+          <a:noFill/>
+        </p:spPr>
+        <p:txBody>
+          <a:bodyPr wrap="none" rtlCol="0">
+            <a:spAutoFit/>
+          </a:bodyPr>
+          <a:lstStyle/>
+          <a:p>
+            <a:r>
+              <a:rPr lang="tr-TR" sz="1600" dirty="0" smtClean="0"/>
+              <a:t>1) Artificial Forces Method</a:t>
+            </a:r>
+            <a:endParaRPr lang="tr-TR" sz="1600" dirty="0"/>
+          </a:p>
+        </p:txBody>
+      </p:sp>
+      <p:sp>
+        <p:nvSpPr>
+          <p:cNvPr id="56" name="TextBox 55"/>
+          <p:cNvSpPr txBox="1"/>
+          <p:nvPr/>
+        </p:nvSpPr>
+        <p:spPr>
+          <a:xfrm>
+            <a:off x="5488533" y="3757632"/>
+            <a:ext cx="3007618" cy="584775"/>
+          </a:xfrm>
+          <a:prstGeom prst="rect">
+            <a:avLst/>
+          </a:prstGeom>
+          <a:noFill/>
+        </p:spPr>
+        <p:txBody>
+          <a:bodyPr wrap="none" rtlCol="0">
+            <a:spAutoFit/>
+          </a:bodyPr>
+          <a:lstStyle/>
+          <a:p>
+            <a:r>
+              <a:rPr lang="tr-TR" sz="1600" dirty="0" smtClean="0"/>
+              <a:t>2) Bubble Packing Method</a:t>
+            </a:r>
+          </a:p>
+          <a:p>
+            <a:r>
+              <a:rPr lang="tr-TR" sz="1600" dirty="0" smtClean="0"/>
+              <a:t>3) Randomized Fractals Method</a:t>
+            </a:r>
+            <a:endParaRPr lang="tr-TR" sz="1600" dirty="0"/>
+          </a:p>
+        </p:txBody>
+      </p:sp>
+      <p:sp>
+        <p:nvSpPr>
+          <p:cNvPr id="57" name="TextBox 56"/>
+          <p:cNvSpPr txBox="1"/>
+          <p:nvPr/>
+        </p:nvSpPr>
+        <p:spPr>
+          <a:xfrm>
+            <a:off x="5586983" y="4553521"/>
+            <a:ext cx="2978098" cy="1169551"/>
+          </a:xfrm>
+          <a:prstGeom prst="rect">
+            <a:avLst/>
+          </a:prstGeom>
+          <a:noFill/>
+        </p:spPr>
+        <p:txBody>
+          <a:bodyPr wrap="square" rtlCol="0">
+            <a:spAutoFit/>
+          </a:bodyPr>
+          <a:lstStyle/>
+          <a:p>
+            <a:pPr marL="285750" indent="-285750" algn="just">
+              <a:buFont typeface="Arial" panose="020B0604020202020204" pitchFamily="34" charset="0"/>
+              <a:buChar char="•"/>
+            </a:pPr>
+            <a:r>
+              <a:rPr lang="tr-TR" sz="1400" dirty="0" smtClean="0"/>
+              <a:t>Partitions the desired formation shape into goal states.</a:t>
+            </a:r>
+          </a:p>
+          <a:p>
+            <a:pPr marL="285750" indent="-285750" algn="just">
+              <a:buFont typeface="Arial" panose="020B0604020202020204" pitchFamily="34" charset="0"/>
+              <a:buChar char="•"/>
+            </a:pPr>
+            <a:r>
+              <a:rPr lang="tr-TR" sz="1400" dirty="0" smtClean="0"/>
+              <a:t>Control laws are implemented to reach these goal states.</a:t>
+            </a:r>
+            <a:endParaRPr lang="tr-TR" sz="1400" dirty="0"/>
+          </a:p>
+          <a:p>
+            <a:pPr marL="285750" indent="-285750" algn="just">
+              <a:buFont typeface="Arial" panose="020B0604020202020204" pitchFamily="34" charset="0"/>
+              <a:buChar char="•"/>
+            </a:pPr>
+            <a:endParaRPr lang="tr-TR" sz="1400" dirty="0"/>
+          </a:p>
+        </p:txBody>
+      </p:sp>
+      <p:cxnSp>
+        <p:nvCxnSpPr>
+          <p:cNvPr id="58" name="Straight Connector 57"/>
+          <p:cNvCxnSpPr/>
+          <p:nvPr/>
+        </p:nvCxnSpPr>
+        <p:spPr>
+          <a:xfrm flipH="1">
+            <a:off x="759661" y="4361914"/>
+            <a:ext cx="2574387" cy="0"/>
+          </a:xfrm>
+          <a:prstGeom prst="line">
+            <a:avLst/>
+          </a:prstGeom>
+        </p:spPr>
+        <p:style>
+          <a:lnRef idx="2">
+            <a:schemeClr val="accent1"/>
+          </a:lnRef>
+          <a:fillRef idx="0">
+            <a:schemeClr val="accent1"/>
+          </a:fillRef>
+          <a:effectRef idx="1">
+            <a:schemeClr val="accent1"/>
+          </a:effectRef>
+          <a:fontRef idx="minor">
+            <a:schemeClr val="tx1"/>
+          </a:fontRef>
+        </p:style>
+      </p:cxnSp>
+      <p:cxnSp>
+        <p:nvCxnSpPr>
+          <p:cNvPr id="60" name="Straight Connector 59"/>
+          <p:cNvCxnSpPr/>
+          <p:nvPr/>
+        </p:nvCxnSpPr>
+        <p:spPr>
+          <a:xfrm flipH="1">
+            <a:off x="5871152" y="4342407"/>
+            <a:ext cx="2574387" cy="0"/>
+          </a:xfrm>
+          <a:prstGeom prst="line">
+            <a:avLst/>
+          </a:prstGeom>
+        </p:spPr>
+        <p:style>
+          <a:lnRef idx="2">
+            <a:schemeClr val="accent1"/>
+          </a:lnRef>
+          <a:fillRef idx="0">
+            <a:schemeClr val="accent1"/>
+          </a:fillRef>
+          <a:effectRef idx="1">
+            <a:schemeClr val="accent1"/>
+          </a:effectRef>
+          <a:fontRef idx="minor">
+            <a:schemeClr val="tx1"/>
+          </a:fontRef>
+        </p:style>
+      </p:cxnSp>
     </p:spTree>
     <p:extLst>
       <p:ext uri="{BB962C8B-B14F-4D97-AF65-F5344CB8AC3E}">
-        <p14:creationId xmlns="" xmlns:p14="http://schemas.microsoft.com/office/powerpoint/2010/main" val="1601229741"/>
+        <p14:creationId xmlns:p14="http://schemas.microsoft.com/office/powerpoint/2010/main" val="215572797"/>
       </p:ext>
     </p:extLst>
   </p:cSld>
@@ -21446,10 +21263,111 @@
           <a:chExt cx="0" cy="0"/>
         </a:xfrm>
       </p:grpSpPr>
+      <p:sp>
+        <p:nvSpPr>
+          <p:cNvPr id="2" name="Title 1"/>
+          <p:cNvSpPr>
+            <a:spLocks noGrp="1"/>
+          </p:cNvSpPr>
+          <p:nvPr>
+            <p:ph type="title"/>
+          </p:nvPr>
+        </p:nvSpPr>
+        <p:spPr/>
+        <p:txBody>
+          <a:bodyPr/>
+          <a:lstStyle/>
+          <a:p>
+            <a:r>
+              <a:rPr lang="tr-TR" dirty="0" smtClean="0"/>
+              <a:t>Formation Control System</a:t>
+            </a:r>
+            <a:endParaRPr lang="tr-TR" dirty="0"/>
+          </a:p>
+        </p:txBody>
+      </p:sp>
+      <p:sp>
+        <p:nvSpPr>
+          <p:cNvPr id="5" name="Date Placeholder 4"/>
+          <p:cNvSpPr>
+            <a:spLocks noGrp="1"/>
+          </p:cNvSpPr>
+          <p:nvPr>
+            <p:ph type="dt" sz="half" idx="2"/>
+          </p:nvPr>
+        </p:nvSpPr>
+        <p:spPr>
+          <a:xfrm>
+            <a:off x="457199" y="6494463"/>
+            <a:ext cx="4000501" cy="266700"/>
+          </a:xfrm>
+        </p:spPr>
+        <p:txBody>
+          <a:bodyPr/>
+          <a:lstStyle/>
+          <a:p>
+            <a:pPr>
+              <a:defRPr/>
+            </a:pPr>
+            <a:r>
+              <a:rPr lang="tr-TR" smtClean="0"/>
+              <a:t>METU Electrical &amp; Electronics Engineering Department</a:t>
+            </a:r>
+            <a:endParaRPr lang="en-US" dirty="0"/>
+          </a:p>
+        </p:txBody>
+      </p:sp>
+      <p:sp>
+        <p:nvSpPr>
+          <p:cNvPr id="3" name="TextBox 2"/>
+          <p:cNvSpPr txBox="1"/>
+          <p:nvPr/>
+        </p:nvSpPr>
+        <p:spPr>
+          <a:xfrm>
+            <a:off x="675249" y="1491175"/>
+            <a:ext cx="7596554" cy="1200329"/>
+          </a:xfrm>
+          <a:prstGeom prst="rect">
+            <a:avLst/>
+          </a:prstGeom>
+          <a:noFill/>
+        </p:spPr>
+        <p:txBody>
+          <a:bodyPr wrap="square" rtlCol="0">
+            <a:spAutoFit/>
+          </a:bodyPr>
+          <a:lstStyle/>
+          <a:p>
+            <a:pPr marL="285750" indent="-285750" algn="just">
+              <a:buFont typeface="Arial" panose="020B0604020202020204" pitchFamily="34" charset="0"/>
+              <a:buChar char="•"/>
+            </a:pPr>
+            <a:r>
+              <a:rPr lang="tr-TR" dirty="0" smtClean="0"/>
+              <a:t>Artificial Forces Method</a:t>
+            </a:r>
+          </a:p>
+          <a:p>
+            <a:pPr marL="342900" indent="-342900" algn="just">
+              <a:buAutoNum type="arabicParenR"/>
+            </a:pPr>
+            <a:endParaRPr lang="tr-TR" dirty="0"/>
+          </a:p>
+          <a:p>
+            <a:pPr algn="just"/>
+            <a:r>
+              <a:rPr lang="tr-TR" dirty="0" smtClean="0"/>
+              <a:t>Directly defines the control for individuals with different potential field components.</a:t>
+            </a:r>
+            <a:endParaRPr lang="tr-TR" dirty="0"/>
+          </a:p>
+        </p:txBody>
+      </p:sp>
     </p:spTree>
     <p:extLst>
       <p:ext uri="{BB962C8B-B14F-4D97-AF65-F5344CB8AC3E}">
-        <p14:creationId xmlns="" xmlns:p14="http://schemas.microsoft.com/office/powerpoint/2010/main" val="3835474893"/>
+        <p14:creationId xmlns:p14="http://schemas.microsoft.com/office/powerpoint/2010/main" val="2182345034"/>
       </p:ext>
     </p:extLst>
   </p:cSld>
@@ -21486,13 +21404,1499 @@
     </p:spTree>
     <p:extLst>
       <p:ext uri="{BB962C8B-B14F-4D97-AF65-F5344CB8AC3E}">
-        <p14:creationId xmlns="" xmlns:p14="http://schemas.microsoft.com/office/powerpoint/2010/main" val="1031498753"/>
+        <p14:creationId xmlns:p14="http://schemas.microsoft.com/office/powerpoint/2010/main" val="1031498753"/>
       </p:ext>
     </p:extLst>
   </p:cSld>
   <p:clrMapOvr>
     <a:masterClrMapping/>
   </p:clrMapOvr>
+  <p:timing>
+    <p:tnLst>
+      <p:par>
+        <p:cTn id="1" dur="indefinite" restart="never" nodeType="tmRoot"/>
+      </p:par>
+    </p:tnLst>
+  </p:timing>
+</p:sld>
+</file>
+
+<file path=ppt/slides/slide20.xml><?xml version="1.0" encoding="utf-8"?>
+<p:sld xmlns:a="http://schemas.openxmlformats.org/drawingml/2006/main" xmlns:r="http://schemas.openxmlformats.org/officeDocument/2006/relationships" xmlns:p="http://schemas.openxmlformats.org/presentationml/2006/main">
+  <p:cSld>
+    <p:spTree>
+      <p:nvGrpSpPr>
+        <p:cNvPr id="1" name=""/>
+        <p:cNvGrpSpPr/>
+        <p:nvPr/>
+      </p:nvGrpSpPr>
+      <p:grpSpPr>
+        <a:xfrm>
+          <a:off x="0" y="0"/>
+          <a:ext cx="0" cy="0"/>
+          <a:chOff x="0" y="0"/>
+          <a:chExt cx="0" cy="0"/>
+        </a:xfrm>
+      </p:grpSpPr>
+      <p:sp>
+        <p:nvSpPr>
+          <p:cNvPr id="2" name="Title 1"/>
+          <p:cNvSpPr>
+            <a:spLocks noGrp="1"/>
+          </p:cNvSpPr>
+          <p:nvPr>
+            <p:ph type="title"/>
+          </p:nvPr>
+        </p:nvSpPr>
+        <p:spPr/>
+        <p:txBody>
+          <a:bodyPr/>
+          <a:lstStyle/>
+          <a:p>
+            <a:r>
+              <a:rPr lang="tr-TR" dirty="0" smtClean="0"/>
+              <a:t>Formation Control System</a:t>
+            </a:r>
+            <a:endParaRPr lang="tr-TR" dirty="0"/>
+          </a:p>
+        </p:txBody>
+      </p:sp>
+      <p:sp>
+        <p:nvSpPr>
+          <p:cNvPr id="5" name="Date Placeholder 4"/>
+          <p:cNvSpPr>
+            <a:spLocks noGrp="1"/>
+          </p:cNvSpPr>
+          <p:nvPr>
+            <p:ph type="dt" sz="half" idx="2"/>
+          </p:nvPr>
+        </p:nvSpPr>
+        <p:spPr>
+          <a:xfrm>
+            <a:off x="457199" y="6494463"/>
+            <a:ext cx="4000501" cy="266700"/>
+          </a:xfrm>
+        </p:spPr>
+        <p:txBody>
+          <a:bodyPr/>
+          <a:lstStyle/>
+          <a:p>
+            <a:pPr>
+              <a:defRPr/>
+            </a:pPr>
+            <a:r>
+              <a:rPr lang="tr-TR" smtClean="0"/>
+              <a:t>METU Electrical &amp; Electronics Engineering Department</a:t>
+            </a:r>
+            <a:endParaRPr lang="en-US" dirty="0"/>
+          </a:p>
+        </p:txBody>
+      </p:sp>
+      <p:sp>
+        <p:nvSpPr>
+          <p:cNvPr id="3" name="TextBox 2"/>
+          <p:cNvSpPr txBox="1"/>
+          <p:nvPr/>
+        </p:nvSpPr>
+        <p:spPr>
+          <a:xfrm>
+            <a:off x="675249" y="1491175"/>
+            <a:ext cx="7596554" cy="369332"/>
+          </a:xfrm>
+          <a:prstGeom prst="rect">
+            <a:avLst/>
+          </a:prstGeom>
+          <a:noFill/>
+        </p:spPr>
+        <p:txBody>
+          <a:bodyPr wrap="square" rtlCol="0">
+            <a:spAutoFit/>
+          </a:bodyPr>
+          <a:lstStyle/>
+          <a:p>
+            <a:pPr marL="285750" indent="-285750" algn="just">
+              <a:buFont typeface="Arial" panose="020B0604020202020204" pitchFamily="34" charset="0"/>
+              <a:buChar char="•"/>
+            </a:pPr>
+            <a:r>
+              <a:rPr lang="tr-TR" dirty="0" smtClean="0"/>
+              <a:t>Bubble Packing and Randomized Fractals Methods</a:t>
+            </a:r>
+          </a:p>
+        </p:txBody>
+      </p:sp>
+      <p:pic>
+        <p:nvPicPr>
+          <p:cNvPr id="4" name="Picture 3"/>
+          <p:cNvPicPr>
+            <a:picLocks noChangeAspect="1"/>
+          </p:cNvPicPr>
+          <p:nvPr/>
+        </p:nvPicPr>
+        <p:blipFill>
+          <a:blip r:embed="rId2">
+            <a:extLst>
+              <a:ext uri="{28A0092B-C50C-407E-A947-70E740481C1C}">
+                <a14:useLocalDpi xmlns:a14="http://schemas.microsoft.com/office/drawing/2010/main" val="0"/>
+              </a:ext>
+            </a:extLst>
+          </a:blip>
+          <a:stretch>
+            <a:fillRect/>
+          </a:stretch>
+        </p:blipFill>
+        <p:spPr>
+          <a:xfrm>
+            <a:off x="584082" y="3100381"/>
+            <a:ext cx="2700448" cy="1860043"/>
+          </a:xfrm>
+          <a:prstGeom prst="rect">
+            <a:avLst/>
+          </a:prstGeom>
+        </p:spPr>
+      </p:pic>
+      <p:pic>
+        <p:nvPicPr>
+          <p:cNvPr id="6" name="Picture 5"/>
+          <p:cNvPicPr>
+            <a:picLocks noChangeAspect="1"/>
+          </p:cNvPicPr>
+          <p:nvPr/>
+        </p:nvPicPr>
+        <p:blipFill>
+          <a:blip r:embed="rId3"/>
+          <a:stretch>
+            <a:fillRect/>
+          </a:stretch>
+        </p:blipFill>
+        <p:spPr>
+          <a:xfrm>
+            <a:off x="541604" y="5019085"/>
+            <a:ext cx="2678267" cy="1416716"/>
+          </a:xfrm>
+          <a:prstGeom prst="rect">
+            <a:avLst/>
+          </a:prstGeom>
+        </p:spPr>
+      </p:pic>
+      <p:pic>
+        <p:nvPicPr>
+          <p:cNvPr id="7" name="Picture 6"/>
+          <p:cNvPicPr>
+            <a:picLocks noChangeAspect="1"/>
+          </p:cNvPicPr>
+          <p:nvPr/>
+        </p:nvPicPr>
+        <p:blipFill>
+          <a:blip r:embed="rId4"/>
+          <a:stretch>
+            <a:fillRect/>
+          </a:stretch>
+        </p:blipFill>
+        <p:spPr>
+          <a:xfrm>
+            <a:off x="5630928" y="3180749"/>
+            <a:ext cx="2524477" cy="2381582"/>
+          </a:xfrm>
+          <a:prstGeom prst="rect">
+            <a:avLst/>
+          </a:prstGeom>
+        </p:spPr>
+      </p:pic>
+      <p:sp>
+        <p:nvSpPr>
+          <p:cNvPr id="9" name="TextBox 8"/>
+          <p:cNvSpPr txBox="1"/>
+          <p:nvPr/>
+        </p:nvSpPr>
+        <p:spPr>
+          <a:xfrm>
+            <a:off x="598150" y="1882811"/>
+            <a:ext cx="8412843" cy="584775"/>
+          </a:xfrm>
+          <a:prstGeom prst="rect">
+            <a:avLst/>
+          </a:prstGeom>
+          <a:noFill/>
+        </p:spPr>
+        <p:txBody>
+          <a:bodyPr wrap="square" rtlCol="0">
+            <a:spAutoFit/>
+          </a:bodyPr>
+          <a:lstStyle/>
+          <a:p>
+            <a:r>
+              <a:rPr lang="tr-TR" sz="1600" dirty="0" smtClean="0"/>
+              <a:t>These two methods partition the desired formation shape into goal states with different approaches. The procedure of the assignment of the agents to these goal states are identical.</a:t>
+            </a:r>
+            <a:endParaRPr lang="tr-TR" sz="1600" dirty="0"/>
+          </a:p>
+        </p:txBody>
+      </p:sp>
+      <p:sp>
+        <p:nvSpPr>
+          <p:cNvPr id="10" name="TextBox 9"/>
+          <p:cNvSpPr txBox="1"/>
+          <p:nvPr/>
+        </p:nvSpPr>
+        <p:spPr>
+          <a:xfrm>
+            <a:off x="598150" y="2621561"/>
+            <a:ext cx="1841081" cy="338554"/>
+          </a:xfrm>
+          <a:prstGeom prst="rect">
+            <a:avLst/>
+          </a:prstGeom>
+          <a:noFill/>
+        </p:spPr>
+        <p:txBody>
+          <a:bodyPr wrap="none" rtlCol="0">
+            <a:spAutoFit/>
+          </a:bodyPr>
+          <a:lstStyle/>
+          <a:p>
+            <a:pPr marL="285750" indent="-285750">
+              <a:buFont typeface="Wingdings" panose="05000000000000000000" pitchFamily="2" charset="2"/>
+              <a:buChar char="v"/>
+            </a:pPr>
+            <a:r>
+              <a:rPr lang="tr-TR" sz="1600" dirty="0" smtClean="0"/>
+              <a:t>Bubble Packing</a:t>
+            </a:r>
+            <a:endParaRPr lang="tr-TR" sz="1600" dirty="0"/>
+          </a:p>
+        </p:txBody>
+      </p:sp>
+      <p:sp>
+        <p:nvSpPr>
+          <p:cNvPr id="11" name="TextBox 10"/>
+          <p:cNvSpPr txBox="1"/>
+          <p:nvPr/>
+        </p:nvSpPr>
+        <p:spPr>
+          <a:xfrm>
+            <a:off x="5759130" y="2637543"/>
+            <a:ext cx="2252155" cy="338554"/>
+          </a:xfrm>
+          <a:prstGeom prst="rect">
+            <a:avLst/>
+          </a:prstGeom>
+          <a:noFill/>
+        </p:spPr>
+        <p:txBody>
+          <a:bodyPr wrap="none" rtlCol="0">
+            <a:spAutoFit/>
+          </a:bodyPr>
+          <a:lstStyle/>
+          <a:p>
+            <a:pPr marL="285750" indent="-285750">
+              <a:buFont typeface="Wingdings" panose="05000000000000000000" pitchFamily="2" charset="2"/>
+              <a:buChar char="v"/>
+            </a:pPr>
+            <a:r>
+              <a:rPr lang="tr-TR" sz="1600" dirty="0" smtClean="0"/>
+              <a:t>Randomized Factals</a:t>
+            </a:r>
+            <a:endParaRPr lang="tr-TR" sz="1600" dirty="0"/>
+          </a:p>
+        </p:txBody>
+      </p:sp>
+      <p:cxnSp>
+        <p:nvCxnSpPr>
+          <p:cNvPr id="13" name="Straight Connector 12"/>
+          <p:cNvCxnSpPr/>
+          <p:nvPr/>
+        </p:nvCxnSpPr>
+        <p:spPr>
+          <a:xfrm flipH="1">
+            <a:off x="4457700" y="2637543"/>
+            <a:ext cx="15826" cy="3636648"/>
+          </a:xfrm>
+          <a:prstGeom prst="line">
+            <a:avLst/>
+          </a:prstGeom>
+          <a:ln>
+            <a:solidFill>
+              <a:schemeClr val="tx1"/>
+            </a:solidFill>
+          </a:ln>
+        </p:spPr>
+        <p:style>
+          <a:lnRef idx="2">
+            <a:schemeClr val="accent1"/>
+          </a:lnRef>
+          <a:fillRef idx="0">
+            <a:schemeClr val="accent1"/>
+          </a:fillRef>
+          <a:effectRef idx="1">
+            <a:schemeClr val="accent1"/>
+          </a:effectRef>
+          <a:fontRef idx="minor">
+            <a:schemeClr val="tx1"/>
+          </a:fontRef>
+        </p:style>
+      </p:cxnSp>
+    </p:spTree>
+    <p:extLst>
+      <p:ext uri="{BB962C8B-B14F-4D97-AF65-F5344CB8AC3E}">
+        <p14:creationId xmlns:p14="http://schemas.microsoft.com/office/powerpoint/2010/main" val="2431369308"/>
+      </p:ext>
+    </p:extLst>
+  </p:cSld>
+  <p:clrMapOvr>
+    <a:masterClrMapping/>
+  </p:clrMapOvr>
+  <p:timing>
+    <p:tnLst>
+      <p:par>
+        <p:cTn id="1" dur="indefinite" restart="never" nodeType="tmRoot"/>
+      </p:par>
+    </p:tnLst>
+  </p:timing>
+</p:sld>
+</file>
+
+<file path=ppt/slides/slide21.xml><?xml version="1.0" encoding="utf-8"?>
+<p:sld xmlns:a="http://schemas.openxmlformats.org/drawingml/2006/main" xmlns:r="http://schemas.openxmlformats.org/officeDocument/2006/relationships" xmlns:p="http://schemas.openxmlformats.org/presentationml/2006/main">
+  <p:cSld>
+    <p:spTree>
+      <p:nvGrpSpPr>
+        <p:cNvPr id="1" name=""/>
+        <p:cNvGrpSpPr/>
+        <p:nvPr/>
+      </p:nvGrpSpPr>
+      <p:grpSpPr>
+        <a:xfrm>
+          <a:off x="0" y="0"/>
+          <a:ext cx="0" cy="0"/>
+          <a:chOff x="0" y="0"/>
+          <a:chExt cx="0" cy="0"/>
+        </a:xfrm>
+      </p:grpSpPr>
+      <p:sp>
+        <p:nvSpPr>
+          <p:cNvPr id="2" name="Title 1"/>
+          <p:cNvSpPr>
+            <a:spLocks noGrp="1"/>
+          </p:cNvSpPr>
+          <p:nvPr>
+            <p:ph type="title"/>
+          </p:nvPr>
+        </p:nvSpPr>
+        <p:spPr/>
+        <p:txBody>
+          <a:bodyPr/>
+          <a:lstStyle/>
+          <a:p>
+            <a:r>
+              <a:rPr lang="tr-TR" dirty="0" smtClean="0"/>
+              <a:t>Formation Control System</a:t>
+            </a:r>
+            <a:endParaRPr lang="tr-TR" dirty="0"/>
+          </a:p>
+        </p:txBody>
+      </p:sp>
+      <p:sp>
+        <p:nvSpPr>
+          <p:cNvPr id="3" name="TextBox 2"/>
+          <p:cNvSpPr txBox="1"/>
+          <p:nvPr/>
+        </p:nvSpPr>
+        <p:spPr>
+          <a:xfrm>
+            <a:off x="675249" y="1491175"/>
+            <a:ext cx="7596554" cy="369332"/>
+          </a:xfrm>
+          <a:prstGeom prst="rect">
+            <a:avLst/>
+          </a:prstGeom>
+          <a:noFill/>
+        </p:spPr>
+        <p:txBody>
+          <a:bodyPr wrap="square" rtlCol="0">
+            <a:spAutoFit/>
+          </a:bodyPr>
+          <a:lstStyle/>
+          <a:p>
+            <a:pPr marL="285750" indent="-285750" algn="just">
+              <a:buFont typeface="Arial" panose="020B0604020202020204" pitchFamily="34" charset="0"/>
+              <a:buChar char="•"/>
+            </a:pPr>
+            <a:r>
+              <a:rPr lang="tr-TR" dirty="0" smtClean="0"/>
+              <a:t>Bubble Packing and Randomized Fractals Methods</a:t>
+            </a:r>
+          </a:p>
+        </p:txBody>
+      </p:sp>
+      <p:sp>
+        <p:nvSpPr>
+          <p:cNvPr id="8" name="TextBox 7"/>
+          <p:cNvSpPr txBox="1"/>
+          <p:nvPr/>
+        </p:nvSpPr>
+        <p:spPr>
+          <a:xfrm>
+            <a:off x="3419366" y="2057893"/>
+            <a:ext cx="2220864" cy="338554"/>
+          </a:xfrm>
+          <a:prstGeom prst="rect">
+            <a:avLst/>
+          </a:prstGeom>
+          <a:noFill/>
+        </p:spPr>
+        <p:txBody>
+          <a:bodyPr wrap="none" rtlCol="0">
+            <a:spAutoFit/>
+          </a:bodyPr>
+          <a:lstStyle/>
+          <a:p>
+            <a:pPr algn="ctr"/>
+            <a:r>
+              <a:rPr lang="tr-TR" sz="1600" dirty="0" smtClean="0"/>
+              <a:t>Decision of Goal States</a:t>
+            </a:r>
+            <a:endParaRPr lang="tr-TR" sz="1600" dirty="0"/>
+          </a:p>
+        </p:txBody>
+      </p:sp>
+      <p:cxnSp>
+        <p:nvCxnSpPr>
+          <p:cNvPr id="14" name="Straight Connector 13"/>
+          <p:cNvCxnSpPr/>
+          <p:nvPr/>
+        </p:nvCxnSpPr>
+        <p:spPr>
+          <a:xfrm>
+            <a:off x="4473524" y="2489982"/>
+            <a:ext cx="0" cy="3727938"/>
+          </a:xfrm>
+          <a:prstGeom prst="line">
+            <a:avLst/>
+          </a:prstGeom>
+          <a:ln>
+            <a:solidFill>
+              <a:schemeClr val="tx1"/>
+            </a:solidFill>
+          </a:ln>
+        </p:spPr>
+        <p:style>
+          <a:lnRef idx="2">
+            <a:schemeClr val="accent1"/>
+          </a:lnRef>
+          <a:fillRef idx="0">
+            <a:schemeClr val="accent1"/>
+          </a:fillRef>
+          <a:effectRef idx="1">
+            <a:schemeClr val="accent1"/>
+          </a:effectRef>
+          <a:fontRef idx="minor">
+            <a:schemeClr val="tx1"/>
+          </a:fontRef>
+        </p:style>
+      </p:cxnSp>
+      <p:sp>
+        <p:nvSpPr>
+          <p:cNvPr id="15" name="TextBox 14"/>
+          <p:cNvSpPr txBox="1"/>
+          <p:nvPr/>
+        </p:nvSpPr>
+        <p:spPr>
+          <a:xfrm>
+            <a:off x="530021" y="2579132"/>
+            <a:ext cx="3331745" cy="307777"/>
+          </a:xfrm>
+          <a:prstGeom prst="rect">
+            <a:avLst/>
+          </a:prstGeom>
+          <a:noFill/>
+        </p:spPr>
+        <p:txBody>
+          <a:bodyPr wrap="none" rtlCol="0">
+            <a:spAutoFit/>
+          </a:bodyPr>
+          <a:lstStyle/>
+          <a:p>
+            <a:pPr algn="ctr"/>
+            <a:r>
+              <a:rPr lang="tr-TR" sz="1400" i="1" u="sng" dirty="0" smtClean="0"/>
+              <a:t>1)</a:t>
+            </a:r>
+            <a:r>
+              <a:rPr lang="en-US" sz="1400" i="1" u="sng" dirty="0" smtClean="0"/>
+              <a:t>Calculation of Free Configuration Space</a:t>
+            </a:r>
+            <a:endParaRPr lang="tr-TR" sz="1400" i="1" u="sng" dirty="0"/>
+          </a:p>
+        </p:txBody>
+      </p:sp>
+      <p:pic>
+        <p:nvPicPr>
+          <p:cNvPr id="16" name="Picture 2"/>
+          <p:cNvPicPr>
+            <a:picLocks noChangeAspect="1" noChangeArrowheads="1"/>
+          </p:cNvPicPr>
+          <p:nvPr/>
+        </p:nvPicPr>
+        <p:blipFill>
+          <a:blip r:embed="rId2"/>
+          <a:srcRect/>
+          <a:stretch>
+            <a:fillRect/>
+          </a:stretch>
+        </p:blipFill>
+        <p:spPr bwMode="auto">
+          <a:xfrm>
+            <a:off x="812995" y="2991969"/>
+            <a:ext cx="2819400" cy="399479"/>
+          </a:xfrm>
+          <a:prstGeom prst="rect">
+            <a:avLst/>
+          </a:prstGeom>
+          <a:noFill/>
+          <a:ln w="9525">
+            <a:noFill/>
+            <a:miter lim="800000"/>
+            <a:headEnd/>
+            <a:tailEnd/>
+          </a:ln>
+          <a:effectLst/>
+        </p:spPr>
+      </p:pic>
+      <p:sp>
+        <p:nvSpPr>
+          <p:cNvPr id="17" name="TextBox 16"/>
+          <p:cNvSpPr txBox="1"/>
+          <p:nvPr/>
+        </p:nvSpPr>
+        <p:spPr>
+          <a:xfrm>
+            <a:off x="-3954" y="3388244"/>
+            <a:ext cx="1605761" cy="307777"/>
+          </a:xfrm>
+          <a:prstGeom prst="rect">
+            <a:avLst/>
+          </a:prstGeom>
+          <a:noFill/>
+        </p:spPr>
+        <p:txBody>
+          <a:bodyPr wrap="none" rtlCol="0">
+            <a:spAutoFit/>
+          </a:bodyPr>
+          <a:lstStyle/>
+          <a:p>
+            <a:r>
+              <a:rPr lang="tr-TR" sz="1400" dirty="0" smtClean="0"/>
+              <a:t>Forbidden Space : </a:t>
+            </a:r>
+            <a:endParaRPr lang="tr-TR" sz="1400" dirty="0"/>
+          </a:p>
+        </p:txBody>
+      </p:sp>
+      <p:pic>
+        <p:nvPicPr>
+          <p:cNvPr id="18" name="Picture 3"/>
+          <p:cNvPicPr>
+            <a:picLocks noChangeAspect="1" noChangeArrowheads="1"/>
+          </p:cNvPicPr>
+          <p:nvPr/>
+        </p:nvPicPr>
+        <p:blipFill>
+          <a:blip r:embed="rId3"/>
+          <a:srcRect/>
+          <a:stretch>
+            <a:fillRect/>
+          </a:stretch>
+        </p:blipFill>
+        <p:spPr bwMode="auto">
+          <a:xfrm>
+            <a:off x="1511141" y="3379548"/>
+            <a:ext cx="2920182" cy="358677"/>
+          </a:xfrm>
+          <a:prstGeom prst="rect">
+            <a:avLst/>
+          </a:prstGeom>
+          <a:noFill/>
+          <a:ln w="9525">
+            <a:noFill/>
+            <a:miter lim="800000"/>
+            <a:headEnd/>
+            <a:tailEnd/>
+          </a:ln>
+          <a:effectLst/>
+        </p:spPr>
+      </p:pic>
+      <p:pic>
+        <p:nvPicPr>
+          <p:cNvPr id="19" name="Picture 4"/>
+          <p:cNvPicPr>
+            <a:picLocks noChangeAspect="1" noChangeArrowheads="1"/>
+          </p:cNvPicPr>
+          <p:nvPr/>
+        </p:nvPicPr>
+        <p:blipFill>
+          <a:blip r:embed="rId4"/>
+          <a:srcRect/>
+          <a:stretch>
+            <a:fillRect/>
+          </a:stretch>
+        </p:blipFill>
+        <p:spPr bwMode="auto">
+          <a:xfrm>
+            <a:off x="1375136" y="3870010"/>
+            <a:ext cx="1638300" cy="1837553"/>
+          </a:xfrm>
+          <a:prstGeom prst="rect">
+            <a:avLst/>
+          </a:prstGeom>
+          <a:noFill/>
+          <a:ln w="9525">
+            <a:noFill/>
+            <a:miter lim="800000"/>
+            <a:headEnd/>
+            <a:tailEnd/>
+          </a:ln>
+          <a:effectLst/>
+        </p:spPr>
+      </p:pic>
+      <p:sp>
+        <p:nvSpPr>
+          <p:cNvPr id="20" name="TextBox 19"/>
+          <p:cNvSpPr txBox="1"/>
+          <p:nvPr/>
+        </p:nvSpPr>
+        <p:spPr>
+          <a:xfrm>
+            <a:off x="1415149" y="5685459"/>
+            <a:ext cx="1473865" cy="307777"/>
+          </a:xfrm>
+          <a:prstGeom prst="rect">
+            <a:avLst/>
+          </a:prstGeom>
+          <a:noFill/>
+        </p:spPr>
+        <p:txBody>
+          <a:bodyPr wrap="none" rtlCol="0">
+            <a:spAutoFit/>
+          </a:bodyPr>
+          <a:lstStyle/>
+          <a:p>
+            <a:r>
+              <a:rPr lang="tr-TR" sz="1400" dirty="0" smtClean="0"/>
+              <a:t>Forbidden Space</a:t>
+            </a:r>
+            <a:endParaRPr lang="tr-TR" sz="1400" dirty="0"/>
+          </a:p>
+        </p:txBody>
+      </p:sp>
+      <p:sp>
+        <p:nvSpPr>
+          <p:cNvPr id="21" name="TextBox 20"/>
+          <p:cNvSpPr txBox="1"/>
+          <p:nvPr/>
+        </p:nvSpPr>
+        <p:spPr>
+          <a:xfrm>
+            <a:off x="6153409" y="2565063"/>
+            <a:ext cx="1603451" cy="307777"/>
+          </a:xfrm>
+          <a:prstGeom prst="rect">
+            <a:avLst/>
+          </a:prstGeom>
+          <a:noFill/>
+        </p:spPr>
+        <p:txBody>
+          <a:bodyPr wrap="none" rtlCol="0">
+            <a:spAutoFit/>
+          </a:bodyPr>
+          <a:lstStyle/>
+          <a:p>
+            <a:pPr algn="ctr"/>
+            <a:r>
+              <a:rPr lang="tr-TR" sz="1400" i="1" u="sng" dirty="0" smtClean="0"/>
+              <a:t>2)Visibility Graphs</a:t>
+            </a:r>
+            <a:endParaRPr lang="tr-TR" sz="1400" i="1" u="sng" dirty="0"/>
+          </a:p>
+        </p:txBody>
+      </p:sp>
+      <p:sp>
+        <p:nvSpPr>
+          <p:cNvPr id="22" name="Rectangle 21"/>
+          <p:cNvSpPr/>
+          <p:nvPr/>
+        </p:nvSpPr>
+        <p:spPr>
+          <a:xfrm>
+            <a:off x="4459455" y="2945129"/>
+            <a:ext cx="4698609" cy="461665"/>
+          </a:xfrm>
+          <a:prstGeom prst="rect">
+            <a:avLst/>
+          </a:prstGeom>
+        </p:spPr>
+        <p:txBody>
+          <a:bodyPr wrap="square">
+            <a:spAutoFit/>
+          </a:bodyPr>
+          <a:lstStyle/>
+          <a:p>
+            <a:pPr algn="just"/>
+            <a:r>
+              <a:rPr lang="en-US" sz="1200" dirty="0"/>
+              <a:t>The shortest path between </a:t>
+            </a:r>
+            <a:r>
+              <a:rPr lang="tr-TR" sz="1200" dirty="0" smtClean="0"/>
+              <a:t>a </a:t>
+            </a:r>
+            <a:r>
+              <a:rPr lang="en-US" sz="1200" dirty="0" smtClean="0"/>
+              <a:t>start</a:t>
+            </a:r>
+            <a:r>
+              <a:rPr lang="tr-TR" sz="1200" dirty="0" smtClean="0"/>
+              <a:t> </a:t>
+            </a:r>
+            <a:r>
+              <a:rPr lang="en-US" sz="1200" dirty="0"/>
+              <a:t>and </a:t>
+            </a:r>
+            <a:r>
+              <a:rPr lang="en-US" sz="1200" dirty="0" smtClean="0"/>
+              <a:t>goal </a:t>
+            </a:r>
+            <a:r>
+              <a:rPr lang="en-US" sz="1200" dirty="0"/>
+              <a:t>among a set S of augmented polygonal</a:t>
+            </a:r>
+            <a:r>
+              <a:rPr lang="tr-TR" sz="1200" dirty="0"/>
+              <a:t> </a:t>
+            </a:r>
+            <a:r>
+              <a:rPr lang="en-US" sz="1200" dirty="0"/>
+              <a:t>obstacles consists of arcs of the visibility</a:t>
+            </a:r>
+            <a:r>
+              <a:rPr lang="tr-TR" sz="1200" dirty="0"/>
+              <a:t> graph</a:t>
+            </a:r>
+            <a:endParaRPr lang="tr-TR" sz="1200" dirty="0"/>
+          </a:p>
+        </p:txBody>
+      </p:sp>
+      <p:pic>
+        <p:nvPicPr>
+          <p:cNvPr id="23" name="Picture 2"/>
+          <p:cNvPicPr>
+            <a:picLocks noChangeAspect="1" noChangeArrowheads="1"/>
+          </p:cNvPicPr>
+          <p:nvPr/>
+        </p:nvPicPr>
+        <p:blipFill>
+          <a:blip r:embed="rId5"/>
+          <a:srcRect/>
+          <a:stretch>
+            <a:fillRect/>
+          </a:stretch>
+        </p:blipFill>
+        <p:spPr bwMode="auto">
+          <a:xfrm>
+            <a:off x="5706533" y="3554260"/>
+            <a:ext cx="2497202" cy="240237"/>
+          </a:xfrm>
+          <a:prstGeom prst="rect">
+            <a:avLst/>
+          </a:prstGeom>
+          <a:noFill/>
+          <a:ln w="9525">
+            <a:noFill/>
+            <a:miter lim="800000"/>
+            <a:headEnd/>
+            <a:tailEnd/>
+          </a:ln>
+          <a:effectLst/>
+        </p:spPr>
+      </p:pic>
+      <p:pic>
+        <p:nvPicPr>
+          <p:cNvPr id="24" name="Picture 3"/>
+          <p:cNvPicPr>
+            <a:picLocks noChangeAspect="1" noChangeArrowheads="1"/>
+          </p:cNvPicPr>
+          <p:nvPr/>
+        </p:nvPicPr>
+        <p:blipFill>
+          <a:blip r:embed="rId6"/>
+          <a:srcRect/>
+          <a:stretch>
+            <a:fillRect/>
+          </a:stretch>
+        </p:blipFill>
+        <p:spPr bwMode="auto">
+          <a:xfrm>
+            <a:off x="6027098" y="3852432"/>
+            <a:ext cx="2176634" cy="2047875"/>
+          </a:xfrm>
+          <a:prstGeom prst="rect">
+            <a:avLst/>
+          </a:prstGeom>
+          <a:noFill/>
+          <a:ln w="9525">
+            <a:noFill/>
+            <a:miter lim="800000"/>
+            <a:headEnd/>
+            <a:tailEnd/>
+          </a:ln>
+          <a:effectLst/>
+        </p:spPr>
+      </p:pic>
+      <p:sp>
+        <p:nvSpPr>
+          <p:cNvPr id="25" name="TextBox 24"/>
+          <p:cNvSpPr txBox="1"/>
+          <p:nvPr/>
+        </p:nvSpPr>
+        <p:spPr>
+          <a:xfrm>
+            <a:off x="6493412" y="5735698"/>
+            <a:ext cx="1405128" cy="307777"/>
+          </a:xfrm>
+          <a:prstGeom prst="rect">
+            <a:avLst/>
+          </a:prstGeom>
+          <a:noFill/>
+        </p:spPr>
+        <p:txBody>
+          <a:bodyPr wrap="none" rtlCol="0">
+            <a:spAutoFit/>
+          </a:bodyPr>
+          <a:lstStyle/>
+          <a:p>
+            <a:r>
+              <a:rPr lang="tr-TR" sz="1400" dirty="0" smtClean="0"/>
+              <a:t>Visibility Graph</a:t>
+            </a:r>
+            <a:endParaRPr lang="tr-TR" sz="1400" dirty="0"/>
+          </a:p>
+        </p:txBody>
+      </p:sp>
+    </p:spTree>
+    <p:extLst>
+      <p:ext uri="{BB962C8B-B14F-4D97-AF65-F5344CB8AC3E}">
+        <p14:creationId xmlns:p14="http://schemas.microsoft.com/office/powerpoint/2010/main" val="2643796659"/>
+      </p:ext>
+    </p:extLst>
+  </p:cSld>
+  <p:clrMapOvr>
+    <a:masterClrMapping/>
+  </p:clrMapOvr>
+  <p:timing>
+    <p:tnLst>
+      <p:par>
+        <p:cTn id="1" dur="indefinite" restart="never" nodeType="tmRoot"/>
+      </p:par>
+    </p:tnLst>
+  </p:timing>
+</p:sld>
+</file>
+
+<file path=ppt/slides/slide22.xml><?xml version="1.0" encoding="utf-8"?>
+<p:sld xmlns:a="http://schemas.openxmlformats.org/drawingml/2006/main" xmlns:r="http://schemas.openxmlformats.org/officeDocument/2006/relationships" xmlns:p="http://schemas.openxmlformats.org/presentationml/2006/main">
+  <p:cSld>
+    <p:spTree>
+      <p:nvGrpSpPr>
+        <p:cNvPr id="1" name=""/>
+        <p:cNvGrpSpPr/>
+        <p:nvPr/>
+      </p:nvGrpSpPr>
+      <p:grpSpPr>
+        <a:xfrm>
+          <a:off x="0" y="0"/>
+          <a:ext cx="0" cy="0"/>
+          <a:chOff x="0" y="0"/>
+          <a:chExt cx="0" cy="0"/>
+        </a:xfrm>
+      </p:grpSpPr>
+      <p:sp>
+        <p:nvSpPr>
+          <p:cNvPr id="2" name="Title 1"/>
+          <p:cNvSpPr>
+            <a:spLocks noGrp="1"/>
+          </p:cNvSpPr>
+          <p:nvPr>
+            <p:ph type="title"/>
+          </p:nvPr>
+        </p:nvSpPr>
+        <p:spPr/>
+        <p:txBody>
+          <a:bodyPr/>
+          <a:lstStyle/>
+          <a:p>
+            <a:r>
+              <a:rPr lang="tr-TR" dirty="0" smtClean="0"/>
+              <a:t>References</a:t>
+            </a:r>
+            <a:endParaRPr lang="tr-TR" dirty="0"/>
+          </a:p>
+        </p:txBody>
+      </p:sp>
+      <p:sp>
+        <p:nvSpPr>
+          <p:cNvPr id="3" name="Content Placeholder 2"/>
+          <p:cNvSpPr>
+            <a:spLocks noGrp="1"/>
+          </p:cNvSpPr>
+          <p:nvPr>
+            <p:ph idx="1"/>
+          </p:nvPr>
+        </p:nvSpPr>
+        <p:spPr/>
+        <p:txBody>
+          <a:bodyPr/>
+          <a:lstStyle/>
+          <a:p>
+            <a:pPr>
+              <a:buFont typeface="Arial" pitchFamily="34" charset="0"/>
+              <a:buChar char="•"/>
+            </a:pPr>
+            <a:r>
+              <a:rPr lang="tr-TR" sz="1100" dirty="0" smtClean="0"/>
+              <a:t>[1]</a:t>
+            </a:r>
+            <a:r>
+              <a:rPr lang="tr-TR" sz="1100" dirty="0" smtClean="0">
+                <a:hlinkClick r:id="rId2"/>
+              </a:rPr>
+              <a:t> </a:t>
+            </a:r>
+            <a:r>
+              <a:rPr lang="tr-TR" sz="1050" dirty="0" smtClean="0">
+                <a:hlinkClick r:id="rId2"/>
+              </a:rPr>
+              <a:t>http://www.eecs.harvard.edu/ssr/projects/progSA/kilobot.html</a:t>
+            </a:r>
+            <a:endParaRPr lang="tr-TR" sz="1100" dirty="0" smtClean="0"/>
+          </a:p>
+          <a:p>
+            <a:pPr>
+              <a:buFont typeface="Arial" pitchFamily="34" charset="0"/>
+              <a:buChar char="•"/>
+            </a:pPr>
+            <a:r>
+              <a:rPr lang="tr-TR" sz="1100" dirty="0" smtClean="0"/>
+              <a:t>[2] </a:t>
+            </a:r>
+            <a:r>
+              <a:rPr lang="tr-TR" sz="900" dirty="0" smtClean="0"/>
+              <a:t>Martin N, Klupar P, “</a:t>
+            </a:r>
+            <a:r>
+              <a:rPr lang="en-US" sz="900" dirty="0" err="1" smtClean="0"/>
+              <a:t>Techsat</a:t>
+            </a:r>
+            <a:r>
+              <a:rPr lang="en-US" sz="900" dirty="0" smtClean="0"/>
+              <a:t> 21 And Revolutionizing Space</a:t>
+            </a:r>
+            <a:r>
+              <a:rPr lang="tr-TR" sz="900" dirty="0" smtClean="0"/>
+              <a:t> M</a:t>
+            </a:r>
+            <a:r>
+              <a:rPr lang="en-US" sz="900" dirty="0" err="1" smtClean="0"/>
+              <a:t>issions</a:t>
+            </a:r>
+            <a:r>
+              <a:rPr lang="tr-TR" sz="900" dirty="0" smtClean="0"/>
+              <a:t> Using Mıcrosatellıtes”, </a:t>
+            </a:r>
+            <a:endParaRPr lang="tr-TR" sz="1100" dirty="0" smtClean="0"/>
+          </a:p>
+          <a:p>
+            <a:pPr>
+              <a:buFont typeface="Arial" pitchFamily="34" charset="0"/>
+              <a:buChar char="•"/>
+            </a:pPr>
+            <a:r>
+              <a:rPr lang="tr-TR" sz="1100" dirty="0" smtClean="0"/>
+              <a:t>[3]</a:t>
+            </a:r>
+            <a:r>
+              <a:rPr lang="tr-TR" sz="1100" dirty="0" smtClean="0">
+                <a:hlinkClick r:id="rId3"/>
+              </a:rPr>
+              <a:t> </a:t>
+            </a:r>
+            <a:r>
+              <a:rPr lang="tr-TR" sz="1050" dirty="0" smtClean="0">
+                <a:hlinkClick r:id="rId3"/>
+              </a:rPr>
+              <a:t>http://www.swarmanoid.org/swarmanoid_hardware.php.html</a:t>
+            </a:r>
+            <a:endParaRPr lang="tr-TR" sz="1050" dirty="0" smtClean="0"/>
+          </a:p>
+          <a:p>
+            <a:pPr>
+              <a:buFont typeface="Arial" pitchFamily="34" charset="0"/>
+              <a:buChar char="•"/>
+            </a:pPr>
+            <a:r>
+              <a:rPr lang="en-US" sz="1050" dirty="0" smtClean="0"/>
+              <a:t>[</a:t>
+            </a:r>
+            <a:r>
+              <a:rPr lang="tr-TR" sz="1050" dirty="0" smtClean="0"/>
+              <a:t>4</a:t>
+            </a:r>
+            <a:r>
+              <a:rPr lang="en-US" sz="1050" dirty="0" smtClean="0"/>
+              <a:t>] S </a:t>
+            </a:r>
+            <a:r>
+              <a:rPr lang="en-US" sz="1050" dirty="0" err="1" smtClean="0"/>
+              <a:t>Kornienki</a:t>
+            </a:r>
+            <a:r>
+              <a:rPr lang="en-US" sz="1050" dirty="0" smtClean="0"/>
+              <a:t>, O. </a:t>
+            </a:r>
+            <a:r>
+              <a:rPr lang="en-US" sz="1050" dirty="0" err="1" smtClean="0"/>
+              <a:t>Kornienko</a:t>
+            </a:r>
+            <a:r>
+              <a:rPr lang="en-US" sz="1050" dirty="0" smtClean="0"/>
+              <a:t>, and Levi. P. Minimalistic approach towards communication</a:t>
+            </a:r>
+          </a:p>
+          <a:p>
+            <a:r>
+              <a:rPr lang="en-US" sz="1050" dirty="0" smtClean="0"/>
+              <a:t>and perception in </a:t>
+            </a:r>
+            <a:r>
+              <a:rPr lang="en-US" sz="1050" dirty="0" err="1" smtClean="0"/>
+              <a:t>microrobotic</a:t>
+            </a:r>
+            <a:r>
+              <a:rPr lang="en-US" sz="1050" dirty="0" smtClean="0"/>
+              <a:t> swarms. In IEEE International Conference</a:t>
+            </a:r>
+            <a:r>
+              <a:rPr lang="tr-TR" sz="1050" dirty="0" smtClean="0"/>
+              <a:t> </a:t>
+            </a:r>
+            <a:r>
+              <a:rPr lang="en-US" sz="1050" dirty="0" smtClean="0"/>
+              <a:t>on Intelligent Robots and Systems, 2005.</a:t>
+            </a:r>
+            <a:endParaRPr lang="tr-TR" sz="1050" dirty="0" smtClean="0"/>
+          </a:p>
+          <a:p>
+            <a:pPr>
+              <a:buFont typeface="Arial" pitchFamily="34" charset="0"/>
+              <a:buChar char="•"/>
+            </a:pPr>
+            <a:r>
+              <a:rPr lang="tr-TR" sz="1050" dirty="0" smtClean="0"/>
+              <a:t>[5] Farshad Arvin, John Murray, Licheng Shi, Chun Zhang, and Shigang Yue. Development</a:t>
+            </a:r>
+          </a:p>
+          <a:p>
+            <a:r>
+              <a:rPr lang="en-US" sz="1050" dirty="0" smtClean="0"/>
+              <a:t>of an autonomous micro robot for swarm robotics. In IEEE International</a:t>
+            </a:r>
+            <a:r>
+              <a:rPr lang="tr-TR" sz="1050" dirty="0" smtClean="0"/>
+              <a:t> </a:t>
+            </a:r>
+            <a:r>
+              <a:rPr lang="en-US" sz="1050" dirty="0" smtClean="0"/>
+              <a:t>Conference on </a:t>
+            </a:r>
+            <a:r>
+              <a:rPr lang="en-US" sz="1050" dirty="0" err="1" smtClean="0"/>
+              <a:t>Mechatronics</a:t>
+            </a:r>
+            <a:r>
+              <a:rPr lang="en-US" sz="1050" dirty="0" smtClean="0"/>
+              <a:t> and Automation, 2014.</a:t>
+            </a:r>
+            <a:endParaRPr lang="tr-TR" sz="1050" dirty="0" smtClean="0"/>
+          </a:p>
+          <a:p>
+            <a:pPr>
+              <a:buFont typeface="Arial" pitchFamily="34" charset="0"/>
+              <a:buChar char="•"/>
+            </a:pPr>
+            <a:r>
+              <a:rPr lang="tr-TR" sz="1050" dirty="0" smtClean="0"/>
+              <a:t>[6]</a:t>
+            </a:r>
+            <a:r>
+              <a:rPr lang="it-IT" sz="1050" dirty="0" smtClean="0"/>
+              <a:t>Touraj Soleymani, Vito Trianni, Michael Bonani, Francesco Mondada, and</a:t>
+            </a:r>
+            <a:r>
+              <a:rPr lang="tr-TR" sz="1050" dirty="0" smtClean="0"/>
+              <a:t> </a:t>
+            </a:r>
+            <a:r>
+              <a:rPr lang="en-US" sz="1050" dirty="0" smtClean="0"/>
+              <a:t>Marco </a:t>
+            </a:r>
+            <a:r>
+              <a:rPr lang="en-US" sz="1050" dirty="0" err="1" smtClean="0"/>
+              <a:t>Dorigo</a:t>
+            </a:r>
+            <a:r>
+              <a:rPr lang="en-US" sz="1050" dirty="0" smtClean="0"/>
+              <a:t>. Bio-inspired construction with mobile robots and compliant</a:t>
+            </a:r>
+            <a:r>
+              <a:rPr lang="tr-TR" sz="1050" dirty="0" smtClean="0"/>
+              <a:t> </a:t>
+            </a:r>
+            <a:r>
+              <a:rPr lang="en-US" sz="1050" dirty="0" smtClean="0"/>
+              <a:t>pockets. Robotics and </a:t>
+            </a:r>
+            <a:r>
+              <a:rPr lang="en-US" sz="1050" dirty="0" err="1" smtClean="0"/>
+              <a:t>Autonomus</a:t>
+            </a:r>
+            <a:r>
+              <a:rPr lang="en-US" sz="1050" dirty="0" smtClean="0"/>
+              <a:t> Systems, 74:340–350, 2015.</a:t>
+            </a:r>
+            <a:endParaRPr lang="tr-TR" sz="1050" dirty="0" smtClean="0"/>
+          </a:p>
+          <a:p>
+            <a:pPr>
+              <a:buFont typeface="Arial" pitchFamily="34" charset="0"/>
+              <a:buChar char="•"/>
+            </a:pPr>
+            <a:r>
+              <a:rPr lang="tr-TR" sz="1050" dirty="0" smtClean="0"/>
+              <a:t>[7] Roderich Grof, Michael Bonani, Mondada Francesco, and Marco Dorigo. Autonomous</a:t>
+            </a:r>
+          </a:p>
+          <a:p>
+            <a:r>
+              <a:rPr lang="en-US" sz="1050" dirty="0" smtClean="0"/>
+              <a:t>self-assembly in a swarm-bot. 22:1115–1130, 2006.</a:t>
+            </a:r>
+            <a:endParaRPr lang="tr-TR" sz="1050" dirty="0" smtClean="0"/>
+          </a:p>
+          <a:p>
+            <a:r>
+              <a:rPr lang="tr-TR" sz="1050" dirty="0" smtClean="0"/>
+              <a:t>[8]</a:t>
+            </a:r>
+            <a:r>
+              <a:rPr lang="en-US" sz="1050" dirty="0" smtClean="0"/>
+              <a:t> S.P. </a:t>
+            </a:r>
+            <a:r>
+              <a:rPr lang="en-US" sz="1050" dirty="0" err="1" smtClean="0"/>
+              <a:t>Hou</a:t>
+            </a:r>
+            <a:r>
+              <a:rPr lang="en-US" sz="1050" dirty="0" smtClean="0"/>
+              <a:t>, C.C. </a:t>
+            </a:r>
+            <a:r>
+              <a:rPr lang="en-US" sz="1050" dirty="0" err="1" smtClean="0"/>
+              <a:t>Cheah</a:t>
+            </a:r>
+            <a:r>
+              <a:rPr lang="en-US" sz="1050" dirty="0" smtClean="0"/>
+              <a:t>, and J.J.E. </a:t>
+            </a:r>
+            <a:r>
+              <a:rPr lang="en-US" sz="1050" dirty="0" err="1" smtClean="0"/>
+              <a:t>Slotine</a:t>
+            </a:r>
+            <a:r>
+              <a:rPr lang="en-US" sz="1050" dirty="0" smtClean="0"/>
+              <a:t>. Dynamic region following </a:t>
+            </a:r>
+            <a:r>
+              <a:rPr lang="en-US" sz="1050" dirty="0" err="1" smtClean="0"/>
+              <a:t>formationcontrol</a:t>
+            </a:r>
+            <a:r>
+              <a:rPr lang="en-US" sz="1050" dirty="0" smtClean="0"/>
+              <a:t> for a swarm of robots. In ICRA, 2009.</a:t>
+            </a:r>
+            <a:r>
+              <a:rPr lang="tr-TR" sz="1050" dirty="0" smtClean="0"/>
+              <a:t>[10] </a:t>
+            </a:r>
+            <a:r>
+              <a:rPr lang="tr-TR" sz="1050" dirty="0" smtClean="0">
+                <a:hlinkClick r:id="rId4"/>
+              </a:rPr>
+              <a:t>http://electronicdesign.com/systems/advanced-robots-swarm-nyc-s-museum-math</a:t>
+            </a:r>
+            <a:endParaRPr lang="tr-TR" sz="1050" dirty="0" smtClean="0"/>
+          </a:p>
+          <a:p>
+            <a:r>
+              <a:rPr lang="tr-TR" sz="1050" dirty="0" smtClean="0"/>
+              <a:t>[9]</a:t>
+            </a:r>
+            <a:r>
+              <a:rPr lang="en-US" sz="1050" dirty="0" smtClean="0"/>
+              <a:t> </a:t>
+            </a:r>
+            <a:r>
+              <a:rPr lang="en-US" sz="1050" dirty="0" err="1" smtClean="0"/>
+              <a:t>Samitha</a:t>
+            </a:r>
+            <a:r>
+              <a:rPr lang="en-US" sz="1050" dirty="0" smtClean="0"/>
+              <a:t> </a:t>
+            </a:r>
+            <a:r>
+              <a:rPr lang="en-US" sz="1050" dirty="0" err="1" smtClean="0"/>
+              <a:t>Ekanayake</a:t>
+            </a:r>
+            <a:r>
+              <a:rPr lang="en-US" sz="1050" dirty="0" smtClean="0"/>
+              <a:t> and </a:t>
+            </a:r>
+            <a:r>
+              <a:rPr lang="en-US" sz="1050" dirty="0" err="1" smtClean="0"/>
+              <a:t>Pubudu</a:t>
+            </a:r>
+            <a:r>
+              <a:rPr lang="en-US" sz="1050" dirty="0" smtClean="0"/>
+              <a:t> </a:t>
+            </a:r>
+            <a:r>
+              <a:rPr lang="en-US" sz="1050" dirty="0" err="1" smtClean="0"/>
+              <a:t>Pathirana</a:t>
+            </a:r>
+            <a:r>
+              <a:rPr lang="en-US" sz="1050" dirty="0" smtClean="0"/>
+              <a:t>. Formations of robotic swarm: An</a:t>
+            </a:r>
+            <a:r>
+              <a:rPr lang="tr-TR" sz="1050" dirty="0" smtClean="0"/>
+              <a:t> </a:t>
+            </a:r>
+            <a:r>
+              <a:rPr lang="en-US" sz="1050" dirty="0" smtClean="0"/>
+              <a:t>artificial force based approach. International Journal of Advanced Robotic Systems,</a:t>
+            </a:r>
+            <a:r>
+              <a:rPr lang="tr-TR" sz="1050" dirty="0" smtClean="0"/>
+              <a:t>7:173–190, 2010</a:t>
+            </a:r>
+          </a:p>
+          <a:p>
+            <a:r>
+              <a:rPr lang="tr-TR" sz="1050" dirty="0" smtClean="0"/>
+              <a:t>[10] http://electronicdesign.com/systems/advanced-robots-swarm-nyc-s-museum-math</a:t>
+            </a:r>
+          </a:p>
+          <a:p>
+            <a:r>
+              <a:rPr lang="tr-TR" sz="1050" dirty="0" smtClean="0"/>
+              <a:t>[11]</a:t>
+            </a:r>
+            <a:r>
+              <a:rPr lang="de-DE" sz="1050" dirty="0" smtClean="0"/>
+              <a:t> Aveek Das, Rafael Fierro, Vijay Kumar, James Ostrowski, John Spletzer, and</a:t>
+            </a:r>
+            <a:r>
+              <a:rPr lang="tr-TR" sz="1050" dirty="0" smtClean="0"/>
+              <a:t> </a:t>
+            </a:r>
+            <a:r>
+              <a:rPr lang="en-US" sz="1050" dirty="0" smtClean="0"/>
+              <a:t>Camilla Taylor. A vision-based formation control framework. IEEE Transactions</a:t>
+            </a:r>
+            <a:r>
+              <a:rPr lang="tr-TR" sz="1050" dirty="0" smtClean="0"/>
+              <a:t> </a:t>
+            </a:r>
+            <a:r>
+              <a:rPr lang="en-US" sz="1050" dirty="0" smtClean="0"/>
+              <a:t>on Robotics and Automation, 18:813–825, 2002.</a:t>
+            </a:r>
+            <a:endParaRPr lang="tr-TR" sz="1050" dirty="0" smtClean="0"/>
+          </a:p>
+          <a:p>
+            <a:r>
+              <a:rPr lang="tr-TR" sz="1050" dirty="0" smtClean="0"/>
+              <a:t>[12]</a:t>
+            </a:r>
+            <a:r>
+              <a:rPr lang="en-US" sz="1050" dirty="0" smtClean="0"/>
+              <a:t> </a:t>
+            </a:r>
+            <a:r>
+              <a:rPr lang="en-US" sz="1050" dirty="0" err="1" smtClean="0"/>
+              <a:t>Yogeswaran</a:t>
+            </a:r>
+            <a:r>
+              <a:rPr lang="en-US" sz="1050" dirty="0" smtClean="0"/>
+              <a:t> Mohan and S.G. </a:t>
+            </a:r>
+            <a:r>
+              <a:rPr lang="en-US" sz="1050" dirty="0" err="1" smtClean="0"/>
+              <a:t>Ponnambalam</a:t>
+            </a:r>
+            <a:r>
+              <a:rPr lang="en-US" sz="1050" dirty="0" smtClean="0"/>
+              <a:t>. An extensive review of research</a:t>
+            </a:r>
+            <a:r>
+              <a:rPr lang="tr-TR" sz="1050" dirty="0" smtClean="0"/>
+              <a:t> </a:t>
+            </a:r>
+            <a:r>
+              <a:rPr lang="en-US" sz="1050" dirty="0" smtClean="0"/>
+              <a:t>in swarm robotics. In World Congress on Nature &amp; Biologically Inspired Computing,</a:t>
+            </a:r>
+            <a:r>
+              <a:rPr lang="tr-TR" sz="1050" dirty="0" smtClean="0"/>
+              <a:t> NaBIC, 2009.</a:t>
+            </a:r>
+          </a:p>
+          <a:p>
+            <a:pPr>
+              <a:buFont typeface="Arial" pitchFamily="34" charset="0"/>
+              <a:buChar char="•"/>
+            </a:pPr>
+            <a:endParaRPr lang="tr-TR" sz="1100" dirty="0" smtClean="0"/>
+          </a:p>
+          <a:p>
+            <a:endParaRPr lang="tr-TR" sz="1100" dirty="0" smtClean="0"/>
+          </a:p>
+          <a:p>
+            <a:r>
+              <a:rPr lang="tr-TR" sz="1100" dirty="0" smtClean="0"/>
+              <a:t>                           </a:t>
+            </a:r>
+            <a:endParaRPr lang="tr-TR" sz="1100" dirty="0"/>
+          </a:p>
+        </p:txBody>
+      </p:sp>
+      <p:sp>
+        <p:nvSpPr>
+          <p:cNvPr id="4" name="Slide Number Placeholder 3"/>
+          <p:cNvSpPr>
+            <a:spLocks noGrp="1"/>
+          </p:cNvSpPr>
+          <p:nvPr>
+            <p:ph type="sldNum" sz="quarter" idx="12"/>
+          </p:nvPr>
+        </p:nvSpPr>
+        <p:spPr/>
+        <p:txBody>
+          <a:bodyPr/>
+          <a:lstStyle/>
+          <a:p>
+            <a:pPr>
+              <a:defRPr/>
+            </a:pPr>
+            <a:fld id="{C878F797-6006-4DDA-AFE9-456F280FE6C5}" type="slidenum">
+              <a:rPr lang="en-US" smtClean="0"/>
+              <a:pPr>
+                <a:defRPr/>
+              </a:pPr>
+              <a:t>22</a:t>
+            </a:fld>
+            <a:endParaRPr lang="en-US" dirty="0"/>
+          </a:p>
+        </p:txBody>
+      </p:sp>
+      <p:sp>
+        <p:nvSpPr>
+          <p:cNvPr id="5" name="Date Placeholder 4"/>
+          <p:cNvSpPr>
+            <a:spLocks noGrp="1"/>
+          </p:cNvSpPr>
+          <p:nvPr>
+            <p:ph type="dt" sz="half" idx="2"/>
+          </p:nvPr>
+        </p:nvSpPr>
+        <p:spPr/>
+        <p:txBody>
+          <a:bodyPr/>
+          <a:lstStyle/>
+          <a:p>
+            <a:pPr>
+              <a:defRPr/>
+            </a:pPr>
+            <a:r>
+              <a:rPr lang="tr-TR" smtClean="0"/>
+              <a:t>METU Electrical &amp; Electronics Engineering Department</a:t>
+            </a:r>
+            <a:endParaRPr lang="en-US" dirty="0"/>
+          </a:p>
+        </p:txBody>
+      </p:sp>
+    </p:spTree>
+    <p:extLst>
+      <p:ext uri="{BB962C8B-B14F-4D97-AF65-F5344CB8AC3E}">
+        <p14:creationId xmlns:p14="http://schemas.microsoft.com/office/powerpoint/2010/main" val="1601229741"/>
+      </p:ext>
+    </p:extLst>
+  </p:cSld>
+  <p:clrMapOvr>
+    <a:masterClrMapping/>
+  </p:clrMapOvr>
+  <p:timing>
+    <p:tnLst>
+      <p:par>
+        <p:cTn id="1" dur="indefinite" restart="never" nodeType="tmRoot"/>
+      </p:par>
+    </p:tnLst>
+  </p:timing>
+</p:sld>
+</file>
+
+<file path=ppt/slides/slide23.xml><?xml version="1.0" encoding="utf-8"?>
+<p:sld xmlns:a="http://schemas.openxmlformats.org/drawingml/2006/main" xmlns:r="http://schemas.openxmlformats.org/officeDocument/2006/relationships" xmlns:p="http://schemas.openxmlformats.org/presentationml/2006/main">
+  <p:cSld>
+    <p:spTree>
+      <p:nvGrpSpPr>
+        <p:cNvPr id="1" name=""/>
+        <p:cNvGrpSpPr/>
+        <p:nvPr/>
+      </p:nvGrpSpPr>
+      <p:grpSpPr>
+        <a:xfrm>
+          <a:off x="0" y="0"/>
+          <a:ext cx="0" cy="0"/>
+          <a:chOff x="0" y="0"/>
+          <a:chExt cx="0" cy="0"/>
+        </a:xfrm>
+      </p:grpSpPr>
+    </p:spTree>
+    <p:extLst>
+      <p:ext uri="{BB962C8B-B14F-4D97-AF65-F5344CB8AC3E}">
+        <p14:creationId xmlns:p14="http://schemas.microsoft.com/office/powerpoint/2010/main" val="3835474893"/>
+      </p:ext>
+    </p:extLst>
+  </p:cSld>
+  <p:clrMapOvr>
+    <a:masterClrMapping/>
+  </p:clrMapOvr>
+  <p:timing>
+    <p:tnLst>
+      <p:par>
+        <p:cTn id="1" dur="indefinite" restart="never" nodeType="tmRoot"/>
+      </p:par>
+    </p:tnLst>
+  </p:timing>
 </p:sld>
 </file>
 
@@ -21691,13 +23095,20 @@
     </p:spTree>
     <p:extLst>
       <p:ext uri="{BB962C8B-B14F-4D97-AF65-F5344CB8AC3E}">
-        <p14:creationId xmlns="" xmlns:p14="http://schemas.microsoft.com/office/powerpoint/2010/main" val="1601229741"/>
+        <p14:creationId xmlns:p14="http://schemas.microsoft.com/office/powerpoint/2010/main" val="1601229741"/>
       </p:ext>
     </p:extLst>
   </p:cSld>
   <p:clrMapOvr>
     <a:masterClrMapping/>
   </p:clrMapOvr>
+  <p:timing>
+    <p:tnLst>
+      <p:par>
+        <p:cTn id="1" dur="indefinite" restart="never" nodeType="tmRoot"/>
+      </p:par>
+    </p:tnLst>
+  </p:timing>
 </p:sld>
 </file>
 
@@ -22016,7 +23427,7 @@
     </p:spTree>
     <p:extLst>
       <p:ext uri="{BB962C8B-B14F-4D97-AF65-F5344CB8AC3E}">
-        <p14:creationId xmlns="" xmlns:p14="http://schemas.microsoft.com/office/powerpoint/2010/main" val="1601229741"/>
+        <p14:creationId xmlns:p14="http://schemas.microsoft.com/office/powerpoint/2010/main" val="1601229741"/>
       </p:ext>
     </p:extLst>
   </p:cSld>
@@ -22316,7 +23727,7 @@
     </p:spTree>
     <p:extLst>
       <p:ext uri="{BB962C8B-B14F-4D97-AF65-F5344CB8AC3E}">
-        <p14:creationId xmlns="" xmlns:p14="http://schemas.microsoft.com/office/powerpoint/2010/main" val="1601229741"/>
+        <p14:creationId xmlns:p14="http://schemas.microsoft.com/office/powerpoint/2010/main" val="1601229741"/>
       </p:ext>
     </p:extLst>
   </p:cSld>
@@ -22634,7 +24045,7 @@
     </p:spTree>
     <p:extLst>
       <p:ext uri="{BB962C8B-B14F-4D97-AF65-F5344CB8AC3E}">
-        <p14:creationId xmlns="" xmlns:p14="http://schemas.microsoft.com/office/powerpoint/2010/main" val="1601229741"/>
+        <p14:creationId xmlns:p14="http://schemas.microsoft.com/office/powerpoint/2010/main" val="1601229741"/>
       </p:ext>
     </p:extLst>
   </p:cSld>
@@ -22944,7 +24355,7 @@
     </p:spTree>
     <p:extLst>
       <p:ext uri="{BB962C8B-B14F-4D97-AF65-F5344CB8AC3E}">
-        <p14:creationId xmlns="" xmlns:p14="http://schemas.microsoft.com/office/powerpoint/2010/main" val="1601229741"/>
+        <p14:creationId xmlns:p14="http://schemas.microsoft.com/office/powerpoint/2010/main" val="1601229741"/>
       </p:ext>
     </p:extLst>
   </p:cSld>
@@ -24203,7 +25614,7 @@
     </p:spTree>
     <p:extLst>
       <p:ext uri="{BB962C8B-B14F-4D97-AF65-F5344CB8AC3E}">
-        <p14:creationId xmlns="" xmlns:p14="http://schemas.microsoft.com/office/powerpoint/2010/main" val="1601229741"/>
+        <p14:creationId xmlns:p14="http://schemas.microsoft.com/office/powerpoint/2010/main" val="1601229741"/>
       </p:ext>
     </p:extLst>
   </p:cSld>
@@ -27925,7 +29336,7 @@
     </p:spTree>
     <p:extLst>
       <p:ext uri="{BB962C8B-B14F-4D97-AF65-F5344CB8AC3E}">
-        <p14:creationId xmlns="" xmlns:p14="http://schemas.microsoft.com/office/powerpoint/2010/main" val="1601229741"/>
+        <p14:creationId xmlns:p14="http://schemas.microsoft.com/office/powerpoint/2010/main" val="1601229741"/>
       </p:ext>
     </p:extLst>
   </p:cSld>

</xml_diff>

<commit_message>
[update] formation control kismi sunuma eklemeye d
</commit_message>
<xml_diff>
--- a/juri_sunum.pptx
+++ b/juri_sunum.pptx
@@ -5,10 +5,10 @@
     <p:sldMasterId id="2147483886" r:id="rId1"/>
   </p:sldMasterIdLst>
   <p:notesMasterIdLst>
-    <p:notesMasterId r:id="rId25"/>
+    <p:notesMasterId r:id="rId28"/>
   </p:notesMasterIdLst>
   <p:handoutMasterIdLst>
-    <p:handoutMasterId r:id="rId26"/>
+    <p:handoutMasterId r:id="rId29"/>
   </p:handoutMasterIdLst>
   <p:sldIdLst>
     <p:sldId id="299" r:id="rId2"/>
@@ -32,8 +32,11 @@
     <p:sldId id="321" r:id="rId20"/>
     <p:sldId id="322" r:id="rId21"/>
     <p:sldId id="323" r:id="rId22"/>
-    <p:sldId id="305" r:id="rId23"/>
-    <p:sldId id="303" r:id="rId24"/>
+    <p:sldId id="324" r:id="rId23"/>
+    <p:sldId id="326" r:id="rId24"/>
+    <p:sldId id="325" r:id="rId25"/>
+    <p:sldId id="305" r:id="rId26"/>
+    <p:sldId id="303" r:id="rId27"/>
   </p:sldIdLst>
   <p:sldSz cx="9144000" cy="6858000" type="screen4x3"/>
   <p:notesSz cx="6858000" cy="9144000"/>
@@ -5926,7 +5929,7 @@
           <a:graphicData uri="http://schemas.openxmlformats.org/presentationml/2006/ole">
             <mc:AlternateContent xmlns:mc="http://schemas.openxmlformats.org/markup-compatibility/2006">
               <mc:Choice xmlns:v="urn:schemas-microsoft-com:vml" Requires="v">
-                <p:oleObj spid="_x0000_s1030" name="Equation" r:id="rId3" imgW="469800" imgH="228600" progId="Equation.3">
+                <p:oleObj spid="_x0000_s1033" name="Equation" r:id="rId3" imgW="469800" imgH="228600" progId="Equation.3">
                   <p:embed/>
                 </p:oleObj>
               </mc:Choice>
@@ -22182,7 +22185,6 @@
               <a:rPr lang="tr-TR" sz="1200" dirty="0"/>
               <a:t> graph</a:t>
             </a:r>
-            <a:endParaRPr lang="tr-TR" sz="1200" dirty="0"/>
           </a:p>
         </p:txBody>
       </p:sp>
@@ -22319,6 +22321,2643 @@
           <a:chExt cx="0" cy="0"/>
         </a:xfrm>
       </p:grpSpPr>
+      <p:pic>
+        <p:nvPicPr>
+          <p:cNvPr id="29" name="Picture 2"/>
+          <p:cNvPicPr>
+            <a:picLocks noChangeAspect="1" noChangeArrowheads="1"/>
+          </p:cNvPicPr>
+          <p:nvPr/>
+        </p:nvPicPr>
+        <p:blipFill>
+          <a:blip r:embed="rId2"/>
+          <a:srcRect/>
+          <a:stretch>
+            <a:fillRect/>
+          </a:stretch>
+        </p:blipFill>
+        <p:spPr bwMode="auto">
+          <a:xfrm>
+            <a:off x="4593060" y="3532197"/>
+            <a:ext cx="1490105" cy="2685723"/>
+          </a:xfrm>
+          <a:prstGeom prst="rect">
+            <a:avLst/>
+          </a:prstGeom>
+          <a:noFill/>
+          <a:ln w="9525">
+            <a:noFill/>
+            <a:miter lim="800000"/>
+            <a:headEnd/>
+            <a:tailEnd/>
+          </a:ln>
+          <a:effectLst/>
+        </p:spPr>
+      </p:pic>
+      <p:sp>
+        <p:nvSpPr>
+          <p:cNvPr id="2" name="Title 1"/>
+          <p:cNvSpPr>
+            <a:spLocks noGrp="1"/>
+          </p:cNvSpPr>
+          <p:nvPr>
+            <p:ph type="title"/>
+          </p:nvPr>
+        </p:nvSpPr>
+        <p:spPr/>
+        <p:txBody>
+          <a:bodyPr/>
+          <a:lstStyle/>
+          <a:p>
+            <a:r>
+              <a:rPr lang="tr-TR" dirty="0" smtClean="0"/>
+              <a:t>Formation Control System</a:t>
+            </a:r>
+            <a:endParaRPr lang="tr-TR" dirty="0"/>
+          </a:p>
+        </p:txBody>
+      </p:sp>
+      <p:sp>
+        <p:nvSpPr>
+          <p:cNvPr id="3" name="TextBox 2"/>
+          <p:cNvSpPr txBox="1"/>
+          <p:nvPr/>
+        </p:nvSpPr>
+        <p:spPr>
+          <a:xfrm>
+            <a:off x="675249" y="1491175"/>
+            <a:ext cx="7596554" cy="369332"/>
+          </a:xfrm>
+          <a:prstGeom prst="rect">
+            <a:avLst/>
+          </a:prstGeom>
+          <a:noFill/>
+        </p:spPr>
+        <p:txBody>
+          <a:bodyPr wrap="square" rtlCol="0">
+            <a:spAutoFit/>
+          </a:bodyPr>
+          <a:lstStyle/>
+          <a:p>
+            <a:pPr marL="285750" indent="-285750" algn="just">
+              <a:buFont typeface="Arial" panose="020B0604020202020204" pitchFamily="34" charset="0"/>
+              <a:buChar char="•"/>
+            </a:pPr>
+            <a:r>
+              <a:rPr lang="tr-TR" dirty="0" smtClean="0"/>
+              <a:t>Bubble Packing and Randomized Fractals Methods</a:t>
+            </a:r>
+          </a:p>
+        </p:txBody>
+      </p:sp>
+      <p:sp>
+        <p:nvSpPr>
+          <p:cNvPr id="8" name="TextBox 7"/>
+          <p:cNvSpPr txBox="1"/>
+          <p:nvPr/>
+        </p:nvSpPr>
+        <p:spPr>
+          <a:xfrm>
+            <a:off x="3419366" y="2057893"/>
+            <a:ext cx="2220864" cy="338554"/>
+          </a:xfrm>
+          <a:prstGeom prst="rect">
+            <a:avLst/>
+          </a:prstGeom>
+          <a:noFill/>
+        </p:spPr>
+        <p:txBody>
+          <a:bodyPr wrap="none" rtlCol="0">
+            <a:spAutoFit/>
+          </a:bodyPr>
+          <a:lstStyle/>
+          <a:p>
+            <a:pPr algn="ctr"/>
+            <a:r>
+              <a:rPr lang="tr-TR" sz="1600" dirty="0" smtClean="0"/>
+              <a:t>Decision of Goal States</a:t>
+            </a:r>
+            <a:endParaRPr lang="tr-TR" sz="1600" dirty="0"/>
+          </a:p>
+        </p:txBody>
+      </p:sp>
+      <p:cxnSp>
+        <p:nvCxnSpPr>
+          <p:cNvPr id="14" name="Straight Connector 13"/>
+          <p:cNvCxnSpPr/>
+          <p:nvPr/>
+        </p:nvCxnSpPr>
+        <p:spPr>
+          <a:xfrm>
+            <a:off x="4473524" y="2489982"/>
+            <a:ext cx="0" cy="3727938"/>
+          </a:xfrm>
+          <a:prstGeom prst="line">
+            <a:avLst/>
+          </a:prstGeom>
+          <a:ln>
+            <a:solidFill>
+              <a:schemeClr val="tx1"/>
+            </a:solidFill>
+          </a:ln>
+        </p:spPr>
+        <p:style>
+          <a:lnRef idx="2">
+            <a:schemeClr val="accent1"/>
+          </a:lnRef>
+          <a:fillRef idx="0">
+            <a:schemeClr val="accent1"/>
+          </a:fillRef>
+          <a:effectRef idx="1">
+            <a:schemeClr val="accent1"/>
+          </a:effectRef>
+          <a:fontRef idx="minor">
+            <a:schemeClr val="tx1"/>
+          </a:fontRef>
+        </p:style>
+      </p:cxnSp>
+      <p:sp>
+        <p:nvSpPr>
+          <p:cNvPr id="15" name="TextBox 14"/>
+          <p:cNvSpPr txBox="1"/>
+          <p:nvPr/>
+        </p:nvSpPr>
+        <p:spPr>
+          <a:xfrm>
+            <a:off x="1260192" y="2579132"/>
+            <a:ext cx="1871410" cy="307777"/>
+          </a:xfrm>
+          <a:prstGeom prst="rect">
+            <a:avLst/>
+          </a:prstGeom>
+          <a:noFill/>
+        </p:spPr>
+        <p:txBody>
+          <a:bodyPr wrap="none" rtlCol="0">
+            <a:spAutoFit/>
+          </a:bodyPr>
+          <a:lstStyle/>
+          <a:p>
+            <a:pPr algn="ctr"/>
+            <a:r>
+              <a:rPr lang="tr-TR" sz="1400" i="1" u="sng" dirty="0"/>
+              <a:t>3</a:t>
+            </a:r>
+            <a:r>
+              <a:rPr lang="tr-TR" sz="1400" i="1" u="sng" dirty="0" smtClean="0"/>
+              <a:t>)Dijkstra’s Algorithm</a:t>
+            </a:r>
+            <a:endParaRPr lang="tr-TR" sz="1400" i="1" u="sng" dirty="0"/>
+          </a:p>
+        </p:txBody>
+      </p:sp>
+      <p:sp>
+        <p:nvSpPr>
+          <p:cNvPr id="21" name="TextBox 20"/>
+          <p:cNvSpPr txBox="1"/>
+          <p:nvPr/>
+        </p:nvSpPr>
+        <p:spPr>
+          <a:xfrm>
+            <a:off x="4575707" y="2565063"/>
+            <a:ext cx="4590039" cy="307777"/>
+          </a:xfrm>
+          <a:prstGeom prst="rect">
+            <a:avLst/>
+          </a:prstGeom>
+          <a:noFill/>
+        </p:spPr>
+        <p:txBody>
+          <a:bodyPr wrap="none" rtlCol="0">
+            <a:spAutoFit/>
+          </a:bodyPr>
+          <a:lstStyle/>
+          <a:p>
+            <a:pPr algn="ctr"/>
+            <a:r>
+              <a:rPr lang="tr-TR" sz="1400" i="1" u="sng" dirty="0" smtClean="0"/>
+              <a:t>4)Hungarian </a:t>
+            </a:r>
+            <a:r>
+              <a:rPr lang="tr-TR" sz="1400" i="1" u="sng" dirty="0"/>
+              <a:t>Algorithm (Munkres Assignment Algorithm)</a:t>
+            </a:r>
+            <a:endParaRPr lang="tr-TR" sz="1400" i="1" u="sng" dirty="0"/>
+          </a:p>
+        </p:txBody>
+      </p:sp>
+      <p:sp>
+        <p:nvSpPr>
+          <p:cNvPr id="22" name="Rectangle 21"/>
+          <p:cNvSpPr/>
+          <p:nvPr/>
+        </p:nvSpPr>
+        <p:spPr>
+          <a:xfrm>
+            <a:off x="4459455" y="2945129"/>
+            <a:ext cx="4698609" cy="461665"/>
+          </a:xfrm>
+          <a:prstGeom prst="rect">
+            <a:avLst/>
+          </a:prstGeom>
+        </p:spPr>
+        <p:txBody>
+          <a:bodyPr wrap="square">
+            <a:spAutoFit/>
+          </a:bodyPr>
+          <a:lstStyle/>
+          <a:p>
+            <a:pPr algn="just"/>
+            <a:r>
+              <a:rPr lang="en-US" sz="1200" dirty="0"/>
+              <a:t>The shortest path between </a:t>
+            </a:r>
+            <a:r>
+              <a:rPr lang="tr-TR" sz="1200" dirty="0" smtClean="0"/>
+              <a:t>a </a:t>
+            </a:r>
+            <a:r>
+              <a:rPr lang="en-US" sz="1200" dirty="0" smtClean="0"/>
+              <a:t>start</a:t>
+            </a:r>
+            <a:r>
+              <a:rPr lang="tr-TR" sz="1200" dirty="0" smtClean="0"/>
+              <a:t> </a:t>
+            </a:r>
+            <a:r>
+              <a:rPr lang="en-US" sz="1200" dirty="0"/>
+              <a:t>and </a:t>
+            </a:r>
+            <a:r>
+              <a:rPr lang="en-US" sz="1200" dirty="0" smtClean="0"/>
+              <a:t>goal </a:t>
+            </a:r>
+            <a:r>
+              <a:rPr lang="en-US" sz="1200" dirty="0"/>
+              <a:t>among a set S of augmented polygonal</a:t>
+            </a:r>
+            <a:r>
+              <a:rPr lang="tr-TR" sz="1200" dirty="0"/>
+              <a:t> </a:t>
+            </a:r>
+            <a:r>
+              <a:rPr lang="en-US" sz="1200" dirty="0"/>
+              <a:t>obstacles consists of arcs of the visibility</a:t>
+            </a:r>
+            <a:r>
+              <a:rPr lang="tr-TR" sz="1200" dirty="0"/>
+              <a:t> graph</a:t>
+            </a:r>
+          </a:p>
+        </p:txBody>
+      </p:sp>
+      <p:sp>
+        <p:nvSpPr>
+          <p:cNvPr id="4" name="Rectangle 3"/>
+          <p:cNvSpPr/>
+          <p:nvPr/>
+        </p:nvSpPr>
+        <p:spPr>
+          <a:xfrm>
+            <a:off x="457200" y="2938252"/>
+            <a:ext cx="4572000" cy="461665"/>
+          </a:xfrm>
+          <a:prstGeom prst="rect">
+            <a:avLst/>
+          </a:prstGeom>
+        </p:spPr>
+        <p:txBody>
+          <a:bodyPr>
+            <a:spAutoFit/>
+          </a:bodyPr>
+          <a:lstStyle/>
+          <a:p>
+            <a:r>
+              <a:rPr lang="en-US" sz="1200" dirty="0"/>
+              <a:t>Dijkstra's algorithm is a</a:t>
+            </a:r>
+            <a:r>
+              <a:rPr lang="tr-TR" sz="1200" dirty="0"/>
+              <a:t> tree search</a:t>
+            </a:r>
+            <a:r>
+              <a:rPr lang="en-US" sz="1200" dirty="0"/>
+              <a:t> </a:t>
+            </a:r>
+            <a:r>
+              <a:rPr lang="tr-TR" sz="1200" dirty="0"/>
+              <a:t>algorithm </a:t>
+            </a:r>
+            <a:r>
+              <a:rPr lang="en-US" sz="1200" dirty="0"/>
+              <a:t>for finding the </a:t>
+            </a:r>
+            <a:r>
+              <a:rPr lang="tr-TR" sz="1200" dirty="0"/>
+              <a:t>shortest paths</a:t>
+            </a:r>
+            <a:r>
+              <a:rPr lang="en-US" sz="1200" dirty="0"/>
+              <a:t> between </a:t>
+            </a:r>
+            <a:r>
+              <a:rPr lang="tr-TR" sz="1200" dirty="0"/>
+              <a:t>nodes</a:t>
+            </a:r>
+            <a:r>
+              <a:rPr lang="en-US" sz="1200" dirty="0"/>
+              <a:t> in a graph</a:t>
+            </a:r>
+            <a:endParaRPr lang="tr-TR" sz="1200" dirty="0"/>
+          </a:p>
+        </p:txBody>
+      </p:sp>
+      <p:pic>
+        <p:nvPicPr>
+          <p:cNvPr id="26" name="Picture 2" descr="https://nevraa.files.wordpress.com/2012/08/ekran-alc4b1ntc4b1sc4b1.png"/>
+          <p:cNvPicPr>
+            <a:picLocks noChangeAspect="1" noChangeArrowheads="1"/>
+          </p:cNvPicPr>
+          <p:nvPr/>
+        </p:nvPicPr>
+        <p:blipFill>
+          <a:blip r:embed="rId3"/>
+          <a:srcRect/>
+          <a:stretch>
+            <a:fillRect/>
+          </a:stretch>
+        </p:blipFill>
+        <p:spPr bwMode="auto">
+          <a:xfrm>
+            <a:off x="241395" y="3753438"/>
+            <a:ext cx="4041412" cy="1221068"/>
+          </a:xfrm>
+          <a:prstGeom prst="rect">
+            <a:avLst/>
+          </a:prstGeom>
+          <a:noFill/>
+        </p:spPr>
+      </p:pic>
+      <p:sp>
+        <p:nvSpPr>
+          <p:cNvPr id="27" name="TextBox 26"/>
+          <p:cNvSpPr txBox="1"/>
+          <p:nvPr/>
+        </p:nvSpPr>
+        <p:spPr>
+          <a:xfrm>
+            <a:off x="121283" y="4974506"/>
+            <a:ext cx="4161524" cy="307777"/>
+          </a:xfrm>
+          <a:prstGeom prst="rect">
+            <a:avLst/>
+          </a:prstGeom>
+          <a:noFill/>
+        </p:spPr>
+        <p:txBody>
+          <a:bodyPr wrap="none" rtlCol="0">
+            <a:spAutoFit/>
+          </a:bodyPr>
+          <a:lstStyle/>
+          <a:p>
+            <a:r>
+              <a:rPr lang="tr-TR" sz="1400" dirty="0" smtClean="0"/>
+              <a:t>Calculation of Minimum Shortest Path From A to K</a:t>
+            </a:r>
+            <a:endParaRPr lang="tr-TR" sz="1400" dirty="0"/>
+          </a:p>
+        </p:txBody>
+      </p:sp>
+      <p:graphicFrame>
+        <p:nvGraphicFramePr>
+          <p:cNvPr id="28" name="Table 27"/>
+          <p:cNvGraphicFramePr>
+            <a:graphicFrameLocks noGrp="1"/>
+          </p:cNvGraphicFramePr>
+          <p:nvPr>
+            <p:extLst>
+              <p:ext uri="{D42A27DB-BD31-4B8C-83A1-F6EECF244321}">
+                <p14:modId xmlns:p14="http://schemas.microsoft.com/office/powerpoint/2010/main" val="1931656854"/>
+              </p:ext>
+            </p:extLst>
+          </p:nvPr>
+        </p:nvGraphicFramePr>
+        <p:xfrm>
+          <a:off x="6020973" y="4052709"/>
+          <a:ext cx="3074435" cy="1706340"/>
+        </p:xfrm>
+        <a:graphic>
+          <a:graphicData uri="http://schemas.openxmlformats.org/drawingml/2006/table">
+            <a:tbl>
+              <a:tblPr firstRow="1" bandRow="1">
+                <a:tableStyleId>{5C22544A-7EE6-4342-B048-85BDC9FD1C3A}</a:tableStyleId>
+              </a:tblPr>
+              <a:tblGrid>
+                <a:gridCol w="752429"/>
+                <a:gridCol w="893404"/>
+                <a:gridCol w="604996"/>
+                <a:gridCol w="823606"/>
+              </a:tblGrid>
+              <a:tr h="547434">
+                <a:tc>
+                  <a:txBody>
+                    <a:bodyPr/>
+                    <a:lstStyle/>
+                    <a:p>
+                      <a:pPr algn="ctr"/>
+                      <a:endParaRPr lang="tr-TR" sz="1000" dirty="0"/>
+                    </a:p>
+                  </a:txBody>
+                  <a:tcPr/>
+                </a:tc>
+                <a:tc>
+                  <a:txBody>
+                    <a:bodyPr/>
+                    <a:lstStyle/>
+                    <a:p>
+                      <a:pPr algn="ctr"/>
+                      <a:r>
+                        <a:rPr lang="tr-TR" sz="1000" dirty="0" smtClean="0"/>
+                        <a:t>Clean</a:t>
+                      </a:r>
+                    </a:p>
+                    <a:p>
+                      <a:pPr algn="ctr"/>
+                      <a:r>
+                        <a:rPr lang="tr-TR" sz="1000" dirty="0" smtClean="0"/>
+                        <a:t>Bathroom</a:t>
+                      </a:r>
+                      <a:endParaRPr lang="tr-TR" sz="1000" dirty="0"/>
+                    </a:p>
+                  </a:txBody>
+                  <a:tcPr/>
+                </a:tc>
+                <a:tc>
+                  <a:txBody>
+                    <a:bodyPr/>
+                    <a:lstStyle/>
+                    <a:p>
+                      <a:pPr algn="ctr"/>
+                      <a:r>
+                        <a:rPr lang="tr-TR" sz="1000" dirty="0" smtClean="0"/>
+                        <a:t>Sweep</a:t>
+                      </a:r>
+                    </a:p>
+                    <a:p>
+                      <a:pPr algn="ctr"/>
+                      <a:r>
+                        <a:rPr lang="tr-TR" sz="1000" dirty="0" smtClean="0"/>
+                        <a:t>Floors</a:t>
+                      </a:r>
+                      <a:endParaRPr lang="tr-TR" sz="1000" dirty="0"/>
+                    </a:p>
+                  </a:txBody>
+                  <a:tcPr/>
+                </a:tc>
+                <a:tc>
+                  <a:txBody>
+                    <a:bodyPr/>
+                    <a:lstStyle/>
+                    <a:p>
+                      <a:pPr algn="ctr"/>
+                      <a:r>
+                        <a:rPr lang="tr-TR" sz="1000" dirty="0" smtClean="0"/>
+                        <a:t>Wash</a:t>
+                      </a:r>
+                      <a:r>
+                        <a:rPr lang="tr-TR" sz="1000" baseline="0" dirty="0" smtClean="0"/>
+                        <a:t> Windows</a:t>
+                      </a:r>
+                      <a:endParaRPr lang="tr-TR" sz="1000" dirty="0"/>
+                    </a:p>
+                  </a:txBody>
+                  <a:tcPr/>
+                </a:tc>
+              </a:tr>
+              <a:tr h="386302">
+                <a:tc>
+                  <a:txBody>
+                    <a:bodyPr/>
+                    <a:lstStyle/>
+                    <a:p>
+                      <a:pPr algn="ctr"/>
+                      <a:r>
+                        <a:rPr lang="tr-TR" sz="1100" dirty="0" smtClean="0"/>
+                        <a:t>Jim</a:t>
+                      </a:r>
+                      <a:endParaRPr lang="tr-TR" sz="1100" dirty="0"/>
+                    </a:p>
+                  </a:txBody>
+                  <a:tcPr/>
+                </a:tc>
+                <a:tc>
+                  <a:txBody>
+                    <a:bodyPr/>
+                    <a:lstStyle/>
+                    <a:p>
+                      <a:pPr algn="ctr"/>
+                      <a:r>
+                        <a:rPr lang="tr-TR" sz="1100" dirty="0" smtClean="0"/>
+                        <a:t>$3</a:t>
+                      </a:r>
+                      <a:endParaRPr lang="tr-TR" sz="1100" dirty="0"/>
+                    </a:p>
+                  </a:txBody>
+                  <a:tcPr/>
+                </a:tc>
+                <a:tc>
+                  <a:txBody>
+                    <a:bodyPr/>
+                    <a:lstStyle/>
+                    <a:p>
+                      <a:pPr algn="ctr"/>
+                      <a:r>
+                        <a:rPr lang="tr-TR" sz="1100" dirty="0" smtClean="0"/>
+                        <a:t>$3</a:t>
+                      </a:r>
+                      <a:endParaRPr lang="tr-TR" sz="1100" dirty="0"/>
+                    </a:p>
+                  </a:txBody>
+                  <a:tcPr/>
+                </a:tc>
+                <a:tc>
+                  <a:txBody>
+                    <a:bodyPr/>
+                    <a:lstStyle/>
+                    <a:p>
+                      <a:pPr algn="ctr"/>
+                      <a:r>
+                        <a:rPr lang="tr-TR" sz="1100" dirty="0" smtClean="0"/>
+                        <a:t>$3</a:t>
+                      </a:r>
+                      <a:endParaRPr lang="tr-TR" sz="1100" dirty="0"/>
+                    </a:p>
+                  </a:txBody>
+                  <a:tcPr/>
+                </a:tc>
+              </a:tr>
+              <a:tr h="386302">
+                <a:tc>
+                  <a:txBody>
+                    <a:bodyPr/>
+                    <a:lstStyle/>
+                    <a:p>
+                      <a:pPr algn="ctr"/>
+                      <a:r>
+                        <a:rPr lang="tr-TR" sz="1100" dirty="0" smtClean="0"/>
+                        <a:t>Steve</a:t>
+                      </a:r>
+                      <a:endParaRPr lang="tr-TR" sz="1100" dirty="0"/>
+                    </a:p>
+                  </a:txBody>
+                  <a:tcPr/>
+                </a:tc>
+                <a:tc>
+                  <a:txBody>
+                    <a:bodyPr/>
+                    <a:lstStyle/>
+                    <a:p>
+                      <a:pPr algn="ctr"/>
+                      <a:r>
+                        <a:rPr lang="tr-TR" sz="1100" dirty="0" smtClean="0"/>
+                        <a:t>$3</a:t>
+                      </a:r>
+                      <a:endParaRPr lang="tr-TR" sz="1100" dirty="0"/>
+                    </a:p>
+                  </a:txBody>
+                  <a:tcPr/>
+                </a:tc>
+                <a:tc>
+                  <a:txBody>
+                    <a:bodyPr/>
+                    <a:lstStyle/>
+                    <a:p>
+                      <a:pPr algn="ctr"/>
+                      <a:r>
+                        <a:rPr lang="tr-TR" sz="1100" dirty="0" smtClean="0"/>
+                        <a:t>$2</a:t>
+                      </a:r>
+                      <a:endParaRPr lang="tr-TR" sz="1100" dirty="0"/>
+                    </a:p>
+                  </a:txBody>
+                  <a:tcPr/>
+                </a:tc>
+                <a:tc>
+                  <a:txBody>
+                    <a:bodyPr/>
+                    <a:lstStyle/>
+                    <a:p>
+                      <a:pPr algn="ctr"/>
+                      <a:r>
+                        <a:rPr lang="tr-TR" sz="1100" dirty="0" smtClean="0"/>
+                        <a:t>$3</a:t>
+                      </a:r>
+                      <a:endParaRPr lang="tr-TR" sz="1100" dirty="0"/>
+                    </a:p>
+                  </a:txBody>
+                  <a:tcPr/>
+                </a:tc>
+              </a:tr>
+              <a:tr h="386302">
+                <a:tc>
+                  <a:txBody>
+                    <a:bodyPr/>
+                    <a:lstStyle/>
+                    <a:p>
+                      <a:pPr algn="ctr"/>
+                      <a:r>
+                        <a:rPr lang="tr-TR" sz="1100" dirty="0" smtClean="0"/>
+                        <a:t>Alan</a:t>
+                      </a:r>
+                      <a:endParaRPr lang="tr-TR" sz="1100" dirty="0"/>
+                    </a:p>
+                  </a:txBody>
+                  <a:tcPr/>
+                </a:tc>
+                <a:tc>
+                  <a:txBody>
+                    <a:bodyPr/>
+                    <a:lstStyle/>
+                    <a:p>
+                      <a:pPr algn="ctr"/>
+                      <a:r>
+                        <a:rPr lang="tr-TR" sz="1100" dirty="0" smtClean="0"/>
+                        <a:t>$3</a:t>
+                      </a:r>
+                      <a:endParaRPr lang="tr-TR" sz="1100" dirty="0"/>
+                    </a:p>
+                  </a:txBody>
+                  <a:tcPr/>
+                </a:tc>
+                <a:tc>
+                  <a:txBody>
+                    <a:bodyPr/>
+                    <a:lstStyle/>
+                    <a:p>
+                      <a:pPr algn="ctr"/>
+                      <a:r>
+                        <a:rPr lang="tr-TR" sz="1100" dirty="0" smtClean="0"/>
+                        <a:t>$3</a:t>
+                      </a:r>
+                      <a:endParaRPr lang="tr-TR" sz="1100" dirty="0"/>
+                    </a:p>
+                  </a:txBody>
+                  <a:tcPr/>
+                </a:tc>
+                <a:tc>
+                  <a:txBody>
+                    <a:bodyPr/>
+                    <a:lstStyle/>
+                    <a:p>
+                      <a:pPr algn="ctr"/>
+                      <a:r>
+                        <a:rPr lang="tr-TR" sz="1100" dirty="0" smtClean="0"/>
+                        <a:t>$2</a:t>
+                      </a:r>
+                      <a:endParaRPr lang="tr-TR" sz="1100" dirty="0"/>
+                    </a:p>
+                  </a:txBody>
+                  <a:tcPr/>
+                </a:tc>
+              </a:tr>
+            </a:tbl>
+          </a:graphicData>
+        </a:graphic>
+      </p:graphicFrame>
+    </p:spTree>
+    <p:extLst>
+      <p:ext uri="{BB962C8B-B14F-4D97-AF65-F5344CB8AC3E}">
+        <p14:creationId xmlns:p14="http://schemas.microsoft.com/office/powerpoint/2010/main" val="2630215700"/>
+      </p:ext>
+    </p:extLst>
+  </p:cSld>
+  <p:clrMapOvr>
+    <a:masterClrMapping/>
+  </p:clrMapOvr>
+  <p:timing>
+    <p:tnLst>
+      <p:par>
+        <p:cTn id="1" dur="indefinite" restart="never" nodeType="tmRoot"/>
+      </p:par>
+    </p:tnLst>
+  </p:timing>
+</p:sld>
+</file>
+
+<file path=ppt/slides/slide23.xml><?xml version="1.0" encoding="utf-8"?>
+<p:sld xmlns:a="http://schemas.openxmlformats.org/drawingml/2006/main" xmlns:r="http://schemas.openxmlformats.org/officeDocument/2006/relationships" xmlns:p="http://schemas.openxmlformats.org/presentationml/2006/main">
+  <p:cSld>
+    <p:spTree>
+      <p:nvGrpSpPr>
+        <p:cNvPr id="1" name=""/>
+        <p:cNvGrpSpPr/>
+        <p:nvPr/>
+      </p:nvGrpSpPr>
+      <p:grpSpPr>
+        <a:xfrm>
+          <a:off x="0" y="0"/>
+          <a:ext cx="0" cy="0"/>
+          <a:chOff x="0" y="0"/>
+          <a:chExt cx="0" cy="0"/>
+        </a:xfrm>
+      </p:grpSpPr>
+      <p:sp>
+        <p:nvSpPr>
+          <p:cNvPr id="2" name="Title 1"/>
+          <p:cNvSpPr>
+            <a:spLocks noGrp="1"/>
+          </p:cNvSpPr>
+          <p:nvPr>
+            <p:ph type="title"/>
+          </p:nvPr>
+        </p:nvSpPr>
+        <p:spPr/>
+        <p:txBody>
+          <a:bodyPr/>
+          <a:lstStyle/>
+          <a:p>
+            <a:r>
+              <a:rPr lang="tr-TR" dirty="0" smtClean="0"/>
+              <a:t>Formation Control System</a:t>
+            </a:r>
+            <a:endParaRPr lang="tr-TR" dirty="0"/>
+          </a:p>
+        </p:txBody>
+      </p:sp>
+      <p:sp>
+        <p:nvSpPr>
+          <p:cNvPr id="3" name="TextBox 2"/>
+          <p:cNvSpPr txBox="1"/>
+          <p:nvPr/>
+        </p:nvSpPr>
+        <p:spPr>
+          <a:xfrm>
+            <a:off x="675249" y="1491175"/>
+            <a:ext cx="7596554" cy="369332"/>
+          </a:xfrm>
+          <a:prstGeom prst="rect">
+            <a:avLst/>
+          </a:prstGeom>
+          <a:noFill/>
+        </p:spPr>
+        <p:txBody>
+          <a:bodyPr wrap="square" rtlCol="0">
+            <a:spAutoFit/>
+          </a:bodyPr>
+          <a:lstStyle/>
+          <a:p>
+            <a:pPr marL="285750" indent="-285750" algn="just">
+              <a:buFont typeface="Arial" panose="020B0604020202020204" pitchFamily="34" charset="0"/>
+              <a:buChar char="•"/>
+            </a:pPr>
+            <a:r>
+              <a:rPr lang="tr-TR" dirty="0" smtClean="0"/>
+              <a:t>Bubble Packing and Randomized Fractals Methods</a:t>
+            </a:r>
+          </a:p>
+        </p:txBody>
+      </p:sp>
+      <p:sp>
+        <p:nvSpPr>
+          <p:cNvPr id="8" name="TextBox 7"/>
+          <p:cNvSpPr txBox="1"/>
+          <p:nvPr/>
+        </p:nvSpPr>
+        <p:spPr>
+          <a:xfrm>
+            <a:off x="3327105" y="2057893"/>
+            <a:ext cx="2405403" cy="338554"/>
+          </a:xfrm>
+          <a:prstGeom prst="rect">
+            <a:avLst/>
+          </a:prstGeom>
+          <a:noFill/>
+        </p:spPr>
+        <p:txBody>
+          <a:bodyPr wrap="none" rtlCol="0">
+            <a:spAutoFit/>
+          </a:bodyPr>
+          <a:lstStyle/>
+          <a:p>
+            <a:pPr algn="ctr"/>
+            <a:r>
+              <a:rPr lang="tr-TR" sz="1600" dirty="0" smtClean="0"/>
+              <a:t>Navigation to Goal States</a:t>
+            </a:r>
+            <a:endParaRPr lang="tr-TR" sz="1600" dirty="0"/>
+          </a:p>
+        </p:txBody>
+      </p:sp>
+      <p:sp>
+        <p:nvSpPr>
+          <p:cNvPr id="32" name="TextBox 31"/>
+          <p:cNvSpPr txBox="1"/>
+          <p:nvPr/>
+        </p:nvSpPr>
+        <p:spPr>
+          <a:xfrm>
+            <a:off x="2121188" y="2491127"/>
+            <a:ext cx="184730" cy="584775"/>
+          </a:xfrm>
+          <a:prstGeom prst="rect">
+            <a:avLst/>
+          </a:prstGeom>
+          <a:noFill/>
+        </p:spPr>
+        <p:txBody>
+          <a:bodyPr wrap="none" rtlCol="0">
+            <a:spAutoFit/>
+          </a:bodyPr>
+          <a:lstStyle/>
+          <a:p>
+            <a:pPr algn="ctr"/>
+            <a:endParaRPr lang="tr-TR" sz="1600" i="1" dirty="0" smtClean="0"/>
+          </a:p>
+          <a:p>
+            <a:pPr algn="ctr"/>
+            <a:endParaRPr lang="tr-TR" sz="1600" dirty="0" smtClean="0"/>
+          </a:p>
+        </p:txBody>
+      </p:sp>
+      <p:pic>
+        <p:nvPicPr>
+          <p:cNvPr id="15" name="Picture 4" descr="C:\Users\Kadir\Desktop\Formation Control\formation_control\Resim - Video\open_loop(23-237).png"/>
+          <p:cNvPicPr>
+            <a:picLocks noChangeAspect="1" noChangeArrowheads="1"/>
+          </p:cNvPicPr>
+          <p:nvPr/>
+        </p:nvPicPr>
+        <p:blipFill>
+          <a:blip r:embed="rId2"/>
+          <a:srcRect/>
+          <a:stretch>
+            <a:fillRect/>
+          </a:stretch>
+        </p:blipFill>
+        <p:spPr bwMode="auto">
+          <a:xfrm>
+            <a:off x="515244" y="4126226"/>
+            <a:ext cx="3440806" cy="2055294"/>
+          </a:xfrm>
+          <a:prstGeom prst="rect">
+            <a:avLst/>
+          </a:prstGeom>
+          <a:noFill/>
+        </p:spPr>
+      </p:pic>
+      <p:pic>
+        <p:nvPicPr>
+          <p:cNvPr id="16" name="Picture 5" descr="C:\Users\Kadir\Desktop\Formation Control\formation_control\Resim - Video\step(23-237).png"/>
+          <p:cNvPicPr>
+            <a:picLocks noChangeAspect="1" noChangeArrowheads="1"/>
+          </p:cNvPicPr>
+          <p:nvPr/>
+        </p:nvPicPr>
+        <p:blipFill>
+          <a:blip r:embed="rId3"/>
+          <a:srcRect/>
+          <a:stretch>
+            <a:fillRect/>
+          </a:stretch>
+        </p:blipFill>
+        <p:spPr bwMode="auto">
+          <a:xfrm>
+            <a:off x="5347239" y="4126225"/>
+            <a:ext cx="3406503" cy="2052446"/>
+          </a:xfrm>
+          <a:prstGeom prst="rect">
+            <a:avLst/>
+          </a:prstGeom>
+          <a:noFill/>
+        </p:spPr>
+      </p:pic>
+      <p:grpSp>
+        <p:nvGrpSpPr>
+          <p:cNvPr id="17" name="Group 16"/>
+          <p:cNvGrpSpPr/>
+          <p:nvPr/>
+        </p:nvGrpSpPr>
+        <p:grpSpPr>
+          <a:xfrm>
+            <a:off x="4097553" y="2512226"/>
+            <a:ext cx="4894052" cy="1348143"/>
+            <a:chOff x="871268" y="1138687"/>
+            <a:chExt cx="5676181" cy="1852597"/>
+          </a:xfrm>
+        </p:grpSpPr>
+        <p:sp>
+          <p:nvSpPr>
+            <p:cNvPr id="18" name="TextBox 17"/>
+            <p:cNvSpPr txBox="1"/>
+            <p:nvPr/>
+          </p:nvSpPr>
+          <p:spPr>
+            <a:xfrm>
+              <a:off x="4770408" y="1496837"/>
+              <a:ext cx="871268" cy="465236"/>
+            </a:xfrm>
+            <a:prstGeom prst="rect">
+              <a:avLst/>
+            </a:prstGeom>
+            <a:noFill/>
+            <a:ln w="15875">
+              <a:solidFill>
+                <a:schemeClr val="accent1"/>
+              </a:solidFill>
+            </a:ln>
+          </p:spPr>
+          <p:txBody>
+            <a:bodyPr wrap="square" rtlCol="0">
+              <a:spAutoFit/>
+            </a:bodyPr>
+            <a:lstStyle/>
+            <a:p>
+              <a:pPr algn="ctr"/>
+              <a:r>
+                <a:rPr lang="tr-TR" sz="1600" dirty="0" smtClean="0"/>
+                <a:t>Plant</a:t>
+              </a:r>
+              <a:endParaRPr lang="tr-TR" sz="1600" dirty="0"/>
+            </a:p>
+          </p:txBody>
+        </p:sp>
+        <p:cxnSp>
+          <p:nvCxnSpPr>
+            <p:cNvPr id="19" name="Straight Connector 18"/>
+            <p:cNvCxnSpPr>
+              <a:stCxn id="18" idx="2"/>
+            </p:cNvCxnSpPr>
+            <p:nvPr/>
+          </p:nvCxnSpPr>
+          <p:spPr>
+            <a:xfrm flipH="1">
+              <a:off x="5201728" y="1962072"/>
+              <a:ext cx="4315" cy="492296"/>
+            </a:xfrm>
+            <a:prstGeom prst="line">
+              <a:avLst/>
+            </a:prstGeom>
+          </p:spPr>
+          <p:style>
+            <a:lnRef idx="1">
+              <a:schemeClr val="accent1"/>
+            </a:lnRef>
+            <a:fillRef idx="0">
+              <a:schemeClr val="accent1"/>
+            </a:fillRef>
+            <a:effectRef idx="0">
+              <a:schemeClr val="accent1"/>
+            </a:effectRef>
+            <a:fontRef idx="minor">
+              <a:schemeClr val="tx1"/>
+            </a:fontRef>
+          </p:style>
+        </p:cxnSp>
+        <p:cxnSp>
+          <p:nvCxnSpPr>
+            <p:cNvPr id="20" name="Straight Connector 19"/>
+            <p:cNvCxnSpPr/>
+            <p:nvPr/>
+          </p:nvCxnSpPr>
+          <p:spPr>
+            <a:xfrm rot="10800000">
+              <a:off x="4649638" y="2460308"/>
+              <a:ext cx="552090" cy="1589"/>
+            </a:xfrm>
+            <a:prstGeom prst="line">
+              <a:avLst/>
+            </a:prstGeom>
+          </p:spPr>
+          <p:style>
+            <a:lnRef idx="1">
+              <a:schemeClr val="accent1"/>
+            </a:lnRef>
+            <a:fillRef idx="0">
+              <a:schemeClr val="accent1"/>
+            </a:fillRef>
+            <a:effectRef idx="0">
+              <a:schemeClr val="accent1"/>
+            </a:effectRef>
+            <a:fontRef idx="minor">
+              <a:schemeClr val="tx1"/>
+            </a:fontRef>
+          </p:style>
+        </p:cxnSp>
+        <p:sp>
+          <p:nvSpPr>
+            <p:cNvPr id="21" name="Isosceles Triangle 20"/>
+            <p:cNvSpPr/>
+            <p:nvPr/>
+          </p:nvSpPr>
+          <p:spPr>
+            <a:xfrm rot="16200000">
+              <a:off x="4123427" y="2156603"/>
+              <a:ext cx="500333" cy="569344"/>
+            </a:xfrm>
+            <a:prstGeom prst="triangle">
+              <a:avLst/>
+            </a:prstGeom>
+            <a:noFill/>
+          </p:spPr>
+          <p:style>
+            <a:lnRef idx="2">
+              <a:schemeClr val="accent1">
+                <a:shade val="50000"/>
+              </a:schemeClr>
+            </a:lnRef>
+            <a:fillRef idx="1">
+              <a:schemeClr val="accent1"/>
+            </a:fillRef>
+            <a:effectRef idx="0">
+              <a:schemeClr val="accent1"/>
+            </a:effectRef>
+            <a:fontRef idx="minor">
+              <a:schemeClr val="lt1"/>
+            </a:fontRef>
+          </p:style>
+          <p:txBody>
+            <a:bodyPr rtlCol="0" anchor="ctr"/>
+            <a:lstStyle/>
+            <a:p>
+              <a:pPr algn="ctr"/>
+              <a:endParaRPr lang="tr-TR"/>
+            </a:p>
+          </p:txBody>
+        </p:sp>
+        <p:sp>
+          <p:nvSpPr>
+            <p:cNvPr id="22" name="TextBox 21"/>
+            <p:cNvSpPr txBox="1"/>
+            <p:nvPr/>
+          </p:nvSpPr>
+          <p:spPr>
+            <a:xfrm>
+              <a:off x="4339088" y="2234242"/>
+              <a:ext cx="351757" cy="422942"/>
+            </a:xfrm>
+            <a:prstGeom prst="rect">
+              <a:avLst/>
+            </a:prstGeom>
+            <a:noFill/>
+          </p:spPr>
+          <p:txBody>
+            <a:bodyPr wrap="none" rtlCol="0">
+              <a:spAutoFit/>
+            </a:bodyPr>
+            <a:lstStyle/>
+            <a:p>
+              <a:r>
+                <a:rPr lang="tr-TR" sz="1400" dirty="0" smtClean="0"/>
+                <a:t>K</a:t>
+              </a:r>
+              <a:endParaRPr lang="tr-TR" sz="1400" dirty="0"/>
+            </a:p>
+          </p:txBody>
+        </p:sp>
+        <p:sp>
+          <p:nvSpPr>
+            <p:cNvPr id="23" name="TextBox 22"/>
+            <p:cNvSpPr txBox="1"/>
+            <p:nvPr/>
+          </p:nvSpPr>
+          <p:spPr>
+            <a:xfrm>
+              <a:off x="5172975" y="2024332"/>
+              <a:ext cx="314574" cy="422942"/>
+            </a:xfrm>
+            <a:prstGeom prst="rect">
+              <a:avLst/>
+            </a:prstGeom>
+            <a:noFill/>
+          </p:spPr>
+          <p:txBody>
+            <a:bodyPr wrap="none" rtlCol="0">
+              <a:spAutoFit/>
+            </a:bodyPr>
+            <a:lstStyle/>
+            <a:p>
+              <a:r>
+                <a:rPr lang="tr-TR" sz="1400" dirty="0" smtClean="0"/>
+                <a:t>x</a:t>
+              </a:r>
+              <a:endParaRPr lang="tr-TR" sz="1400" dirty="0"/>
+            </a:p>
+          </p:txBody>
+        </p:sp>
+        <p:cxnSp>
+          <p:nvCxnSpPr>
+            <p:cNvPr id="24" name="Shape 14"/>
+            <p:cNvCxnSpPr>
+              <a:stCxn id="21" idx="0"/>
+            </p:cNvCxnSpPr>
+            <p:nvPr/>
+          </p:nvCxnSpPr>
+          <p:spPr>
+            <a:xfrm rot="10800000">
+              <a:off x="3752492" y="1932317"/>
+              <a:ext cx="336431" cy="508958"/>
+            </a:xfrm>
+            <a:prstGeom prst="bentConnector2">
+              <a:avLst/>
+            </a:prstGeom>
+            <a:ln>
+              <a:tailEnd type="arrow"/>
+            </a:ln>
+          </p:spPr>
+          <p:style>
+            <a:lnRef idx="1">
+              <a:schemeClr val="accent1"/>
+            </a:lnRef>
+            <a:fillRef idx="0">
+              <a:schemeClr val="accent1"/>
+            </a:fillRef>
+            <a:effectRef idx="0">
+              <a:schemeClr val="accent1"/>
+            </a:effectRef>
+            <a:fontRef idx="minor">
+              <a:schemeClr val="tx1"/>
+            </a:fontRef>
+          </p:style>
+        </p:cxnSp>
+        <p:sp>
+          <p:nvSpPr>
+            <p:cNvPr id="25" name="Oval 24"/>
+            <p:cNvSpPr/>
+            <p:nvPr/>
+          </p:nvSpPr>
+          <p:spPr>
+            <a:xfrm>
+              <a:off x="3545457" y="1526875"/>
+              <a:ext cx="448574" cy="405442"/>
+            </a:xfrm>
+            <a:prstGeom prst="ellipse">
+              <a:avLst/>
+            </a:prstGeom>
+            <a:noFill/>
+          </p:spPr>
+          <p:style>
+            <a:lnRef idx="2">
+              <a:schemeClr val="accent1">
+                <a:shade val="50000"/>
+              </a:schemeClr>
+            </a:lnRef>
+            <a:fillRef idx="1">
+              <a:schemeClr val="accent1"/>
+            </a:fillRef>
+            <a:effectRef idx="0">
+              <a:schemeClr val="accent1"/>
+            </a:effectRef>
+            <a:fontRef idx="minor">
+              <a:schemeClr val="lt1"/>
+            </a:fontRef>
+          </p:style>
+          <p:txBody>
+            <a:bodyPr rtlCol="0" anchor="ctr"/>
+            <a:lstStyle/>
+            <a:p>
+              <a:pPr algn="ctr"/>
+              <a:endParaRPr lang="tr-TR"/>
+            </a:p>
+          </p:txBody>
+        </p:sp>
+        <p:cxnSp>
+          <p:nvCxnSpPr>
+            <p:cNvPr id="26" name="Straight Arrow Connector 25"/>
+            <p:cNvCxnSpPr>
+              <a:stCxn id="25" idx="6"/>
+              <a:endCxn id="18" idx="1"/>
+            </p:cNvCxnSpPr>
+            <p:nvPr/>
+          </p:nvCxnSpPr>
+          <p:spPr>
+            <a:xfrm flipV="1">
+              <a:off x="3994031" y="1729454"/>
+              <a:ext cx="776377" cy="142"/>
+            </a:xfrm>
+            <a:prstGeom prst="straightConnector1">
+              <a:avLst/>
+            </a:prstGeom>
+            <a:ln>
+              <a:tailEnd type="arrow"/>
+            </a:ln>
+          </p:spPr>
+          <p:style>
+            <a:lnRef idx="1">
+              <a:schemeClr val="accent1"/>
+            </a:lnRef>
+            <a:fillRef idx="0">
+              <a:schemeClr val="accent1"/>
+            </a:fillRef>
+            <a:effectRef idx="0">
+              <a:schemeClr val="accent1"/>
+            </a:effectRef>
+            <a:fontRef idx="minor">
+              <a:schemeClr val="tx1"/>
+            </a:fontRef>
+          </p:style>
+        </p:cxnSp>
+        <p:cxnSp>
+          <p:nvCxnSpPr>
+            <p:cNvPr id="27" name="Straight Arrow Connector 26"/>
+            <p:cNvCxnSpPr>
+              <a:endCxn id="25" idx="2"/>
+            </p:cNvCxnSpPr>
+            <p:nvPr/>
+          </p:nvCxnSpPr>
+          <p:spPr>
+            <a:xfrm flipV="1">
+              <a:off x="3036498" y="1729596"/>
+              <a:ext cx="508959" cy="4313"/>
+            </a:xfrm>
+            <a:prstGeom prst="straightConnector1">
+              <a:avLst/>
+            </a:prstGeom>
+            <a:ln>
+              <a:tailEnd type="arrow"/>
+            </a:ln>
+          </p:spPr>
+          <p:style>
+            <a:lnRef idx="1">
+              <a:schemeClr val="accent1"/>
+            </a:lnRef>
+            <a:fillRef idx="0">
+              <a:schemeClr val="accent1"/>
+            </a:fillRef>
+            <a:effectRef idx="0">
+              <a:schemeClr val="accent1"/>
+            </a:effectRef>
+            <a:fontRef idx="minor">
+              <a:schemeClr val="tx1"/>
+            </a:fontRef>
+          </p:style>
+        </p:cxnSp>
+        <p:sp>
+          <p:nvSpPr>
+            <p:cNvPr id="28" name="Oval 27"/>
+            <p:cNvSpPr/>
+            <p:nvPr/>
+          </p:nvSpPr>
+          <p:spPr>
+            <a:xfrm>
+              <a:off x="1653397" y="1521918"/>
+              <a:ext cx="448574" cy="405442"/>
+            </a:xfrm>
+            <a:prstGeom prst="ellipse">
+              <a:avLst/>
+            </a:prstGeom>
+            <a:noFill/>
+          </p:spPr>
+          <p:style>
+            <a:lnRef idx="2">
+              <a:schemeClr val="accent1">
+                <a:shade val="50000"/>
+              </a:schemeClr>
+            </a:lnRef>
+            <a:fillRef idx="1">
+              <a:schemeClr val="accent1"/>
+            </a:fillRef>
+            <a:effectRef idx="0">
+              <a:schemeClr val="accent1"/>
+            </a:effectRef>
+            <a:fontRef idx="minor">
+              <a:schemeClr val="lt1"/>
+            </a:fontRef>
+          </p:style>
+          <p:txBody>
+            <a:bodyPr rtlCol="0" anchor="ctr"/>
+            <a:lstStyle/>
+            <a:p>
+              <a:pPr algn="ctr"/>
+              <a:endParaRPr lang="tr-TR"/>
+            </a:p>
+          </p:txBody>
+        </p:sp>
+        <p:cxnSp>
+          <p:nvCxnSpPr>
+            <p:cNvPr id="29" name="Straight Arrow Connector 28"/>
+            <p:cNvCxnSpPr>
+              <a:stCxn id="18" idx="3"/>
+            </p:cNvCxnSpPr>
+            <p:nvPr/>
+          </p:nvCxnSpPr>
+          <p:spPr>
+            <a:xfrm flipV="1">
+              <a:off x="5641676" y="1723896"/>
+              <a:ext cx="905773" cy="5559"/>
+            </a:xfrm>
+            <a:prstGeom prst="straightConnector1">
+              <a:avLst/>
+            </a:prstGeom>
+            <a:ln>
+              <a:tailEnd type="arrow"/>
+            </a:ln>
+          </p:spPr>
+          <p:style>
+            <a:lnRef idx="1">
+              <a:schemeClr val="accent1"/>
+            </a:lnRef>
+            <a:fillRef idx="0">
+              <a:schemeClr val="accent1"/>
+            </a:fillRef>
+            <a:effectRef idx="0">
+              <a:schemeClr val="accent1"/>
+            </a:effectRef>
+            <a:fontRef idx="minor">
+              <a:schemeClr val="tx1"/>
+            </a:fontRef>
+          </p:style>
+        </p:cxnSp>
+        <p:cxnSp>
+          <p:nvCxnSpPr>
+            <p:cNvPr id="30" name="Straight Connector 29"/>
+            <p:cNvCxnSpPr/>
+            <p:nvPr/>
+          </p:nvCxnSpPr>
+          <p:spPr>
+            <a:xfrm rot="16200000" flipH="1">
+              <a:off x="5520906" y="2337759"/>
+              <a:ext cx="1259456" cy="17252"/>
+            </a:xfrm>
+            <a:prstGeom prst="line">
+              <a:avLst/>
+            </a:prstGeom>
+          </p:spPr>
+          <p:style>
+            <a:lnRef idx="1">
+              <a:schemeClr val="accent1"/>
+            </a:lnRef>
+            <a:fillRef idx="0">
+              <a:schemeClr val="accent1"/>
+            </a:fillRef>
+            <a:effectRef idx="0">
+              <a:schemeClr val="accent1"/>
+            </a:effectRef>
+            <a:fontRef idx="minor">
+              <a:schemeClr val="tx1"/>
+            </a:fontRef>
+          </p:style>
+        </p:cxnSp>
+        <p:cxnSp>
+          <p:nvCxnSpPr>
+            <p:cNvPr id="31" name="Straight Connector 30"/>
+            <p:cNvCxnSpPr/>
+            <p:nvPr/>
+          </p:nvCxnSpPr>
+          <p:spPr>
+            <a:xfrm rot="10800000" flipV="1">
+              <a:off x="1897812" y="2969470"/>
+              <a:ext cx="4261455" cy="17254"/>
+            </a:xfrm>
+            <a:prstGeom prst="line">
+              <a:avLst/>
+            </a:prstGeom>
+          </p:spPr>
+          <p:style>
+            <a:lnRef idx="1">
+              <a:schemeClr val="accent1"/>
+            </a:lnRef>
+            <a:fillRef idx="0">
+              <a:schemeClr val="accent1"/>
+            </a:fillRef>
+            <a:effectRef idx="0">
+              <a:schemeClr val="accent1"/>
+            </a:effectRef>
+            <a:fontRef idx="minor">
+              <a:schemeClr val="tx1"/>
+            </a:fontRef>
+          </p:style>
+        </p:cxnSp>
+        <p:cxnSp>
+          <p:nvCxnSpPr>
+            <p:cNvPr id="42" name="Straight Arrow Connector 41"/>
+            <p:cNvCxnSpPr/>
+            <p:nvPr/>
+          </p:nvCxnSpPr>
+          <p:spPr>
+            <a:xfrm rot="16200000" flipV="1">
+              <a:off x="1358208" y="2457884"/>
+              <a:ext cx="1063924" cy="2875"/>
+            </a:xfrm>
+            <a:prstGeom prst="straightConnector1">
+              <a:avLst/>
+            </a:prstGeom>
+            <a:ln>
+              <a:tailEnd type="arrow"/>
+            </a:ln>
+          </p:spPr>
+          <p:style>
+            <a:lnRef idx="1">
+              <a:schemeClr val="accent1"/>
+            </a:lnRef>
+            <a:fillRef idx="0">
+              <a:schemeClr val="accent1"/>
+            </a:fillRef>
+            <a:effectRef idx="0">
+              <a:schemeClr val="accent1"/>
+            </a:effectRef>
+            <a:fontRef idx="minor">
+              <a:schemeClr val="tx1"/>
+            </a:fontRef>
+          </p:style>
+        </p:cxnSp>
+        <p:cxnSp>
+          <p:nvCxnSpPr>
+            <p:cNvPr id="43" name="Straight Arrow Connector 42"/>
+            <p:cNvCxnSpPr/>
+            <p:nvPr/>
+          </p:nvCxnSpPr>
+          <p:spPr>
+            <a:xfrm flipV="1">
+              <a:off x="871268" y="1752600"/>
+              <a:ext cx="790755" cy="7188"/>
+            </a:xfrm>
+            <a:prstGeom prst="straightConnector1">
+              <a:avLst/>
+            </a:prstGeom>
+            <a:ln>
+              <a:tailEnd type="arrow"/>
+            </a:ln>
+          </p:spPr>
+          <p:style>
+            <a:lnRef idx="1">
+              <a:schemeClr val="accent1"/>
+            </a:lnRef>
+            <a:fillRef idx="0">
+              <a:schemeClr val="accent1"/>
+            </a:fillRef>
+            <a:effectRef idx="0">
+              <a:schemeClr val="accent1"/>
+            </a:effectRef>
+            <a:fontRef idx="minor">
+              <a:schemeClr val="tx1"/>
+            </a:fontRef>
+          </p:style>
+        </p:cxnSp>
+        <p:sp>
+          <p:nvSpPr>
+            <p:cNvPr id="44" name="TextBox 43"/>
+            <p:cNvSpPr txBox="1"/>
+            <p:nvPr/>
+          </p:nvSpPr>
+          <p:spPr>
+            <a:xfrm>
+              <a:off x="1236455" y="1408982"/>
+              <a:ext cx="294124" cy="422942"/>
+            </a:xfrm>
+            <a:prstGeom prst="rect">
+              <a:avLst/>
+            </a:prstGeom>
+            <a:noFill/>
+          </p:spPr>
+          <p:txBody>
+            <a:bodyPr wrap="none" rtlCol="0">
+              <a:spAutoFit/>
+            </a:bodyPr>
+            <a:lstStyle/>
+            <a:p>
+              <a:r>
+                <a:rPr lang="tr-TR" sz="1400" dirty="0" smtClean="0"/>
+                <a:t>r</a:t>
+              </a:r>
+              <a:endParaRPr lang="tr-TR" sz="1400" dirty="0"/>
+            </a:p>
+          </p:txBody>
+        </p:sp>
+        <p:sp>
+          <p:nvSpPr>
+            <p:cNvPr id="45" name="TextBox 44"/>
+            <p:cNvSpPr txBox="1"/>
+            <p:nvPr/>
+          </p:nvSpPr>
+          <p:spPr>
+            <a:xfrm>
+              <a:off x="6093127" y="1348596"/>
+              <a:ext cx="314574" cy="422942"/>
+            </a:xfrm>
+            <a:prstGeom prst="rect">
+              <a:avLst/>
+            </a:prstGeom>
+            <a:noFill/>
+          </p:spPr>
+          <p:txBody>
+            <a:bodyPr wrap="none" rtlCol="0">
+              <a:spAutoFit/>
+            </a:bodyPr>
+            <a:lstStyle/>
+            <a:p>
+              <a:r>
+                <a:rPr lang="tr-TR" sz="1400" dirty="0" smtClean="0"/>
+                <a:t>y</a:t>
+              </a:r>
+              <a:endParaRPr lang="tr-TR" sz="1400" dirty="0"/>
+            </a:p>
+          </p:txBody>
+        </p:sp>
+        <p:sp>
+          <p:nvSpPr>
+            <p:cNvPr id="46" name="Rectangle 45"/>
+            <p:cNvSpPr/>
+            <p:nvPr/>
+          </p:nvSpPr>
+          <p:spPr>
+            <a:xfrm>
+              <a:off x="3226279" y="1319842"/>
+              <a:ext cx="2674189" cy="1570007"/>
+            </a:xfrm>
+            <a:prstGeom prst="rect">
+              <a:avLst/>
+            </a:prstGeom>
+            <a:noFill/>
+            <a:ln w="19050">
+              <a:prstDash val="dash"/>
+            </a:ln>
+          </p:spPr>
+          <p:style>
+            <a:lnRef idx="2">
+              <a:schemeClr val="accent1">
+                <a:shade val="50000"/>
+              </a:schemeClr>
+            </a:lnRef>
+            <a:fillRef idx="1">
+              <a:schemeClr val="accent1"/>
+            </a:fillRef>
+            <a:effectRef idx="0">
+              <a:schemeClr val="accent1"/>
+            </a:effectRef>
+            <a:fontRef idx="minor">
+              <a:schemeClr val="lt1"/>
+            </a:fontRef>
+          </p:style>
+          <p:txBody>
+            <a:bodyPr rtlCol="0" anchor="ctr"/>
+            <a:lstStyle/>
+            <a:p>
+              <a:pPr algn="ctr"/>
+              <a:endParaRPr lang="tr-TR"/>
+            </a:p>
+          </p:txBody>
+        </p:sp>
+        <p:pic>
+          <p:nvPicPr>
+            <p:cNvPr id="47" name="Picture 1"/>
+            <p:cNvPicPr>
+              <a:picLocks noChangeAspect="1" noChangeArrowheads="1"/>
+            </p:cNvPicPr>
+            <p:nvPr/>
+          </p:nvPicPr>
+          <p:blipFill>
+            <a:blip r:embed="rId4">
+              <a:clrChange>
+                <a:clrFrom>
+                  <a:srgbClr val="FFFFFF"/>
+                </a:clrFrom>
+                <a:clrTo>
+                  <a:srgbClr val="FFFFFF">
+                    <a:alpha val="0"/>
+                  </a:srgbClr>
+                </a:clrTo>
+              </a:clrChange>
+            </a:blip>
+            <a:srcRect/>
+            <a:stretch>
+              <a:fillRect/>
+            </a:stretch>
+          </p:blipFill>
+          <p:spPr bwMode="auto">
+            <a:xfrm>
+              <a:off x="3968151" y="1138687"/>
+              <a:ext cx="1228725" cy="190500"/>
+            </a:xfrm>
+            <a:prstGeom prst="rect">
+              <a:avLst/>
+            </a:prstGeom>
+            <a:noFill/>
+          </p:spPr>
+        </p:pic>
+        <p:sp>
+          <p:nvSpPr>
+            <p:cNvPr id="48" name="TextBox 47"/>
+            <p:cNvSpPr txBox="1"/>
+            <p:nvPr/>
+          </p:nvSpPr>
+          <p:spPr>
+            <a:xfrm>
+              <a:off x="2490839" y="1530735"/>
+              <a:ext cx="546339" cy="380648"/>
+            </a:xfrm>
+            <a:prstGeom prst="rect">
+              <a:avLst/>
+            </a:prstGeom>
+            <a:noFill/>
+            <a:ln w="15875">
+              <a:solidFill>
+                <a:schemeClr val="accent1"/>
+              </a:solidFill>
+            </a:ln>
+          </p:spPr>
+          <p:txBody>
+            <a:bodyPr wrap="square" rtlCol="0">
+              <a:spAutoFit/>
+            </a:bodyPr>
+            <a:lstStyle/>
+            <a:p>
+              <a:pPr algn="ctr"/>
+              <a:r>
+                <a:rPr lang="tr-TR" sz="1200" dirty="0" smtClean="0"/>
+                <a:t>1/s</a:t>
+              </a:r>
+              <a:endParaRPr lang="tr-TR" sz="1200" dirty="0"/>
+            </a:p>
+          </p:txBody>
+        </p:sp>
+        <p:cxnSp>
+          <p:nvCxnSpPr>
+            <p:cNvPr id="49" name="Straight Arrow Connector 48"/>
+            <p:cNvCxnSpPr>
+              <a:stCxn id="28" idx="6"/>
+              <a:endCxn id="48" idx="1"/>
+            </p:cNvCxnSpPr>
+            <p:nvPr/>
+          </p:nvCxnSpPr>
+          <p:spPr>
+            <a:xfrm flipV="1">
+              <a:off x="2101970" y="1721060"/>
+              <a:ext cx="388869" cy="3580"/>
+            </a:xfrm>
+            <a:prstGeom prst="straightConnector1">
+              <a:avLst/>
+            </a:prstGeom>
+            <a:ln>
+              <a:tailEnd type="arrow"/>
+            </a:ln>
+          </p:spPr>
+          <p:style>
+            <a:lnRef idx="1">
+              <a:schemeClr val="accent1"/>
+            </a:lnRef>
+            <a:fillRef idx="0">
+              <a:schemeClr val="accent1"/>
+            </a:fillRef>
+            <a:effectRef idx="0">
+              <a:schemeClr val="accent1"/>
+            </a:effectRef>
+            <a:fontRef idx="minor">
+              <a:schemeClr val="tx1"/>
+            </a:fontRef>
+          </p:style>
+        </p:cxnSp>
+      </p:grpSp>
+      <p:sp>
+        <p:nvSpPr>
+          <p:cNvPr id="50" name="TextBox 49"/>
+          <p:cNvSpPr txBox="1"/>
+          <p:nvPr/>
+        </p:nvSpPr>
+        <p:spPr>
+          <a:xfrm>
+            <a:off x="1296766" y="6162085"/>
+            <a:ext cx="1866665" cy="307777"/>
+          </a:xfrm>
+          <a:prstGeom prst="rect">
+            <a:avLst/>
+          </a:prstGeom>
+          <a:noFill/>
+        </p:spPr>
+        <p:txBody>
+          <a:bodyPr wrap="none" rtlCol="0">
+            <a:spAutoFit/>
+          </a:bodyPr>
+          <a:lstStyle/>
+          <a:p>
+            <a:r>
+              <a:rPr lang="tr-TR" sz="1400" dirty="0" smtClean="0"/>
+              <a:t>Open </a:t>
+            </a:r>
+            <a:r>
+              <a:rPr lang="tr-TR" sz="1400" dirty="0" smtClean="0"/>
+              <a:t>loop </a:t>
+            </a:r>
+            <a:r>
+              <a:rPr lang="tr-TR" sz="1400" dirty="0" smtClean="0"/>
+              <a:t>Bode plots</a:t>
+            </a:r>
+            <a:endParaRPr lang="tr-TR" sz="1400" dirty="0"/>
+          </a:p>
+        </p:txBody>
+      </p:sp>
+      <p:sp>
+        <p:nvSpPr>
+          <p:cNvPr id="51" name="TextBox 50"/>
+          <p:cNvSpPr txBox="1"/>
+          <p:nvPr/>
+        </p:nvSpPr>
+        <p:spPr>
+          <a:xfrm>
+            <a:off x="6425671" y="6140068"/>
+            <a:ext cx="1249637" cy="307777"/>
+          </a:xfrm>
+          <a:prstGeom prst="rect">
+            <a:avLst/>
+          </a:prstGeom>
+          <a:noFill/>
+        </p:spPr>
+        <p:txBody>
+          <a:bodyPr wrap="none" rtlCol="0">
+            <a:spAutoFit/>
+          </a:bodyPr>
+          <a:lstStyle/>
+          <a:p>
+            <a:r>
+              <a:rPr lang="tr-TR" sz="1400" dirty="0" smtClean="0"/>
+              <a:t>Step response</a:t>
+            </a:r>
+            <a:endParaRPr lang="tr-TR" sz="1400" dirty="0"/>
+          </a:p>
+        </p:txBody>
+      </p:sp>
+      <p:grpSp>
+        <p:nvGrpSpPr>
+          <p:cNvPr id="52" name="Group 51"/>
+          <p:cNvGrpSpPr/>
+          <p:nvPr/>
+        </p:nvGrpSpPr>
+        <p:grpSpPr>
+          <a:xfrm>
+            <a:off x="556613" y="2729172"/>
+            <a:ext cx="3111958" cy="972262"/>
+            <a:chOff x="2355011" y="3165894"/>
+            <a:chExt cx="4267159" cy="1639019"/>
+          </a:xfrm>
+        </p:grpSpPr>
+        <p:sp>
+          <p:nvSpPr>
+            <p:cNvPr id="53" name="Oval 52"/>
+            <p:cNvSpPr/>
+            <p:nvPr/>
+          </p:nvSpPr>
+          <p:spPr>
+            <a:xfrm>
+              <a:off x="2355011" y="4235570"/>
+              <a:ext cx="638355" cy="569343"/>
+            </a:xfrm>
+            <a:prstGeom prst="ellipse">
+              <a:avLst/>
+            </a:prstGeom>
+            <a:noFill/>
+          </p:spPr>
+          <p:style>
+            <a:lnRef idx="2">
+              <a:schemeClr val="accent1">
+                <a:shade val="50000"/>
+              </a:schemeClr>
+            </a:lnRef>
+            <a:fillRef idx="1">
+              <a:schemeClr val="accent1"/>
+            </a:fillRef>
+            <a:effectRef idx="0">
+              <a:schemeClr val="accent1"/>
+            </a:effectRef>
+            <a:fontRef idx="minor">
+              <a:schemeClr val="lt1"/>
+            </a:fontRef>
+          </p:style>
+          <p:txBody>
+            <a:bodyPr rtlCol="0" anchor="ctr"/>
+            <a:lstStyle/>
+            <a:p>
+              <a:pPr algn="ctr"/>
+              <a:endParaRPr lang="tr-TR"/>
+            </a:p>
+          </p:txBody>
+        </p:sp>
+        <p:sp>
+          <p:nvSpPr>
+            <p:cNvPr id="54" name="TextBox 53"/>
+            <p:cNvSpPr txBox="1"/>
+            <p:nvPr/>
+          </p:nvSpPr>
+          <p:spPr>
+            <a:xfrm>
+              <a:off x="2435696" y="4296103"/>
+              <a:ext cx="336953" cy="276999"/>
+            </a:xfrm>
+            <a:prstGeom prst="rect">
+              <a:avLst/>
+            </a:prstGeom>
+            <a:noFill/>
+          </p:spPr>
+          <p:txBody>
+            <a:bodyPr wrap="none" rtlCol="0">
+              <a:spAutoFit/>
+            </a:bodyPr>
+            <a:lstStyle/>
+            <a:p>
+              <a:r>
+                <a:rPr lang="tr-TR" sz="1200" dirty="0" smtClean="0"/>
+                <a:t>A1</a:t>
+              </a:r>
+              <a:endParaRPr lang="tr-TR" sz="1200" dirty="0"/>
+            </a:p>
+          </p:txBody>
+        </p:sp>
+        <p:sp>
+          <p:nvSpPr>
+            <p:cNvPr id="55" name="Oval 54"/>
+            <p:cNvSpPr/>
+            <p:nvPr/>
+          </p:nvSpPr>
+          <p:spPr>
+            <a:xfrm>
+              <a:off x="5727940" y="3165894"/>
+              <a:ext cx="45719" cy="60385"/>
+            </a:xfrm>
+            <a:prstGeom prst="ellipse">
+              <a:avLst/>
+            </a:prstGeom>
+          </p:spPr>
+          <p:style>
+            <a:lnRef idx="2">
+              <a:schemeClr val="accent1">
+                <a:shade val="50000"/>
+              </a:schemeClr>
+            </a:lnRef>
+            <a:fillRef idx="1">
+              <a:schemeClr val="accent1"/>
+            </a:fillRef>
+            <a:effectRef idx="0">
+              <a:schemeClr val="accent1"/>
+            </a:effectRef>
+            <a:fontRef idx="minor">
+              <a:schemeClr val="lt1"/>
+            </a:fontRef>
+          </p:style>
+          <p:txBody>
+            <a:bodyPr rtlCol="0" anchor="ctr"/>
+            <a:lstStyle/>
+            <a:p>
+              <a:pPr algn="ctr"/>
+              <a:endParaRPr lang="tr-TR"/>
+            </a:p>
+          </p:txBody>
+        </p:sp>
+        <p:sp>
+          <p:nvSpPr>
+            <p:cNvPr id="56" name="TextBox 55"/>
+            <p:cNvSpPr txBox="1"/>
+            <p:nvPr/>
+          </p:nvSpPr>
+          <p:spPr>
+            <a:xfrm>
+              <a:off x="5511710" y="3201911"/>
+              <a:ext cx="1110460" cy="441017"/>
+            </a:xfrm>
+            <a:prstGeom prst="rect">
+              <a:avLst/>
+            </a:prstGeom>
+            <a:noFill/>
+          </p:spPr>
+          <p:txBody>
+            <a:bodyPr wrap="none" rtlCol="0">
+              <a:spAutoFit/>
+            </a:bodyPr>
+            <a:lstStyle/>
+            <a:p>
+              <a:r>
+                <a:rPr lang="tr-TR" sz="1100" dirty="0" smtClean="0"/>
+                <a:t>Goal State</a:t>
+              </a:r>
+              <a:endParaRPr lang="tr-TR" sz="1100" dirty="0"/>
+            </a:p>
+          </p:txBody>
+        </p:sp>
+        <p:cxnSp>
+          <p:nvCxnSpPr>
+            <p:cNvPr id="57" name="Straight Arrow Connector 56"/>
+            <p:cNvCxnSpPr>
+              <a:stCxn id="53" idx="7"/>
+            </p:cNvCxnSpPr>
+            <p:nvPr/>
+          </p:nvCxnSpPr>
+          <p:spPr>
+            <a:xfrm rot="5400000" flipH="1" flipV="1">
+              <a:off x="3733070" y="2375837"/>
+              <a:ext cx="1109922" cy="2776300"/>
+            </a:xfrm>
+            <a:prstGeom prst="straightConnector1">
+              <a:avLst/>
+            </a:prstGeom>
+            <a:ln>
+              <a:tailEnd type="arrow"/>
+            </a:ln>
+          </p:spPr>
+          <p:style>
+            <a:lnRef idx="1">
+              <a:schemeClr val="accent1"/>
+            </a:lnRef>
+            <a:fillRef idx="0">
+              <a:schemeClr val="accent1"/>
+            </a:fillRef>
+            <a:effectRef idx="0">
+              <a:schemeClr val="accent1"/>
+            </a:effectRef>
+            <a:fontRef idx="minor">
+              <a:schemeClr val="tx1"/>
+            </a:fontRef>
+          </p:style>
+        </p:cxnSp>
+        <p:sp>
+          <p:nvSpPr>
+            <p:cNvPr id="58" name="Freeform 57"/>
+            <p:cNvSpPr/>
+            <p:nvPr/>
+          </p:nvSpPr>
+          <p:spPr>
+            <a:xfrm>
+              <a:off x="3493698" y="4106174"/>
+              <a:ext cx="112143" cy="189781"/>
+            </a:xfrm>
+            <a:custGeom>
+              <a:avLst/>
+              <a:gdLst>
+                <a:gd name="connsiteX0" fmla="*/ 51759 w 112143"/>
+                <a:gd name="connsiteY0" fmla="*/ 189781 h 189781"/>
+                <a:gd name="connsiteX1" fmla="*/ 103517 w 112143"/>
+                <a:gd name="connsiteY1" fmla="*/ 69011 h 189781"/>
+                <a:gd name="connsiteX2" fmla="*/ 0 w 112143"/>
+                <a:gd name="connsiteY2" fmla="*/ 0 h 189781"/>
+                <a:gd name="connsiteX3" fmla="*/ 0 w 112143"/>
+                <a:gd name="connsiteY3" fmla="*/ 0 h 189781"/>
+              </a:gdLst>
+              <a:ahLst/>
+              <a:cxnLst>
+                <a:cxn ang="0">
+                  <a:pos x="connsiteX0" y="connsiteY0"/>
+                </a:cxn>
+                <a:cxn ang="0">
+                  <a:pos x="connsiteX1" y="connsiteY1"/>
+                </a:cxn>
+                <a:cxn ang="0">
+                  <a:pos x="connsiteX2" y="connsiteY2"/>
+                </a:cxn>
+                <a:cxn ang="0">
+                  <a:pos x="connsiteX3" y="connsiteY3"/>
+                </a:cxn>
+              </a:cxnLst>
+              <a:rect l="l" t="t" r="r" b="b"/>
+              <a:pathLst>
+                <a:path w="112143" h="189781">
+                  <a:moveTo>
+                    <a:pt x="51759" y="189781"/>
+                  </a:moveTo>
+                  <a:cubicBezTo>
+                    <a:pt x="81951" y="145211"/>
+                    <a:pt x="112143" y="100641"/>
+                    <a:pt x="103517" y="69011"/>
+                  </a:cubicBezTo>
+                  <a:cubicBezTo>
+                    <a:pt x="94891" y="37381"/>
+                    <a:pt x="0" y="0"/>
+                    <a:pt x="0" y="0"/>
+                  </a:cubicBezTo>
+                  <a:lnTo>
+                    <a:pt x="0" y="0"/>
+                  </a:lnTo>
+                </a:path>
+              </a:pathLst>
+            </a:custGeom>
+          </p:spPr>
+          <p:style>
+            <a:lnRef idx="1">
+              <a:schemeClr val="accent1"/>
+            </a:lnRef>
+            <a:fillRef idx="0">
+              <a:schemeClr val="accent1"/>
+            </a:fillRef>
+            <a:effectRef idx="0">
+              <a:schemeClr val="accent1"/>
+            </a:effectRef>
+            <a:fontRef idx="minor">
+              <a:schemeClr val="tx1"/>
+            </a:fontRef>
+          </p:style>
+          <p:txBody>
+            <a:bodyPr rtlCol="0" anchor="ctr"/>
+            <a:lstStyle/>
+            <a:p>
+              <a:pPr algn="ctr"/>
+              <a:endParaRPr lang="tr-TR"/>
+            </a:p>
+          </p:txBody>
+        </p:sp>
+        <p:cxnSp>
+          <p:nvCxnSpPr>
+            <p:cNvPr id="59" name="Straight Connector 58"/>
+            <p:cNvCxnSpPr>
+              <a:stCxn id="53" idx="7"/>
+            </p:cNvCxnSpPr>
+            <p:nvPr/>
+          </p:nvCxnSpPr>
+          <p:spPr>
+            <a:xfrm rot="5400000" flipH="1" flipV="1">
+              <a:off x="3418206" y="3769003"/>
+              <a:ext cx="31620" cy="1068270"/>
+            </a:xfrm>
+            <a:prstGeom prst="line">
+              <a:avLst/>
+            </a:prstGeom>
+          </p:spPr>
+          <p:style>
+            <a:lnRef idx="1">
+              <a:schemeClr val="accent1"/>
+            </a:lnRef>
+            <a:fillRef idx="0">
+              <a:schemeClr val="accent1"/>
+            </a:fillRef>
+            <a:effectRef idx="0">
+              <a:schemeClr val="accent1"/>
+            </a:effectRef>
+            <a:fontRef idx="minor">
+              <a:schemeClr val="tx1"/>
+            </a:fontRef>
+          </p:style>
+        </p:cxnSp>
+        <p:sp>
+          <p:nvSpPr>
+            <p:cNvPr id="60" name="TextBox 59"/>
+            <p:cNvSpPr txBox="1"/>
+            <p:nvPr/>
+          </p:nvSpPr>
+          <p:spPr>
+            <a:xfrm>
+              <a:off x="3605841" y="3983638"/>
+              <a:ext cx="1043876" cy="261609"/>
+            </a:xfrm>
+            <a:prstGeom prst="rect">
+              <a:avLst/>
+            </a:prstGeom>
+            <a:noFill/>
+          </p:spPr>
+          <p:txBody>
+            <a:bodyPr wrap="none" rtlCol="0">
+              <a:spAutoFit/>
+            </a:bodyPr>
+            <a:lstStyle/>
+            <a:p>
+              <a:r>
+                <a:rPr lang="tr-TR" sz="1050" dirty="0" smtClean="0"/>
+                <a:t>Bearing Angle</a:t>
+              </a:r>
+              <a:endParaRPr lang="tr-TR" sz="1050" dirty="0"/>
+            </a:p>
+          </p:txBody>
+        </p:sp>
+        <p:sp>
+          <p:nvSpPr>
+            <p:cNvPr id="61" name="TextBox 60"/>
+            <p:cNvSpPr txBox="1"/>
+            <p:nvPr/>
+          </p:nvSpPr>
+          <p:spPr>
+            <a:xfrm rot="20365342">
+              <a:off x="3720116" y="3534966"/>
+              <a:ext cx="777777" cy="246221"/>
+            </a:xfrm>
+            <a:prstGeom prst="rect">
+              <a:avLst/>
+            </a:prstGeom>
+            <a:noFill/>
+          </p:spPr>
+          <p:txBody>
+            <a:bodyPr wrap="none" rtlCol="0">
+              <a:spAutoFit/>
+            </a:bodyPr>
+            <a:lstStyle/>
+            <a:p>
+              <a:r>
+                <a:rPr lang="tr-TR" sz="1000" dirty="0" smtClean="0"/>
+                <a:t>Amplitude</a:t>
+              </a:r>
+              <a:endParaRPr lang="tr-TR" sz="1000" dirty="0"/>
+            </a:p>
+          </p:txBody>
+        </p:sp>
+      </p:grpSp>
+    </p:spTree>
+    <p:extLst>
+      <p:ext uri="{BB962C8B-B14F-4D97-AF65-F5344CB8AC3E}">
+        <p14:creationId xmlns:p14="http://schemas.microsoft.com/office/powerpoint/2010/main" val="1700721917"/>
+      </p:ext>
+    </p:extLst>
+  </p:cSld>
+  <p:clrMapOvr>
+    <a:masterClrMapping/>
+  </p:clrMapOvr>
+  <p:timing>
+    <p:tnLst>
+      <p:par>
+        <p:cTn id="1" dur="indefinite" restart="never" nodeType="tmRoot"/>
+      </p:par>
+    </p:tnLst>
+  </p:timing>
+</p:sld>
+</file>
+
+<file path=ppt/slides/slide24.xml><?xml version="1.0" encoding="utf-8"?>
+<p:sld xmlns:a="http://schemas.openxmlformats.org/drawingml/2006/main" xmlns:r="http://schemas.openxmlformats.org/officeDocument/2006/relationships" xmlns:p="http://schemas.openxmlformats.org/presentationml/2006/main">
+  <p:cSld>
+    <p:spTree>
+      <p:nvGrpSpPr>
+        <p:cNvPr id="1" name=""/>
+        <p:cNvGrpSpPr/>
+        <p:nvPr/>
+      </p:nvGrpSpPr>
+      <p:grpSpPr>
+        <a:xfrm>
+          <a:off x="0" y="0"/>
+          <a:ext cx="0" cy="0"/>
+          <a:chOff x="0" y="0"/>
+          <a:chExt cx="0" cy="0"/>
+        </a:xfrm>
+      </p:grpSpPr>
+      <p:sp>
+        <p:nvSpPr>
+          <p:cNvPr id="2" name="Title 1"/>
+          <p:cNvSpPr>
+            <a:spLocks noGrp="1"/>
+          </p:cNvSpPr>
+          <p:nvPr>
+            <p:ph type="title"/>
+          </p:nvPr>
+        </p:nvSpPr>
+        <p:spPr/>
+        <p:txBody>
+          <a:bodyPr/>
+          <a:lstStyle/>
+          <a:p>
+            <a:r>
+              <a:rPr lang="tr-TR" dirty="0" smtClean="0"/>
+              <a:t>Formation Control System</a:t>
+            </a:r>
+            <a:endParaRPr lang="tr-TR" dirty="0"/>
+          </a:p>
+        </p:txBody>
+      </p:sp>
+      <p:sp>
+        <p:nvSpPr>
+          <p:cNvPr id="3" name="TextBox 2"/>
+          <p:cNvSpPr txBox="1"/>
+          <p:nvPr/>
+        </p:nvSpPr>
+        <p:spPr>
+          <a:xfrm>
+            <a:off x="675249" y="1491175"/>
+            <a:ext cx="7596554" cy="369332"/>
+          </a:xfrm>
+          <a:prstGeom prst="rect">
+            <a:avLst/>
+          </a:prstGeom>
+          <a:noFill/>
+        </p:spPr>
+        <p:txBody>
+          <a:bodyPr wrap="square" rtlCol="0">
+            <a:spAutoFit/>
+          </a:bodyPr>
+          <a:lstStyle/>
+          <a:p>
+            <a:pPr marL="285750" indent="-285750" algn="just">
+              <a:buFont typeface="Arial" panose="020B0604020202020204" pitchFamily="34" charset="0"/>
+              <a:buChar char="•"/>
+            </a:pPr>
+            <a:r>
+              <a:rPr lang="tr-TR" dirty="0" smtClean="0"/>
+              <a:t>Bubble Packing and Randomized Fractals Methods</a:t>
+            </a:r>
+          </a:p>
+        </p:txBody>
+      </p:sp>
+      <p:sp>
+        <p:nvSpPr>
+          <p:cNvPr id="8" name="TextBox 7"/>
+          <p:cNvSpPr txBox="1"/>
+          <p:nvPr/>
+        </p:nvSpPr>
+        <p:spPr>
+          <a:xfrm>
+            <a:off x="3602240" y="2057893"/>
+            <a:ext cx="1855123" cy="338554"/>
+          </a:xfrm>
+          <a:prstGeom prst="rect">
+            <a:avLst/>
+          </a:prstGeom>
+          <a:noFill/>
+        </p:spPr>
+        <p:txBody>
+          <a:bodyPr wrap="none" rtlCol="0">
+            <a:spAutoFit/>
+          </a:bodyPr>
+          <a:lstStyle/>
+          <a:p>
+            <a:pPr algn="ctr"/>
+            <a:r>
+              <a:rPr lang="tr-TR" sz="1600" dirty="0" smtClean="0"/>
+              <a:t>Velocity Controller</a:t>
+            </a:r>
+            <a:endParaRPr lang="tr-TR" sz="1600" dirty="0"/>
+          </a:p>
+        </p:txBody>
+      </p:sp>
+      <p:sp>
+        <p:nvSpPr>
+          <p:cNvPr id="32" name="TextBox 31"/>
+          <p:cNvSpPr txBox="1"/>
+          <p:nvPr/>
+        </p:nvSpPr>
+        <p:spPr>
+          <a:xfrm>
+            <a:off x="2121188" y="2491127"/>
+            <a:ext cx="184730" cy="584775"/>
+          </a:xfrm>
+          <a:prstGeom prst="rect">
+            <a:avLst/>
+          </a:prstGeom>
+          <a:noFill/>
+        </p:spPr>
+        <p:txBody>
+          <a:bodyPr wrap="none" rtlCol="0">
+            <a:spAutoFit/>
+          </a:bodyPr>
+          <a:lstStyle/>
+          <a:p>
+            <a:pPr algn="ctr"/>
+            <a:endParaRPr lang="tr-TR" sz="1600" i="1" dirty="0" smtClean="0"/>
+          </a:p>
+          <a:p>
+            <a:pPr algn="ctr"/>
+            <a:endParaRPr lang="tr-TR" sz="1600" dirty="0" smtClean="0"/>
+          </a:p>
+        </p:txBody>
+      </p:sp>
+      <p:sp>
+        <p:nvSpPr>
+          <p:cNvPr id="33" name="TextBox 32"/>
+          <p:cNvSpPr txBox="1"/>
+          <p:nvPr/>
+        </p:nvSpPr>
+        <p:spPr>
+          <a:xfrm>
+            <a:off x="254878" y="2659086"/>
+            <a:ext cx="5460114" cy="738664"/>
+          </a:xfrm>
+          <a:prstGeom prst="rect">
+            <a:avLst/>
+          </a:prstGeom>
+          <a:noFill/>
+        </p:spPr>
+        <p:txBody>
+          <a:bodyPr wrap="square" rtlCol="0">
+            <a:spAutoFit/>
+          </a:bodyPr>
+          <a:lstStyle/>
+          <a:p>
+            <a:r>
+              <a:rPr lang="tr-TR" sz="1400" dirty="0" smtClean="0"/>
+              <a:t>The dynamical system of agents  is </a:t>
+            </a:r>
+            <a:r>
+              <a:rPr lang="tr-TR" sz="1400" dirty="0" smtClean="0"/>
+              <a:t>augmented with an artificial error state, </a:t>
+            </a:r>
+            <a:r>
+              <a:rPr lang="tr-TR" sz="1400" dirty="0" smtClean="0"/>
+              <a:t>to design an </a:t>
+            </a:r>
+            <a:r>
+              <a:rPr lang="tr-TR" sz="1400" dirty="0"/>
+              <a:t>State feedback with LQR controller;</a:t>
+            </a:r>
+          </a:p>
+          <a:p>
+            <a:endParaRPr lang="tr-TR" sz="1400" dirty="0"/>
+          </a:p>
+        </p:txBody>
+      </p:sp>
+      <p:pic>
+        <p:nvPicPr>
+          <p:cNvPr id="34" name="Picture 1"/>
+          <p:cNvPicPr>
+            <a:picLocks noChangeAspect="1" noChangeArrowheads="1"/>
+          </p:cNvPicPr>
+          <p:nvPr/>
+        </p:nvPicPr>
+        <p:blipFill>
+          <a:blip r:embed="rId2">
+            <a:clrChange>
+              <a:clrFrom>
+                <a:srgbClr val="FFFFFF"/>
+              </a:clrFrom>
+              <a:clrTo>
+                <a:srgbClr val="FFFFFF">
+                  <a:alpha val="0"/>
+                </a:srgbClr>
+              </a:clrTo>
+            </a:clrChange>
+          </a:blip>
+          <a:srcRect/>
+          <a:stretch>
+            <a:fillRect/>
+          </a:stretch>
+        </p:blipFill>
+        <p:spPr bwMode="auto">
+          <a:xfrm>
+            <a:off x="335391" y="3573744"/>
+            <a:ext cx="2976114" cy="454684"/>
+          </a:xfrm>
+          <a:prstGeom prst="rect">
+            <a:avLst/>
+          </a:prstGeom>
+          <a:noFill/>
+        </p:spPr>
+      </p:pic>
+      <p:pic>
+        <p:nvPicPr>
+          <p:cNvPr id="35" name="Picture 4"/>
+          <p:cNvPicPr>
+            <a:picLocks noChangeAspect="1" noChangeArrowheads="1"/>
+          </p:cNvPicPr>
+          <p:nvPr/>
+        </p:nvPicPr>
+        <p:blipFill>
+          <a:blip r:embed="rId3">
+            <a:clrChange>
+              <a:clrFrom>
+                <a:srgbClr val="FFFFFF"/>
+              </a:clrFrom>
+              <a:clrTo>
+                <a:srgbClr val="FFFFFF">
+                  <a:alpha val="0"/>
+                </a:srgbClr>
+              </a:clrTo>
+            </a:clrChange>
+          </a:blip>
+          <a:srcRect/>
+          <a:stretch>
+            <a:fillRect/>
+          </a:stretch>
+        </p:blipFill>
+        <p:spPr bwMode="auto">
+          <a:xfrm>
+            <a:off x="5200691" y="3536255"/>
+            <a:ext cx="1268082" cy="408604"/>
+          </a:xfrm>
+          <a:prstGeom prst="rect">
+            <a:avLst/>
+          </a:prstGeom>
+          <a:noFill/>
+        </p:spPr>
+      </p:pic>
+      <p:sp>
+        <p:nvSpPr>
+          <p:cNvPr id="36" name="TextBox 35"/>
+          <p:cNvSpPr txBox="1"/>
+          <p:nvPr/>
+        </p:nvSpPr>
+        <p:spPr>
+          <a:xfrm>
+            <a:off x="188742" y="4182237"/>
+            <a:ext cx="4149406" cy="307777"/>
+          </a:xfrm>
+          <a:prstGeom prst="rect">
+            <a:avLst/>
+          </a:prstGeom>
+          <a:noFill/>
+        </p:spPr>
+        <p:txBody>
+          <a:bodyPr wrap="none" rtlCol="0">
+            <a:spAutoFit/>
+          </a:bodyPr>
+          <a:lstStyle/>
+          <a:p>
+            <a:r>
+              <a:rPr lang="tr-TR" sz="1400" dirty="0" smtClean="0"/>
+              <a:t>Q and R matrices used in solving Riccati equations,</a:t>
+            </a:r>
+          </a:p>
+        </p:txBody>
+      </p:sp>
+      <p:pic>
+        <p:nvPicPr>
+          <p:cNvPr id="37" name="Picture 10"/>
+          <p:cNvPicPr>
+            <a:picLocks noChangeAspect="1" noChangeArrowheads="1"/>
+          </p:cNvPicPr>
+          <p:nvPr/>
+        </p:nvPicPr>
+        <p:blipFill>
+          <a:blip r:embed="rId4">
+            <a:clrChange>
+              <a:clrFrom>
+                <a:srgbClr val="FFFFFF"/>
+              </a:clrFrom>
+              <a:clrTo>
+                <a:srgbClr val="FFFFFF">
+                  <a:alpha val="0"/>
+                </a:srgbClr>
+              </a:clrTo>
+            </a:clrChange>
+          </a:blip>
+          <a:srcRect/>
+          <a:stretch>
+            <a:fillRect/>
+          </a:stretch>
+        </p:blipFill>
+        <p:spPr bwMode="auto">
+          <a:xfrm>
+            <a:off x="3139110" y="4535120"/>
+            <a:ext cx="4233460" cy="491705"/>
+          </a:xfrm>
+          <a:prstGeom prst="rect">
+            <a:avLst/>
+          </a:prstGeom>
+          <a:noFill/>
+        </p:spPr>
+      </p:pic>
+      <p:pic>
+        <p:nvPicPr>
+          <p:cNvPr id="38" name="Picture 13"/>
+          <p:cNvPicPr>
+            <a:picLocks noChangeAspect="1" noChangeArrowheads="1"/>
+          </p:cNvPicPr>
+          <p:nvPr/>
+        </p:nvPicPr>
+        <p:blipFill>
+          <a:blip r:embed="rId5">
+            <a:clrChange>
+              <a:clrFrom>
+                <a:srgbClr val="FFFFFF"/>
+              </a:clrFrom>
+              <a:clrTo>
+                <a:srgbClr val="FFFFFF">
+                  <a:alpha val="0"/>
+                </a:srgbClr>
+              </a:clrTo>
+            </a:clrChange>
+          </a:blip>
+          <a:srcRect/>
+          <a:stretch>
+            <a:fillRect/>
+          </a:stretch>
+        </p:blipFill>
+        <p:spPr bwMode="auto">
+          <a:xfrm>
+            <a:off x="404402" y="4623516"/>
+            <a:ext cx="1811548" cy="374378"/>
+          </a:xfrm>
+          <a:prstGeom prst="rect">
+            <a:avLst/>
+          </a:prstGeom>
+          <a:noFill/>
+        </p:spPr>
+      </p:pic>
+      <p:sp>
+        <p:nvSpPr>
+          <p:cNvPr id="39" name="TextBox 38"/>
+          <p:cNvSpPr txBox="1"/>
+          <p:nvPr/>
+        </p:nvSpPr>
+        <p:spPr>
+          <a:xfrm>
+            <a:off x="254878" y="5248238"/>
+            <a:ext cx="704488" cy="307777"/>
+          </a:xfrm>
+          <a:prstGeom prst="rect">
+            <a:avLst/>
+          </a:prstGeom>
+          <a:noFill/>
+        </p:spPr>
+        <p:txBody>
+          <a:bodyPr wrap="none" rtlCol="0">
+            <a:spAutoFit/>
+          </a:bodyPr>
+          <a:lstStyle/>
+          <a:p>
+            <a:r>
+              <a:rPr lang="tr-TR" sz="1400" dirty="0" smtClean="0"/>
+              <a:t>where,</a:t>
+            </a:r>
+          </a:p>
+        </p:txBody>
+      </p:sp>
+      <p:pic>
+        <p:nvPicPr>
+          <p:cNvPr id="40" name="Picture 16"/>
+          <p:cNvPicPr>
+            <a:picLocks noChangeAspect="1" noChangeArrowheads="1"/>
+          </p:cNvPicPr>
+          <p:nvPr/>
+        </p:nvPicPr>
+        <p:blipFill>
+          <a:blip r:embed="rId6">
+            <a:clrChange>
+              <a:clrFrom>
+                <a:srgbClr val="FFFFFF"/>
+              </a:clrFrom>
+              <a:clrTo>
+                <a:srgbClr val="FFFFFF">
+                  <a:alpha val="0"/>
+                </a:srgbClr>
+              </a:clrTo>
+            </a:clrChange>
+          </a:blip>
+          <a:srcRect/>
+          <a:stretch>
+            <a:fillRect/>
+          </a:stretch>
+        </p:blipFill>
+        <p:spPr bwMode="auto">
+          <a:xfrm>
+            <a:off x="487483" y="6038239"/>
+            <a:ext cx="2971718" cy="221770"/>
+          </a:xfrm>
+          <a:prstGeom prst="rect">
+            <a:avLst/>
+          </a:prstGeom>
+          <a:noFill/>
+        </p:spPr>
+      </p:pic>
+      <p:pic>
+        <p:nvPicPr>
+          <p:cNvPr id="41" name="Picture 21"/>
+          <p:cNvPicPr>
+            <a:picLocks noChangeAspect="1" noChangeArrowheads="1"/>
+          </p:cNvPicPr>
+          <p:nvPr/>
+        </p:nvPicPr>
+        <p:blipFill>
+          <a:blip r:embed="rId7">
+            <a:clrChange>
+              <a:clrFrom>
+                <a:srgbClr val="FFFFFF"/>
+              </a:clrFrom>
+              <a:clrTo>
+                <a:srgbClr val="FFFFFF">
+                  <a:alpha val="0"/>
+                </a:srgbClr>
+              </a:clrTo>
+            </a:clrChange>
+          </a:blip>
+          <a:srcRect/>
+          <a:stretch>
+            <a:fillRect/>
+          </a:stretch>
+        </p:blipFill>
+        <p:spPr bwMode="auto">
+          <a:xfrm>
+            <a:off x="482042" y="5773667"/>
+            <a:ext cx="2191108" cy="237460"/>
+          </a:xfrm>
+          <a:prstGeom prst="rect">
+            <a:avLst/>
+          </a:prstGeom>
+          <a:noFill/>
+        </p:spPr>
+      </p:pic>
+    </p:spTree>
+    <p:extLst>
+      <p:ext uri="{BB962C8B-B14F-4D97-AF65-F5344CB8AC3E}">
+        <p14:creationId xmlns:p14="http://schemas.microsoft.com/office/powerpoint/2010/main" val="125623688"/>
+      </p:ext>
+    </p:extLst>
+  </p:cSld>
+  <p:clrMapOvr>
+    <a:masterClrMapping/>
+  </p:clrMapOvr>
+  <p:timing>
+    <p:tnLst>
+      <p:par>
+        <p:cTn id="1" dur="indefinite" restart="never" nodeType="tmRoot"/>
+      </p:par>
+    </p:tnLst>
+  </p:timing>
+</p:sld>
+</file>
+
+<file path=ppt/slides/slide25.xml><?xml version="1.0" encoding="utf-8"?>
+<p:sld xmlns:a="http://schemas.openxmlformats.org/drawingml/2006/main" xmlns:r="http://schemas.openxmlformats.org/officeDocument/2006/relationships" xmlns:p="http://schemas.openxmlformats.org/presentationml/2006/main">
+  <p:cSld>
+    <p:spTree>
+      <p:nvGrpSpPr>
+        <p:cNvPr id="1" name=""/>
+        <p:cNvGrpSpPr/>
+        <p:nvPr/>
+      </p:nvGrpSpPr>
+      <p:grpSpPr>
+        <a:xfrm>
+          <a:off x="0" y="0"/>
+          <a:ext cx="0" cy="0"/>
+          <a:chOff x="0" y="0"/>
+          <a:chExt cx="0" cy="0"/>
+        </a:xfrm>
+      </p:grpSpPr>
       <p:sp>
         <p:nvSpPr>
           <p:cNvPr id="2" name="Title 1"/>
@@ -22811,7 +25450,7 @@
               <a:pPr>
                 <a:defRPr/>
               </a:pPr>
-              <a:t>22</a:t>
+              <a:t>25</a:t>
             </a:fld>
             <a:endParaRPr lang="en-US" dirty="0"/>
           </a:p>
@@ -22863,7 +25502,7 @@
 </p:sld>
 </file>
 
-<file path=ppt/slides/slide23.xml><?xml version="1.0" encoding="utf-8"?>
+<file path=ppt/slides/slide26.xml><?xml version="1.0" encoding="utf-8"?>
 <p:sld xmlns:a="http://schemas.openxmlformats.org/drawingml/2006/main" xmlns:r="http://schemas.openxmlformats.org/officeDocument/2006/relationships" xmlns:p="http://schemas.openxmlformats.org/presentationml/2006/main">
   <p:cSld>
     <p:spTree>

</xml_diff>

<commit_message>
[update] formation control part added to presenta
</commit_message>
<xml_diff>
--- a/juri_sunum.pptx
+++ b/juri_sunum.pptx
@@ -167,7 +167,7 @@
   </p:defaultTextStyle>
   <p:extLst>
     <p:ext uri="{EFAFB233-063F-42B5-8137-9DF3F51BA10A}">
-      <p15:sldGuideLst xmlns:p15="http://schemas.microsoft.com/office/powerpoint/2012/main">
+      <p15:sldGuideLst xmlns:p15="http://schemas.microsoft.com/office/powerpoint/2012/main" xmlns="">
         <p15:guide id="1" orient="horz" pos="2160">
           <p15:clr>
             <a:srgbClr val="A4A3A4"/>
@@ -389,7 +389,7 @@
     </p:spTree>
     <p:extLst>
       <p:ext uri="{BB962C8B-B14F-4D97-AF65-F5344CB8AC3E}">
-        <p14:creationId xmlns:p14="http://schemas.microsoft.com/office/powerpoint/2010/main" val="2307124841"/>
+        <p14:creationId xmlns:p14="http://schemas.microsoft.com/office/powerpoint/2010/main" xmlns="" val="2307124841"/>
       </p:ext>
     </p:extLst>
   </p:cSld>
@@ -699,7 +699,7 @@
     </p:spTree>
     <p:extLst>
       <p:ext uri="{BB962C8B-B14F-4D97-AF65-F5344CB8AC3E}">
-        <p14:creationId xmlns:p14="http://schemas.microsoft.com/office/powerpoint/2010/main" val="733486758"/>
+        <p14:creationId xmlns:p14="http://schemas.microsoft.com/office/powerpoint/2010/main" xmlns="" val="733486758"/>
       </p:ext>
     </p:extLst>
   </p:cSld>
@@ -861,14 +861,14 @@
           <a:noFill/>
           <a:extLst>
             <a:ext uri="{909E8E84-426E-40DD-AFC4-6F175D3DCCD1}">
-              <a14:hiddenFill xmlns:a14="http://schemas.microsoft.com/office/drawing/2010/main">
+              <a14:hiddenFill xmlns:a14="http://schemas.microsoft.com/office/drawing/2010/main" xmlns="">
                 <a:solidFill>
                   <a:srgbClr val="FFFFFF"/>
                 </a:solidFill>
               </a14:hiddenFill>
             </a:ext>
             <a:ext uri="{91240B29-F687-4F45-9708-019B960494DF}">
-              <a14:hiddenLine xmlns:a14="http://schemas.microsoft.com/office/drawing/2010/main" w="9525">
+              <a14:hiddenLine xmlns:a14="http://schemas.microsoft.com/office/drawing/2010/main" xmlns="" w="9525">
                 <a:solidFill>
                   <a:srgbClr val="000000"/>
                 </a:solidFill>
@@ -1015,7 +1015,7 @@
           </a:ln>
           <a:extLst>
             <a:ext uri="{909E8E84-426E-40DD-AFC4-6F175D3DCCD1}">
-              <a14:hiddenFill xmlns:a14="http://schemas.microsoft.com/office/drawing/2010/main">
+              <a14:hiddenFill xmlns:a14="http://schemas.microsoft.com/office/drawing/2010/main" xmlns="">
                 <a:solidFill>
                   <a:srgbClr val="FFFFFF"/>
                 </a:solidFill>
@@ -1038,14 +1038,14 @@
           <a:noFill/>
           <a:extLst>
             <a:ext uri="{909E8E84-426E-40DD-AFC4-6F175D3DCCD1}">
-              <a14:hiddenFill xmlns:a14="http://schemas.microsoft.com/office/drawing/2010/main">
+              <a14:hiddenFill xmlns:a14="http://schemas.microsoft.com/office/drawing/2010/main" xmlns="">
                 <a:solidFill>
                   <a:srgbClr val="FFFFFF"/>
                 </a:solidFill>
               </a14:hiddenFill>
             </a:ext>
             <a:ext uri="{91240B29-F687-4F45-9708-019B960494DF}">
-              <a14:hiddenLine xmlns:a14="http://schemas.microsoft.com/office/drawing/2010/main" w="9525">
+              <a14:hiddenLine xmlns:a14="http://schemas.microsoft.com/office/drawing/2010/main" xmlns="" w="9525">
                 <a:solidFill>
                   <a:srgbClr val="000000"/>
                 </a:solidFill>
@@ -1080,7 +1080,7 @@
     </p:spTree>
     <p:extLst>
       <p:ext uri="{BB962C8B-B14F-4D97-AF65-F5344CB8AC3E}">
-        <p14:creationId xmlns:p14="http://schemas.microsoft.com/office/powerpoint/2010/main" val="1831345199"/>
+        <p14:creationId xmlns:p14="http://schemas.microsoft.com/office/powerpoint/2010/main" xmlns="" val="1831345199"/>
       </p:ext>
     </p:extLst>
   </p:cSld>
@@ -1119,7 +1119,7 @@
           <a:blip r:embed="rId2">
             <a:extLst>
               <a:ext uri="{28A0092B-C50C-407E-A947-70E740481C1C}">
-                <a14:useLocalDpi xmlns:a14="http://schemas.microsoft.com/office/drawing/2010/main" val="0"/>
+                <a14:useLocalDpi xmlns:a14="http://schemas.microsoft.com/office/drawing/2010/main" xmlns="" val="0"/>
               </a:ext>
             </a:extLst>
           </a:blip>
@@ -1142,14 +1142,14 @@
           </a:ln>
           <a:extLst>
             <a:ext uri="{909E8E84-426E-40DD-AFC4-6F175D3DCCD1}">
-              <a14:hiddenFill xmlns:a14="http://schemas.microsoft.com/office/drawing/2010/main">
+              <a14:hiddenFill xmlns:a14="http://schemas.microsoft.com/office/drawing/2010/main" xmlns="">
                 <a:solidFill>
                   <a:srgbClr val="FFFFFF"/>
                 </a:solidFill>
               </a14:hiddenFill>
             </a:ext>
             <a:ext uri="{91240B29-F687-4F45-9708-019B960494DF}">
-              <a14:hiddenLine xmlns:a14="http://schemas.microsoft.com/office/drawing/2010/main" w="9525">
+              <a14:hiddenLine xmlns:a14="http://schemas.microsoft.com/office/drawing/2010/main" xmlns="" w="9525">
                 <a:solidFill>
                   <a:srgbClr val="000000"/>
                 </a:solidFill>
@@ -1515,7 +1515,7 @@
     </p:spTree>
     <p:extLst>
       <p:ext uri="{BB962C8B-B14F-4D97-AF65-F5344CB8AC3E}">
-        <p14:creationId xmlns:p14="http://schemas.microsoft.com/office/powerpoint/2010/main" val="4044641051"/>
+        <p14:creationId xmlns:p14="http://schemas.microsoft.com/office/powerpoint/2010/main" xmlns="" val="4044641051"/>
       </p:ext>
     </p:extLst>
   </p:cSld>
@@ -1833,7 +1833,7 @@
     </p:spTree>
     <p:extLst>
       <p:ext uri="{BB962C8B-B14F-4D97-AF65-F5344CB8AC3E}">
-        <p14:creationId xmlns:p14="http://schemas.microsoft.com/office/powerpoint/2010/main" val="43940600"/>
+        <p14:creationId xmlns:p14="http://schemas.microsoft.com/office/powerpoint/2010/main" xmlns="" val="43940600"/>
       </p:ext>
     </p:extLst>
   </p:cSld>
@@ -2218,7 +2218,7 @@
     </p:spTree>
     <p:extLst>
       <p:ext uri="{BB962C8B-B14F-4D97-AF65-F5344CB8AC3E}">
-        <p14:creationId xmlns:p14="http://schemas.microsoft.com/office/powerpoint/2010/main" val="4116636478"/>
+        <p14:creationId xmlns:p14="http://schemas.microsoft.com/office/powerpoint/2010/main" xmlns="" val="4116636478"/>
       </p:ext>
     </p:extLst>
   </p:cSld>
@@ -2625,7 +2625,7 @@
     </p:spTree>
     <p:extLst>
       <p:ext uri="{BB962C8B-B14F-4D97-AF65-F5344CB8AC3E}">
-        <p14:creationId xmlns:p14="http://schemas.microsoft.com/office/powerpoint/2010/main" val="4111024574"/>
+        <p14:creationId xmlns:p14="http://schemas.microsoft.com/office/powerpoint/2010/main" xmlns="" val="4111024574"/>
       </p:ext>
     </p:extLst>
   </p:cSld>
@@ -2804,7 +2804,7 @@
     </p:spTree>
     <p:extLst>
       <p:ext uri="{BB962C8B-B14F-4D97-AF65-F5344CB8AC3E}">
-        <p14:creationId xmlns:p14="http://schemas.microsoft.com/office/powerpoint/2010/main" val="2069476619"/>
+        <p14:creationId xmlns:p14="http://schemas.microsoft.com/office/powerpoint/2010/main" xmlns="" val="2069476619"/>
       </p:ext>
     </p:extLst>
   </p:cSld>
@@ -2923,7 +2923,7 @@
     </p:spTree>
     <p:extLst>
       <p:ext uri="{BB962C8B-B14F-4D97-AF65-F5344CB8AC3E}">
-        <p14:creationId xmlns:p14="http://schemas.microsoft.com/office/powerpoint/2010/main" val="1462183360"/>
+        <p14:creationId xmlns:p14="http://schemas.microsoft.com/office/powerpoint/2010/main" xmlns="" val="1462183360"/>
       </p:ext>
     </p:extLst>
   </p:cSld>
@@ -2969,7 +2969,7 @@
           <a:blip r:embed="rId2">
             <a:extLst>
               <a:ext uri="{28A0092B-C50C-407E-A947-70E740481C1C}">
-                <a14:useLocalDpi xmlns:a14="http://schemas.microsoft.com/office/drawing/2010/main" val="0"/>
+                <a14:useLocalDpi xmlns:a14="http://schemas.microsoft.com/office/drawing/2010/main" xmlns="" val="0"/>
               </a:ext>
             </a:extLst>
           </a:blip>
@@ -2992,14 +2992,14 @@
           </a:ln>
           <a:extLst>
             <a:ext uri="{909E8E84-426E-40DD-AFC4-6F175D3DCCD1}">
-              <a14:hiddenFill xmlns:a14="http://schemas.microsoft.com/office/drawing/2010/main">
+              <a14:hiddenFill xmlns:a14="http://schemas.microsoft.com/office/drawing/2010/main" xmlns="">
                 <a:solidFill>
                   <a:srgbClr val="FFFFFF"/>
                 </a:solidFill>
               </a14:hiddenFill>
             </a:ext>
             <a:ext uri="{91240B29-F687-4F45-9708-019B960494DF}">
-              <a14:hiddenLine xmlns:a14="http://schemas.microsoft.com/office/drawing/2010/main" w="9525">
+              <a14:hiddenLine xmlns:a14="http://schemas.microsoft.com/office/drawing/2010/main" xmlns="" w="9525">
                 <a:solidFill>
                   <a:srgbClr val="000000"/>
                 </a:solidFill>
@@ -3033,14 +3033,14 @@
           </a:ln>
           <a:extLst>
             <a:ext uri="{909E8E84-426E-40DD-AFC4-6F175D3DCCD1}">
-              <a14:hiddenFill xmlns:a14="http://schemas.microsoft.com/office/drawing/2010/main">
+              <a14:hiddenFill xmlns:a14="http://schemas.microsoft.com/office/drawing/2010/main" xmlns="">
                 <a:solidFill>
                   <a:srgbClr val="FFFFFF"/>
                 </a:solidFill>
               </a14:hiddenFill>
             </a:ext>
             <a:ext uri="{91240B29-F687-4F45-9708-019B960494DF}">
-              <a14:hiddenLine xmlns:a14="http://schemas.microsoft.com/office/drawing/2010/main" w="9525">
+              <a14:hiddenLine xmlns:a14="http://schemas.microsoft.com/office/drawing/2010/main" xmlns="" w="9525">
                 <a:solidFill>
                   <a:srgbClr val="000000"/>
                 </a:solidFill>
@@ -3188,7 +3188,7 @@
     </p:spTree>
     <p:extLst>
       <p:ext uri="{BB962C8B-B14F-4D97-AF65-F5344CB8AC3E}">
-        <p14:creationId xmlns:p14="http://schemas.microsoft.com/office/powerpoint/2010/main" val="3245506927"/>
+        <p14:creationId xmlns:p14="http://schemas.microsoft.com/office/powerpoint/2010/main" xmlns="" val="3245506927"/>
       </p:ext>
     </p:extLst>
   </p:cSld>
@@ -3307,7 +3307,7 @@
             <a:blip r:embed="rId9">
               <a:extLst>
                 <a:ext uri="{28A0092B-C50C-407E-A947-70E740481C1C}">
-                  <a14:useLocalDpi xmlns:a14="http://schemas.microsoft.com/office/drawing/2010/main" val="0"/>
+                  <a14:useLocalDpi xmlns:a14="http://schemas.microsoft.com/office/drawing/2010/main" xmlns="" val="0"/>
                 </a:ext>
               </a:extLst>
             </a:blip>
@@ -3330,14 +3330,14 @@
             </a:ln>
             <a:extLst>
               <a:ext uri="{909E8E84-426E-40DD-AFC4-6F175D3DCCD1}">
-                <a14:hiddenFill xmlns:a14="http://schemas.microsoft.com/office/drawing/2010/main">
+                <a14:hiddenFill xmlns:a14="http://schemas.microsoft.com/office/drawing/2010/main" xmlns="">
                   <a:solidFill>
                     <a:srgbClr val="FFFFFF"/>
                   </a:solidFill>
                 </a14:hiddenFill>
               </a:ext>
               <a:ext uri="{91240B29-F687-4F45-9708-019B960494DF}">
-                <a14:hiddenLine xmlns:a14="http://schemas.microsoft.com/office/drawing/2010/main" w="9525">
+                <a14:hiddenLine xmlns:a14="http://schemas.microsoft.com/office/drawing/2010/main" xmlns="" w="9525">
                   <a:solidFill>
                     <a:srgbClr val="000000"/>
                   </a:solidFill>
@@ -3506,14 +3506,14 @@
           </a:ln>
           <a:extLst>
             <a:ext uri="{909E8E84-426E-40DD-AFC4-6F175D3DCCD1}">
-              <a14:hiddenFill xmlns:a14="http://schemas.microsoft.com/office/drawing/2010/main">
+              <a14:hiddenFill xmlns:a14="http://schemas.microsoft.com/office/drawing/2010/main" xmlns="">
                 <a:solidFill>
                   <a:srgbClr val="FFFFFF"/>
                 </a:solidFill>
               </a14:hiddenFill>
             </a:ext>
             <a:ext uri="{91240B29-F687-4F45-9708-019B960494DF}">
-              <a14:hiddenLine xmlns:a14="http://schemas.microsoft.com/office/drawing/2010/main" w="9525">
+              <a14:hiddenLine xmlns:a14="http://schemas.microsoft.com/office/drawing/2010/main" xmlns="" w="9525">
                 <a:solidFill>
                   <a:srgbClr val="000000"/>
                 </a:solidFill>
@@ -3597,14 +3597,14 @@
           </a:ln>
           <a:extLst>
             <a:ext uri="{909E8E84-426E-40DD-AFC4-6F175D3DCCD1}">
-              <a14:hiddenFill xmlns:a14="http://schemas.microsoft.com/office/drawing/2010/main">
+              <a14:hiddenFill xmlns:a14="http://schemas.microsoft.com/office/drawing/2010/main" xmlns="">
                 <a:solidFill>
                   <a:srgbClr val="FFFFFF"/>
                 </a:solidFill>
               </a14:hiddenFill>
             </a:ext>
             <a:ext uri="{91240B29-F687-4F45-9708-019B960494DF}">
-              <a14:hiddenLine xmlns:a14="http://schemas.microsoft.com/office/drawing/2010/main" w="9525">
+              <a14:hiddenLine xmlns:a14="http://schemas.microsoft.com/office/drawing/2010/main" xmlns="" w="9525">
                 <a:solidFill>
                   <a:srgbClr val="000000"/>
                 </a:solidFill>
@@ -4251,7 +4251,7 @@
           <a:blip r:embed="rId3">
             <a:extLst>
               <a:ext uri="{28A0092B-C50C-407E-A947-70E740481C1C}">
-                <a14:useLocalDpi xmlns:a14="http://schemas.microsoft.com/office/drawing/2010/main" val="0"/>
+                <a14:useLocalDpi xmlns:a14="http://schemas.microsoft.com/office/drawing/2010/main" xmlns="" val="0"/>
               </a:ext>
             </a:extLst>
           </a:blip>
@@ -4274,14 +4274,14 @@
           </a:ln>
           <a:extLst>
             <a:ext uri="{909E8E84-426E-40DD-AFC4-6F175D3DCCD1}">
-              <a14:hiddenFill xmlns:a14="http://schemas.microsoft.com/office/drawing/2010/main">
+              <a14:hiddenFill xmlns:a14="http://schemas.microsoft.com/office/drawing/2010/main" xmlns="">
                 <a:solidFill>
                   <a:srgbClr val="FFFFFF"/>
                 </a:solidFill>
               </a14:hiddenFill>
             </a:ext>
             <a:ext uri="{91240B29-F687-4F45-9708-019B960494DF}">
-              <a14:hiddenLine xmlns:a14="http://schemas.microsoft.com/office/drawing/2010/main" w="9525">
+              <a14:hiddenLine xmlns:a14="http://schemas.microsoft.com/office/drawing/2010/main" xmlns="" w="9525">
                 <a:solidFill>
                   <a:srgbClr val="000000"/>
                 </a:solidFill>
@@ -4630,7 +4630,7 @@
     </p:spTree>
     <p:extLst>
       <p:ext uri="{BB962C8B-B14F-4D97-AF65-F5344CB8AC3E}">
-        <p14:creationId xmlns:p14="http://schemas.microsoft.com/office/powerpoint/2010/main" val="1601229741"/>
+        <p14:creationId xmlns:p14="http://schemas.microsoft.com/office/powerpoint/2010/main" xmlns="" val="1601229741"/>
       </p:ext>
     </p:extLst>
   </p:cSld>
@@ -5802,7 +5802,7 @@
     </p:spTree>
     <p:extLst>
       <p:ext uri="{BB962C8B-B14F-4D97-AF65-F5344CB8AC3E}">
-        <p14:creationId xmlns:p14="http://schemas.microsoft.com/office/powerpoint/2010/main" val="1601229741"/>
+        <p14:creationId xmlns:p14="http://schemas.microsoft.com/office/powerpoint/2010/main" xmlns="" val="1601229741"/>
       </p:ext>
     </p:extLst>
   </p:cSld>
@@ -5927,59 +5927,9 @@
         </p:xfrm>
         <a:graphic>
           <a:graphicData uri="http://schemas.openxmlformats.org/presentationml/2006/ole">
-            <mc:AlternateContent xmlns:mc="http://schemas.openxmlformats.org/markup-compatibility/2006">
-              <mc:Choice xmlns:v="urn:schemas-microsoft-com:vml" Requires="v">
-                <p:oleObj spid="_x0000_s1033" name="Equation" r:id="rId3" imgW="469800" imgH="228600" progId="Equation.3">
-                  <p:embed/>
-                </p:oleObj>
-              </mc:Choice>
-              <mc:Fallback>
-                <p:oleObj name="Equation" r:id="rId3" imgW="469800" imgH="228600" progId="Equation.3">
-                  <p:embed/>
-                  <p:pic>
-                    <p:nvPicPr>
-                      <p:cNvPr id="0" name="Picture 2"/>
-                      <p:cNvPicPr>
-                        <a:picLocks noChangeAspect="1" noChangeArrowheads="1"/>
-                      </p:cNvPicPr>
-                      <p:nvPr/>
-                    </p:nvPicPr>
-                    <p:blipFill>
-                      <a:blip r:embed="rId4">
-                        <a:extLst>
-                          <a:ext uri="{28A0092B-C50C-407E-A947-70E740481C1C}">
-                            <a14:useLocalDpi xmlns:a14="http://schemas.microsoft.com/office/drawing/2010/main" val="0"/>
-                          </a:ext>
-                        </a:extLst>
-                      </a:blip>
-                      <a:srcRect/>
-                      <a:stretch>
-                        <a:fillRect/>
-                      </a:stretch>
-                    </p:blipFill>
-                    <p:spPr bwMode="auto">
-                      <a:xfrm>
-                        <a:off x="3958431" y="2571750"/>
-                        <a:ext cx="998537" cy="485775"/>
-                      </a:xfrm>
-                      <a:prstGeom prst="rect">
-                        <a:avLst/>
-                      </a:prstGeom>
-                      <a:noFill/>
-                      <a:extLst>
-                        <a:ext uri="{909E8E84-426E-40DD-AFC4-6F175D3DCCD1}">
-                          <a14:hiddenFill xmlns:a14="http://schemas.microsoft.com/office/drawing/2010/main">
-                            <a:solidFill>
-                              <a:srgbClr val="FFFFFF"/>
-                            </a:solidFill>
-                          </a14:hiddenFill>
-                        </a:ext>
-                      </a:extLst>
-                    </p:spPr>
-                  </p:pic>
-                </p:oleObj>
-              </mc:Fallback>
-            </mc:AlternateContent>
+            <p:oleObj spid="_x0000_s1033" name="Equation" r:id="rId3" imgW="469900" imgH="228600" progId="Equation.3">
+              <p:embed/>
+            </p:oleObj>
           </a:graphicData>
         </a:graphic>
       </p:graphicFrame>
@@ -6185,7 +6135,7 @@
             <p:nvPr/>
           </p:nvPicPr>
           <p:blipFill>
-            <a:blip r:embed="rId5"/>
+            <a:blip r:embed="rId4"/>
             <a:srcRect/>
             <a:stretch>
               <a:fillRect/>
@@ -6218,7 +6168,7 @@
             <p:nvPr/>
           </p:nvPicPr>
           <p:blipFill>
-            <a:blip r:embed="rId6"/>
+            <a:blip r:embed="rId5"/>
             <a:srcRect/>
             <a:stretch>
               <a:fillRect/>
@@ -6288,7 +6238,7 @@
     </p:spTree>
     <p:extLst>
       <p:ext uri="{BB962C8B-B14F-4D97-AF65-F5344CB8AC3E}">
-        <p14:creationId xmlns:p14="http://schemas.microsoft.com/office/powerpoint/2010/main" val="1601229741"/>
+        <p14:creationId xmlns:p14="http://schemas.microsoft.com/office/powerpoint/2010/main" xmlns="" val="1601229741"/>
       </p:ext>
     </p:extLst>
   </p:cSld>
@@ -6772,7 +6722,7 @@
     </p:spTree>
     <p:extLst>
       <p:ext uri="{BB962C8B-B14F-4D97-AF65-F5344CB8AC3E}">
-        <p14:creationId xmlns:p14="http://schemas.microsoft.com/office/powerpoint/2010/main" val="1601229741"/>
+        <p14:creationId xmlns:p14="http://schemas.microsoft.com/office/powerpoint/2010/main" xmlns="" val="1601229741"/>
       </p:ext>
     </p:extLst>
   </p:cSld>
@@ -9335,7 +9285,7 @@
     </p:spTree>
     <p:extLst>
       <p:ext uri="{BB962C8B-B14F-4D97-AF65-F5344CB8AC3E}">
-        <p14:creationId xmlns:p14="http://schemas.microsoft.com/office/powerpoint/2010/main" val="1601229741"/>
+        <p14:creationId xmlns:p14="http://schemas.microsoft.com/office/powerpoint/2010/main" xmlns="" val="1601229741"/>
       </p:ext>
     </p:extLst>
   </p:cSld>
@@ -9447,7 +9397,15 @@
           <a:p>
             <a:r>
               <a:rPr lang="tr-TR" u="sng" dirty="0" smtClean="0"/>
-              <a:t>1)Route Table Determination</a:t>
+              <a:t>2</a:t>
+            </a:r>
+            <a:r>
+              <a:rPr lang="tr-TR" u="sng" dirty="0" smtClean="0"/>
+              <a:t>)Route </a:t>
+            </a:r>
+            <a:r>
+              <a:rPr lang="tr-TR" u="sng" dirty="0" smtClean="0"/>
+              <a:t>Table Determination</a:t>
             </a:r>
             <a:endParaRPr lang="tr-TR" dirty="0"/>
           </a:p>
@@ -9578,7 +9536,7 @@
     </p:spTree>
     <p:extLst>
       <p:ext uri="{BB962C8B-B14F-4D97-AF65-F5344CB8AC3E}">
-        <p14:creationId xmlns:p14="http://schemas.microsoft.com/office/powerpoint/2010/main" val="1601229741"/>
+        <p14:creationId xmlns:p14="http://schemas.microsoft.com/office/powerpoint/2010/main" xmlns="" val="1601229741"/>
       </p:ext>
     </p:extLst>
   </p:cSld>
@@ -9690,7 +9648,15 @@
           <a:p>
             <a:r>
               <a:rPr lang="tr-TR" u="sng" dirty="0" smtClean="0"/>
-              <a:t>1)Route Table Determination</a:t>
+              <a:t>2</a:t>
+            </a:r>
+            <a:r>
+              <a:rPr lang="tr-TR" u="sng" dirty="0" smtClean="0"/>
+              <a:t>)Route </a:t>
+            </a:r>
+            <a:r>
+              <a:rPr lang="tr-TR" u="sng" dirty="0" smtClean="0"/>
+              <a:t>Table Determination</a:t>
             </a:r>
             <a:endParaRPr lang="tr-TR" dirty="0"/>
           </a:p>
@@ -14914,7 +14880,7 @@
     </p:spTree>
     <p:extLst>
       <p:ext uri="{BB962C8B-B14F-4D97-AF65-F5344CB8AC3E}">
-        <p14:creationId xmlns:p14="http://schemas.microsoft.com/office/powerpoint/2010/main" val="1601229741"/>
+        <p14:creationId xmlns:p14="http://schemas.microsoft.com/office/powerpoint/2010/main" xmlns="" val="1601229741"/>
       </p:ext>
     </p:extLst>
   </p:cSld>
@@ -20693,7 +20659,15 @@
           <a:p>
             <a:r>
               <a:rPr lang="tr-TR" u="sng" dirty="0" smtClean="0"/>
-              <a:t>1)Route Table Determination</a:t>
+              <a:t>2)</a:t>
+            </a:r>
+            <a:r>
+              <a:rPr lang="tr-TR" u="sng" dirty="0" smtClean="0"/>
+              <a:t>Route </a:t>
+            </a:r>
+            <a:r>
+              <a:rPr lang="tr-TR" u="sng" dirty="0" smtClean="0"/>
+              <a:t>Table Determination</a:t>
             </a:r>
             <a:endParaRPr lang="tr-TR" dirty="0"/>
           </a:p>
@@ -20728,7 +20702,7 @@
     </p:spTree>
     <p:extLst>
       <p:ext uri="{BB962C8B-B14F-4D97-AF65-F5344CB8AC3E}">
-        <p14:creationId xmlns:p14="http://schemas.microsoft.com/office/powerpoint/2010/main" val="1601229741"/>
+        <p14:creationId xmlns:p14="http://schemas.microsoft.com/office/powerpoint/2010/main" xmlns="" val="1601229741"/>
       </p:ext>
     </p:extLst>
   </p:cSld>
@@ -21232,7 +21206,7 @@
     </p:spTree>
     <p:extLst>
       <p:ext uri="{BB962C8B-B14F-4D97-AF65-F5344CB8AC3E}">
-        <p14:creationId xmlns:p14="http://schemas.microsoft.com/office/powerpoint/2010/main" val="215572797"/>
+        <p14:creationId xmlns:p14="http://schemas.microsoft.com/office/powerpoint/2010/main" xmlns="" val="215572797"/>
       </p:ext>
     </p:extLst>
   </p:cSld>
@@ -21266,6 +21240,32 @@
           <a:chExt cx="0" cy="0"/>
         </a:xfrm>
       </p:grpSpPr>
+      <p:pic>
+        <p:nvPicPr>
+          <p:cNvPr id="25604" name="Picture 4" descr="C:\Users\Kadir\Desktop\Seminer\intermember_forces.png"/>
+          <p:cNvPicPr>
+            <a:picLocks noChangeAspect="1" noChangeArrowheads="1"/>
+          </p:cNvPicPr>
+          <p:nvPr/>
+        </p:nvPicPr>
+        <p:blipFill>
+          <a:blip r:embed="rId2"/>
+          <a:srcRect/>
+          <a:stretch>
+            <a:fillRect/>
+          </a:stretch>
+        </p:blipFill>
+        <p:spPr bwMode="auto">
+          <a:xfrm>
+            <a:off x="6822848" y="2311762"/>
+            <a:ext cx="2053432" cy="1892567"/>
+          </a:xfrm>
+          <a:prstGeom prst="rect">
+            <a:avLst/>
+          </a:prstGeom>
+          <a:noFill/>
+        </p:spPr>
+      </p:pic>
       <p:sp>
         <p:nvSpPr>
           <p:cNvPr id="2" name="Title 1"/>
@@ -21329,7 +21329,7 @@
         <p:spPr>
           <a:xfrm>
             <a:off x="675249" y="1491175"/>
-            <a:ext cx="7596554" cy="1200329"/>
+            <a:ext cx="7596554" cy="646331"/>
           </a:xfrm>
           <a:prstGeom prst="rect">
             <a:avLst/>
@@ -21348,29 +21348,167 @@
             </a:pPr>
             <a:r>
               <a:rPr lang="tr-TR" dirty="0" smtClean="0"/>
-              <a:t>Artificial Forces Method</a:t>
+              <a:t>Artificial Forces </a:t>
+            </a:r>
+            <a:r>
+              <a:rPr lang="tr-TR" dirty="0" smtClean="0"/>
+              <a:t>Method</a:t>
             </a:r>
           </a:p>
           <a:p>
-            <a:pPr marL="342900" indent="-342900" algn="just">
-              <a:buAutoNum type="arabicParenR"/>
-            </a:pPr>
-            <a:endParaRPr lang="tr-TR" dirty="0"/>
-          </a:p>
-          <a:p>
-            <a:pPr algn="just"/>
-            <a:r>
-              <a:rPr lang="tr-TR" dirty="0" smtClean="0"/>
-              <a:t>Directly defines the control for individuals with different potential field components.</a:t>
-            </a:r>
+            <a:pPr marL="285750" indent="-285750" algn="just"/>
             <a:endParaRPr lang="tr-TR" dirty="0"/>
           </a:p>
         </p:txBody>
       </p:sp>
+      <p:pic>
+        <p:nvPicPr>
+          <p:cNvPr id="25602" name="Picture 2" descr="C:\Users\Kadir\Desktop\Seminer\attractive_forces.png"/>
+          <p:cNvPicPr>
+            <a:picLocks noChangeAspect="1" noChangeArrowheads="1"/>
+          </p:cNvPicPr>
+          <p:nvPr/>
+        </p:nvPicPr>
+        <p:blipFill>
+          <a:blip r:embed="rId3"/>
+          <a:srcRect/>
+          <a:stretch>
+            <a:fillRect/>
+          </a:stretch>
+        </p:blipFill>
+        <p:spPr bwMode="auto">
+          <a:xfrm>
+            <a:off x="0" y="2488304"/>
+            <a:ext cx="3036099" cy="1716025"/>
+          </a:xfrm>
+          <a:prstGeom prst="rect">
+            <a:avLst/>
+          </a:prstGeom>
+          <a:noFill/>
+        </p:spPr>
+      </p:pic>
+      <p:pic>
+        <p:nvPicPr>
+          <p:cNvPr id="25603" name="Picture 3" descr="C:\Users\Kadir\Desktop\Seminer\repulsive_forces.png"/>
+          <p:cNvPicPr>
+            <a:picLocks noChangeAspect="1" noChangeArrowheads="1"/>
+          </p:cNvPicPr>
+          <p:nvPr/>
+        </p:nvPicPr>
+        <p:blipFill>
+          <a:blip r:embed="rId4"/>
+          <a:srcRect/>
+          <a:stretch>
+            <a:fillRect/>
+          </a:stretch>
+        </p:blipFill>
+        <p:spPr bwMode="auto">
+          <a:xfrm>
+            <a:off x="537936" y="4493027"/>
+            <a:ext cx="2627312" cy="1709336"/>
+          </a:xfrm>
+          <a:prstGeom prst="rect">
+            <a:avLst/>
+          </a:prstGeom>
+          <a:noFill/>
+        </p:spPr>
+      </p:pic>
+      <p:sp>
+        <p:nvSpPr>
+          <p:cNvPr id="11" name="TextBox 10"/>
+          <p:cNvSpPr txBox="1"/>
+          <p:nvPr/>
+        </p:nvSpPr>
+        <p:spPr>
+          <a:xfrm>
+            <a:off x="675249" y="1845118"/>
+            <a:ext cx="8000588" cy="584775"/>
+          </a:xfrm>
+          <a:prstGeom prst="rect">
+            <a:avLst/>
+          </a:prstGeom>
+          <a:noFill/>
+        </p:spPr>
+        <p:txBody>
+          <a:bodyPr wrap="none" rtlCol="0">
+            <a:spAutoFit/>
+          </a:bodyPr>
+          <a:lstStyle/>
+          <a:p>
+            <a:r>
+              <a:rPr lang="tr-TR" sz="1600" dirty="0" smtClean="0"/>
+              <a:t>Directly defines the </a:t>
+            </a:r>
+            <a:r>
+              <a:rPr lang="tr-TR" sz="1600" dirty="0" smtClean="0"/>
+              <a:t>control law </a:t>
+            </a:r>
+            <a:r>
+              <a:rPr lang="tr-TR" sz="1600" dirty="0" smtClean="0"/>
+              <a:t>for individuals with different potential field components.</a:t>
+            </a:r>
+          </a:p>
+          <a:p>
+            <a:endParaRPr lang="tr-TR" sz="1600" dirty="0"/>
+          </a:p>
+        </p:txBody>
+      </p:sp>
+      <p:pic>
+        <p:nvPicPr>
+          <p:cNvPr id="25611" name="Picture 11" descr="C:\Users\Kadir\Desktop\Seminer\denklem.png"/>
+          <p:cNvPicPr>
+            <a:picLocks noChangeAspect="1" noChangeArrowheads="1"/>
+          </p:cNvPicPr>
+          <p:nvPr/>
+        </p:nvPicPr>
+        <p:blipFill>
+          <a:blip r:embed="rId5"/>
+          <a:srcRect/>
+          <a:stretch>
+            <a:fillRect/>
+          </a:stretch>
+        </p:blipFill>
+        <p:spPr bwMode="auto">
+          <a:xfrm>
+            <a:off x="3270023" y="3985254"/>
+            <a:ext cx="3552825" cy="438150"/>
+          </a:xfrm>
+          <a:prstGeom prst="rect">
+            <a:avLst/>
+          </a:prstGeom>
+          <a:noFill/>
+        </p:spPr>
+      </p:pic>
+      <p:pic>
+        <p:nvPicPr>
+          <p:cNvPr id="25612" name="Picture 12" descr="C:\Users\Kadir\Desktop\Seminer\obstacle_forces.png"/>
+          <p:cNvPicPr>
+            <a:picLocks noChangeAspect="1" noChangeArrowheads="1"/>
+          </p:cNvPicPr>
+          <p:nvPr/>
+        </p:nvPicPr>
+        <p:blipFill>
+          <a:blip r:embed="rId6"/>
+          <a:srcRect/>
+          <a:stretch>
+            <a:fillRect/>
+          </a:stretch>
+        </p:blipFill>
+        <p:spPr bwMode="auto">
+          <a:xfrm>
+            <a:off x="7137500" y="4204329"/>
+            <a:ext cx="1511200" cy="2290134"/>
+          </a:xfrm>
+          <a:prstGeom prst="rect">
+            <a:avLst/>
+          </a:prstGeom>
+          <a:noFill/>
+        </p:spPr>
+      </p:pic>
     </p:spTree>
     <p:extLst>
       <p:ext uri="{BB962C8B-B14F-4D97-AF65-F5344CB8AC3E}">
-        <p14:creationId xmlns:p14="http://schemas.microsoft.com/office/powerpoint/2010/main" val="2182345034"/>
+        <p14:creationId xmlns:p14="http://schemas.microsoft.com/office/powerpoint/2010/main" xmlns="" val="2182345034"/>
       </p:ext>
     </p:extLst>
   </p:cSld>
@@ -21407,7 +21545,7 @@
     </p:spTree>
     <p:extLst>
       <p:ext uri="{BB962C8B-B14F-4D97-AF65-F5344CB8AC3E}">
-        <p14:creationId xmlns:p14="http://schemas.microsoft.com/office/powerpoint/2010/main" val="1031498753"/>
+        <p14:creationId xmlns:p14="http://schemas.microsoft.com/office/powerpoint/2010/main" xmlns="" val="1031498753"/>
       </p:ext>
     </p:extLst>
   </p:cSld>
@@ -21540,7 +21678,7 @@
           <a:blip r:embed="rId2">
             <a:extLst>
               <a:ext uri="{28A0092B-C50C-407E-A947-70E740481C1C}">
-                <a14:useLocalDpi xmlns:a14="http://schemas.microsoft.com/office/drawing/2010/main" val="0"/>
+                <a14:useLocalDpi xmlns:a14="http://schemas.microsoft.com/office/drawing/2010/main" xmlns="" val="0"/>
               </a:ext>
             </a:extLst>
           </a:blip>
@@ -21739,10 +21877,78 @@
           </a:fontRef>
         </p:style>
       </p:cxnSp>
+      <p:sp>
+        <p:nvSpPr>
+          <p:cNvPr id="14" name="TextBox 13"/>
+          <p:cNvSpPr txBox="1"/>
+          <p:nvPr/>
+        </p:nvSpPr>
+        <p:spPr>
+          <a:xfrm>
+            <a:off x="2962988" y="4706508"/>
+            <a:ext cx="385042" cy="253916"/>
+          </a:xfrm>
+          <a:prstGeom prst="rect">
+            <a:avLst/>
+          </a:prstGeom>
+          <a:noFill/>
+        </p:spPr>
+        <p:txBody>
+          <a:bodyPr wrap="none" rtlCol="0">
+            <a:spAutoFit/>
+          </a:bodyPr>
+          <a:lstStyle/>
+          <a:p>
+            <a:r>
+              <a:rPr lang="tr-TR" sz="1050" dirty="0" smtClean="0"/>
+              <a:t>[</a:t>
+            </a:r>
+            <a:r>
+              <a:rPr lang="tr-TR" sz="1050" dirty="0" smtClean="0"/>
+              <a:t>12]</a:t>
+            </a:r>
+            <a:endParaRPr lang="tr-TR" sz="1050" dirty="0"/>
+          </a:p>
+        </p:txBody>
+      </p:sp>
+      <p:sp>
+        <p:nvSpPr>
+          <p:cNvPr id="15" name="TextBox 14"/>
+          <p:cNvSpPr txBox="1"/>
+          <p:nvPr/>
+        </p:nvSpPr>
+        <p:spPr>
+          <a:xfrm>
+            <a:off x="7626243" y="5019085"/>
+            <a:ext cx="380232" cy="253916"/>
+          </a:xfrm>
+          <a:prstGeom prst="rect">
+            <a:avLst/>
+          </a:prstGeom>
+          <a:noFill/>
+        </p:spPr>
+        <p:txBody>
+          <a:bodyPr wrap="none" rtlCol="0">
+            <a:spAutoFit/>
+          </a:bodyPr>
+          <a:lstStyle/>
+          <a:p>
+            <a:r>
+              <a:rPr lang="tr-TR" sz="1050" dirty="0" smtClean="0"/>
+              <a:t>[</a:t>
+            </a:r>
+            <a:r>
+              <a:rPr lang="tr-TR" sz="1050" dirty="0" smtClean="0"/>
+              <a:t>13]</a:t>
+            </a:r>
+            <a:endParaRPr lang="tr-TR" sz="1050" dirty="0"/>
+          </a:p>
+        </p:txBody>
+      </p:sp>
     </p:spTree>
     <p:extLst>
       <p:ext uri="{BB962C8B-B14F-4D97-AF65-F5344CB8AC3E}">
-        <p14:creationId xmlns:p14="http://schemas.microsoft.com/office/powerpoint/2010/main" val="2431369308"/>
+        <p14:creationId xmlns:p14="http://schemas.microsoft.com/office/powerpoint/2010/main" xmlns="" val="2431369308"/>
       </p:ext>
     </p:extLst>
   </p:cSld>
@@ -22284,10 +22490,78 @@
           </a:p>
         </p:txBody>
       </p:sp>
+      <p:sp>
+        <p:nvSpPr>
+          <p:cNvPr id="26" name="TextBox 25"/>
+          <p:cNvSpPr txBox="1"/>
+          <p:nvPr/>
+        </p:nvSpPr>
+        <p:spPr>
+          <a:xfrm>
+            <a:off x="2823320" y="5453647"/>
+            <a:ext cx="391454" cy="253916"/>
+          </a:xfrm>
+          <a:prstGeom prst="rect">
+            <a:avLst/>
+          </a:prstGeom>
+          <a:noFill/>
+        </p:spPr>
+        <p:txBody>
+          <a:bodyPr wrap="none" rtlCol="0">
+            <a:spAutoFit/>
+          </a:bodyPr>
+          <a:lstStyle/>
+          <a:p>
+            <a:r>
+              <a:rPr lang="tr-TR" sz="1050" dirty="0" smtClean="0"/>
+              <a:t>[</a:t>
+            </a:r>
+            <a:r>
+              <a:rPr lang="tr-TR" sz="1050" dirty="0" smtClean="0"/>
+              <a:t>14]</a:t>
+            </a:r>
+            <a:endParaRPr lang="tr-TR" sz="1050" dirty="0"/>
+          </a:p>
+        </p:txBody>
+      </p:sp>
+      <p:sp>
+        <p:nvSpPr>
+          <p:cNvPr id="27" name="TextBox 26"/>
+          <p:cNvSpPr txBox="1"/>
+          <p:nvPr/>
+        </p:nvSpPr>
+        <p:spPr>
+          <a:xfrm>
+            <a:off x="7812281" y="5453647"/>
+            <a:ext cx="391454" cy="253916"/>
+          </a:xfrm>
+          <a:prstGeom prst="rect">
+            <a:avLst/>
+          </a:prstGeom>
+          <a:noFill/>
+        </p:spPr>
+        <p:txBody>
+          <a:bodyPr wrap="none" rtlCol="0">
+            <a:spAutoFit/>
+          </a:bodyPr>
+          <a:lstStyle/>
+          <a:p>
+            <a:r>
+              <a:rPr lang="tr-TR" sz="1050" dirty="0" smtClean="0"/>
+              <a:t>[</a:t>
+            </a:r>
+            <a:r>
+              <a:rPr lang="tr-TR" sz="1050" dirty="0" smtClean="0"/>
+              <a:t>14]</a:t>
+            </a:r>
+            <a:endParaRPr lang="tr-TR" sz="1050" dirty="0"/>
+          </a:p>
+        </p:txBody>
+      </p:sp>
     </p:spTree>
     <p:extLst>
       <p:ext uri="{BB962C8B-B14F-4D97-AF65-F5344CB8AC3E}">
-        <p14:creationId xmlns:p14="http://schemas.microsoft.com/office/powerpoint/2010/main" val="2643796659"/>
+        <p14:creationId xmlns:p14="http://schemas.microsoft.com/office/powerpoint/2010/main" xmlns="" val="2643796659"/>
       </p:ext>
     </p:extLst>
   </p:cSld>
@@ -22542,7 +22816,6 @@
               <a:rPr lang="tr-TR" sz="1400" i="1" u="sng" dirty="0"/>
               <a:t>Algorithm (Munkres Assignment Algorithm)</a:t>
             </a:r>
-            <a:endParaRPr lang="tr-TR" sz="1400" i="1" u="sng" dirty="0"/>
           </a:p>
         </p:txBody>
       </p:sp>
@@ -22737,7 +23010,7 @@
           <p:nvPr>
             <p:extLst>
               <p:ext uri="{D42A27DB-BD31-4B8C-83A1-F6EECF244321}">
-                <p14:modId xmlns:p14="http://schemas.microsoft.com/office/powerpoint/2010/main" val="1931656854"/>
+                <p14:modId xmlns:p14="http://schemas.microsoft.com/office/powerpoint/2010/main" xmlns="" val="1931656854"/>
               </p:ext>
             </p:extLst>
           </p:nvPr>
@@ -23024,10 +23297,78 @@
           </a:graphicData>
         </a:graphic>
       </p:graphicFrame>
+      <p:sp>
+        <p:nvSpPr>
+          <p:cNvPr id="16" name="TextBox 15"/>
+          <p:cNvSpPr txBox="1"/>
+          <p:nvPr/>
+        </p:nvSpPr>
+        <p:spPr>
+          <a:xfrm>
+            <a:off x="5259998" y="6090962"/>
+            <a:ext cx="391454" cy="253916"/>
+          </a:xfrm>
+          <a:prstGeom prst="rect">
+            <a:avLst/>
+          </a:prstGeom>
+          <a:noFill/>
+        </p:spPr>
+        <p:txBody>
+          <a:bodyPr wrap="none" rtlCol="0">
+            <a:spAutoFit/>
+          </a:bodyPr>
+          <a:lstStyle/>
+          <a:p>
+            <a:r>
+              <a:rPr lang="tr-TR" sz="1050" dirty="0" smtClean="0"/>
+              <a:t>[</a:t>
+            </a:r>
+            <a:r>
+              <a:rPr lang="tr-TR" sz="1050" dirty="0" smtClean="0"/>
+              <a:t>16]</a:t>
+            </a:r>
+            <a:endParaRPr lang="tr-TR" sz="1050" dirty="0"/>
+          </a:p>
+        </p:txBody>
+      </p:sp>
+      <p:sp>
+        <p:nvSpPr>
+          <p:cNvPr id="17" name="TextBox 16"/>
+          <p:cNvSpPr txBox="1"/>
+          <p:nvPr/>
+        </p:nvSpPr>
+        <p:spPr>
+          <a:xfrm>
+            <a:off x="3583646" y="4720590"/>
+            <a:ext cx="383438" cy="253916"/>
+          </a:xfrm>
+          <a:prstGeom prst="rect">
+            <a:avLst/>
+          </a:prstGeom>
+          <a:noFill/>
+        </p:spPr>
+        <p:txBody>
+          <a:bodyPr wrap="none" rtlCol="0">
+            <a:spAutoFit/>
+          </a:bodyPr>
+          <a:lstStyle/>
+          <a:p>
+            <a:r>
+              <a:rPr lang="tr-TR" sz="1050" dirty="0" smtClean="0"/>
+              <a:t>[</a:t>
+            </a:r>
+            <a:r>
+              <a:rPr lang="tr-TR" sz="1050" dirty="0" smtClean="0"/>
+              <a:t>15]</a:t>
+            </a:r>
+            <a:endParaRPr lang="tr-TR" sz="1050" dirty="0"/>
+          </a:p>
+        </p:txBody>
+      </p:sp>
     </p:spTree>
     <p:extLst>
       <p:ext uri="{BB962C8B-B14F-4D97-AF65-F5344CB8AC3E}">
-        <p14:creationId xmlns:p14="http://schemas.microsoft.com/office/powerpoint/2010/main" val="2630215700"/>
+        <p14:creationId xmlns:p14="http://schemas.microsoft.com/office/powerpoint/2010/main" xmlns="" val="2630215700"/>
       </p:ext>
     </p:extLst>
   </p:cSld>
@@ -24031,15 +24372,7 @@
           <a:p>
             <a:r>
               <a:rPr lang="tr-TR" sz="1400" dirty="0" smtClean="0"/>
-              <a:t>Open </a:t>
-            </a:r>
-            <a:r>
-              <a:rPr lang="tr-TR" sz="1400" dirty="0" smtClean="0"/>
-              <a:t>loop </a:t>
-            </a:r>
-            <a:r>
-              <a:rPr lang="tr-TR" sz="1400" dirty="0" smtClean="0"/>
-              <a:t>Bode plots</a:t>
+              <a:t>Open loop Bode plots</a:t>
             </a:r>
             <a:endParaRPr lang="tr-TR" sz="1400" dirty="0"/>
           </a:p>
@@ -24445,7 +24778,7 @@
     </p:spTree>
     <p:extLst>
       <p:ext uri="{BB962C8B-B14F-4D97-AF65-F5344CB8AC3E}">
-        <p14:creationId xmlns:p14="http://schemas.microsoft.com/office/powerpoint/2010/main" val="1700721917"/>
+        <p14:creationId xmlns:p14="http://schemas.microsoft.com/office/powerpoint/2010/main" xmlns="" val="1700721917"/>
       </p:ext>
     </p:extLst>
   </p:cSld>
@@ -24621,15 +24954,7 @@
           <a:p>
             <a:r>
               <a:rPr lang="tr-TR" sz="1400" dirty="0" smtClean="0"/>
-              <a:t>The dynamical system of agents  is </a:t>
-            </a:r>
-            <a:r>
-              <a:rPr lang="tr-TR" sz="1400" dirty="0" smtClean="0"/>
-              <a:t>augmented with an artificial error state, </a:t>
-            </a:r>
-            <a:r>
-              <a:rPr lang="tr-TR" sz="1400" dirty="0" smtClean="0"/>
-              <a:t>to design an </a:t>
+              <a:t>The dynamical system of agents  is augmented with an artificial error state, to design an </a:t>
             </a:r>
             <a:r>
               <a:rPr lang="tr-TR" sz="1400" dirty="0"/>
@@ -24924,7 +25249,7 @@
     </p:spTree>
     <p:extLst>
       <p:ext uri="{BB962C8B-B14F-4D97-AF65-F5344CB8AC3E}">
-        <p14:creationId xmlns:p14="http://schemas.microsoft.com/office/powerpoint/2010/main" val="125623688"/>
+        <p14:creationId xmlns:p14="http://schemas.microsoft.com/office/powerpoint/2010/main" xmlns="" val="125623688"/>
       </p:ext>
     </p:extLst>
   </p:cSld>
@@ -25269,144 +25594,266 @@
             </a:r>
             <a:r>
               <a:rPr lang="en-US" sz="1050" dirty="0" smtClean="0"/>
-              <a:t> for a swarm of robots. In ICRA, 2009.</a:t>
+              <a:t> for a swarm of robots. In ICRA, 2009</a:t>
+            </a:r>
+            <a:r>
+              <a:rPr lang="en-US" sz="1050" dirty="0" smtClean="0"/>
+              <a:t>.</a:t>
             </a:r>
             <a:r>
               <a:rPr lang="tr-TR" sz="1050" dirty="0" smtClean="0"/>
-              <a:t>[10] </a:t>
-            </a:r>
-            <a:r>
-              <a:rPr lang="tr-TR" sz="1050" dirty="0" smtClean="0">
-                <a:hlinkClick r:id="rId4"/>
-              </a:rPr>
-              <a:t>http://electronicdesign.com/systems/advanced-robots-swarm-nyc-s-museum-math</a:t>
+              <a:t> [</a:t>
+            </a:r>
+            <a:r>
+              <a:rPr lang="tr-TR" sz="1050" dirty="0" smtClean="0"/>
+              <a:t>9]</a:t>
+            </a:r>
+            <a:r>
+              <a:rPr lang="en-US" sz="1050" dirty="0" smtClean="0"/>
+              <a:t> </a:t>
+            </a:r>
+            <a:r>
+              <a:rPr lang="en-US" sz="1050" dirty="0" err="1" smtClean="0"/>
+              <a:t>Samitha</a:t>
+            </a:r>
+            <a:r>
+              <a:rPr lang="en-US" sz="1050" dirty="0" smtClean="0"/>
+              <a:t> </a:t>
+            </a:r>
+            <a:r>
+              <a:rPr lang="en-US" sz="1050" dirty="0" err="1" smtClean="0"/>
+              <a:t>Ekanayake</a:t>
+            </a:r>
+            <a:r>
+              <a:rPr lang="en-US" sz="1050" dirty="0" smtClean="0"/>
+              <a:t> and </a:t>
+            </a:r>
+            <a:r>
+              <a:rPr lang="en-US" sz="1050" dirty="0" err="1" smtClean="0"/>
+              <a:t>Pubudu</a:t>
+            </a:r>
+            <a:r>
+              <a:rPr lang="en-US" sz="1050" dirty="0" smtClean="0"/>
+              <a:t> </a:t>
+            </a:r>
+            <a:r>
+              <a:rPr lang="en-US" sz="1050" dirty="0" err="1" smtClean="0"/>
+              <a:t>Pathirana</a:t>
+            </a:r>
+            <a:r>
+              <a:rPr lang="en-US" sz="1050" dirty="0" smtClean="0"/>
+              <a:t>. Formations of robotic swarm: An</a:t>
+            </a:r>
+            <a:r>
+              <a:rPr lang="tr-TR" sz="1050" dirty="0" smtClean="0"/>
+              <a:t> </a:t>
+            </a:r>
+            <a:r>
+              <a:rPr lang="en-US" sz="1050" dirty="0" smtClean="0"/>
+              <a:t>artificial force based approach. International Journal of Advanced Robotic Systems,</a:t>
+            </a:r>
+            <a:r>
+              <a:rPr lang="tr-TR" sz="1050" dirty="0" smtClean="0"/>
+              <a:t>7:173–190, 2010</a:t>
+            </a:r>
+          </a:p>
+          <a:p>
+            <a:r>
+              <a:rPr lang="tr-TR" sz="1050" dirty="0" smtClean="0"/>
+              <a:t>[10] http://electronicdesign.com/systems/advanced-robots-swarm-nyc-s-museum-math</a:t>
+            </a:r>
+          </a:p>
+          <a:p>
+            <a:r>
+              <a:rPr lang="tr-TR" sz="1050" dirty="0" smtClean="0"/>
+              <a:t>[11]</a:t>
+            </a:r>
+            <a:r>
+              <a:rPr lang="de-DE" sz="1050" dirty="0" smtClean="0"/>
+              <a:t> Aveek Das, Rafael Fierro, Vijay Kumar, James Ostrowski, John Spletzer, and</a:t>
+            </a:r>
+            <a:r>
+              <a:rPr lang="tr-TR" sz="1050" dirty="0" smtClean="0"/>
+              <a:t> </a:t>
+            </a:r>
+            <a:r>
+              <a:rPr lang="en-US" sz="1050" dirty="0" smtClean="0"/>
+              <a:t>Camilla Taylor. A vision-based formation control framework. IEEE Transactions</a:t>
+            </a:r>
+            <a:r>
+              <a:rPr lang="tr-TR" sz="1050" dirty="0" smtClean="0"/>
+              <a:t> </a:t>
+            </a:r>
+            <a:r>
+              <a:rPr lang="en-US" sz="1050" dirty="0" smtClean="0"/>
+              <a:t>on Robotics and Automation, 18:813–825, 2002.</a:t>
             </a:r>
             <a:endParaRPr lang="tr-TR" sz="1050" dirty="0" smtClean="0"/>
           </a:p>
           <a:p>
             <a:r>
               <a:rPr lang="tr-TR" sz="1050" dirty="0" smtClean="0"/>
-              <a:t>[9]</a:t>
+              <a:t>[12] Kenji </a:t>
+            </a:r>
+            <a:r>
+              <a:rPr lang="tr-TR" sz="1050" dirty="0" smtClean="0"/>
+              <a:t>Shimada and David Gossard. Bubble mesh: Automated triangular </a:t>
+            </a:r>
+            <a:r>
+              <a:rPr lang="tr-TR" sz="1050" dirty="0" smtClean="0"/>
+              <a:t>meshing </a:t>
             </a:r>
             <a:r>
               <a:rPr lang="en-US" sz="1050" dirty="0" smtClean="0"/>
-              <a:t> </a:t>
-            </a:r>
-            <a:r>
-              <a:rPr lang="en-US" sz="1050" dirty="0" err="1" smtClean="0"/>
-              <a:t>Samitha</a:t>
+              <a:t>of </a:t>
             </a:r>
             <a:r>
               <a:rPr lang="en-US" sz="1050" dirty="0" smtClean="0"/>
-              <a:t> </a:t>
-            </a:r>
-            <a:r>
-              <a:rPr lang="en-US" sz="1050" dirty="0" err="1" smtClean="0"/>
-              <a:t>Ekanayake</a:t>
+              <a:t>non-manifold geometry by sphere </a:t>
             </a:r>
             <a:r>
               <a:rPr lang="en-US" sz="1050" dirty="0" smtClean="0"/>
-              <a:t> and </a:t>
-            </a:r>
-            <a:r>
-              <a:rPr lang="en-US" sz="1050" dirty="0" err="1" smtClean="0"/>
-              <a:t>Pubudu</a:t>
+              <a:t>packing</a:t>
             </a:r>
             <a:r>
               <a:rPr lang="en-US" sz="1050" dirty="0" smtClean="0"/>
-              <a:t> </a:t>
-            </a:r>
-            <a:r>
-              <a:rPr lang="en-US" sz="1050" dirty="0" err="1" smtClean="0"/>
-              <a:t>Pathirana</a:t>
+              <a:t>. In ACM Symposium on </a:t>
             </a:r>
             <a:r>
               <a:rPr lang="en-US" sz="1050" dirty="0" smtClean="0"/>
-              <a:t>. Formations of robotic swarm: An</a:t>
+              <a:t>Solid</a:t>
             </a:r>
             <a:r>
               <a:rPr lang="tr-TR" sz="1050" dirty="0" smtClean="0"/>
-              <a:t> </a:t>
-            </a:r>
-            <a:r>
-              <a:rPr lang="en-US" sz="1050" dirty="0" smtClean="0"/>
-              <a:t>artificial force based approach. International Journal of Advanced Robotic Systems,</a:t>
+              <a:t> Modeling </a:t>
             </a:r>
             <a:r>
               <a:rPr lang="tr-TR" sz="1050" dirty="0" smtClean="0"/>
-              <a:t>7:173–190, 2010</a:t>
+              <a:t>and Applications, 1995</a:t>
+            </a:r>
+            <a:r>
+              <a:rPr lang="tr-TR" sz="1050" dirty="0" smtClean="0"/>
+              <a:t>.</a:t>
             </a:r>
           </a:p>
           <a:p>
             <a:r>
               <a:rPr lang="tr-TR" sz="1050" dirty="0" smtClean="0"/>
-              <a:t>[10] http://electronicdesign.com/systems/advanced-robots-swarm-nyc-s-museum-math</a:t>
-            </a:r>
-          </a:p>
-          <a:p>
-            <a:r>
-              <a:rPr lang="tr-TR" sz="1050" dirty="0" smtClean="0"/>
-              <a:t>[11]</a:t>
+              <a:t>[13]</a:t>
+            </a:r>
+            <a:r>
+              <a:rPr lang="en-US" sz="1050" dirty="0" smtClean="0"/>
+              <a:t>John </a:t>
+            </a:r>
+            <a:r>
+              <a:rPr lang="en-US" sz="1050" dirty="0" smtClean="0"/>
+              <a:t>Shier and Paul Bourke. An algorithm for random fractal filling of </a:t>
+            </a:r>
+            <a:r>
+              <a:rPr lang="en-US" sz="1050" dirty="0" smtClean="0"/>
+              <a:t>space.</a:t>
             </a:r>
             <a:r>
               <a:rPr lang="de-DE" sz="1050" dirty="0" smtClean="0"/>
-              <a:t> Aveek Das, Rafael Fierro, Vijay Kumar, James Ostrowski, John Spletzer, and</a:t>
-            </a:r>
-            <a:r>
-              <a:rPr lang="tr-TR" sz="1050" dirty="0" smtClean="0"/>
-              <a:t> </a:t>
-            </a:r>
-            <a:r>
-              <a:rPr lang="en-US" sz="1050" dirty="0" smtClean="0"/>
-              <a:t>Camilla Taylor. A vision-based formation control framework. IEEE Transactions</a:t>
-            </a:r>
-            <a:r>
-              <a:rPr lang="tr-TR" sz="1050" dirty="0" smtClean="0"/>
-              <a:t> </a:t>
-            </a:r>
-            <a:r>
-              <a:rPr lang="en-US" sz="1050" dirty="0" smtClean="0"/>
-              <a:t>on Robotics and Automation, 18:813–825, 2002.</a:t>
+              <a:t>Computer </a:t>
+            </a:r>
+            <a:r>
+              <a:rPr lang="de-DE" sz="1050" dirty="0" smtClean="0"/>
+              <a:t>Graphics Forum, 32:89–97, 2013</a:t>
+            </a:r>
+            <a:r>
+              <a:rPr lang="de-DE" sz="1050" dirty="0" smtClean="0"/>
+              <a:t>.</a:t>
             </a:r>
             <a:endParaRPr lang="tr-TR" sz="1050" dirty="0" smtClean="0"/>
           </a:p>
           <a:p>
             <a:r>
               <a:rPr lang="tr-TR" sz="1050" dirty="0" smtClean="0"/>
-              <a:t>[12]</a:t>
+              <a:t>[14]</a:t>
             </a:r>
             <a:r>
               <a:rPr lang="en-US" sz="1050" dirty="0" smtClean="0"/>
-              <a:t> </a:t>
+              <a:t> Mark Berg, </a:t>
             </a:r>
             <a:r>
               <a:rPr lang="en-US" sz="1050" dirty="0" err="1" smtClean="0"/>
-              <a:t>Yogeswaran</a:t>
+              <a:t>Otfried</a:t>
             </a:r>
             <a:r>
               <a:rPr lang="en-US" sz="1050" dirty="0" smtClean="0"/>
-              <a:t> Mohan and S.G. </a:t>
+              <a:t> Cheong, </a:t>
             </a:r>
             <a:r>
               <a:rPr lang="en-US" sz="1050" dirty="0" err="1" smtClean="0"/>
-              <a:t>Ponnambalam</a:t>
+              <a:t>Kreveld</a:t>
             </a:r>
             <a:r>
               <a:rPr lang="en-US" sz="1050" dirty="0" smtClean="0"/>
-              <a:t>. An extensive review of research</a:t>
+              <a:t>. Marc, and Marc </a:t>
+            </a:r>
+            <a:r>
+              <a:rPr lang="en-US" sz="1050" dirty="0" err="1" smtClean="0"/>
+              <a:t>Overmars</a:t>
+            </a:r>
+            <a:r>
+              <a:rPr lang="en-US" sz="1050" dirty="0" smtClean="0"/>
+              <a:t>. </a:t>
+            </a:r>
+            <a:r>
+              <a:rPr lang="en-US" sz="1050" dirty="0" smtClean="0"/>
+              <a:t>Computational</a:t>
             </a:r>
             <a:r>
               <a:rPr lang="tr-TR" sz="1050" dirty="0" smtClean="0"/>
-              <a:t> </a:t>
+              <a:t>Geometry</a:t>
+            </a:r>
+            <a:r>
+              <a:rPr lang="tr-TR" sz="1050" dirty="0" smtClean="0"/>
+              <a:t>. Springer, 1998</a:t>
+            </a:r>
+            <a:r>
+              <a:rPr lang="tr-TR" sz="1050" dirty="0" smtClean="0"/>
+              <a:t>.</a:t>
+            </a:r>
+          </a:p>
+          <a:p>
+            <a:r>
+              <a:rPr lang="tr-TR" sz="1050" dirty="0" smtClean="0"/>
+              <a:t>[15] </a:t>
+            </a:r>
+            <a:r>
+              <a:rPr lang="tr-TR" sz="1050" dirty="0" smtClean="0"/>
+              <a:t> https</a:t>
+            </a:r>
+            <a:r>
+              <a:rPr lang="tr-TR" sz="1050" dirty="0" smtClean="0"/>
+              <a:t>://nevraa.wordpress.com/2012/08/08/dijkstra-algoritmasi-ile-en-kisa-yol-bulma/</a:t>
+            </a:r>
+            <a:endParaRPr lang="tr-TR" sz="1050" dirty="0" smtClean="0"/>
+          </a:p>
+          <a:p>
+            <a:r>
+              <a:rPr lang="tr-TR" sz="1050" dirty="0" smtClean="0"/>
+              <a:t>[16]</a:t>
+            </a:r>
+            <a:r>
+              <a:rPr lang="tr-TR" sz="1050" dirty="0" smtClean="0"/>
+              <a:t> Jop Frederik Sibeyn. Graph algorithms. https://www8.cs.umu.se/ </a:t>
+            </a:r>
+            <a:r>
+              <a:rPr lang="tr-TR" sz="1050" dirty="0" smtClean="0"/>
+              <a:t>jopsi/dinf504/</a:t>
             </a:r>
             <a:r>
               <a:rPr lang="en-US" sz="1050" dirty="0" smtClean="0"/>
-              <a:t>in swarm robotics. In World Congress on Nature &amp; Biologically Inspired Computing,</a:t>
-            </a:r>
-            <a:r>
-              <a:rPr lang="tr-TR" sz="1050" dirty="0" smtClean="0"/>
-              <a:t> NaBIC, 2009.</a:t>
-            </a:r>
+              <a:t>chap14.shtml</a:t>
+            </a:r>
+            <a:r>
+              <a:rPr lang="en-US" sz="1050" dirty="0" smtClean="0"/>
+              <a:t>, last visited on April 2016.</a:t>
+            </a:r>
+            <a:endParaRPr lang="tr-TR" sz="1050" dirty="0" smtClean="0"/>
           </a:p>
           <a:p>
             <a:pPr>
@@ -25485,7 +25932,7 @@
     </p:spTree>
     <p:extLst>
       <p:ext uri="{BB962C8B-B14F-4D97-AF65-F5344CB8AC3E}">
-        <p14:creationId xmlns:p14="http://schemas.microsoft.com/office/powerpoint/2010/main" val="1601229741"/>
+        <p14:creationId xmlns:p14="http://schemas.microsoft.com/office/powerpoint/2010/main" xmlns="" val="1601229741"/>
       </p:ext>
     </p:extLst>
   </p:cSld>
@@ -25522,7 +25969,7 @@
     </p:spTree>
     <p:extLst>
       <p:ext uri="{BB962C8B-B14F-4D97-AF65-F5344CB8AC3E}">
-        <p14:creationId xmlns:p14="http://schemas.microsoft.com/office/powerpoint/2010/main" val="3835474893"/>
+        <p14:creationId xmlns:p14="http://schemas.microsoft.com/office/powerpoint/2010/main" xmlns="" val="3835474893"/>
       </p:ext>
     </p:extLst>
   </p:cSld>
@@ -25734,7 +26181,7 @@
     </p:spTree>
     <p:extLst>
       <p:ext uri="{BB962C8B-B14F-4D97-AF65-F5344CB8AC3E}">
-        <p14:creationId xmlns:p14="http://schemas.microsoft.com/office/powerpoint/2010/main" val="1601229741"/>
+        <p14:creationId xmlns:p14="http://schemas.microsoft.com/office/powerpoint/2010/main" xmlns="" val="1601229741"/>
       </p:ext>
     </p:extLst>
   </p:cSld>
@@ -26066,7 +26513,7 @@
     </p:spTree>
     <p:extLst>
       <p:ext uri="{BB962C8B-B14F-4D97-AF65-F5344CB8AC3E}">
-        <p14:creationId xmlns:p14="http://schemas.microsoft.com/office/powerpoint/2010/main" val="1601229741"/>
+        <p14:creationId xmlns:p14="http://schemas.microsoft.com/office/powerpoint/2010/main" xmlns="" val="1601229741"/>
       </p:ext>
     </p:extLst>
   </p:cSld>
@@ -26366,7 +26813,7 @@
     </p:spTree>
     <p:extLst>
       <p:ext uri="{BB962C8B-B14F-4D97-AF65-F5344CB8AC3E}">
-        <p14:creationId xmlns:p14="http://schemas.microsoft.com/office/powerpoint/2010/main" val="1601229741"/>
+        <p14:creationId xmlns:p14="http://schemas.microsoft.com/office/powerpoint/2010/main" xmlns="" val="1601229741"/>
       </p:ext>
     </p:extLst>
   </p:cSld>
@@ -26684,7 +27131,7 @@
     </p:spTree>
     <p:extLst>
       <p:ext uri="{BB962C8B-B14F-4D97-AF65-F5344CB8AC3E}">
-        <p14:creationId xmlns:p14="http://schemas.microsoft.com/office/powerpoint/2010/main" val="1601229741"/>
+        <p14:creationId xmlns:p14="http://schemas.microsoft.com/office/powerpoint/2010/main" xmlns="" val="1601229741"/>
       </p:ext>
     </p:extLst>
   </p:cSld>
@@ -26994,7 +27441,7 @@
     </p:spTree>
     <p:extLst>
       <p:ext uri="{BB962C8B-B14F-4D97-AF65-F5344CB8AC3E}">
-        <p14:creationId xmlns:p14="http://schemas.microsoft.com/office/powerpoint/2010/main" val="1601229741"/>
+        <p14:creationId xmlns:p14="http://schemas.microsoft.com/office/powerpoint/2010/main" xmlns="" val="1601229741"/>
       </p:ext>
     </p:extLst>
   </p:cSld>
@@ -28253,7 +28700,7 @@
     </p:spTree>
     <p:extLst>
       <p:ext uri="{BB962C8B-B14F-4D97-AF65-F5344CB8AC3E}">
-        <p14:creationId xmlns:p14="http://schemas.microsoft.com/office/powerpoint/2010/main" val="1601229741"/>
+        <p14:creationId xmlns:p14="http://schemas.microsoft.com/office/powerpoint/2010/main" xmlns="" val="1601229741"/>
       </p:ext>
     </p:extLst>
   </p:cSld>
@@ -31975,7 +32422,7 @@
     </p:spTree>
     <p:extLst>
       <p:ext uri="{BB962C8B-B14F-4D97-AF65-F5344CB8AC3E}">
-        <p14:creationId xmlns:p14="http://schemas.microsoft.com/office/powerpoint/2010/main" val="1601229741"/>
+        <p14:creationId xmlns:p14="http://schemas.microsoft.com/office/powerpoint/2010/main" xmlns="" val="1601229741"/>
       </p:ext>
     </p:extLst>
   </p:cSld>

</xml_diff>